<commit_message>
update poster draft close #110
update poster draft
</commit_message>
<xml_diff>
--- a/Poster/Stu_data Poster.pptx
+++ b/Poster/Stu_data Poster.pptx
@@ -226,7 +226,7 @@
             <a:fld id="{59D7332B-1442-4F8C-A160-0D5EB57A24C0}" type="datetimeFigureOut">
               <a:rPr lang="en-AU" smtClean="0"/>
               <a:pPr/>
-              <a:t>5/10/17</a:t>
+              <a:t>7/10/17</a:t>
             </a:fld>
             <a:endParaRPr lang="en-AU"/>
           </a:p>
@@ -393,7 +393,7 @@
             <a:fld id="{33744820-F59C-490B-A624-3CEFDFE2581B}" type="datetimeFigureOut">
               <a:rPr lang="en-AU" smtClean="0"/>
               <a:pPr/>
-              <a:t>5/10/17</a:t>
+              <a:t>7/10/17</a:t>
             </a:fld>
             <a:endParaRPr lang="en-AU"/>
           </a:p>
@@ -1163,7 +1163,7 @@
         </p:nvSpPr>
         <p:spPr>
           <a:xfrm>
-            <a:off x="9268533" y="1054110"/>
+            <a:off x="9268533" y="885775"/>
             <a:ext cx="28515168" cy="1508105"/>
           </a:xfrm>
           <a:prstGeom prst="rect">
@@ -1205,8 +1205,8 @@
         </p:nvSpPr>
         <p:spPr>
           <a:xfrm>
-            <a:off x="310682" y="4945771"/>
-            <a:ext cx="11095074" cy="15985776"/>
+            <a:off x="263216" y="4971361"/>
+            <a:ext cx="11273568" cy="16134012"/>
           </a:xfrm>
           <a:custGeom>
             <a:avLst/>
@@ -1301,6 +1301,78 @@
               <a:gd name="connsiteY7" fmla="*/ 14136560 h 15985776"/>
               <a:gd name="connsiteX8" fmla="*/ 0 w 11095074"/>
               <a:gd name="connsiteY8" fmla="*/ 1239616 h 15985776"/>
+              <a:gd name="connsiteX0" fmla="*/ 0 w 11095074"/>
+              <a:gd name="connsiteY0" fmla="*/ 1239616 h 15985776"/>
+              <a:gd name="connsiteX1" fmla="*/ 1849216 w 11095074"/>
+              <a:gd name="connsiteY1" fmla="*/ 0 h 15985776"/>
+              <a:gd name="connsiteX2" fmla="*/ 9245858 w 11095074"/>
+              <a:gd name="connsiteY2" fmla="*/ 0 h 15985776"/>
+              <a:gd name="connsiteX3" fmla="*/ 11095074 w 11095074"/>
+              <a:gd name="connsiteY3" fmla="*/ 1849216 h 15985776"/>
+              <a:gd name="connsiteX4" fmla="*/ 11095074 w 11095074"/>
+              <a:gd name="connsiteY4" fmla="*/ 14136560 h 15985776"/>
+              <a:gd name="connsiteX5" fmla="*/ 9245858 w 11095074"/>
+              <a:gd name="connsiteY5" fmla="*/ 15985776 h 15985776"/>
+              <a:gd name="connsiteX6" fmla="*/ 1849216 w 11095074"/>
+              <a:gd name="connsiteY6" fmla="*/ 15985776 h 15985776"/>
+              <a:gd name="connsiteX7" fmla="*/ 0 w 11095074"/>
+              <a:gd name="connsiteY7" fmla="*/ 14136560 h 15985776"/>
+              <a:gd name="connsiteX8" fmla="*/ 0 w 11095074"/>
+              <a:gd name="connsiteY8" fmla="*/ 1239616 h 15985776"/>
+              <a:gd name="connsiteX0" fmla="*/ 0 w 11095074"/>
+              <a:gd name="connsiteY0" fmla="*/ 1239616 h 15985776"/>
+              <a:gd name="connsiteX1" fmla="*/ 1849216 w 11095074"/>
+              <a:gd name="connsiteY1" fmla="*/ 0 h 15985776"/>
+              <a:gd name="connsiteX2" fmla="*/ 9245858 w 11095074"/>
+              <a:gd name="connsiteY2" fmla="*/ 0 h 15985776"/>
+              <a:gd name="connsiteX3" fmla="*/ 11095074 w 11095074"/>
+              <a:gd name="connsiteY3" fmla="*/ 1849216 h 15985776"/>
+              <a:gd name="connsiteX4" fmla="*/ 11095074 w 11095074"/>
+              <a:gd name="connsiteY4" fmla="*/ 14136560 h 15985776"/>
+              <a:gd name="connsiteX5" fmla="*/ 9245858 w 11095074"/>
+              <a:gd name="connsiteY5" fmla="*/ 15985776 h 15985776"/>
+              <a:gd name="connsiteX6" fmla="*/ 1849216 w 11095074"/>
+              <a:gd name="connsiteY6" fmla="*/ 15985776 h 15985776"/>
+              <a:gd name="connsiteX7" fmla="*/ 0 w 11095074"/>
+              <a:gd name="connsiteY7" fmla="*/ 14136560 h 15985776"/>
+              <a:gd name="connsiteX8" fmla="*/ 0 w 11095074"/>
+              <a:gd name="connsiteY8" fmla="*/ 1239616 h 15985776"/>
+              <a:gd name="connsiteX0" fmla="*/ 43543 w 11138617"/>
+              <a:gd name="connsiteY0" fmla="*/ 1239616 h 15985776"/>
+              <a:gd name="connsiteX1" fmla="*/ 1892759 w 11138617"/>
+              <a:gd name="connsiteY1" fmla="*/ 0 h 15985776"/>
+              <a:gd name="connsiteX2" fmla="*/ 9289401 w 11138617"/>
+              <a:gd name="connsiteY2" fmla="*/ 0 h 15985776"/>
+              <a:gd name="connsiteX3" fmla="*/ 11138617 w 11138617"/>
+              <a:gd name="connsiteY3" fmla="*/ 1849216 h 15985776"/>
+              <a:gd name="connsiteX4" fmla="*/ 11138617 w 11138617"/>
+              <a:gd name="connsiteY4" fmla="*/ 14136560 h 15985776"/>
+              <a:gd name="connsiteX5" fmla="*/ 9289401 w 11138617"/>
+              <a:gd name="connsiteY5" fmla="*/ 15985776 h 15985776"/>
+              <a:gd name="connsiteX6" fmla="*/ 1892759 w 11138617"/>
+              <a:gd name="connsiteY6" fmla="*/ 15985776 h 15985776"/>
+              <a:gd name="connsiteX7" fmla="*/ 0 w 11138617"/>
+              <a:gd name="connsiteY7" fmla="*/ 14920332 h 15985776"/>
+              <a:gd name="connsiteX8" fmla="*/ 43543 w 11138617"/>
+              <a:gd name="connsiteY8" fmla="*/ 1239616 h 15985776"/>
+              <a:gd name="connsiteX0" fmla="*/ 43543 w 11138617"/>
+              <a:gd name="connsiteY0" fmla="*/ 1239616 h 15985776"/>
+              <a:gd name="connsiteX1" fmla="*/ 1892759 w 11138617"/>
+              <a:gd name="connsiteY1" fmla="*/ 0 h 15985776"/>
+              <a:gd name="connsiteX2" fmla="*/ 9289401 w 11138617"/>
+              <a:gd name="connsiteY2" fmla="*/ 0 h 15985776"/>
+              <a:gd name="connsiteX3" fmla="*/ 11138617 w 11138617"/>
+              <a:gd name="connsiteY3" fmla="*/ 1849216 h 15985776"/>
+              <a:gd name="connsiteX4" fmla="*/ 11138617 w 11138617"/>
+              <a:gd name="connsiteY4" fmla="*/ 14136560 h 15985776"/>
+              <a:gd name="connsiteX5" fmla="*/ 9289401 w 11138617"/>
+              <a:gd name="connsiteY5" fmla="*/ 15985776 h 15985776"/>
+              <a:gd name="connsiteX6" fmla="*/ 1892759 w 11138617"/>
+              <a:gd name="connsiteY6" fmla="*/ 15985776 h 15985776"/>
+              <a:gd name="connsiteX7" fmla="*/ 0 w 11138617"/>
+              <a:gd name="connsiteY7" fmla="*/ 14920332 h 15985776"/>
+              <a:gd name="connsiteX8" fmla="*/ 43543 w 11138617"/>
+              <a:gd name="connsiteY8" fmla="*/ 1239616 h 15985776"/>
             </a:gdLst>
             <a:ahLst/>
             <a:cxnLst>
@@ -1334,41 +1406,41 @@
             </a:cxnLst>
             <a:rect l="l" t="t" r="r" b="b"/>
             <a:pathLst>
-              <a:path w="11095074" h="15985776">
+              <a:path w="11138617" h="15985776">
                 <a:moveTo>
-                  <a:pt x="0" y="1239616"/>
+                  <a:pt x="43543" y="1239616"/>
                 </a:moveTo>
                 <a:cubicBezTo>
-                  <a:pt x="0" y="218322"/>
-                  <a:pt x="15122" y="50800"/>
-                  <a:pt x="1849216" y="0"/>
+                  <a:pt x="43543" y="218322"/>
+                  <a:pt x="58665" y="50800"/>
+                  <a:pt x="1892759" y="0"/>
                 </a:cubicBezTo>
                 <a:lnTo>
-                  <a:pt x="9245858" y="0"/>
+                  <a:pt x="9289401" y="0"/>
                 </a:lnTo>
                 <a:cubicBezTo>
-                  <a:pt x="11105352" y="76200"/>
-                  <a:pt x="11044274" y="91322"/>
-                  <a:pt x="11095074" y="1849216"/>
+                  <a:pt x="11148895" y="76200"/>
+                  <a:pt x="11087817" y="91322"/>
+                  <a:pt x="11138617" y="1849216"/>
                 </a:cubicBezTo>
                 <a:lnTo>
-                  <a:pt x="11095074" y="14136560"/>
+                  <a:pt x="11138617" y="14136560"/>
                 </a:lnTo>
                 <a:cubicBezTo>
-                  <a:pt x="11095074" y="15157854"/>
-                  <a:pt x="10267152" y="15985776"/>
-                  <a:pt x="9245858" y="15985776"/>
+                  <a:pt x="11051532" y="15810997"/>
+                  <a:pt x="11050924" y="15985776"/>
+                  <a:pt x="9289401" y="15985776"/>
                 </a:cubicBezTo>
                 <a:lnTo>
-                  <a:pt x="1849216" y="15985776"/>
+                  <a:pt x="1892759" y="15985776"/>
                 </a:lnTo>
                 <a:cubicBezTo>
-                  <a:pt x="827922" y="15985776"/>
-                  <a:pt x="0" y="15157854"/>
-                  <a:pt x="0" y="14136560"/>
+                  <a:pt x="131236" y="15985776"/>
+                  <a:pt x="0" y="15941626"/>
+                  <a:pt x="0" y="14920332"/>
                 </a:cubicBezTo>
                 <a:lnTo>
-                  <a:pt x="0" y="1239616"/>
+                  <a:pt x="43543" y="1239616"/>
                 </a:lnTo>
                 <a:close/>
               </a:path>
@@ -1419,12 +1491,265 @@
         </p:nvSpPr>
         <p:spPr>
           <a:xfrm>
-            <a:off x="11680801" y="4992896"/>
-            <a:ext cx="18146016" cy="7588425"/>
+            <a:off x="11680801" y="4992897"/>
+            <a:ext cx="18146016" cy="7607548"/>
           </a:xfrm>
-          <a:prstGeom prst="roundRect">
+          <a:custGeom>
             <a:avLst/>
-          </a:prstGeom>
+            <a:gdLst>
+              <a:gd name="connsiteX0" fmla="*/ 0 w 18146016"/>
+              <a:gd name="connsiteY0" fmla="*/ 1264763 h 7588425"/>
+              <a:gd name="connsiteX1" fmla="*/ 1264763 w 18146016"/>
+              <a:gd name="connsiteY1" fmla="*/ 0 h 7588425"/>
+              <a:gd name="connsiteX2" fmla="*/ 16881253 w 18146016"/>
+              <a:gd name="connsiteY2" fmla="*/ 0 h 7588425"/>
+              <a:gd name="connsiteX3" fmla="*/ 18146016 w 18146016"/>
+              <a:gd name="connsiteY3" fmla="*/ 1264763 h 7588425"/>
+              <a:gd name="connsiteX4" fmla="*/ 18146016 w 18146016"/>
+              <a:gd name="connsiteY4" fmla="*/ 6323662 h 7588425"/>
+              <a:gd name="connsiteX5" fmla="*/ 16881253 w 18146016"/>
+              <a:gd name="connsiteY5" fmla="*/ 7588425 h 7588425"/>
+              <a:gd name="connsiteX6" fmla="*/ 1264763 w 18146016"/>
+              <a:gd name="connsiteY6" fmla="*/ 7588425 h 7588425"/>
+              <a:gd name="connsiteX7" fmla="*/ 0 w 18146016"/>
+              <a:gd name="connsiteY7" fmla="*/ 6323662 h 7588425"/>
+              <a:gd name="connsiteX8" fmla="*/ 0 w 18146016"/>
+              <a:gd name="connsiteY8" fmla="*/ 1264763 h 7588425"/>
+              <a:gd name="connsiteX0" fmla="*/ 0 w 18146016"/>
+              <a:gd name="connsiteY0" fmla="*/ 1264763 h 7588425"/>
+              <a:gd name="connsiteX1" fmla="*/ 1264763 w 18146016"/>
+              <a:gd name="connsiteY1" fmla="*/ 0 h 7588425"/>
+              <a:gd name="connsiteX2" fmla="*/ 16881253 w 18146016"/>
+              <a:gd name="connsiteY2" fmla="*/ 0 h 7588425"/>
+              <a:gd name="connsiteX3" fmla="*/ 18146016 w 18146016"/>
+              <a:gd name="connsiteY3" fmla="*/ 1264763 h 7588425"/>
+              <a:gd name="connsiteX4" fmla="*/ 18146016 w 18146016"/>
+              <a:gd name="connsiteY4" fmla="*/ 6323662 h 7588425"/>
+              <a:gd name="connsiteX5" fmla="*/ 16881253 w 18146016"/>
+              <a:gd name="connsiteY5" fmla="*/ 7588425 h 7588425"/>
+              <a:gd name="connsiteX6" fmla="*/ 1264763 w 18146016"/>
+              <a:gd name="connsiteY6" fmla="*/ 7588425 h 7588425"/>
+              <a:gd name="connsiteX7" fmla="*/ 0 w 18146016"/>
+              <a:gd name="connsiteY7" fmla="*/ 6323662 h 7588425"/>
+              <a:gd name="connsiteX8" fmla="*/ 0 w 18146016"/>
+              <a:gd name="connsiteY8" fmla="*/ 1264763 h 7588425"/>
+              <a:gd name="connsiteX0" fmla="*/ 0 w 18146016"/>
+              <a:gd name="connsiteY0" fmla="*/ 1264763 h 7588425"/>
+              <a:gd name="connsiteX1" fmla="*/ 1264763 w 18146016"/>
+              <a:gd name="connsiteY1" fmla="*/ 0 h 7588425"/>
+              <a:gd name="connsiteX2" fmla="*/ 16881253 w 18146016"/>
+              <a:gd name="connsiteY2" fmla="*/ 0 h 7588425"/>
+              <a:gd name="connsiteX3" fmla="*/ 18146016 w 18146016"/>
+              <a:gd name="connsiteY3" fmla="*/ 1264763 h 7588425"/>
+              <a:gd name="connsiteX4" fmla="*/ 18146016 w 18146016"/>
+              <a:gd name="connsiteY4" fmla="*/ 6323662 h 7588425"/>
+              <a:gd name="connsiteX5" fmla="*/ 16881253 w 18146016"/>
+              <a:gd name="connsiteY5" fmla="*/ 7588425 h 7588425"/>
+              <a:gd name="connsiteX6" fmla="*/ 1264763 w 18146016"/>
+              <a:gd name="connsiteY6" fmla="*/ 7588425 h 7588425"/>
+              <a:gd name="connsiteX7" fmla="*/ 0 w 18146016"/>
+              <a:gd name="connsiteY7" fmla="*/ 6323662 h 7588425"/>
+              <a:gd name="connsiteX8" fmla="*/ 0 w 18146016"/>
+              <a:gd name="connsiteY8" fmla="*/ 1264763 h 7588425"/>
+              <a:gd name="connsiteX0" fmla="*/ 0 w 18146016"/>
+              <a:gd name="connsiteY0" fmla="*/ 1264763 h 7588425"/>
+              <a:gd name="connsiteX1" fmla="*/ 1264763 w 18146016"/>
+              <a:gd name="connsiteY1" fmla="*/ 0 h 7588425"/>
+              <a:gd name="connsiteX2" fmla="*/ 16881253 w 18146016"/>
+              <a:gd name="connsiteY2" fmla="*/ 0 h 7588425"/>
+              <a:gd name="connsiteX3" fmla="*/ 18146016 w 18146016"/>
+              <a:gd name="connsiteY3" fmla="*/ 1264763 h 7588425"/>
+              <a:gd name="connsiteX4" fmla="*/ 18146016 w 18146016"/>
+              <a:gd name="connsiteY4" fmla="*/ 6323662 h 7588425"/>
+              <a:gd name="connsiteX5" fmla="*/ 16881253 w 18146016"/>
+              <a:gd name="connsiteY5" fmla="*/ 7588425 h 7588425"/>
+              <a:gd name="connsiteX6" fmla="*/ 1264763 w 18146016"/>
+              <a:gd name="connsiteY6" fmla="*/ 7588425 h 7588425"/>
+              <a:gd name="connsiteX7" fmla="*/ 0 w 18146016"/>
+              <a:gd name="connsiteY7" fmla="*/ 6323662 h 7588425"/>
+              <a:gd name="connsiteX8" fmla="*/ 0 w 18146016"/>
+              <a:gd name="connsiteY8" fmla="*/ 1264763 h 7588425"/>
+              <a:gd name="connsiteX0" fmla="*/ 0 w 18146016"/>
+              <a:gd name="connsiteY0" fmla="*/ 1264763 h 7588425"/>
+              <a:gd name="connsiteX1" fmla="*/ 1264763 w 18146016"/>
+              <a:gd name="connsiteY1" fmla="*/ 0 h 7588425"/>
+              <a:gd name="connsiteX2" fmla="*/ 16881253 w 18146016"/>
+              <a:gd name="connsiteY2" fmla="*/ 0 h 7588425"/>
+              <a:gd name="connsiteX3" fmla="*/ 18146016 w 18146016"/>
+              <a:gd name="connsiteY3" fmla="*/ 1264763 h 7588425"/>
+              <a:gd name="connsiteX4" fmla="*/ 18146016 w 18146016"/>
+              <a:gd name="connsiteY4" fmla="*/ 6323662 h 7588425"/>
+              <a:gd name="connsiteX5" fmla="*/ 16881253 w 18146016"/>
+              <a:gd name="connsiteY5" fmla="*/ 7588425 h 7588425"/>
+              <a:gd name="connsiteX6" fmla="*/ 1264763 w 18146016"/>
+              <a:gd name="connsiteY6" fmla="*/ 7588425 h 7588425"/>
+              <a:gd name="connsiteX7" fmla="*/ 0 w 18146016"/>
+              <a:gd name="connsiteY7" fmla="*/ 6323662 h 7588425"/>
+              <a:gd name="connsiteX8" fmla="*/ 0 w 18146016"/>
+              <a:gd name="connsiteY8" fmla="*/ 1264763 h 7588425"/>
+              <a:gd name="connsiteX0" fmla="*/ 0 w 18146016"/>
+              <a:gd name="connsiteY0" fmla="*/ 1264763 h 7588425"/>
+              <a:gd name="connsiteX1" fmla="*/ 1264763 w 18146016"/>
+              <a:gd name="connsiteY1" fmla="*/ 0 h 7588425"/>
+              <a:gd name="connsiteX2" fmla="*/ 16881253 w 18146016"/>
+              <a:gd name="connsiteY2" fmla="*/ 0 h 7588425"/>
+              <a:gd name="connsiteX3" fmla="*/ 18146016 w 18146016"/>
+              <a:gd name="connsiteY3" fmla="*/ 1264763 h 7588425"/>
+              <a:gd name="connsiteX4" fmla="*/ 18146016 w 18146016"/>
+              <a:gd name="connsiteY4" fmla="*/ 6323662 h 7588425"/>
+              <a:gd name="connsiteX5" fmla="*/ 16881253 w 18146016"/>
+              <a:gd name="connsiteY5" fmla="*/ 7588425 h 7588425"/>
+              <a:gd name="connsiteX6" fmla="*/ 1264763 w 18146016"/>
+              <a:gd name="connsiteY6" fmla="*/ 7588425 h 7588425"/>
+              <a:gd name="connsiteX7" fmla="*/ 0 w 18146016"/>
+              <a:gd name="connsiteY7" fmla="*/ 6323662 h 7588425"/>
+              <a:gd name="connsiteX8" fmla="*/ 0 w 18146016"/>
+              <a:gd name="connsiteY8" fmla="*/ 1264763 h 7588425"/>
+              <a:gd name="connsiteX0" fmla="*/ 167 w 18146183"/>
+              <a:gd name="connsiteY0" fmla="*/ 1264763 h 7588425"/>
+              <a:gd name="connsiteX1" fmla="*/ 1264930 w 18146183"/>
+              <a:gd name="connsiteY1" fmla="*/ 0 h 7588425"/>
+              <a:gd name="connsiteX2" fmla="*/ 16881420 w 18146183"/>
+              <a:gd name="connsiteY2" fmla="*/ 0 h 7588425"/>
+              <a:gd name="connsiteX3" fmla="*/ 18146183 w 18146183"/>
+              <a:gd name="connsiteY3" fmla="*/ 1264763 h 7588425"/>
+              <a:gd name="connsiteX4" fmla="*/ 18146183 w 18146183"/>
+              <a:gd name="connsiteY4" fmla="*/ 6323662 h 7588425"/>
+              <a:gd name="connsiteX5" fmla="*/ 16881420 w 18146183"/>
+              <a:gd name="connsiteY5" fmla="*/ 7588425 h 7588425"/>
+              <a:gd name="connsiteX6" fmla="*/ 1264930 w 18146183"/>
+              <a:gd name="connsiteY6" fmla="*/ 7588425 h 7588425"/>
+              <a:gd name="connsiteX7" fmla="*/ 167 w 18146183"/>
+              <a:gd name="connsiteY7" fmla="*/ 6323662 h 7588425"/>
+              <a:gd name="connsiteX8" fmla="*/ 167 w 18146183"/>
+              <a:gd name="connsiteY8" fmla="*/ 1264763 h 7588425"/>
+              <a:gd name="connsiteX0" fmla="*/ 0 w 18146016"/>
+              <a:gd name="connsiteY0" fmla="*/ 1264763 h 7588425"/>
+              <a:gd name="connsiteX1" fmla="*/ 1264763 w 18146016"/>
+              <a:gd name="connsiteY1" fmla="*/ 0 h 7588425"/>
+              <a:gd name="connsiteX2" fmla="*/ 16881253 w 18146016"/>
+              <a:gd name="connsiteY2" fmla="*/ 0 h 7588425"/>
+              <a:gd name="connsiteX3" fmla="*/ 18146016 w 18146016"/>
+              <a:gd name="connsiteY3" fmla="*/ 1264763 h 7588425"/>
+              <a:gd name="connsiteX4" fmla="*/ 18146016 w 18146016"/>
+              <a:gd name="connsiteY4" fmla="*/ 6323662 h 7588425"/>
+              <a:gd name="connsiteX5" fmla="*/ 16881253 w 18146016"/>
+              <a:gd name="connsiteY5" fmla="*/ 7588425 h 7588425"/>
+              <a:gd name="connsiteX6" fmla="*/ 1264763 w 18146016"/>
+              <a:gd name="connsiteY6" fmla="*/ 7588425 h 7588425"/>
+              <a:gd name="connsiteX7" fmla="*/ 0 w 18146016"/>
+              <a:gd name="connsiteY7" fmla="*/ 6323662 h 7588425"/>
+              <a:gd name="connsiteX8" fmla="*/ 0 w 18146016"/>
+              <a:gd name="connsiteY8" fmla="*/ 1264763 h 7588425"/>
+              <a:gd name="connsiteX0" fmla="*/ 0 w 18146016"/>
+              <a:gd name="connsiteY0" fmla="*/ 1264763 h 7591661"/>
+              <a:gd name="connsiteX1" fmla="*/ 1264763 w 18146016"/>
+              <a:gd name="connsiteY1" fmla="*/ 0 h 7591661"/>
+              <a:gd name="connsiteX2" fmla="*/ 16881253 w 18146016"/>
+              <a:gd name="connsiteY2" fmla="*/ 0 h 7591661"/>
+              <a:gd name="connsiteX3" fmla="*/ 18146016 w 18146016"/>
+              <a:gd name="connsiteY3" fmla="*/ 1264763 h 7591661"/>
+              <a:gd name="connsiteX4" fmla="*/ 18146016 w 18146016"/>
+              <a:gd name="connsiteY4" fmla="*/ 6323662 h 7591661"/>
+              <a:gd name="connsiteX5" fmla="*/ 16881253 w 18146016"/>
+              <a:gd name="connsiteY5" fmla="*/ 7588425 h 7591661"/>
+              <a:gd name="connsiteX6" fmla="*/ 1264763 w 18146016"/>
+              <a:gd name="connsiteY6" fmla="*/ 7588425 h 7591661"/>
+              <a:gd name="connsiteX7" fmla="*/ 0 w 18146016"/>
+              <a:gd name="connsiteY7" fmla="*/ 6323662 h 7591661"/>
+              <a:gd name="connsiteX8" fmla="*/ 0 w 18146016"/>
+              <a:gd name="connsiteY8" fmla="*/ 1264763 h 7591661"/>
+              <a:gd name="connsiteX0" fmla="*/ 0 w 18146016"/>
+              <a:gd name="connsiteY0" fmla="*/ 1264763 h 7607548"/>
+              <a:gd name="connsiteX1" fmla="*/ 1264763 w 18146016"/>
+              <a:gd name="connsiteY1" fmla="*/ 0 h 7607548"/>
+              <a:gd name="connsiteX2" fmla="*/ 16881253 w 18146016"/>
+              <a:gd name="connsiteY2" fmla="*/ 0 h 7607548"/>
+              <a:gd name="connsiteX3" fmla="*/ 18146016 w 18146016"/>
+              <a:gd name="connsiteY3" fmla="*/ 1264763 h 7607548"/>
+              <a:gd name="connsiteX4" fmla="*/ 18146016 w 18146016"/>
+              <a:gd name="connsiteY4" fmla="*/ 6323662 h 7607548"/>
+              <a:gd name="connsiteX5" fmla="*/ 16881253 w 18146016"/>
+              <a:gd name="connsiteY5" fmla="*/ 7588425 h 7607548"/>
+              <a:gd name="connsiteX6" fmla="*/ 1264763 w 18146016"/>
+              <a:gd name="connsiteY6" fmla="*/ 7588425 h 7607548"/>
+              <a:gd name="connsiteX7" fmla="*/ 0 w 18146016"/>
+              <a:gd name="connsiteY7" fmla="*/ 6323662 h 7607548"/>
+              <a:gd name="connsiteX8" fmla="*/ 0 w 18146016"/>
+              <a:gd name="connsiteY8" fmla="*/ 1264763 h 7607548"/>
+            </a:gdLst>
+            <a:ahLst/>
+            <a:cxnLst>
+              <a:cxn ang="0">
+                <a:pos x="connsiteX0" y="connsiteY0"/>
+              </a:cxn>
+              <a:cxn ang="0">
+                <a:pos x="connsiteX1" y="connsiteY1"/>
+              </a:cxn>
+              <a:cxn ang="0">
+                <a:pos x="connsiteX2" y="connsiteY2"/>
+              </a:cxn>
+              <a:cxn ang="0">
+                <a:pos x="connsiteX3" y="connsiteY3"/>
+              </a:cxn>
+              <a:cxn ang="0">
+                <a:pos x="connsiteX4" y="connsiteY4"/>
+              </a:cxn>
+              <a:cxn ang="0">
+                <a:pos x="connsiteX5" y="connsiteY5"/>
+              </a:cxn>
+              <a:cxn ang="0">
+                <a:pos x="connsiteX6" y="connsiteY6"/>
+              </a:cxn>
+              <a:cxn ang="0">
+                <a:pos x="connsiteX7" y="connsiteY7"/>
+              </a:cxn>
+              <a:cxn ang="0">
+                <a:pos x="connsiteX8" y="connsiteY8"/>
+              </a:cxn>
+            </a:cxnLst>
+            <a:rect l="l" t="t" r="r" b="b"/>
+            <a:pathLst>
+              <a:path w="18146016" h="7607548">
+                <a:moveTo>
+                  <a:pt x="0" y="1264763"/>
+                </a:moveTo>
+                <a:cubicBezTo>
+                  <a:pt x="43542" y="-86889"/>
+                  <a:pt x="-43346" y="87086"/>
+                  <a:pt x="1264763" y="0"/>
+                </a:cubicBezTo>
+                <a:lnTo>
+                  <a:pt x="16881253" y="0"/>
+                </a:lnTo>
+                <a:cubicBezTo>
+                  <a:pt x="18145819" y="43543"/>
+                  <a:pt x="18058930" y="197"/>
+                  <a:pt x="18146016" y="1264763"/>
+                </a:cubicBezTo>
+                <a:lnTo>
+                  <a:pt x="18146016" y="6323662"/>
+                </a:lnTo>
+                <a:cubicBezTo>
+                  <a:pt x="18102473" y="7588228"/>
+                  <a:pt x="18189362" y="7544882"/>
+                  <a:pt x="16881253" y="7588425"/>
+                </a:cubicBezTo>
+                <a:lnTo>
+                  <a:pt x="1264763" y="7588425"/>
+                </a:lnTo>
+                <a:cubicBezTo>
+                  <a:pt x="87283" y="7631968"/>
+                  <a:pt x="87086" y="7718857"/>
+                  <a:pt x="0" y="6323662"/>
+                </a:cubicBezTo>
+                <a:lnTo>
+                  <a:pt x="0" y="1264763"/>
+                </a:lnTo>
+                <a:close/>
+              </a:path>
+            </a:pathLst>
+          </a:custGeom>
           <a:solidFill>
             <a:schemeClr val="bg1"/>
           </a:solidFill>
@@ -1470,12 +1795,265 @@
         </p:nvSpPr>
         <p:spPr>
           <a:xfrm>
-            <a:off x="30114849" y="4912469"/>
-            <a:ext cx="12385376" cy="8192119"/>
+            <a:off x="29982053" y="4912470"/>
+            <a:ext cx="12530121" cy="8235662"/>
           </a:xfrm>
-          <a:prstGeom prst="roundRect">
+          <a:custGeom>
             <a:avLst/>
-          </a:prstGeom>
+            <a:gdLst>
+              <a:gd name="connsiteX0" fmla="*/ 0 w 12385376"/>
+              <a:gd name="connsiteY0" fmla="*/ 1365380 h 8192119"/>
+              <a:gd name="connsiteX1" fmla="*/ 1365380 w 12385376"/>
+              <a:gd name="connsiteY1" fmla="*/ 0 h 8192119"/>
+              <a:gd name="connsiteX2" fmla="*/ 11019996 w 12385376"/>
+              <a:gd name="connsiteY2" fmla="*/ 0 h 8192119"/>
+              <a:gd name="connsiteX3" fmla="*/ 12385376 w 12385376"/>
+              <a:gd name="connsiteY3" fmla="*/ 1365380 h 8192119"/>
+              <a:gd name="connsiteX4" fmla="*/ 12385376 w 12385376"/>
+              <a:gd name="connsiteY4" fmla="*/ 6826739 h 8192119"/>
+              <a:gd name="connsiteX5" fmla="*/ 11019996 w 12385376"/>
+              <a:gd name="connsiteY5" fmla="*/ 8192119 h 8192119"/>
+              <a:gd name="connsiteX6" fmla="*/ 1365380 w 12385376"/>
+              <a:gd name="connsiteY6" fmla="*/ 8192119 h 8192119"/>
+              <a:gd name="connsiteX7" fmla="*/ 0 w 12385376"/>
+              <a:gd name="connsiteY7" fmla="*/ 6826739 h 8192119"/>
+              <a:gd name="connsiteX8" fmla="*/ 0 w 12385376"/>
+              <a:gd name="connsiteY8" fmla="*/ 1365380 h 8192119"/>
+              <a:gd name="connsiteX0" fmla="*/ 2054 w 12387430"/>
+              <a:gd name="connsiteY0" fmla="*/ 1365380 h 8192119"/>
+              <a:gd name="connsiteX1" fmla="*/ 1367434 w 12387430"/>
+              <a:gd name="connsiteY1" fmla="*/ 0 h 8192119"/>
+              <a:gd name="connsiteX2" fmla="*/ 11022050 w 12387430"/>
+              <a:gd name="connsiteY2" fmla="*/ 0 h 8192119"/>
+              <a:gd name="connsiteX3" fmla="*/ 12387430 w 12387430"/>
+              <a:gd name="connsiteY3" fmla="*/ 1365380 h 8192119"/>
+              <a:gd name="connsiteX4" fmla="*/ 12387430 w 12387430"/>
+              <a:gd name="connsiteY4" fmla="*/ 6826739 h 8192119"/>
+              <a:gd name="connsiteX5" fmla="*/ 11022050 w 12387430"/>
+              <a:gd name="connsiteY5" fmla="*/ 8192119 h 8192119"/>
+              <a:gd name="connsiteX6" fmla="*/ 1367434 w 12387430"/>
+              <a:gd name="connsiteY6" fmla="*/ 8192119 h 8192119"/>
+              <a:gd name="connsiteX7" fmla="*/ 2054 w 12387430"/>
+              <a:gd name="connsiteY7" fmla="*/ 6826739 h 8192119"/>
+              <a:gd name="connsiteX8" fmla="*/ 2054 w 12387430"/>
+              <a:gd name="connsiteY8" fmla="*/ 1365380 h 8192119"/>
+              <a:gd name="connsiteX0" fmla="*/ 9779 w 12395155"/>
+              <a:gd name="connsiteY0" fmla="*/ 1365380 h 8192119"/>
+              <a:gd name="connsiteX1" fmla="*/ 1375159 w 12395155"/>
+              <a:gd name="connsiteY1" fmla="*/ 0 h 8192119"/>
+              <a:gd name="connsiteX2" fmla="*/ 11029775 w 12395155"/>
+              <a:gd name="connsiteY2" fmla="*/ 0 h 8192119"/>
+              <a:gd name="connsiteX3" fmla="*/ 12395155 w 12395155"/>
+              <a:gd name="connsiteY3" fmla="*/ 1365380 h 8192119"/>
+              <a:gd name="connsiteX4" fmla="*/ 12395155 w 12395155"/>
+              <a:gd name="connsiteY4" fmla="*/ 6826739 h 8192119"/>
+              <a:gd name="connsiteX5" fmla="*/ 11029775 w 12395155"/>
+              <a:gd name="connsiteY5" fmla="*/ 8192119 h 8192119"/>
+              <a:gd name="connsiteX6" fmla="*/ 1375159 w 12395155"/>
+              <a:gd name="connsiteY6" fmla="*/ 8192119 h 8192119"/>
+              <a:gd name="connsiteX7" fmla="*/ 9779 w 12395155"/>
+              <a:gd name="connsiteY7" fmla="*/ 6826739 h 8192119"/>
+              <a:gd name="connsiteX8" fmla="*/ 9779 w 12395155"/>
+              <a:gd name="connsiteY8" fmla="*/ 1365380 h 8192119"/>
+              <a:gd name="connsiteX0" fmla="*/ 9779 w 12396102"/>
+              <a:gd name="connsiteY0" fmla="*/ 1365380 h 8192119"/>
+              <a:gd name="connsiteX1" fmla="*/ 1375159 w 12396102"/>
+              <a:gd name="connsiteY1" fmla="*/ 0 h 8192119"/>
+              <a:gd name="connsiteX2" fmla="*/ 11029775 w 12396102"/>
+              <a:gd name="connsiteY2" fmla="*/ 0 h 8192119"/>
+              <a:gd name="connsiteX3" fmla="*/ 12395155 w 12396102"/>
+              <a:gd name="connsiteY3" fmla="*/ 1365380 h 8192119"/>
+              <a:gd name="connsiteX4" fmla="*/ 12395155 w 12396102"/>
+              <a:gd name="connsiteY4" fmla="*/ 6826739 h 8192119"/>
+              <a:gd name="connsiteX5" fmla="*/ 11029775 w 12396102"/>
+              <a:gd name="connsiteY5" fmla="*/ 8192119 h 8192119"/>
+              <a:gd name="connsiteX6" fmla="*/ 1375159 w 12396102"/>
+              <a:gd name="connsiteY6" fmla="*/ 8192119 h 8192119"/>
+              <a:gd name="connsiteX7" fmla="*/ 9779 w 12396102"/>
+              <a:gd name="connsiteY7" fmla="*/ 6826739 h 8192119"/>
+              <a:gd name="connsiteX8" fmla="*/ 9779 w 12396102"/>
+              <a:gd name="connsiteY8" fmla="*/ 1365380 h 8192119"/>
+              <a:gd name="connsiteX0" fmla="*/ 9779 w 12395155"/>
+              <a:gd name="connsiteY0" fmla="*/ 1365380 h 8192119"/>
+              <a:gd name="connsiteX1" fmla="*/ 1375159 w 12395155"/>
+              <a:gd name="connsiteY1" fmla="*/ 0 h 8192119"/>
+              <a:gd name="connsiteX2" fmla="*/ 11029775 w 12395155"/>
+              <a:gd name="connsiteY2" fmla="*/ 0 h 8192119"/>
+              <a:gd name="connsiteX3" fmla="*/ 12395155 w 12395155"/>
+              <a:gd name="connsiteY3" fmla="*/ 1365380 h 8192119"/>
+              <a:gd name="connsiteX4" fmla="*/ 12395155 w 12395155"/>
+              <a:gd name="connsiteY4" fmla="*/ 6826739 h 8192119"/>
+              <a:gd name="connsiteX5" fmla="*/ 11029775 w 12395155"/>
+              <a:gd name="connsiteY5" fmla="*/ 8192119 h 8192119"/>
+              <a:gd name="connsiteX6" fmla="*/ 1375159 w 12395155"/>
+              <a:gd name="connsiteY6" fmla="*/ 8192119 h 8192119"/>
+              <a:gd name="connsiteX7" fmla="*/ 9779 w 12395155"/>
+              <a:gd name="connsiteY7" fmla="*/ 6826739 h 8192119"/>
+              <a:gd name="connsiteX8" fmla="*/ 9779 w 12395155"/>
+              <a:gd name="connsiteY8" fmla="*/ 1365380 h 8192119"/>
+              <a:gd name="connsiteX0" fmla="*/ 9779 w 12395155"/>
+              <a:gd name="connsiteY0" fmla="*/ 1365380 h 8192119"/>
+              <a:gd name="connsiteX1" fmla="*/ 1375159 w 12395155"/>
+              <a:gd name="connsiteY1" fmla="*/ 0 h 8192119"/>
+              <a:gd name="connsiteX2" fmla="*/ 11029775 w 12395155"/>
+              <a:gd name="connsiteY2" fmla="*/ 0 h 8192119"/>
+              <a:gd name="connsiteX3" fmla="*/ 12395155 w 12395155"/>
+              <a:gd name="connsiteY3" fmla="*/ 1365380 h 8192119"/>
+              <a:gd name="connsiteX4" fmla="*/ 12395155 w 12395155"/>
+              <a:gd name="connsiteY4" fmla="*/ 6826739 h 8192119"/>
+              <a:gd name="connsiteX5" fmla="*/ 11029775 w 12395155"/>
+              <a:gd name="connsiteY5" fmla="*/ 8192119 h 8192119"/>
+              <a:gd name="connsiteX6" fmla="*/ 1375159 w 12395155"/>
+              <a:gd name="connsiteY6" fmla="*/ 8192119 h 8192119"/>
+              <a:gd name="connsiteX7" fmla="*/ 9779 w 12395155"/>
+              <a:gd name="connsiteY7" fmla="*/ 6826739 h 8192119"/>
+              <a:gd name="connsiteX8" fmla="*/ 9779 w 12395155"/>
+              <a:gd name="connsiteY8" fmla="*/ 1365380 h 8192119"/>
+              <a:gd name="connsiteX0" fmla="*/ 9779 w 12397209"/>
+              <a:gd name="connsiteY0" fmla="*/ 1365380 h 8192119"/>
+              <a:gd name="connsiteX1" fmla="*/ 1375159 w 12397209"/>
+              <a:gd name="connsiteY1" fmla="*/ 0 h 8192119"/>
+              <a:gd name="connsiteX2" fmla="*/ 11029775 w 12397209"/>
+              <a:gd name="connsiteY2" fmla="*/ 0 h 8192119"/>
+              <a:gd name="connsiteX3" fmla="*/ 12395155 w 12397209"/>
+              <a:gd name="connsiteY3" fmla="*/ 1365380 h 8192119"/>
+              <a:gd name="connsiteX4" fmla="*/ 12395155 w 12397209"/>
+              <a:gd name="connsiteY4" fmla="*/ 6826739 h 8192119"/>
+              <a:gd name="connsiteX5" fmla="*/ 11029775 w 12397209"/>
+              <a:gd name="connsiteY5" fmla="*/ 8192119 h 8192119"/>
+              <a:gd name="connsiteX6" fmla="*/ 1375159 w 12397209"/>
+              <a:gd name="connsiteY6" fmla="*/ 8192119 h 8192119"/>
+              <a:gd name="connsiteX7" fmla="*/ 9779 w 12397209"/>
+              <a:gd name="connsiteY7" fmla="*/ 6826739 h 8192119"/>
+              <a:gd name="connsiteX8" fmla="*/ 9779 w 12397209"/>
+              <a:gd name="connsiteY8" fmla="*/ 1365380 h 8192119"/>
+              <a:gd name="connsiteX0" fmla="*/ 9779 w 12407105"/>
+              <a:gd name="connsiteY0" fmla="*/ 1365380 h 8192119"/>
+              <a:gd name="connsiteX1" fmla="*/ 1375159 w 12407105"/>
+              <a:gd name="connsiteY1" fmla="*/ 0 h 8192119"/>
+              <a:gd name="connsiteX2" fmla="*/ 11029775 w 12407105"/>
+              <a:gd name="connsiteY2" fmla="*/ 0 h 8192119"/>
+              <a:gd name="connsiteX3" fmla="*/ 12395155 w 12407105"/>
+              <a:gd name="connsiteY3" fmla="*/ 1365380 h 8192119"/>
+              <a:gd name="connsiteX4" fmla="*/ 12395155 w 12407105"/>
+              <a:gd name="connsiteY4" fmla="*/ 6826739 h 8192119"/>
+              <a:gd name="connsiteX5" fmla="*/ 11029775 w 12407105"/>
+              <a:gd name="connsiteY5" fmla="*/ 8192119 h 8192119"/>
+              <a:gd name="connsiteX6" fmla="*/ 1375159 w 12407105"/>
+              <a:gd name="connsiteY6" fmla="*/ 8192119 h 8192119"/>
+              <a:gd name="connsiteX7" fmla="*/ 9779 w 12407105"/>
+              <a:gd name="connsiteY7" fmla="*/ 6826739 h 8192119"/>
+              <a:gd name="connsiteX8" fmla="*/ 9779 w 12407105"/>
+              <a:gd name="connsiteY8" fmla="*/ 1365380 h 8192119"/>
+              <a:gd name="connsiteX0" fmla="*/ 9779 w 12407105"/>
+              <a:gd name="connsiteY0" fmla="*/ 1365380 h 8235662"/>
+              <a:gd name="connsiteX1" fmla="*/ 1375159 w 12407105"/>
+              <a:gd name="connsiteY1" fmla="*/ 0 h 8235662"/>
+              <a:gd name="connsiteX2" fmla="*/ 11029775 w 12407105"/>
+              <a:gd name="connsiteY2" fmla="*/ 0 h 8235662"/>
+              <a:gd name="connsiteX3" fmla="*/ 12395155 w 12407105"/>
+              <a:gd name="connsiteY3" fmla="*/ 1365380 h 8235662"/>
+              <a:gd name="connsiteX4" fmla="*/ 12395155 w 12407105"/>
+              <a:gd name="connsiteY4" fmla="*/ 6826739 h 8235662"/>
+              <a:gd name="connsiteX5" fmla="*/ 11029775 w 12407105"/>
+              <a:gd name="connsiteY5" fmla="*/ 8192119 h 8235662"/>
+              <a:gd name="connsiteX6" fmla="*/ 983273 w 12407105"/>
+              <a:gd name="connsiteY6" fmla="*/ 8235662 h 8235662"/>
+              <a:gd name="connsiteX7" fmla="*/ 9779 w 12407105"/>
+              <a:gd name="connsiteY7" fmla="*/ 6826739 h 8235662"/>
+              <a:gd name="connsiteX8" fmla="*/ 9779 w 12407105"/>
+              <a:gd name="connsiteY8" fmla="*/ 1365380 h 8235662"/>
+              <a:gd name="connsiteX0" fmla="*/ 9779 w 12407105"/>
+              <a:gd name="connsiteY0" fmla="*/ 1365380 h 8235662"/>
+              <a:gd name="connsiteX1" fmla="*/ 1375159 w 12407105"/>
+              <a:gd name="connsiteY1" fmla="*/ 0 h 8235662"/>
+              <a:gd name="connsiteX2" fmla="*/ 11029775 w 12407105"/>
+              <a:gd name="connsiteY2" fmla="*/ 0 h 8235662"/>
+              <a:gd name="connsiteX3" fmla="*/ 12395155 w 12407105"/>
+              <a:gd name="connsiteY3" fmla="*/ 1365380 h 8235662"/>
+              <a:gd name="connsiteX4" fmla="*/ 12395155 w 12407105"/>
+              <a:gd name="connsiteY4" fmla="*/ 6826739 h 8235662"/>
+              <a:gd name="connsiteX5" fmla="*/ 11029775 w 12407105"/>
+              <a:gd name="connsiteY5" fmla="*/ 8192119 h 8235662"/>
+              <a:gd name="connsiteX6" fmla="*/ 983273 w 12407105"/>
+              <a:gd name="connsiteY6" fmla="*/ 8235662 h 8235662"/>
+              <a:gd name="connsiteX7" fmla="*/ 9779 w 12407105"/>
+              <a:gd name="connsiteY7" fmla="*/ 6826739 h 8235662"/>
+              <a:gd name="connsiteX8" fmla="*/ 9779 w 12407105"/>
+              <a:gd name="connsiteY8" fmla="*/ 1365380 h 8235662"/>
+            </a:gdLst>
+            <a:ahLst/>
+            <a:cxnLst>
+              <a:cxn ang="0">
+                <a:pos x="connsiteX0" y="connsiteY0"/>
+              </a:cxn>
+              <a:cxn ang="0">
+                <a:pos x="connsiteX1" y="connsiteY1"/>
+              </a:cxn>
+              <a:cxn ang="0">
+                <a:pos x="connsiteX2" y="connsiteY2"/>
+              </a:cxn>
+              <a:cxn ang="0">
+                <a:pos x="connsiteX3" y="connsiteY3"/>
+              </a:cxn>
+              <a:cxn ang="0">
+                <a:pos x="connsiteX4" y="connsiteY4"/>
+              </a:cxn>
+              <a:cxn ang="0">
+                <a:pos x="connsiteX5" y="connsiteY5"/>
+              </a:cxn>
+              <a:cxn ang="0">
+                <a:pos x="connsiteX6" y="connsiteY6"/>
+              </a:cxn>
+              <a:cxn ang="0">
+                <a:pos x="connsiteX7" y="connsiteY7"/>
+              </a:cxn>
+              <a:cxn ang="0">
+                <a:pos x="connsiteX8" y="connsiteY8"/>
+              </a:cxn>
+            </a:cxnLst>
+            <a:rect l="l" t="t" r="r" b="b"/>
+            <a:pathLst>
+              <a:path w="12407105" h="8235662">
+                <a:moveTo>
+                  <a:pt x="9779" y="1365380"/>
+                </a:moveTo>
+                <a:cubicBezTo>
+                  <a:pt x="-33764" y="88787"/>
+                  <a:pt x="11480" y="43543"/>
+                  <a:pt x="1375159" y="0"/>
+                </a:cubicBezTo>
+                <a:lnTo>
+                  <a:pt x="11029775" y="0"/>
+                </a:lnTo>
+                <a:cubicBezTo>
+                  <a:pt x="12349911" y="43543"/>
+                  <a:pt x="12308070" y="45244"/>
+                  <a:pt x="12395155" y="1365380"/>
+                </a:cubicBezTo>
+                <a:lnTo>
+                  <a:pt x="12395155" y="6826739"/>
+                </a:lnTo>
+                <a:cubicBezTo>
+                  <a:pt x="12438698" y="8103333"/>
+                  <a:pt x="12436997" y="8192119"/>
+                  <a:pt x="11029775" y="8192119"/>
+                </a:cubicBezTo>
+                <a:lnTo>
+                  <a:pt x="983273" y="8235662"/>
+                </a:lnTo>
+                <a:cubicBezTo>
+                  <a:pt x="229194" y="8235662"/>
+                  <a:pt x="96865" y="8190418"/>
+                  <a:pt x="9779" y="6826739"/>
+                </a:cubicBezTo>
+                <a:lnTo>
+                  <a:pt x="9779" y="1365380"/>
+                </a:lnTo>
+                <a:close/>
+              </a:path>
+            </a:pathLst>
+          </a:custGeom>
           <a:solidFill>
             <a:schemeClr val="bg1"/>
           </a:solidFill>
@@ -1521,12 +2099,303 @@
         </p:nvSpPr>
         <p:spPr>
           <a:xfrm>
-            <a:off x="303537" y="21402302"/>
-            <a:ext cx="11095074" cy="7488832"/>
+            <a:off x="303537" y="21402303"/>
+            <a:ext cx="11233247" cy="7619460"/>
           </a:xfrm>
-          <a:prstGeom prst="roundRect">
+          <a:custGeom>
             <a:avLst/>
-          </a:prstGeom>
+            <a:gdLst>
+              <a:gd name="connsiteX0" fmla="*/ 0 w 11095074"/>
+              <a:gd name="connsiteY0" fmla="*/ 1248164 h 7488832"/>
+              <a:gd name="connsiteX1" fmla="*/ 1248164 w 11095074"/>
+              <a:gd name="connsiteY1" fmla="*/ 0 h 7488832"/>
+              <a:gd name="connsiteX2" fmla="*/ 9846910 w 11095074"/>
+              <a:gd name="connsiteY2" fmla="*/ 0 h 7488832"/>
+              <a:gd name="connsiteX3" fmla="*/ 11095074 w 11095074"/>
+              <a:gd name="connsiteY3" fmla="*/ 1248164 h 7488832"/>
+              <a:gd name="connsiteX4" fmla="*/ 11095074 w 11095074"/>
+              <a:gd name="connsiteY4" fmla="*/ 6240668 h 7488832"/>
+              <a:gd name="connsiteX5" fmla="*/ 9846910 w 11095074"/>
+              <a:gd name="connsiteY5" fmla="*/ 7488832 h 7488832"/>
+              <a:gd name="connsiteX6" fmla="*/ 1248164 w 11095074"/>
+              <a:gd name="connsiteY6" fmla="*/ 7488832 h 7488832"/>
+              <a:gd name="connsiteX7" fmla="*/ 0 w 11095074"/>
+              <a:gd name="connsiteY7" fmla="*/ 6240668 h 7488832"/>
+              <a:gd name="connsiteX8" fmla="*/ 0 w 11095074"/>
+              <a:gd name="connsiteY8" fmla="*/ 1248164 h 7488832"/>
+              <a:gd name="connsiteX0" fmla="*/ 0 w 11095074"/>
+              <a:gd name="connsiteY0" fmla="*/ 1248164 h 7488832"/>
+              <a:gd name="connsiteX1" fmla="*/ 1248164 w 11095074"/>
+              <a:gd name="connsiteY1" fmla="*/ 0 h 7488832"/>
+              <a:gd name="connsiteX2" fmla="*/ 9846910 w 11095074"/>
+              <a:gd name="connsiteY2" fmla="*/ 0 h 7488832"/>
+              <a:gd name="connsiteX3" fmla="*/ 11051531 w 11095074"/>
+              <a:gd name="connsiteY3" fmla="*/ 769192 h 7488832"/>
+              <a:gd name="connsiteX4" fmla="*/ 11095074 w 11095074"/>
+              <a:gd name="connsiteY4" fmla="*/ 6240668 h 7488832"/>
+              <a:gd name="connsiteX5" fmla="*/ 9846910 w 11095074"/>
+              <a:gd name="connsiteY5" fmla="*/ 7488832 h 7488832"/>
+              <a:gd name="connsiteX6" fmla="*/ 1248164 w 11095074"/>
+              <a:gd name="connsiteY6" fmla="*/ 7488832 h 7488832"/>
+              <a:gd name="connsiteX7" fmla="*/ 0 w 11095074"/>
+              <a:gd name="connsiteY7" fmla="*/ 6240668 h 7488832"/>
+              <a:gd name="connsiteX8" fmla="*/ 0 w 11095074"/>
+              <a:gd name="connsiteY8" fmla="*/ 1248164 h 7488832"/>
+              <a:gd name="connsiteX0" fmla="*/ 0 w 11095074"/>
+              <a:gd name="connsiteY0" fmla="*/ 1248164 h 7488832"/>
+              <a:gd name="connsiteX1" fmla="*/ 1248164 w 11095074"/>
+              <a:gd name="connsiteY1" fmla="*/ 0 h 7488832"/>
+              <a:gd name="connsiteX2" fmla="*/ 9846910 w 11095074"/>
+              <a:gd name="connsiteY2" fmla="*/ 0 h 7488832"/>
+              <a:gd name="connsiteX3" fmla="*/ 11051531 w 11095074"/>
+              <a:gd name="connsiteY3" fmla="*/ 769192 h 7488832"/>
+              <a:gd name="connsiteX4" fmla="*/ 11095074 w 11095074"/>
+              <a:gd name="connsiteY4" fmla="*/ 6240668 h 7488832"/>
+              <a:gd name="connsiteX5" fmla="*/ 9846910 w 11095074"/>
+              <a:gd name="connsiteY5" fmla="*/ 7488832 h 7488832"/>
+              <a:gd name="connsiteX6" fmla="*/ 1248164 w 11095074"/>
+              <a:gd name="connsiteY6" fmla="*/ 7488832 h 7488832"/>
+              <a:gd name="connsiteX7" fmla="*/ 0 w 11095074"/>
+              <a:gd name="connsiteY7" fmla="*/ 6240668 h 7488832"/>
+              <a:gd name="connsiteX8" fmla="*/ 0 w 11095074"/>
+              <a:gd name="connsiteY8" fmla="*/ 1248164 h 7488832"/>
+              <a:gd name="connsiteX0" fmla="*/ 0 w 11097297"/>
+              <a:gd name="connsiteY0" fmla="*/ 1248164 h 7492627"/>
+              <a:gd name="connsiteX1" fmla="*/ 1248164 w 11097297"/>
+              <a:gd name="connsiteY1" fmla="*/ 0 h 7492627"/>
+              <a:gd name="connsiteX2" fmla="*/ 9846910 w 11097297"/>
+              <a:gd name="connsiteY2" fmla="*/ 0 h 7492627"/>
+              <a:gd name="connsiteX3" fmla="*/ 11051531 w 11097297"/>
+              <a:gd name="connsiteY3" fmla="*/ 769192 h 7492627"/>
+              <a:gd name="connsiteX4" fmla="*/ 11095074 w 11097297"/>
+              <a:gd name="connsiteY4" fmla="*/ 6240668 h 7492627"/>
+              <a:gd name="connsiteX5" fmla="*/ 9846910 w 11097297"/>
+              <a:gd name="connsiteY5" fmla="*/ 7488832 h 7492627"/>
+              <a:gd name="connsiteX6" fmla="*/ 1248164 w 11097297"/>
+              <a:gd name="connsiteY6" fmla="*/ 7488832 h 7492627"/>
+              <a:gd name="connsiteX7" fmla="*/ 0 w 11097297"/>
+              <a:gd name="connsiteY7" fmla="*/ 6240668 h 7492627"/>
+              <a:gd name="connsiteX8" fmla="*/ 0 w 11097297"/>
+              <a:gd name="connsiteY8" fmla="*/ 1248164 h 7492627"/>
+              <a:gd name="connsiteX0" fmla="*/ 0 w 11111124"/>
+              <a:gd name="connsiteY0" fmla="*/ 1248164 h 7488832"/>
+              <a:gd name="connsiteX1" fmla="*/ 1248164 w 11111124"/>
+              <a:gd name="connsiteY1" fmla="*/ 0 h 7488832"/>
+              <a:gd name="connsiteX2" fmla="*/ 9846910 w 11111124"/>
+              <a:gd name="connsiteY2" fmla="*/ 0 h 7488832"/>
+              <a:gd name="connsiteX3" fmla="*/ 11051531 w 11111124"/>
+              <a:gd name="connsiteY3" fmla="*/ 769192 h 7488832"/>
+              <a:gd name="connsiteX4" fmla="*/ 11095074 w 11111124"/>
+              <a:gd name="connsiteY4" fmla="*/ 6240668 h 7488832"/>
+              <a:gd name="connsiteX5" fmla="*/ 9846910 w 11111124"/>
+              <a:gd name="connsiteY5" fmla="*/ 7488832 h 7488832"/>
+              <a:gd name="connsiteX6" fmla="*/ 1248164 w 11111124"/>
+              <a:gd name="connsiteY6" fmla="*/ 7488832 h 7488832"/>
+              <a:gd name="connsiteX7" fmla="*/ 0 w 11111124"/>
+              <a:gd name="connsiteY7" fmla="*/ 6240668 h 7488832"/>
+              <a:gd name="connsiteX8" fmla="*/ 0 w 11111124"/>
+              <a:gd name="connsiteY8" fmla="*/ 1248164 h 7488832"/>
+              <a:gd name="connsiteX0" fmla="*/ 0 w 11102256"/>
+              <a:gd name="connsiteY0" fmla="*/ 1248164 h 7508821"/>
+              <a:gd name="connsiteX1" fmla="*/ 1248164 w 11102256"/>
+              <a:gd name="connsiteY1" fmla="*/ 0 h 7508821"/>
+              <a:gd name="connsiteX2" fmla="*/ 9846910 w 11102256"/>
+              <a:gd name="connsiteY2" fmla="*/ 0 h 7508821"/>
+              <a:gd name="connsiteX3" fmla="*/ 11051531 w 11102256"/>
+              <a:gd name="connsiteY3" fmla="*/ 769192 h 7508821"/>
+              <a:gd name="connsiteX4" fmla="*/ 11095074 w 11102256"/>
+              <a:gd name="connsiteY4" fmla="*/ 6240668 h 7508821"/>
+              <a:gd name="connsiteX5" fmla="*/ 9846910 w 11102256"/>
+              <a:gd name="connsiteY5" fmla="*/ 7488832 h 7508821"/>
+              <a:gd name="connsiteX6" fmla="*/ 1248164 w 11102256"/>
+              <a:gd name="connsiteY6" fmla="*/ 7488832 h 7508821"/>
+              <a:gd name="connsiteX7" fmla="*/ 0 w 11102256"/>
+              <a:gd name="connsiteY7" fmla="*/ 6240668 h 7508821"/>
+              <a:gd name="connsiteX8" fmla="*/ 0 w 11102256"/>
+              <a:gd name="connsiteY8" fmla="*/ 1248164 h 7508821"/>
+              <a:gd name="connsiteX0" fmla="*/ 0 w 11102256"/>
+              <a:gd name="connsiteY0" fmla="*/ 1248164 h 7619460"/>
+              <a:gd name="connsiteX1" fmla="*/ 1248164 w 11102256"/>
+              <a:gd name="connsiteY1" fmla="*/ 0 h 7619460"/>
+              <a:gd name="connsiteX2" fmla="*/ 9846910 w 11102256"/>
+              <a:gd name="connsiteY2" fmla="*/ 0 h 7619460"/>
+              <a:gd name="connsiteX3" fmla="*/ 11051531 w 11102256"/>
+              <a:gd name="connsiteY3" fmla="*/ 769192 h 7619460"/>
+              <a:gd name="connsiteX4" fmla="*/ 11095074 w 11102256"/>
+              <a:gd name="connsiteY4" fmla="*/ 6240668 h 7619460"/>
+              <a:gd name="connsiteX5" fmla="*/ 9846910 w 11102256"/>
+              <a:gd name="connsiteY5" fmla="*/ 7488832 h 7619460"/>
+              <a:gd name="connsiteX6" fmla="*/ 725649 w 11102256"/>
+              <a:gd name="connsiteY6" fmla="*/ 7619460 h 7619460"/>
+              <a:gd name="connsiteX7" fmla="*/ 0 w 11102256"/>
+              <a:gd name="connsiteY7" fmla="*/ 6240668 h 7619460"/>
+              <a:gd name="connsiteX8" fmla="*/ 0 w 11102256"/>
+              <a:gd name="connsiteY8" fmla="*/ 1248164 h 7619460"/>
+              <a:gd name="connsiteX0" fmla="*/ 0 w 11102256"/>
+              <a:gd name="connsiteY0" fmla="*/ 1248164 h 7619460"/>
+              <a:gd name="connsiteX1" fmla="*/ 1248164 w 11102256"/>
+              <a:gd name="connsiteY1" fmla="*/ 0 h 7619460"/>
+              <a:gd name="connsiteX2" fmla="*/ 9846910 w 11102256"/>
+              <a:gd name="connsiteY2" fmla="*/ 0 h 7619460"/>
+              <a:gd name="connsiteX3" fmla="*/ 11051531 w 11102256"/>
+              <a:gd name="connsiteY3" fmla="*/ 769192 h 7619460"/>
+              <a:gd name="connsiteX4" fmla="*/ 11095074 w 11102256"/>
+              <a:gd name="connsiteY4" fmla="*/ 6240668 h 7619460"/>
+              <a:gd name="connsiteX5" fmla="*/ 9846910 w 11102256"/>
+              <a:gd name="connsiteY5" fmla="*/ 7488832 h 7619460"/>
+              <a:gd name="connsiteX6" fmla="*/ 725649 w 11102256"/>
+              <a:gd name="connsiteY6" fmla="*/ 7619460 h 7619460"/>
+              <a:gd name="connsiteX7" fmla="*/ 0 w 11102256"/>
+              <a:gd name="connsiteY7" fmla="*/ 6240668 h 7619460"/>
+              <a:gd name="connsiteX8" fmla="*/ 0 w 11102256"/>
+              <a:gd name="connsiteY8" fmla="*/ 1248164 h 7619460"/>
+              <a:gd name="connsiteX0" fmla="*/ 0 w 11102256"/>
+              <a:gd name="connsiteY0" fmla="*/ 1248431 h 7619727"/>
+              <a:gd name="connsiteX1" fmla="*/ 1248164 w 11102256"/>
+              <a:gd name="connsiteY1" fmla="*/ 267 h 7619727"/>
+              <a:gd name="connsiteX2" fmla="*/ 9846910 w 11102256"/>
+              <a:gd name="connsiteY2" fmla="*/ 267 h 7619727"/>
+              <a:gd name="connsiteX3" fmla="*/ 11051531 w 11102256"/>
+              <a:gd name="connsiteY3" fmla="*/ 769459 h 7619727"/>
+              <a:gd name="connsiteX4" fmla="*/ 11095074 w 11102256"/>
+              <a:gd name="connsiteY4" fmla="*/ 6240935 h 7619727"/>
+              <a:gd name="connsiteX5" fmla="*/ 9846910 w 11102256"/>
+              <a:gd name="connsiteY5" fmla="*/ 7489099 h 7619727"/>
+              <a:gd name="connsiteX6" fmla="*/ 725649 w 11102256"/>
+              <a:gd name="connsiteY6" fmla="*/ 7619727 h 7619727"/>
+              <a:gd name="connsiteX7" fmla="*/ 0 w 11102256"/>
+              <a:gd name="connsiteY7" fmla="*/ 6240935 h 7619727"/>
+              <a:gd name="connsiteX8" fmla="*/ 0 w 11102256"/>
+              <a:gd name="connsiteY8" fmla="*/ 1248431 h 7619727"/>
+              <a:gd name="connsiteX0" fmla="*/ 0 w 11102256"/>
+              <a:gd name="connsiteY0" fmla="*/ 1248164 h 7619460"/>
+              <a:gd name="connsiteX1" fmla="*/ 1248164 w 11102256"/>
+              <a:gd name="connsiteY1" fmla="*/ 0 h 7619460"/>
+              <a:gd name="connsiteX2" fmla="*/ 9846910 w 11102256"/>
+              <a:gd name="connsiteY2" fmla="*/ 0 h 7619460"/>
+              <a:gd name="connsiteX3" fmla="*/ 11051531 w 11102256"/>
+              <a:gd name="connsiteY3" fmla="*/ 769192 h 7619460"/>
+              <a:gd name="connsiteX4" fmla="*/ 11095074 w 11102256"/>
+              <a:gd name="connsiteY4" fmla="*/ 6240668 h 7619460"/>
+              <a:gd name="connsiteX5" fmla="*/ 9846910 w 11102256"/>
+              <a:gd name="connsiteY5" fmla="*/ 7488832 h 7619460"/>
+              <a:gd name="connsiteX6" fmla="*/ 725649 w 11102256"/>
+              <a:gd name="connsiteY6" fmla="*/ 7619460 h 7619460"/>
+              <a:gd name="connsiteX7" fmla="*/ 0 w 11102256"/>
+              <a:gd name="connsiteY7" fmla="*/ 6240668 h 7619460"/>
+              <a:gd name="connsiteX8" fmla="*/ 0 w 11102256"/>
+              <a:gd name="connsiteY8" fmla="*/ 1248164 h 7619460"/>
+              <a:gd name="connsiteX0" fmla="*/ 0 w 11104726"/>
+              <a:gd name="connsiteY0" fmla="*/ 1248164 h 7619460"/>
+              <a:gd name="connsiteX1" fmla="*/ 1248164 w 11104726"/>
+              <a:gd name="connsiteY1" fmla="*/ 0 h 7619460"/>
+              <a:gd name="connsiteX2" fmla="*/ 9846910 w 11104726"/>
+              <a:gd name="connsiteY2" fmla="*/ 0 h 7619460"/>
+              <a:gd name="connsiteX3" fmla="*/ 11051531 w 11104726"/>
+              <a:gd name="connsiteY3" fmla="*/ 769192 h 7619460"/>
+              <a:gd name="connsiteX4" fmla="*/ 11095074 w 11104726"/>
+              <a:gd name="connsiteY4" fmla="*/ 6240668 h 7619460"/>
+              <a:gd name="connsiteX5" fmla="*/ 9846910 w 11104726"/>
+              <a:gd name="connsiteY5" fmla="*/ 7488832 h 7619460"/>
+              <a:gd name="connsiteX6" fmla="*/ 725649 w 11104726"/>
+              <a:gd name="connsiteY6" fmla="*/ 7619460 h 7619460"/>
+              <a:gd name="connsiteX7" fmla="*/ 0 w 11104726"/>
+              <a:gd name="connsiteY7" fmla="*/ 6240668 h 7619460"/>
+              <a:gd name="connsiteX8" fmla="*/ 0 w 11104726"/>
+              <a:gd name="connsiteY8" fmla="*/ 1248164 h 7619460"/>
+              <a:gd name="connsiteX0" fmla="*/ 0 w 11095074"/>
+              <a:gd name="connsiteY0" fmla="*/ 1248164 h 7619460"/>
+              <a:gd name="connsiteX1" fmla="*/ 1248164 w 11095074"/>
+              <a:gd name="connsiteY1" fmla="*/ 0 h 7619460"/>
+              <a:gd name="connsiteX2" fmla="*/ 9846910 w 11095074"/>
+              <a:gd name="connsiteY2" fmla="*/ 0 h 7619460"/>
+              <a:gd name="connsiteX3" fmla="*/ 11051531 w 11095074"/>
+              <a:gd name="connsiteY3" fmla="*/ 769192 h 7619460"/>
+              <a:gd name="connsiteX4" fmla="*/ 11095074 w 11095074"/>
+              <a:gd name="connsiteY4" fmla="*/ 6240668 h 7619460"/>
+              <a:gd name="connsiteX5" fmla="*/ 9846910 w 11095074"/>
+              <a:gd name="connsiteY5" fmla="*/ 7488832 h 7619460"/>
+              <a:gd name="connsiteX6" fmla="*/ 725649 w 11095074"/>
+              <a:gd name="connsiteY6" fmla="*/ 7619460 h 7619460"/>
+              <a:gd name="connsiteX7" fmla="*/ 0 w 11095074"/>
+              <a:gd name="connsiteY7" fmla="*/ 6240668 h 7619460"/>
+              <a:gd name="connsiteX8" fmla="*/ 0 w 11095074"/>
+              <a:gd name="connsiteY8" fmla="*/ 1248164 h 7619460"/>
+            </a:gdLst>
+            <a:ahLst/>
+            <a:cxnLst>
+              <a:cxn ang="0">
+                <a:pos x="connsiteX0" y="connsiteY0"/>
+              </a:cxn>
+              <a:cxn ang="0">
+                <a:pos x="connsiteX1" y="connsiteY1"/>
+              </a:cxn>
+              <a:cxn ang="0">
+                <a:pos x="connsiteX2" y="connsiteY2"/>
+              </a:cxn>
+              <a:cxn ang="0">
+                <a:pos x="connsiteX3" y="connsiteY3"/>
+              </a:cxn>
+              <a:cxn ang="0">
+                <a:pos x="connsiteX4" y="connsiteY4"/>
+              </a:cxn>
+              <a:cxn ang="0">
+                <a:pos x="connsiteX5" y="connsiteY5"/>
+              </a:cxn>
+              <a:cxn ang="0">
+                <a:pos x="connsiteX6" y="connsiteY6"/>
+              </a:cxn>
+              <a:cxn ang="0">
+                <a:pos x="connsiteX7" y="connsiteY7"/>
+              </a:cxn>
+              <a:cxn ang="0">
+                <a:pos x="connsiteX8" y="connsiteY8"/>
+              </a:cxn>
+            </a:cxnLst>
+            <a:rect l="l" t="t" r="r" b="b"/>
+            <a:pathLst>
+              <a:path w="11095074" h="7619460">
+                <a:moveTo>
+                  <a:pt x="0" y="1248164"/>
+                </a:moveTo>
+                <a:cubicBezTo>
+                  <a:pt x="43543" y="-50778"/>
+                  <a:pt x="79851" y="43543"/>
+                  <a:pt x="1248164" y="0"/>
+                </a:cubicBezTo>
+                <a:lnTo>
+                  <a:pt x="9846910" y="0"/>
+                </a:lnTo>
+                <a:cubicBezTo>
+                  <a:pt x="10971681" y="43542"/>
+                  <a:pt x="11051531" y="79850"/>
+                  <a:pt x="11051531" y="769192"/>
+                </a:cubicBezTo>
+                <a:cubicBezTo>
+                  <a:pt x="11051531" y="2433360"/>
+                  <a:pt x="11095074" y="4576500"/>
+                  <a:pt x="11095074" y="6240668"/>
+                </a:cubicBezTo>
+                <a:cubicBezTo>
+                  <a:pt x="11092317" y="7429927"/>
+                  <a:pt x="11084671" y="7462927"/>
+                  <a:pt x="9846910" y="7488832"/>
+                </a:cubicBezTo>
+                <a:lnTo>
+                  <a:pt x="725649" y="7619460"/>
+                </a:lnTo>
+                <a:cubicBezTo>
+                  <a:pt x="36307" y="7619460"/>
+                  <a:pt x="130629" y="7583153"/>
+                  <a:pt x="0" y="6240668"/>
+                </a:cubicBezTo>
+                <a:lnTo>
+                  <a:pt x="0" y="1248164"/>
+                </a:lnTo>
+                <a:close/>
+              </a:path>
+            </a:pathLst>
+          </a:custGeom>
           <a:solidFill>
             <a:schemeClr val="bg1"/>
           </a:solidFill>
@@ -1876,12 +2745,355 @@
         </p:nvSpPr>
         <p:spPr>
           <a:xfrm>
-            <a:off x="30114849" y="21546318"/>
-            <a:ext cx="12385376" cy="7344816"/>
+            <a:off x="29982053" y="21546318"/>
+            <a:ext cx="12518172" cy="7431902"/>
           </a:xfrm>
-          <a:prstGeom prst="roundRect">
+          <a:custGeom>
             <a:avLst/>
-          </a:prstGeom>
+            <a:gdLst>
+              <a:gd name="connsiteX0" fmla="*/ 0 w 12385376"/>
+              <a:gd name="connsiteY0" fmla="*/ 1224160 h 7344816"/>
+              <a:gd name="connsiteX1" fmla="*/ 1224160 w 12385376"/>
+              <a:gd name="connsiteY1" fmla="*/ 0 h 7344816"/>
+              <a:gd name="connsiteX2" fmla="*/ 11161216 w 12385376"/>
+              <a:gd name="connsiteY2" fmla="*/ 0 h 7344816"/>
+              <a:gd name="connsiteX3" fmla="*/ 12385376 w 12385376"/>
+              <a:gd name="connsiteY3" fmla="*/ 1224160 h 7344816"/>
+              <a:gd name="connsiteX4" fmla="*/ 12385376 w 12385376"/>
+              <a:gd name="connsiteY4" fmla="*/ 6120656 h 7344816"/>
+              <a:gd name="connsiteX5" fmla="*/ 11161216 w 12385376"/>
+              <a:gd name="connsiteY5" fmla="*/ 7344816 h 7344816"/>
+              <a:gd name="connsiteX6" fmla="*/ 1224160 w 12385376"/>
+              <a:gd name="connsiteY6" fmla="*/ 7344816 h 7344816"/>
+              <a:gd name="connsiteX7" fmla="*/ 0 w 12385376"/>
+              <a:gd name="connsiteY7" fmla="*/ 6120656 h 7344816"/>
+              <a:gd name="connsiteX8" fmla="*/ 0 w 12385376"/>
+              <a:gd name="connsiteY8" fmla="*/ 1224160 h 7344816"/>
+              <a:gd name="connsiteX0" fmla="*/ 0 w 12385376"/>
+              <a:gd name="connsiteY0" fmla="*/ 1224160 h 7344816"/>
+              <a:gd name="connsiteX1" fmla="*/ 1224160 w 12385376"/>
+              <a:gd name="connsiteY1" fmla="*/ 0 h 7344816"/>
+              <a:gd name="connsiteX2" fmla="*/ 11161216 w 12385376"/>
+              <a:gd name="connsiteY2" fmla="*/ 0 h 7344816"/>
+              <a:gd name="connsiteX3" fmla="*/ 12385376 w 12385376"/>
+              <a:gd name="connsiteY3" fmla="*/ 1224160 h 7344816"/>
+              <a:gd name="connsiteX4" fmla="*/ 12385376 w 12385376"/>
+              <a:gd name="connsiteY4" fmla="*/ 6120656 h 7344816"/>
+              <a:gd name="connsiteX5" fmla="*/ 11161216 w 12385376"/>
+              <a:gd name="connsiteY5" fmla="*/ 7344816 h 7344816"/>
+              <a:gd name="connsiteX6" fmla="*/ 1224160 w 12385376"/>
+              <a:gd name="connsiteY6" fmla="*/ 7344816 h 7344816"/>
+              <a:gd name="connsiteX7" fmla="*/ 0 w 12385376"/>
+              <a:gd name="connsiteY7" fmla="*/ 6120656 h 7344816"/>
+              <a:gd name="connsiteX8" fmla="*/ 0 w 12385376"/>
+              <a:gd name="connsiteY8" fmla="*/ 1224160 h 7344816"/>
+              <a:gd name="connsiteX0" fmla="*/ 0 w 12385376"/>
+              <a:gd name="connsiteY0" fmla="*/ 1224160 h 7344816"/>
+              <a:gd name="connsiteX1" fmla="*/ 1224160 w 12385376"/>
+              <a:gd name="connsiteY1" fmla="*/ 0 h 7344816"/>
+              <a:gd name="connsiteX2" fmla="*/ 11161216 w 12385376"/>
+              <a:gd name="connsiteY2" fmla="*/ 0 h 7344816"/>
+              <a:gd name="connsiteX3" fmla="*/ 12385376 w 12385376"/>
+              <a:gd name="connsiteY3" fmla="*/ 1224160 h 7344816"/>
+              <a:gd name="connsiteX4" fmla="*/ 12385376 w 12385376"/>
+              <a:gd name="connsiteY4" fmla="*/ 6120656 h 7344816"/>
+              <a:gd name="connsiteX5" fmla="*/ 11161216 w 12385376"/>
+              <a:gd name="connsiteY5" fmla="*/ 7344816 h 7344816"/>
+              <a:gd name="connsiteX6" fmla="*/ 1224160 w 12385376"/>
+              <a:gd name="connsiteY6" fmla="*/ 7344816 h 7344816"/>
+              <a:gd name="connsiteX7" fmla="*/ 0 w 12385376"/>
+              <a:gd name="connsiteY7" fmla="*/ 6120656 h 7344816"/>
+              <a:gd name="connsiteX8" fmla="*/ 0 w 12385376"/>
+              <a:gd name="connsiteY8" fmla="*/ 1224160 h 7344816"/>
+              <a:gd name="connsiteX0" fmla="*/ 0 w 12387637"/>
+              <a:gd name="connsiteY0" fmla="*/ 1224160 h 7345285"/>
+              <a:gd name="connsiteX1" fmla="*/ 1224160 w 12387637"/>
+              <a:gd name="connsiteY1" fmla="*/ 0 h 7345285"/>
+              <a:gd name="connsiteX2" fmla="*/ 11161216 w 12387637"/>
+              <a:gd name="connsiteY2" fmla="*/ 0 h 7345285"/>
+              <a:gd name="connsiteX3" fmla="*/ 12385376 w 12387637"/>
+              <a:gd name="connsiteY3" fmla="*/ 1224160 h 7345285"/>
+              <a:gd name="connsiteX4" fmla="*/ 12385376 w 12387637"/>
+              <a:gd name="connsiteY4" fmla="*/ 6120656 h 7345285"/>
+              <a:gd name="connsiteX5" fmla="*/ 11161216 w 12387637"/>
+              <a:gd name="connsiteY5" fmla="*/ 7344816 h 7345285"/>
+              <a:gd name="connsiteX6" fmla="*/ 1224160 w 12387637"/>
+              <a:gd name="connsiteY6" fmla="*/ 7344816 h 7345285"/>
+              <a:gd name="connsiteX7" fmla="*/ 0 w 12387637"/>
+              <a:gd name="connsiteY7" fmla="*/ 6120656 h 7345285"/>
+              <a:gd name="connsiteX8" fmla="*/ 0 w 12387637"/>
+              <a:gd name="connsiteY8" fmla="*/ 1224160 h 7345285"/>
+              <a:gd name="connsiteX0" fmla="*/ 0 w 12385376"/>
+              <a:gd name="connsiteY0" fmla="*/ 1224160 h 7344816"/>
+              <a:gd name="connsiteX1" fmla="*/ 1224160 w 12385376"/>
+              <a:gd name="connsiteY1" fmla="*/ 0 h 7344816"/>
+              <a:gd name="connsiteX2" fmla="*/ 11161216 w 12385376"/>
+              <a:gd name="connsiteY2" fmla="*/ 0 h 7344816"/>
+              <a:gd name="connsiteX3" fmla="*/ 12385376 w 12385376"/>
+              <a:gd name="connsiteY3" fmla="*/ 1224160 h 7344816"/>
+              <a:gd name="connsiteX4" fmla="*/ 12385376 w 12385376"/>
+              <a:gd name="connsiteY4" fmla="*/ 6120656 h 7344816"/>
+              <a:gd name="connsiteX5" fmla="*/ 11161216 w 12385376"/>
+              <a:gd name="connsiteY5" fmla="*/ 7344816 h 7344816"/>
+              <a:gd name="connsiteX6" fmla="*/ 1224160 w 12385376"/>
+              <a:gd name="connsiteY6" fmla="*/ 7344816 h 7344816"/>
+              <a:gd name="connsiteX7" fmla="*/ 0 w 12385376"/>
+              <a:gd name="connsiteY7" fmla="*/ 6120656 h 7344816"/>
+              <a:gd name="connsiteX8" fmla="*/ 0 w 12385376"/>
+              <a:gd name="connsiteY8" fmla="*/ 1224160 h 7344816"/>
+              <a:gd name="connsiteX0" fmla="*/ 0 w 12385376"/>
+              <a:gd name="connsiteY0" fmla="*/ 1224160 h 7431902"/>
+              <a:gd name="connsiteX1" fmla="*/ 1224160 w 12385376"/>
+              <a:gd name="connsiteY1" fmla="*/ 0 h 7431902"/>
+              <a:gd name="connsiteX2" fmla="*/ 11161216 w 12385376"/>
+              <a:gd name="connsiteY2" fmla="*/ 0 h 7431902"/>
+              <a:gd name="connsiteX3" fmla="*/ 12385376 w 12385376"/>
+              <a:gd name="connsiteY3" fmla="*/ 1224160 h 7431902"/>
+              <a:gd name="connsiteX4" fmla="*/ 12385376 w 12385376"/>
+              <a:gd name="connsiteY4" fmla="*/ 6120656 h 7431902"/>
+              <a:gd name="connsiteX5" fmla="*/ 11161216 w 12385376"/>
+              <a:gd name="connsiteY5" fmla="*/ 7431902 h 7431902"/>
+              <a:gd name="connsiteX6" fmla="*/ 1224160 w 12385376"/>
+              <a:gd name="connsiteY6" fmla="*/ 7344816 h 7431902"/>
+              <a:gd name="connsiteX7" fmla="*/ 0 w 12385376"/>
+              <a:gd name="connsiteY7" fmla="*/ 6120656 h 7431902"/>
+              <a:gd name="connsiteX8" fmla="*/ 0 w 12385376"/>
+              <a:gd name="connsiteY8" fmla="*/ 1224160 h 7431902"/>
+              <a:gd name="connsiteX0" fmla="*/ 0 w 12385376"/>
+              <a:gd name="connsiteY0" fmla="*/ 1224160 h 7431902"/>
+              <a:gd name="connsiteX1" fmla="*/ 1224160 w 12385376"/>
+              <a:gd name="connsiteY1" fmla="*/ 0 h 7431902"/>
+              <a:gd name="connsiteX2" fmla="*/ 11161216 w 12385376"/>
+              <a:gd name="connsiteY2" fmla="*/ 0 h 7431902"/>
+              <a:gd name="connsiteX3" fmla="*/ 12385376 w 12385376"/>
+              <a:gd name="connsiteY3" fmla="*/ 1224160 h 7431902"/>
+              <a:gd name="connsiteX4" fmla="*/ 12385376 w 12385376"/>
+              <a:gd name="connsiteY4" fmla="*/ 6120656 h 7431902"/>
+              <a:gd name="connsiteX5" fmla="*/ 11161216 w 12385376"/>
+              <a:gd name="connsiteY5" fmla="*/ 7431902 h 7431902"/>
+              <a:gd name="connsiteX6" fmla="*/ 1224160 w 12385376"/>
+              <a:gd name="connsiteY6" fmla="*/ 7344816 h 7431902"/>
+              <a:gd name="connsiteX7" fmla="*/ 0 w 12385376"/>
+              <a:gd name="connsiteY7" fmla="*/ 6120656 h 7431902"/>
+              <a:gd name="connsiteX8" fmla="*/ 0 w 12385376"/>
+              <a:gd name="connsiteY8" fmla="*/ 1224160 h 7431902"/>
+              <a:gd name="connsiteX0" fmla="*/ 14 w 12385390"/>
+              <a:gd name="connsiteY0" fmla="*/ 1224160 h 7431902"/>
+              <a:gd name="connsiteX1" fmla="*/ 1224174 w 12385390"/>
+              <a:gd name="connsiteY1" fmla="*/ 0 h 7431902"/>
+              <a:gd name="connsiteX2" fmla="*/ 11161230 w 12385390"/>
+              <a:gd name="connsiteY2" fmla="*/ 0 h 7431902"/>
+              <a:gd name="connsiteX3" fmla="*/ 12385390 w 12385390"/>
+              <a:gd name="connsiteY3" fmla="*/ 1224160 h 7431902"/>
+              <a:gd name="connsiteX4" fmla="*/ 12385390 w 12385390"/>
+              <a:gd name="connsiteY4" fmla="*/ 6120656 h 7431902"/>
+              <a:gd name="connsiteX5" fmla="*/ 11161230 w 12385390"/>
+              <a:gd name="connsiteY5" fmla="*/ 7431902 h 7431902"/>
+              <a:gd name="connsiteX6" fmla="*/ 1224174 w 12385390"/>
+              <a:gd name="connsiteY6" fmla="*/ 7344816 h 7431902"/>
+              <a:gd name="connsiteX7" fmla="*/ 14 w 12385390"/>
+              <a:gd name="connsiteY7" fmla="*/ 6120656 h 7431902"/>
+              <a:gd name="connsiteX8" fmla="*/ 14 w 12385390"/>
+              <a:gd name="connsiteY8" fmla="*/ 1224160 h 7431902"/>
+              <a:gd name="connsiteX0" fmla="*/ 14 w 12385390"/>
+              <a:gd name="connsiteY0" fmla="*/ 1224160 h 7431902"/>
+              <a:gd name="connsiteX1" fmla="*/ 1224174 w 12385390"/>
+              <a:gd name="connsiteY1" fmla="*/ 0 h 7431902"/>
+              <a:gd name="connsiteX2" fmla="*/ 11161230 w 12385390"/>
+              <a:gd name="connsiteY2" fmla="*/ 0 h 7431902"/>
+              <a:gd name="connsiteX3" fmla="*/ 12385390 w 12385390"/>
+              <a:gd name="connsiteY3" fmla="*/ 1224160 h 7431902"/>
+              <a:gd name="connsiteX4" fmla="*/ 12385390 w 12385390"/>
+              <a:gd name="connsiteY4" fmla="*/ 6120656 h 7431902"/>
+              <a:gd name="connsiteX5" fmla="*/ 11161230 w 12385390"/>
+              <a:gd name="connsiteY5" fmla="*/ 7431902 h 7431902"/>
+              <a:gd name="connsiteX6" fmla="*/ 1224174 w 12385390"/>
+              <a:gd name="connsiteY6" fmla="*/ 7344816 h 7431902"/>
+              <a:gd name="connsiteX7" fmla="*/ 14 w 12385390"/>
+              <a:gd name="connsiteY7" fmla="*/ 6120656 h 7431902"/>
+              <a:gd name="connsiteX8" fmla="*/ 14 w 12385390"/>
+              <a:gd name="connsiteY8" fmla="*/ 1224160 h 7431902"/>
+              <a:gd name="connsiteX0" fmla="*/ 14 w 12385390"/>
+              <a:gd name="connsiteY0" fmla="*/ 1224160 h 7431902"/>
+              <a:gd name="connsiteX1" fmla="*/ 1224174 w 12385390"/>
+              <a:gd name="connsiteY1" fmla="*/ 0 h 7431902"/>
+              <a:gd name="connsiteX2" fmla="*/ 11161230 w 12385390"/>
+              <a:gd name="connsiteY2" fmla="*/ 0 h 7431902"/>
+              <a:gd name="connsiteX3" fmla="*/ 12385390 w 12385390"/>
+              <a:gd name="connsiteY3" fmla="*/ 1224160 h 7431902"/>
+              <a:gd name="connsiteX4" fmla="*/ 12385390 w 12385390"/>
+              <a:gd name="connsiteY4" fmla="*/ 6120656 h 7431902"/>
+              <a:gd name="connsiteX5" fmla="*/ 11161230 w 12385390"/>
+              <a:gd name="connsiteY5" fmla="*/ 7431902 h 7431902"/>
+              <a:gd name="connsiteX6" fmla="*/ 1224174 w 12385390"/>
+              <a:gd name="connsiteY6" fmla="*/ 7344816 h 7431902"/>
+              <a:gd name="connsiteX7" fmla="*/ 14 w 12385390"/>
+              <a:gd name="connsiteY7" fmla="*/ 6120656 h 7431902"/>
+              <a:gd name="connsiteX8" fmla="*/ 14 w 12385390"/>
+              <a:gd name="connsiteY8" fmla="*/ 1224160 h 7431902"/>
+              <a:gd name="connsiteX0" fmla="*/ 14 w 12385390"/>
+              <a:gd name="connsiteY0" fmla="*/ 1224160 h 7431902"/>
+              <a:gd name="connsiteX1" fmla="*/ 1224174 w 12385390"/>
+              <a:gd name="connsiteY1" fmla="*/ 0 h 7431902"/>
+              <a:gd name="connsiteX2" fmla="*/ 11161230 w 12385390"/>
+              <a:gd name="connsiteY2" fmla="*/ 0 h 7431902"/>
+              <a:gd name="connsiteX3" fmla="*/ 12385390 w 12385390"/>
+              <a:gd name="connsiteY3" fmla="*/ 1224160 h 7431902"/>
+              <a:gd name="connsiteX4" fmla="*/ 12385390 w 12385390"/>
+              <a:gd name="connsiteY4" fmla="*/ 6120656 h 7431902"/>
+              <a:gd name="connsiteX5" fmla="*/ 11161230 w 12385390"/>
+              <a:gd name="connsiteY5" fmla="*/ 7431902 h 7431902"/>
+              <a:gd name="connsiteX6" fmla="*/ 1224174 w 12385390"/>
+              <a:gd name="connsiteY6" fmla="*/ 7344816 h 7431902"/>
+              <a:gd name="connsiteX7" fmla="*/ 14 w 12385390"/>
+              <a:gd name="connsiteY7" fmla="*/ 6120656 h 7431902"/>
+              <a:gd name="connsiteX8" fmla="*/ 14 w 12385390"/>
+              <a:gd name="connsiteY8" fmla="*/ 1224160 h 7431902"/>
+              <a:gd name="connsiteX0" fmla="*/ 0 w 12385376"/>
+              <a:gd name="connsiteY0" fmla="*/ 1224160 h 7431902"/>
+              <a:gd name="connsiteX1" fmla="*/ 1224160 w 12385376"/>
+              <a:gd name="connsiteY1" fmla="*/ 0 h 7431902"/>
+              <a:gd name="connsiteX2" fmla="*/ 11161216 w 12385376"/>
+              <a:gd name="connsiteY2" fmla="*/ 0 h 7431902"/>
+              <a:gd name="connsiteX3" fmla="*/ 12385376 w 12385376"/>
+              <a:gd name="connsiteY3" fmla="*/ 1224160 h 7431902"/>
+              <a:gd name="connsiteX4" fmla="*/ 12385376 w 12385376"/>
+              <a:gd name="connsiteY4" fmla="*/ 6120656 h 7431902"/>
+              <a:gd name="connsiteX5" fmla="*/ 11161216 w 12385376"/>
+              <a:gd name="connsiteY5" fmla="*/ 7431902 h 7431902"/>
+              <a:gd name="connsiteX6" fmla="*/ 1224160 w 12385376"/>
+              <a:gd name="connsiteY6" fmla="*/ 7344816 h 7431902"/>
+              <a:gd name="connsiteX7" fmla="*/ 0 w 12385376"/>
+              <a:gd name="connsiteY7" fmla="*/ 6120656 h 7431902"/>
+              <a:gd name="connsiteX8" fmla="*/ 0 w 12385376"/>
+              <a:gd name="connsiteY8" fmla="*/ 1224160 h 7431902"/>
+              <a:gd name="connsiteX0" fmla="*/ 0 w 12385376"/>
+              <a:gd name="connsiteY0" fmla="*/ 1224160 h 7431902"/>
+              <a:gd name="connsiteX1" fmla="*/ 1224160 w 12385376"/>
+              <a:gd name="connsiteY1" fmla="*/ 0 h 7431902"/>
+              <a:gd name="connsiteX2" fmla="*/ 11161216 w 12385376"/>
+              <a:gd name="connsiteY2" fmla="*/ 0 h 7431902"/>
+              <a:gd name="connsiteX3" fmla="*/ 12385376 w 12385376"/>
+              <a:gd name="connsiteY3" fmla="*/ 1224160 h 7431902"/>
+              <a:gd name="connsiteX4" fmla="*/ 12385376 w 12385376"/>
+              <a:gd name="connsiteY4" fmla="*/ 6120656 h 7431902"/>
+              <a:gd name="connsiteX5" fmla="*/ 11161216 w 12385376"/>
+              <a:gd name="connsiteY5" fmla="*/ 7431902 h 7431902"/>
+              <a:gd name="connsiteX6" fmla="*/ 1224160 w 12385376"/>
+              <a:gd name="connsiteY6" fmla="*/ 7344816 h 7431902"/>
+              <a:gd name="connsiteX7" fmla="*/ 0 w 12385376"/>
+              <a:gd name="connsiteY7" fmla="*/ 6120656 h 7431902"/>
+              <a:gd name="connsiteX8" fmla="*/ 0 w 12385376"/>
+              <a:gd name="connsiteY8" fmla="*/ 1224160 h 7431902"/>
+              <a:gd name="connsiteX0" fmla="*/ 0 w 12385376"/>
+              <a:gd name="connsiteY0" fmla="*/ 1224160 h 7431902"/>
+              <a:gd name="connsiteX1" fmla="*/ 1224160 w 12385376"/>
+              <a:gd name="connsiteY1" fmla="*/ 0 h 7431902"/>
+              <a:gd name="connsiteX2" fmla="*/ 11161216 w 12385376"/>
+              <a:gd name="connsiteY2" fmla="*/ 0 h 7431902"/>
+              <a:gd name="connsiteX3" fmla="*/ 12385376 w 12385376"/>
+              <a:gd name="connsiteY3" fmla="*/ 1224160 h 7431902"/>
+              <a:gd name="connsiteX4" fmla="*/ 12385376 w 12385376"/>
+              <a:gd name="connsiteY4" fmla="*/ 6120656 h 7431902"/>
+              <a:gd name="connsiteX5" fmla="*/ 11161216 w 12385376"/>
+              <a:gd name="connsiteY5" fmla="*/ 7431902 h 7431902"/>
+              <a:gd name="connsiteX6" fmla="*/ 1224160 w 12385376"/>
+              <a:gd name="connsiteY6" fmla="*/ 7344816 h 7431902"/>
+              <a:gd name="connsiteX7" fmla="*/ 0 w 12385376"/>
+              <a:gd name="connsiteY7" fmla="*/ 6120656 h 7431902"/>
+              <a:gd name="connsiteX8" fmla="*/ 0 w 12385376"/>
+              <a:gd name="connsiteY8" fmla="*/ 1224160 h 7431902"/>
+              <a:gd name="connsiteX0" fmla="*/ 0 w 12385376"/>
+              <a:gd name="connsiteY0" fmla="*/ 1224160 h 7431902"/>
+              <a:gd name="connsiteX1" fmla="*/ 1224160 w 12385376"/>
+              <a:gd name="connsiteY1" fmla="*/ 0 h 7431902"/>
+              <a:gd name="connsiteX2" fmla="*/ 11161216 w 12385376"/>
+              <a:gd name="connsiteY2" fmla="*/ 0 h 7431902"/>
+              <a:gd name="connsiteX3" fmla="*/ 12385376 w 12385376"/>
+              <a:gd name="connsiteY3" fmla="*/ 1224160 h 7431902"/>
+              <a:gd name="connsiteX4" fmla="*/ 12385376 w 12385376"/>
+              <a:gd name="connsiteY4" fmla="*/ 6120656 h 7431902"/>
+              <a:gd name="connsiteX5" fmla="*/ 11161216 w 12385376"/>
+              <a:gd name="connsiteY5" fmla="*/ 7431902 h 7431902"/>
+              <a:gd name="connsiteX6" fmla="*/ 1224160 w 12385376"/>
+              <a:gd name="connsiteY6" fmla="*/ 7344816 h 7431902"/>
+              <a:gd name="connsiteX7" fmla="*/ 0 w 12385376"/>
+              <a:gd name="connsiteY7" fmla="*/ 6120656 h 7431902"/>
+              <a:gd name="connsiteX8" fmla="*/ 0 w 12385376"/>
+              <a:gd name="connsiteY8" fmla="*/ 1224160 h 7431902"/>
+            </a:gdLst>
+            <a:ahLst/>
+            <a:cxnLst>
+              <a:cxn ang="0">
+                <a:pos x="connsiteX0" y="connsiteY0"/>
+              </a:cxn>
+              <a:cxn ang="0">
+                <a:pos x="connsiteX1" y="connsiteY1"/>
+              </a:cxn>
+              <a:cxn ang="0">
+                <a:pos x="connsiteX2" y="connsiteY2"/>
+              </a:cxn>
+              <a:cxn ang="0">
+                <a:pos x="connsiteX3" y="connsiteY3"/>
+              </a:cxn>
+              <a:cxn ang="0">
+                <a:pos x="connsiteX4" y="connsiteY4"/>
+              </a:cxn>
+              <a:cxn ang="0">
+                <a:pos x="connsiteX5" y="connsiteY5"/>
+              </a:cxn>
+              <a:cxn ang="0">
+                <a:pos x="connsiteX6" y="connsiteY6"/>
+              </a:cxn>
+              <a:cxn ang="0">
+                <a:pos x="connsiteX7" y="connsiteY7"/>
+              </a:cxn>
+              <a:cxn ang="0">
+                <a:pos x="connsiteX8" y="connsiteY8"/>
+              </a:cxn>
+            </a:cxnLst>
+            <a:rect l="l" t="t" r="r" b="b"/>
+            <a:pathLst>
+              <a:path w="12385376" h="7431902">
+                <a:moveTo>
+                  <a:pt x="0" y="1224160"/>
+                </a:moveTo>
+                <a:cubicBezTo>
+                  <a:pt x="43543" y="112646"/>
+                  <a:pt x="-17983" y="43543"/>
+                  <a:pt x="1224160" y="0"/>
+                </a:cubicBezTo>
+                <a:lnTo>
+                  <a:pt x="11161216" y="0"/>
+                </a:lnTo>
+                <a:cubicBezTo>
+                  <a:pt x="12344933" y="46298"/>
+                  <a:pt x="12382068" y="43199"/>
+                  <a:pt x="12385376" y="1224160"/>
+                </a:cubicBezTo>
+                <a:lnTo>
+                  <a:pt x="12385376" y="6120656"/>
+                </a:lnTo>
+                <a:cubicBezTo>
+                  <a:pt x="12341834" y="7319256"/>
+                  <a:pt x="12359815" y="7388359"/>
+                  <a:pt x="11161216" y="7431902"/>
+                </a:cubicBezTo>
+                <a:lnTo>
+                  <a:pt x="1224160" y="7344816"/>
+                </a:lnTo>
+                <a:cubicBezTo>
+                  <a:pt x="28317" y="7339303"/>
+                  <a:pt x="0" y="7319255"/>
+                  <a:pt x="0" y="6120656"/>
+                </a:cubicBezTo>
+                <a:lnTo>
+                  <a:pt x="0" y="1224160"/>
+                </a:lnTo>
+                <a:close/>
+              </a:path>
+            </a:pathLst>
+          </a:custGeom>
           <a:solidFill>
             <a:schemeClr val="bg1"/>
           </a:solidFill>
@@ -2167,7 +3379,7 @@
         </p:nvSpPr>
         <p:spPr>
           <a:xfrm>
-            <a:off x="31735029" y="21079783"/>
+            <a:off x="31730496" y="21141873"/>
             <a:ext cx="9145016" cy="1959078"/>
           </a:xfrm>
           <a:prstGeom prst="roundRect">
@@ -2413,7 +3625,7 @@
         </p:nvSpPr>
         <p:spPr>
           <a:xfrm>
-            <a:off x="32421299" y="4582668"/>
+            <a:off x="16357263" y="13105568"/>
             <a:ext cx="9304941" cy="1200329"/>
           </a:xfrm>
           <a:prstGeom prst="rect">
@@ -2479,7 +3691,7 @@
         </p:nvSpPr>
         <p:spPr>
           <a:xfrm>
-            <a:off x="16435422" y="12965719"/>
+            <a:off x="32779145" y="4473865"/>
             <a:ext cx="9304941" cy="1200329"/>
           </a:xfrm>
           <a:prstGeom prst="rect">
@@ -2545,12 +3757,283 @@
         </p:nvSpPr>
         <p:spPr>
           <a:xfrm>
-            <a:off x="30114849" y="13653045"/>
-            <a:ext cx="12385376" cy="7344816"/>
+            <a:off x="29982053" y="13653045"/>
+            <a:ext cx="12518171" cy="7345158"/>
           </a:xfrm>
-          <a:prstGeom prst="roundRect">
+          <a:custGeom>
             <a:avLst/>
-          </a:prstGeom>
+            <a:gdLst>
+              <a:gd name="connsiteX0" fmla="*/ 0 w 12385376"/>
+              <a:gd name="connsiteY0" fmla="*/ 1224160 h 7344816"/>
+              <a:gd name="connsiteX1" fmla="*/ 1224160 w 12385376"/>
+              <a:gd name="connsiteY1" fmla="*/ 0 h 7344816"/>
+              <a:gd name="connsiteX2" fmla="*/ 11161216 w 12385376"/>
+              <a:gd name="connsiteY2" fmla="*/ 0 h 7344816"/>
+              <a:gd name="connsiteX3" fmla="*/ 12385376 w 12385376"/>
+              <a:gd name="connsiteY3" fmla="*/ 1224160 h 7344816"/>
+              <a:gd name="connsiteX4" fmla="*/ 12385376 w 12385376"/>
+              <a:gd name="connsiteY4" fmla="*/ 6120656 h 7344816"/>
+              <a:gd name="connsiteX5" fmla="*/ 11161216 w 12385376"/>
+              <a:gd name="connsiteY5" fmla="*/ 7344816 h 7344816"/>
+              <a:gd name="connsiteX6" fmla="*/ 1224160 w 12385376"/>
+              <a:gd name="connsiteY6" fmla="*/ 7344816 h 7344816"/>
+              <a:gd name="connsiteX7" fmla="*/ 0 w 12385376"/>
+              <a:gd name="connsiteY7" fmla="*/ 6120656 h 7344816"/>
+              <a:gd name="connsiteX8" fmla="*/ 0 w 12385376"/>
+              <a:gd name="connsiteY8" fmla="*/ 1224160 h 7344816"/>
+              <a:gd name="connsiteX0" fmla="*/ 0 w 12385376"/>
+              <a:gd name="connsiteY0" fmla="*/ 1224160 h 7344816"/>
+              <a:gd name="connsiteX1" fmla="*/ 1224160 w 12385376"/>
+              <a:gd name="connsiteY1" fmla="*/ 0 h 7344816"/>
+              <a:gd name="connsiteX2" fmla="*/ 11161216 w 12385376"/>
+              <a:gd name="connsiteY2" fmla="*/ 0 h 7344816"/>
+              <a:gd name="connsiteX3" fmla="*/ 12385376 w 12385376"/>
+              <a:gd name="connsiteY3" fmla="*/ 1224160 h 7344816"/>
+              <a:gd name="connsiteX4" fmla="*/ 12385376 w 12385376"/>
+              <a:gd name="connsiteY4" fmla="*/ 6120656 h 7344816"/>
+              <a:gd name="connsiteX5" fmla="*/ 11161216 w 12385376"/>
+              <a:gd name="connsiteY5" fmla="*/ 7344816 h 7344816"/>
+              <a:gd name="connsiteX6" fmla="*/ 1224160 w 12385376"/>
+              <a:gd name="connsiteY6" fmla="*/ 7344816 h 7344816"/>
+              <a:gd name="connsiteX7" fmla="*/ 0 w 12385376"/>
+              <a:gd name="connsiteY7" fmla="*/ 6120656 h 7344816"/>
+              <a:gd name="connsiteX8" fmla="*/ 0 w 12385376"/>
+              <a:gd name="connsiteY8" fmla="*/ 1224160 h 7344816"/>
+              <a:gd name="connsiteX0" fmla="*/ 0 w 12385376"/>
+              <a:gd name="connsiteY0" fmla="*/ 1224160 h 7344816"/>
+              <a:gd name="connsiteX1" fmla="*/ 1224160 w 12385376"/>
+              <a:gd name="connsiteY1" fmla="*/ 0 h 7344816"/>
+              <a:gd name="connsiteX2" fmla="*/ 11161216 w 12385376"/>
+              <a:gd name="connsiteY2" fmla="*/ 0 h 7344816"/>
+              <a:gd name="connsiteX3" fmla="*/ 12385376 w 12385376"/>
+              <a:gd name="connsiteY3" fmla="*/ 1224160 h 7344816"/>
+              <a:gd name="connsiteX4" fmla="*/ 12385376 w 12385376"/>
+              <a:gd name="connsiteY4" fmla="*/ 6120656 h 7344816"/>
+              <a:gd name="connsiteX5" fmla="*/ 11161216 w 12385376"/>
+              <a:gd name="connsiteY5" fmla="*/ 7344816 h 7344816"/>
+              <a:gd name="connsiteX6" fmla="*/ 1224160 w 12385376"/>
+              <a:gd name="connsiteY6" fmla="*/ 7344816 h 7344816"/>
+              <a:gd name="connsiteX7" fmla="*/ 0 w 12385376"/>
+              <a:gd name="connsiteY7" fmla="*/ 6120656 h 7344816"/>
+              <a:gd name="connsiteX8" fmla="*/ 0 w 12385376"/>
+              <a:gd name="connsiteY8" fmla="*/ 1224160 h 7344816"/>
+              <a:gd name="connsiteX0" fmla="*/ 0 w 12385376"/>
+              <a:gd name="connsiteY0" fmla="*/ 1224160 h 7344830"/>
+              <a:gd name="connsiteX1" fmla="*/ 1224160 w 12385376"/>
+              <a:gd name="connsiteY1" fmla="*/ 0 h 7344830"/>
+              <a:gd name="connsiteX2" fmla="*/ 11161216 w 12385376"/>
+              <a:gd name="connsiteY2" fmla="*/ 0 h 7344830"/>
+              <a:gd name="connsiteX3" fmla="*/ 12385376 w 12385376"/>
+              <a:gd name="connsiteY3" fmla="*/ 1224160 h 7344830"/>
+              <a:gd name="connsiteX4" fmla="*/ 12385376 w 12385376"/>
+              <a:gd name="connsiteY4" fmla="*/ 6120656 h 7344830"/>
+              <a:gd name="connsiteX5" fmla="*/ 11161216 w 12385376"/>
+              <a:gd name="connsiteY5" fmla="*/ 7344816 h 7344830"/>
+              <a:gd name="connsiteX6" fmla="*/ 1224160 w 12385376"/>
+              <a:gd name="connsiteY6" fmla="*/ 7344816 h 7344830"/>
+              <a:gd name="connsiteX7" fmla="*/ 0 w 12385376"/>
+              <a:gd name="connsiteY7" fmla="*/ 6120656 h 7344830"/>
+              <a:gd name="connsiteX8" fmla="*/ 0 w 12385376"/>
+              <a:gd name="connsiteY8" fmla="*/ 1224160 h 7344830"/>
+              <a:gd name="connsiteX0" fmla="*/ 0 w 12385376"/>
+              <a:gd name="connsiteY0" fmla="*/ 1224160 h 7344830"/>
+              <a:gd name="connsiteX1" fmla="*/ 1224160 w 12385376"/>
+              <a:gd name="connsiteY1" fmla="*/ 0 h 7344830"/>
+              <a:gd name="connsiteX2" fmla="*/ 11161216 w 12385376"/>
+              <a:gd name="connsiteY2" fmla="*/ 0 h 7344830"/>
+              <a:gd name="connsiteX3" fmla="*/ 12385376 w 12385376"/>
+              <a:gd name="connsiteY3" fmla="*/ 1224160 h 7344830"/>
+              <a:gd name="connsiteX4" fmla="*/ 12385376 w 12385376"/>
+              <a:gd name="connsiteY4" fmla="*/ 6120656 h 7344830"/>
+              <a:gd name="connsiteX5" fmla="*/ 11161216 w 12385376"/>
+              <a:gd name="connsiteY5" fmla="*/ 7344816 h 7344830"/>
+              <a:gd name="connsiteX6" fmla="*/ 1224160 w 12385376"/>
+              <a:gd name="connsiteY6" fmla="*/ 7344816 h 7344830"/>
+              <a:gd name="connsiteX7" fmla="*/ 0 w 12385376"/>
+              <a:gd name="connsiteY7" fmla="*/ 6120656 h 7344830"/>
+              <a:gd name="connsiteX8" fmla="*/ 0 w 12385376"/>
+              <a:gd name="connsiteY8" fmla="*/ 1224160 h 7344830"/>
+              <a:gd name="connsiteX0" fmla="*/ 0 w 12385376"/>
+              <a:gd name="connsiteY0" fmla="*/ 1224160 h 7347077"/>
+              <a:gd name="connsiteX1" fmla="*/ 1224160 w 12385376"/>
+              <a:gd name="connsiteY1" fmla="*/ 0 h 7347077"/>
+              <a:gd name="connsiteX2" fmla="*/ 11161216 w 12385376"/>
+              <a:gd name="connsiteY2" fmla="*/ 0 h 7347077"/>
+              <a:gd name="connsiteX3" fmla="*/ 12385376 w 12385376"/>
+              <a:gd name="connsiteY3" fmla="*/ 1224160 h 7347077"/>
+              <a:gd name="connsiteX4" fmla="*/ 12385376 w 12385376"/>
+              <a:gd name="connsiteY4" fmla="*/ 6120656 h 7347077"/>
+              <a:gd name="connsiteX5" fmla="*/ 11161216 w 12385376"/>
+              <a:gd name="connsiteY5" fmla="*/ 7344816 h 7347077"/>
+              <a:gd name="connsiteX6" fmla="*/ 1224160 w 12385376"/>
+              <a:gd name="connsiteY6" fmla="*/ 7344816 h 7347077"/>
+              <a:gd name="connsiteX7" fmla="*/ 0 w 12385376"/>
+              <a:gd name="connsiteY7" fmla="*/ 6120656 h 7347077"/>
+              <a:gd name="connsiteX8" fmla="*/ 0 w 12385376"/>
+              <a:gd name="connsiteY8" fmla="*/ 1224160 h 7347077"/>
+              <a:gd name="connsiteX0" fmla="*/ 0 w 12385376"/>
+              <a:gd name="connsiteY0" fmla="*/ 1224160 h 7352847"/>
+              <a:gd name="connsiteX1" fmla="*/ 1224160 w 12385376"/>
+              <a:gd name="connsiteY1" fmla="*/ 0 h 7352847"/>
+              <a:gd name="connsiteX2" fmla="*/ 11161216 w 12385376"/>
+              <a:gd name="connsiteY2" fmla="*/ 0 h 7352847"/>
+              <a:gd name="connsiteX3" fmla="*/ 12385376 w 12385376"/>
+              <a:gd name="connsiteY3" fmla="*/ 1224160 h 7352847"/>
+              <a:gd name="connsiteX4" fmla="*/ 12385376 w 12385376"/>
+              <a:gd name="connsiteY4" fmla="*/ 6120656 h 7352847"/>
+              <a:gd name="connsiteX5" fmla="*/ 11161216 w 12385376"/>
+              <a:gd name="connsiteY5" fmla="*/ 7344816 h 7352847"/>
+              <a:gd name="connsiteX6" fmla="*/ 1224160 w 12385376"/>
+              <a:gd name="connsiteY6" fmla="*/ 7344816 h 7352847"/>
+              <a:gd name="connsiteX7" fmla="*/ 0 w 12385376"/>
+              <a:gd name="connsiteY7" fmla="*/ 6120656 h 7352847"/>
+              <a:gd name="connsiteX8" fmla="*/ 0 w 12385376"/>
+              <a:gd name="connsiteY8" fmla="*/ 1224160 h 7352847"/>
+              <a:gd name="connsiteX0" fmla="*/ 0 w 12385376"/>
+              <a:gd name="connsiteY0" fmla="*/ 1224160 h 7378707"/>
+              <a:gd name="connsiteX1" fmla="*/ 1224160 w 12385376"/>
+              <a:gd name="connsiteY1" fmla="*/ 0 h 7378707"/>
+              <a:gd name="connsiteX2" fmla="*/ 11161216 w 12385376"/>
+              <a:gd name="connsiteY2" fmla="*/ 0 h 7378707"/>
+              <a:gd name="connsiteX3" fmla="*/ 12385376 w 12385376"/>
+              <a:gd name="connsiteY3" fmla="*/ 1224160 h 7378707"/>
+              <a:gd name="connsiteX4" fmla="*/ 12385376 w 12385376"/>
+              <a:gd name="connsiteY4" fmla="*/ 6120656 h 7378707"/>
+              <a:gd name="connsiteX5" fmla="*/ 11161216 w 12385376"/>
+              <a:gd name="connsiteY5" fmla="*/ 7344816 h 7378707"/>
+              <a:gd name="connsiteX6" fmla="*/ 1224160 w 12385376"/>
+              <a:gd name="connsiteY6" fmla="*/ 7344816 h 7378707"/>
+              <a:gd name="connsiteX7" fmla="*/ 0 w 12385376"/>
+              <a:gd name="connsiteY7" fmla="*/ 6120656 h 7378707"/>
+              <a:gd name="connsiteX8" fmla="*/ 0 w 12385376"/>
+              <a:gd name="connsiteY8" fmla="*/ 1224160 h 7378707"/>
+              <a:gd name="connsiteX0" fmla="*/ 2261 w 12387637"/>
+              <a:gd name="connsiteY0" fmla="*/ 1224160 h 7378707"/>
+              <a:gd name="connsiteX1" fmla="*/ 1226421 w 12387637"/>
+              <a:gd name="connsiteY1" fmla="*/ 0 h 7378707"/>
+              <a:gd name="connsiteX2" fmla="*/ 11163477 w 12387637"/>
+              <a:gd name="connsiteY2" fmla="*/ 0 h 7378707"/>
+              <a:gd name="connsiteX3" fmla="*/ 12387637 w 12387637"/>
+              <a:gd name="connsiteY3" fmla="*/ 1224160 h 7378707"/>
+              <a:gd name="connsiteX4" fmla="*/ 12387637 w 12387637"/>
+              <a:gd name="connsiteY4" fmla="*/ 6120656 h 7378707"/>
+              <a:gd name="connsiteX5" fmla="*/ 11163477 w 12387637"/>
+              <a:gd name="connsiteY5" fmla="*/ 7344816 h 7378707"/>
+              <a:gd name="connsiteX6" fmla="*/ 1226421 w 12387637"/>
+              <a:gd name="connsiteY6" fmla="*/ 7344816 h 7378707"/>
+              <a:gd name="connsiteX7" fmla="*/ 2261 w 12387637"/>
+              <a:gd name="connsiteY7" fmla="*/ 6120656 h 7378707"/>
+              <a:gd name="connsiteX8" fmla="*/ 2261 w 12387637"/>
+              <a:gd name="connsiteY8" fmla="*/ 1224160 h 7378707"/>
+              <a:gd name="connsiteX0" fmla="*/ 9063 w 12394439"/>
+              <a:gd name="connsiteY0" fmla="*/ 1224160 h 7378707"/>
+              <a:gd name="connsiteX1" fmla="*/ 1233223 w 12394439"/>
+              <a:gd name="connsiteY1" fmla="*/ 0 h 7378707"/>
+              <a:gd name="connsiteX2" fmla="*/ 11170279 w 12394439"/>
+              <a:gd name="connsiteY2" fmla="*/ 0 h 7378707"/>
+              <a:gd name="connsiteX3" fmla="*/ 12394439 w 12394439"/>
+              <a:gd name="connsiteY3" fmla="*/ 1224160 h 7378707"/>
+              <a:gd name="connsiteX4" fmla="*/ 12394439 w 12394439"/>
+              <a:gd name="connsiteY4" fmla="*/ 6120656 h 7378707"/>
+              <a:gd name="connsiteX5" fmla="*/ 11170279 w 12394439"/>
+              <a:gd name="connsiteY5" fmla="*/ 7344816 h 7378707"/>
+              <a:gd name="connsiteX6" fmla="*/ 1233223 w 12394439"/>
+              <a:gd name="connsiteY6" fmla="*/ 7344816 h 7378707"/>
+              <a:gd name="connsiteX7" fmla="*/ 9063 w 12394439"/>
+              <a:gd name="connsiteY7" fmla="*/ 6120656 h 7378707"/>
+              <a:gd name="connsiteX8" fmla="*/ 9063 w 12394439"/>
+              <a:gd name="connsiteY8" fmla="*/ 1224160 h 7378707"/>
+              <a:gd name="connsiteX0" fmla="*/ 9063 w 12394439"/>
+              <a:gd name="connsiteY0" fmla="*/ 1224160 h 7345158"/>
+              <a:gd name="connsiteX1" fmla="*/ 1233223 w 12394439"/>
+              <a:gd name="connsiteY1" fmla="*/ 0 h 7345158"/>
+              <a:gd name="connsiteX2" fmla="*/ 11170279 w 12394439"/>
+              <a:gd name="connsiteY2" fmla="*/ 0 h 7345158"/>
+              <a:gd name="connsiteX3" fmla="*/ 12394439 w 12394439"/>
+              <a:gd name="connsiteY3" fmla="*/ 1224160 h 7345158"/>
+              <a:gd name="connsiteX4" fmla="*/ 12394439 w 12394439"/>
+              <a:gd name="connsiteY4" fmla="*/ 6120656 h 7345158"/>
+              <a:gd name="connsiteX5" fmla="*/ 11170279 w 12394439"/>
+              <a:gd name="connsiteY5" fmla="*/ 7344816 h 7345158"/>
+              <a:gd name="connsiteX6" fmla="*/ 1233223 w 12394439"/>
+              <a:gd name="connsiteY6" fmla="*/ 7344816 h 7345158"/>
+              <a:gd name="connsiteX7" fmla="*/ 9063 w 12394439"/>
+              <a:gd name="connsiteY7" fmla="*/ 6120656 h 7345158"/>
+              <a:gd name="connsiteX8" fmla="*/ 9063 w 12394439"/>
+              <a:gd name="connsiteY8" fmla="*/ 1224160 h 7345158"/>
+            </a:gdLst>
+            <a:ahLst/>
+            <a:cxnLst>
+              <a:cxn ang="0">
+                <a:pos x="connsiteX0" y="connsiteY0"/>
+              </a:cxn>
+              <a:cxn ang="0">
+                <a:pos x="connsiteX1" y="connsiteY1"/>
+              </a:cxn>
+              <a:cxn ang="0">
+                <a:pos x="connsiteX2" y="connsiteY2"/>
+              </a:cxn>
+              <a:cxn ang="0">
+                <a:pos x="connsiteX3" y="connsiteY3"/>
+              </a:cxn>
+              <a:cxn ang="0">
+                <a:pos x="connsiteX4" y="connsiteY4"/>
+              </a:cxn>
+              <a:cxn ang="0">
+                <a:pos x="connsiteX5" y="connsiteY5"/>
+              </a:cxn>
+              <a:cxn ang="0">
+                <a:pos x="connsiteX6" y="connsiteY6"/>
+              </a:cxn>
+              <a:cxn ang="0">
+                <a:pos x="connsiteX7" y="connsiteY7"/>
+              </a:cxn>
+              <a:cxn ang="0">
+                <a:pos x="connsiteX8" y="connsiteY8"/>
+              </a:cxn>
+            </a:cxnLst>
+            <a:rect l="l" t="t" r="r" b="b"/>
+            <a:pathLst>
+              <a:path w="12394439" h="7345158">
+                <a:moveTo>
+                  <a:pt x="9063" y="1224160"/>
+                </a:moveTo>
+                <a:cubicBezTo>
+                  <a:pt x="-34480" y="69103"/>
+                  <a:pt x="34624" y="43542"/>
+                  <a:pt x="1233223" y="0"/>
+                </a:cubicBezTo>
+                <a:lnTo>
+                  <a:pt x="11170279" y="0"/>
+                </a:lnTo>
+                <a:cubicBezTo>
+                  <a:pt x="12281792" y="43543"/>
+                  <a:pt x="12394439" y="-17982"/>
+                  <a:pt x="12394439" y="1224160"/>
+                </a:cubicBezTo>
+                <a:lnTo>
+                  <a:pt x="12394439" y="6120656"/>
+                </a:lnTo>
+                <a:cubicBezTo>
+                  <a:pt x="12307354" y="7362798"/>
+                  <a:pt x="12412421" y="7344816"/>
+                  <a:pt x="11170279" y="7344816"/>
+                </a:cubicBezTo>
+                <a:lnTo>
+                  <a:pt x="1233223" y="7344816"/>
+                </a:lnTo>
+                <a:cubicBezTo>
+                  <a:pt x="107380" y="7339304"/>
+                  <a:pt x="9063" y="7449884"/>
+                  <a:pt x="9063" y="6120656"/>
+                </a:cubicBezTo>
+                <a:lnTo>
+                  <a:pt x="9063" y="1224160"/>
+                </a:lnTo>
+                <a:close/>
+              </a:path>
+            </a:pathLst>
+          </a:custGeom>
           <a:solidFill>
             <a:schemeClr val="bg1"/>
           </a:solidFill>
@@ -2596,7 +4079,7 @@
         </p:nvSpPr>
         <p:spPr>
           <a:xfrm>
-            <a:off x="31735029" y="13186510"/>
+            <a:off x="31730496" y="13297968"/>
             <a:ext cx="9145016" cy="1959078"/>
           </a:xfrm>
           <a:prstGeom prst="roundRect">
@@ -2688,8 +4171,8 @@
         </p:nvSpPr>
         <p:spPr>
           <a:xfrm>
-            <a:off x="33787257" y="13565884"/>
-            <a:ext cx="9304941" cy="1200329"/>
+            <a:off x="33715249" y="13502436"/>
+            <a:ext cx="5544616" cy="1200329"/>
           </a:xfrm>
           <a:prstGeom prst="rect">
             <a:avLst/>
@@ -2724,6 +4207,224 @@
           </a:p>
         </p:txBody>
       </p:sp>
+      <p:sp>
+        <p:nvSpPr>
+          <p:cNvPr id="2" name="TextBox 1"/>
+          <p:cNvSpPr txBox="1"/>
+          <p:nvPr/>
+        </p:nvSpPr>
+        <p:spPr>
+          <a:xfrm>
+            <a:off x="16055287" y="1973572"/>
+            <a:ext cx="14941660" cy="1569660"/>
+          </a:xfrm>
+          <a:prstGeom prst="rect">
+            <a:avLst/>
+          </a:prstGeom>
+          <a:noFill/>
+        </p:spPr>
+        <p:txBody>
+          <a:bodyPr wrap="square" rtlCol="0">
+            <a:spAutoFit/>
+          </a:bodyPr>
+          <a:lstStyle/>
+          <a:p>
+            <a:pPr algn="ctr"/>
+            <a:r>
+              <a:rPr lang="en-US" altLang="zh-CN" sz="3200" dirty="0">
+                <a:solidFill>
+                  <a:schemeClr val="bg1"/>
+                </a:solidFill>
+              </a:rPr>
+              <a:t>Zeqi Fu, </a:t>
+            </a:r>
+            <a:r>
+              <a:rPr lang="en-US" altLang="zh-CN" sz="3200" dirty="0" err="1">
+                <a:solidFill>
+                  <a:schemeClr val="bg1"/>
+                </a:solidFill>
+              </a:rPr>
+              <a:t>Zeyu</a:t>
+            </a:r>
+            <a:r>
+              <a:rPr lang="en-US" altLang="zh-CN" sz="3200" dirty="0">
+                <a:solidFill>
+                  <a:schemeClr val="bg1"/>
+                </a:solidFill>
+              </a:rPr>
+              <a:t> Lin, Minh Tam </a:t>
+            </a:r>
+            <a:r>
+              <a:rPr lang="en-US" altLang="zh-CN" sz="3200" dirty="0" smtClean="0">
+                <a:solidFill>
+                  <a:schemeClr val="bg1"/>
+                </a:solidFill>
+              </a:rPr>
+              <a:t>Phan</a:t>
+            </a:r>
+            <a:r>
+              <a:rPr lang="zh-CN" altLang="en-US" sz="3200" dirty="0" smtClean="0">
+                <a:solidFill>
+                  <a:schemeClr val="bg1"/>
+                </a:solidFill>
+              </a:rPr>
+              <a:t> </a:t>
+            </a:r>
+            <a:r>
+              <a:rPr lang="en-US" altLang="zh-CN" sz="3200" dirty="0" smtClean="0">
+                <a:solidFill>
+                  <a:schemeClr val="bg1"/>
+                </a:solidFill>
+              </a:rPr>
+              <a:t>@</a:t>
+            </a:r>
+            <a:r>
+              <a:rPr lang="en-US" altLang="zh-CN" sz="3200" dirty="0" err="1" smtClean="0">
+                <a:solidFill>
+                  <a:schemeClr val="bg1"/>
+                </a:solidFill>
+              </a:rPr>
+              <a:t>student.adelaide.edu.au</a:t>
+            </a:r>
+            <a:endParaRPr lang="en-US" altLang="zh-CN" sz="3200" dirty="0">
+              <a:solidFill>
+                <a:schemeClr val="bg1"/>
+              </a:solidFill>
+            </a:endParaRPr>
+          </a:p>
+          <a:p>
+            <a:pPr algn="ctr"/>
+            <a:r>
+              <a:rPr lang="en-US" altLang="zh-CN" sz="3200" dirty="0" smtClean="0">
+                <a:solidFill>
+                  <a:schemeClr val="bg1"/>
+                </a:solidFill>
+              </a:rPr>
+              <a:t>Supervised</a:t>
+            </a:r>
+            <a:r>
+              <a:rPr lang="zh-CN" altLang="en-US" sz="3200" dirty="0" smtClean="0">
+                <a:solidFill>
+                  <a:schemeClr val="bg1"/>
+                </a:solidFill>
+              </a:rPr>
+              <a:t> </a:t>
+            </a:r>
+            <a:r>
+              <a:rPr lang="en-US" altLang="zh-CN" sz="3200" dirty="0" smtClean="0">
+                <a:solidFill>
+                  <a:schemeClr val="bg1"/>
+                </a:solidFill>
+              </a:rPr>
+              <a:t>by</a:t>
+            </a:r>
+            <a:r>
+              <a:rPr lang="zh-CN" altLang="en-US" sz="3200" dirty="0" smtClean="0">
+                <a:solidFill>
+                  <a:schemeClr val="bg1"/>
+                </a:solidFill>
+              </a:rPr>
+              <a:t> </a:t>
+            </a:r>
+            <a:r>
+              <a:rPr lang="en-US" sz="3200" dirty="0">
+                <a:solidFill>
+                  <a:schemeClr val="bg1"/>
+                </a:solidFill>
+              </a:rPr>
+              <a:t>Nickolas Falkner, Christoph </a:t>
+            </a:r>
+            <a:r>
+              <a:rPr lang="en-US" sz="3200" dirty="0" err="1">
+                <a:solidFill>
+                  <a:schemeClr val="bg1"/>
+                </a:solidFill>
+              </a:rPr>
+              <a:t>Treude</a:t>
+            </a:r>
+            <a:r>
+              <a:rPr lang="en-US" sz="3200" dirty="0">
+                <a:solidFill>
+                  <a:schemeClr val="bg1"/>
+                </a:solidFill>
+              </a:rPr>
+              <a:t>, Claudia Szabo, Marian </a:t>
+            </a:r>
+            <a:r>
+              <a:rPr lang="en-US" sz="3200" dirty="0" err="1" smtClean="0">
+                <a:solidFill>
+                  <a:schemeClr val="bg1"/>
+                </a:solidFill>
+              </a:rPr>
+              <a:t>Mihailescu</a:t>
+            </a:r>
+          </a:p>
+          <a:p>
+            <a:pPr algn="ctr"/>
+            <a:r>
+              <a:rPr lang="en-US" altLang="zh-CN" sz="3200" dirty="0" smtClean="0">
+                <a:solidFill>
+                  <a:schemeClr val="bg1"/>
+                </a:solidFill>
+              </a:rPr>
+              <a:t>School</a:t>
+            </a:r>
+            <a:r>
+              <a:rPr lang="zh-CN" altLang="en-US" sz="3200" dirty="0" smtClean="0">
+                <a:solidFill>
+                  <a:schemeClr val="bg1"/>
+                </a:solidFill>
+              </a:rPr>
+              <a:t> </a:t>
+            </a:r>
+            <a:r>
+              <a:rPr lang="en-US" altLang="zh-CN" sz="3200" dirty="0" smtClean="0">
+                <a:solidFill>
+                  <a:schemeClr val="bg1"/>
+                </a:solidFill>
+              </a:rPr>
+              <a:t>of</a:t>
+            </a:r>
+            <a:r>
+              <a:rPr lang="zh-CN" altLang="en-US" sz="3200" dirty="0" smtClean="0">
+                <a:solidFill>
+                  <a:schemeClr val="bg1"/>
+                </a:solidFill>
+              </a:rPr>
+              <a:t> </a:t>
+            </a:r>
+            <a:r>
+              <a:rPr lang="en-US" altLang="zh-CN" sz="3200" dirty="0" smtClean="0">
+                <a:solidFill>
+                  <a:schemeClr val="bg1"/>
+                </a:solidFill>
+              </a:rPr>
+              <a:t>Computer</a:t>
+            </a:r>
+            <a:r>
+              <a:rPr lang="zh-CN" altLang="en-US" sz="3200" dirty="0" smtClean="0">
+                <a:solidFill>
+                  <a:schemeClr val="bg1"/>
+                </a:solidFill>
+              </a:rPr>
+              <a:t> </a:t>
+            </a:r>
+            <a:r>
+              <a:rPr lang="en-US" altLang="zh-CN" sz="3200" dirty="0" smtClean="0">
+                <a:solidFill>
+                  <a:schemeClr val="bg1"/>
+                </a:solidFill>
+              </a:rPr>
+              <a:t>Science</a:t>
+            </a:r>
+            <a:endParaRPr lang="en-US" sz="3200" dirty="0">
+              <a:solidFill>
+                <a:schemeClr val="bg1"/>
+              </a:solidFill>
+            </a:endParaRPr>
+          </a:p>
+        </p:txBody>
+      </p:sp>
     </p:spTree>
     <p:extLst>
       <p:ext uri="{BB962C8B-B14F-4D97-AF65-F5344CB8AC3E}">
@@ -2734,6 +4435,13 @@
   <p:clrMapOvr>
     <a:masterClrMapping/>
   </p:clrMapOvr>
+  <p:timing>
+    <p:tnLst>
+      <p:par>
+        <p:cTn id="1" dur="indefinite" restart="never" nodeType="tmRoot"/>
+      </p:par>
+    </p:tnLst>
+  </p:timing>
 </p:sld>
 </file>
 

</xml_diff>

<commit_message>
Update the Poster Sub-title close #173
Update the Poster Sub-title PPT
</commit_message>
<xml_diff>
--- a/Poster/Stu_data Poster.pptx
+++ b/Poster/Stu_data Poster.pptx
@@ -226,7 +226,7 @@
             <a:fld id="{59D7332B-1442-4F8C-A160-0D5EB57A24C0}" type="datetimeFigureOut">
               <a:rPr lang="en-AU" smtClean="0"/>
               <a:pPr/>
-              <a:t>7/10/17</a:t>
+              <a:t>9/10/17</a:t>
             </a:fld>
             <a:endParaRPr lang="en-AU"/>
           </a:p>
@@ -393,7 +393,7 @@
             <a:fld id="{33744820-F59C-490B-A624-3CEFDFE2581B}" type="datetimeFigureOut">
               <a:rPr lang="en-AU" smtClean="0"/>
               <a:pPr/>
-              <a:t>7/10/17</a:t>
+              <a:t>9/10/17</a:t>
             </a:fld>
             <a:endParaRPr lang="en-AU"/>
           </a:p>
@@ -1097,6 +1097,448 @@
       </p:grpSpPr>
       <p:sp>
         <p:nvSpPr>
+          <p:cNvPr id="27" name="Rounded Rectangle 10"/>
+          <p:cNvSpPr/>
+          <p:nvPr/>
+        </p:nvSpPr>
+        <p:spPr>
+          <a:xfrm>
+            <a:off x="29994002" y="21240295"/>
+            <a:ext cx="12518172" cy="4728873"/>
+          </a:xfrm>
+          <a:custGeom>
+            <a:avLst/>
+            <a:gdLst>
+              <a:gd name="connsiteX0" fmla="*/ 0 w 12385376"/>
+              <a:gd name="connsiteY0" fmla="*/ 1224160 h 7344816"/>
+              <a:gd name="connsiteX1" fmla="*/ 1224160 w 12385376"/>
+              <a:gd name="connsiteY1" fmla="*/ 0 h 7344816"/>
+              <a:gd name="connsiteX2" fmla="*/ 11161216 w 12385376"/>
+              <a:gd name="connsiteY2" fmla="*/ 0 h 7344816"/>
+              <a:gd name="connsiteX3" fmla="*/ 12385376 w 12385376"/>
+              <a:gd name="connsiteY3" fmla="*/ 1224160 h 7344816"/>
+              <a:gd name="connsiteX4" fmla="*/ 12385376 w 12385376"/>
+              <a:gd name="connsiteY4" fmla="*/ 6120656 h 7344816"/>
+              <a:gd name="connsiteX5" fmla="*/ 11161216 w 12385376"/>
+              <a:gd name="connsiteY5" fmla="*/ 7344816 h 7344816"/>
+              <a:gd name="connsiteX6" fmla="*/ 1224160 w 12385376"/>
+              <a:gd name="connsiteY6" fmla="*/ 7344816 h 7344816"/>
+              <a:gd name="connsiteX7" fmla="*/ 0 w 12385376"/>
+              <a:gd name="connsiteY7" fmla="*/ 6120656 h 7344816"/>
+              <a:gd name="connsiteX8" fmla="*/ 0 w 12385376"/>
+              <a:gd name="connsiteY8" fmla="*/ 1224160 h 7344816"/>
+              <a:gd name="connsiteX0" fmla="*/ 0 w 12385376"/>
+              <a:gd name="connsiteY0" fmla="*/ 1224160 h 7344816"/>
+              <a:gd name="connsiteX1" fmla="*/ 1224160 w 12385376"/>
+              <a:gd name="connsiteY1" fmla="*/ 0 h 7344816"/>
+              <a:gd name="connsiteX2" fmla="*/ 11161216 w 12385376"/>
+              <a:gd name="connsiteY2" fmla="*/ 0 h 7344816"/>
+              <a:gd name="connsiteX3" fmla="*/ 12385376 w 12385376"/>
+              <a:gd name="connsiteY3" fmla="*/ 1224160 h 7344816"/>
+              <a:gd name="connsiteX4" fmla="*/ 12385376 w 12385376"/>
+              <a:gd name="connsiteY4" fmla="*/ 6120656 h 7344816"/>
+              <a:gd name="connsiteX5" fmla="*/ 11161216 w 12385376"/>
+              <a:gd name="connsiteY5" fmla="*/ 7344816 h 7344816"/>
+              <a:gd name="connsiteX6" fmla="*/ 1224160 w 12385376"/>
+              <a:gd name="connsiteY6" fmla="*/ 7344816 h 7344816"/>
+              <a:gd name="connsiteX7" fmla="*/ 0 w 12385376"/>
+              <a:gd name="connsiteY7" fmla="*/ 6120656 h 7344816"/>
+              <a:gd name="connsiteX8" fmla="*/ 0 w 12385376"/>
+              <a:gd name="connsiteY8" fmla="*/ 1224160 h 7344816"/>
+              <a:gd name="connsiteX0" fmla="*/ 0 w 12385376"/>
+              <a:gd name="connsiteY0" fmla="*/ 1224160 h 7344816"/>
+              <a:gd name="connsiteX1" fmla="*/ 1224160 w 12385376"/>
+              <a:gd name="connsiteY1" fmla="*/ 0 h 7344816"/>
+              <a:gd name="connsiteX2" fmla="*/ 11161216 w 12385376"/>
+              <a:gd name="connsiteY2" fmla="*/ 0 h 7344816"/>
+              <a:gd name="connsiteX3" fmla="*/ 12385376 w 12385376"/>
+              <a:gd name="connsiteY3" fmla="*/ 1224160 h 7344816"/>
+              <a:gd name="connsiteX4" fmla="*/ 12385376 w 12385376"/>
+              <a:gd name="connsiteY4" fmla="*/ 6120656 h 7344816"/>
+              <a:gd name="connsiteX5" fmla="*/ 11161216 w 12385376"/>
+              <a:gd name="connsiteY5" fmla="*/ 7344816 h 7344816"/>
+              <a:gd name="connsiteX6" fmla="*/ 1224160 w 12385376"/>
+              <a:gd name="connsiteY6" fmla="*/ 7344816 h 7344816"/>
+              <a:gd name="connsiteX7" fmla="*/ 0 w 12385376"/>
+              <a:gd name="connsiteY7" fmla="*/ 6120656 h 7344816"/>
+              <a:gd name="connsiteX8" fmla="*/ 0 w 12385376"/>
+              <a:gd name="connsiteY8" fmla="*/ 1224160 h 7344816"/>
+              <a:gd name="connsiteX0" fmla="*/ 0 w 12387637"/>
+              <a:gd name="connsiteY0" fmla="*/ 1224160 h 7345285"/>
+              <a:gd name="connsiteX1" fmla="*/ 1224160 w 12387637"/>
+              <a:gd name="connsiteY1" fmla="*/ 0 h 7345285"/>
+              <a:gd name="connsiteX2" fmla="*/ 11161216 w 12387637"/>
+              <a:gd name="connsiteY2" fmla="*/ 0 h 7345285"/>
+              <a:gd name="connsiteX3" fmla="*/ 12385376 w 12387637"/>
+              <a:gd name="connsiteY3" fmla="*/ 1224160 h 7345285"/>
+              <a:gd name="connsiteX4" fmla="*/ 12385376 w 12387637"/>
+              <a:gd name="connsiteY4" fmla="*/ 6120656 h 7345285"/>
+              <a:gd name="connsiteX5" fmla="*/ 11161216 w 12387637"/>
+              <a:gd name="connsiteY5" fmla="*/ 7344816 h 7345285"/>
+              <a:gd name="connsiteX6" fmla="*/ 1224160 w 12387637"/>
+              <a:gd name="connsiteY6" fmla="*/ 7344816 h 7345285"/>
+              <a:gd name="connsiteX7" fmla="*/ 0 w 12387637"/>
+              <a:gd name="connsiteY7" fmla="*/ 6120656 h 7345285"/>
+              <a:gd name="connsiteX8" fmla="*/ 0 w 12387637"/>
+              <a:gd name="connsiteY8" fmla="*/ 1224160 h 7345285"/>
+              <a:gd name="connsiteX0" fmla="*/ 0 w 12385376"/>
+              <a:gd name="connsiteY0" fmla="*/ 1224160 h 7344816"/>
+              <a:gd name="connsiteX1" fmla="*/ 1224160 w 12385376"/>
+              <a:gd name="connsiteY1" fmla="*/ 0 h 7344816"/>
+              <a:gd name="connsiteX2" fmla="*/ 11161216 w 12385376"/>
+              <a:gd name="connsiteY2" fmla="*/ 0 h 7344816"/>
+              <a:gd name="connsiteX3" fmla="*/ 12385376 w 12385376"/>
+              <a:gd name="connsiteY3" fmla="*/ 1224160 h 7344816"/>
+              <a:gd name="connsiteX4" fmla="*/ 12385376 w 12385376"/>
+              <a:gd name="connsiteY4" fmla="*/ 6120656 h 7344816"/>
+              <a:gd name="connsiteX5" fmla="*/ 11161216 w 12385376"/>
+              <a:gd name="connsiteY5" fmla="*/ 7344816 h 7344816"/>
+              <a:gd name="connsiteX6" fmla="*/ 1224160 w 12385376"/>
+              <a:gd name="connsiteY6" fmla="*/ 7344816 h 7344816"/>
+              <a:gd name="connsiteX7" fmla="*/ 0 w 12385376"/>
+              <a:gd name="connsiteY7" fmla="*/ 6120656 h 7344816"/>
+              <a:gd name="connsiteX8" fmla="*/ 0 w 12385376"/>
+              <a:gd name="connsiteY8" fmla="*/ 1224160 h 7344816"/>
+              <a:gd name="connsiteX0" fmla="*/ 0 w 12385376"/>
+              <a:gd name="connsiteY0" fmla="*/ 1224160 h 7431902"/>
+              <a:gd name="connsiteX1" fmla="*/ 1224160 w 12385376"/>
+              <a:gd name="connsiteY1" fmla="*/ 0 h 7431902"/>
+              <a:gd name="connsiteX2" fmla="*/ 11161216 w 12385376"/>
+              <a:gd name="connsiteY2" fmla="*/ 0 h 7431902"/>
+              <a:gd name="connsiteX3" fmla="*/ 12385376 w 12385376"/>
+              <a:gd name="connsiteY3" fmla="*/ 1224160 h 7431902"/>
+              <a:gd name="connsiteX4" fmla="*/ 12385376 w 12385376"/>
+              <a:gd name="connsiteY4" fmla="*/ 6120656 h 7431902"/>
+              <a:gd name="connsiteX5" fmla="*/ 11161216 w 12385376"/>
+              <a:gd name="connsiteY5" fmla="*/ 7431902 h 7431902"/>
+              <a:gd name="connsiteX6" fmla="*/ 1224160 w 12385376"/>
+              <a:gd name="connsiteY6" fmla="*/ 7344816 h 7431902"/>
+              <a:gd name="connsiteX7" fmla="*/ 0 w 12385376"/>
+              <a:gd name="connsiteY7" fmla="*/ 6120656 h 7431902"/>
+              <a:gd name="connsiteX8" fmla="*/ 0 w 12385376"/>
+              <a:gd name="connsiteY8" fmla="*/ 1224160 h 7431902"/>
+              <a:gd name="connsiteX0" fmla="*/ 0 w 12385376"/>
+              <a:gd name="connsiteY0" fmla="*/ 1224160 h 7431902"/>
+              <a:gd name="connsiteX1" fmla="*/ 1224160 w 12385376"/>
+              <a:gd name="connsiteY1" fmla="*/ 0 h 7431902"/>
+              <a:gd name="connsiteX2" fmla="*/ 11161216 w 12385376"/>
+              <a:gd name="connsiteY2" fmla="*/ 0 h 7431902"/>
+              <a:gd name="connsiteX3" fmla="*/ 12385376 w 12385376"/>
+              <a:gd name="connsiteY3" fmla="*/ 1224160 h 7431902"/>
+              <a:gd name="connsiteX4" fmla="*/ 12385376 w 12385376"/>
+              <a:gd name="connsiteY4" fmla="*/ 6120656 h 7431902"/>
+              <a:gd name="connsiteX5" fmla="*/ 11161216 w 12385376"/>
+              <a:gd name="connsiteY5" fmla="*/ 7431902 h 7431902"/>
+              <a:gd name="connsiteX6" fmla="*/ 1224160 w 12385376"/>
+              <a:gd name="connsiteY6" fmla="*/ 7344816 h 7431902"/>
+              <a:gd name="connsiteX7" fmla="*/ 0 w 12385376"/>
+              <a:gd name="connsiteY7" fmla="*/ 6120656 h 7431902"/>
+              <a:gd name="connsiteX8" fmla="*/ 0 w 12385376"/>
+              <a:gd name="connsiteY8" fmla="*/ 1224160 h 7431902"/>
+              <a:gd name="connsiteX0" fmla="*/ 14 w 12385390"/>
+              <a:gd name="connsiteY0" fmla="*/ 1224160 h 7431902"/>
+              <a:gd name="connsiteX1" fmla="*/ 1224174 w 12385390"/>
+              <a:gd name="connsiteY1" fmla="*/ 0 h 7431902"/>
+              <a:gd name="connsiteX2" fmla="*/ 11161230 w 12385390"/>
+              <a:gd name="connsiteY2" fmla="*/ 0 h 7431902"/>
+              <a:gd name="connsiteX3" fmla="*/ 12385390 w 12385390"/>
+              <a:gd name="connsiteY3" fmla="*/ 1224160 h 7431902"/>
+              <a:gd name="connsiteX4" fmla="*/ 12385390 w 12385390"/>
+              <a:gd name="connsiteY4" fmla="*/ 6120656 h 7431902"/>
+              <a:gd name="connsiteX5" fmla="*/ 11161230 w 12385390"/>
+              <a:gd name="connsiteY5" fmla="*/ 7431902 h 7431902"/>
+              <a:gd name="connsiteX6" fmla="*/ 1224174 w 12385390"/>
+              <a:gd name="connsiteY6" fmla="*/ 7344816 h 7431902"/>
+              <a:gd name="connsiteX7" fmla="*/ 14 w 12385390"/>
+              <a:gd name="connsiteY7" fmla="*/ 6120656 h 7431902"/>
+              <a:gd name="connsiteX8" fmla="*/ 14 w 12385390"/>
+              <a:gd name="connsiteY8" fmla="*/ 1224160 h 7431902"/>
+              <a:gd name="connsiteX0" fmla="*/ 14 w 12385390"/>
+              <a:gd name="connsiteY0" fmla="*/ 1224160 h 7431902"/>
+              <a:gd name="connsiteX1" fmla="*/ 1224174 w 12385390"/>
+              <a:gd name="connsiteY1" fmla="*/ 0 h 7431902"/>
+              <a:gd name="connsiteX2" fmla="*/ 11161230 w 12385390"/>
+              <a:gd name="connsiteY2" fmla="*/ 0 h 7431902"/>
+              <a:gd name="connsiteX3" fmla="*/ 12385390 w 12385390"/>
+              <a:gd name="connsiteY3" fmla="*/ 1224160 h 7431902"/>
+              <a:gd name="connsiteX4" fmla="*/ 12385390 w 12385390"/>
+              <a:gd name="connsiteY4" fmla="*/ 6120656 h 7431902"/>
+              <a:gd name="connsiteX5" fmla="*/ 11161230 w 12385390"/>
+              <a:gd name="connsiteY5" fmla="*/ 7431902 h 7431902"/>
+              <a:gd name="connsiteX6" fmla="*/ 1224174 w 12385390"/>
+              <a:gd name="connsiteY6" fmla="*/ 7344816 h 7431902"/>
+              <a:gd name="connsiteX7" fmla="*/ 14 w 12385390"/>
+              <a:gd name="connsiteY7" fmla="*/ 6120656 h 7431902"/>
+              <a:gd name="connsiteX8" fmla="*/ 14 w 12385390"/>
+              <a:gd name="connsiteY8" fmla="*/ 1224160 h 7431902"/>
+              <a:gd name="connsiteX0" fmla="*/ 14 w 12385390"/>
+              <a:gd name="connsiteY0" fmla="*/ 1224160 h 7431902"/>
+              <a:gd name="connsiteX1" fmla="*/ 1224174 w 12385390"/>
+              <a:gd name="connsiteY1" fmla="*/ 0 h 7431902"/>
+              <a:gd name="connsiteX2" fmla="*/ 11161230 w 12385390"/>
+              <a:gd name="connsiteY2" fmla="*/ 0 h 7431902"/>
+              <a:gd name="connsiteX3" fmla="*/ 12385390 w 12385390"/>
+              <a:gd name="connsiteY3" fmla="*/ 1224160 h 7431902"/>
+              <a:gd name="connsiteX4" fmla="*/ 12385390 w 12385390"/>
+              <a:gd name="connsiteY4" fmla="*/ 6120656 h 7431902"/>
+              <a:gd name="connsiteX5" fmla="*/ 11161230 w 12385390"/>
+              <a:gd name="connsiteY5" fmla="*/ 7431902 h 7431902"/>
+              <a:gd name="connsiteX6" fmla="*/ 1224174 w 12385390"/>
+              <a:gd name="connsiteY6" fmla="*/ 7344816 h 7431902"/>
+              <a:gd name="connsiteX7" fmla="*/ 14 w 12385390"/>
+              <a:gd name="connsiteY7" fmla="*/ 6120656 h 7431902"/>
+              <a:gd name="connsiteX8" fmla="*/ 14 w 12385390"/>
+              <a:gd name="connsiteY8" fmla="*/ 1224160 h 7431902"/>
+              <a:gd name="connsiteX0" fmla="*/ 14 w 12385390"/>
+              <a:gd name="connsiteY0" fmla="*/ 1224160 h 7431902"/>
+              <a:gd name="connsiteX1" fmla="*/ 1224174 w 12385390"/>
+              <a:gd name="connsiteY1" fmla="*/ 0 h 7431902"/>
+              <a:gd name="connsiteX2" fmla="*/ 11161230 w 12385390"/>
+              <a:gd name="connsiteY2" fmla="*/ 0 h 7431902"/>
+              <a:gd name="connsiteX3" fmla="*/ 12385390 w 12385390"/>
+              <a:gd name="connsiteY3" fmla="*/ 1224160 h 7431902"/>
+              <a:gd name="connsiteX4" fmla="*/ 12385390 w 12385390"/>
+              <a:gd name="connsiteY4" fmla="*/ 6120656 h 7431902"/>
+              <a:gd name="connsiteX5" fmla="*/ 11161230 w 12385390"/>
+              <a:gd name="connsiteY5" fmla="*/ 7431902 h 7431902"/>
+              <a:gd name="connsiteX6" fmla="*/ 1224174 w 12385390"/>
+              <a:gd name="connsiteY6" fmla="*/ 7344816 h 7431902"/>
+              <a:gd name="connsiteX7" fmla="*/ 14 w 12385390"/>
+              <a:gd name="connsiteY7" fmla="*/ 6120656 h 7431902"/>
+              <a:gd name="connsiteX8" fmla="*/ 14 w 12385390"/>
+              <a:gd name="connsiteY8" fmla="*/ 1224160 h 7431902"/>
+              <a:gd name="connsiteX0" fmla="*/ 0 w 12385376"/>
+              <a:gd name="connsiteY0" fmla="*/ 1224160 h 7431902"/>
+              <a:gd name="connsiteX1" fmla="*/ 1224160 w 12385376"/>
+              <a:gd name="connsiteY1" fmla="*/ 0 h 7431902"/>
+              <a:gd name="connsiteX2" fmla="*/ 11161216 w 12385376"/>
+              <a:gd name="connsiteY2" fmla="*/ 0 h 7431902"/>
+              <a:gd name="connsiteX3" fmla="*/ 12385376 w 12385376"/>
+              <a:gd name="connsiteY3" fmla="*/ 1224160 h 7431902"/>
+              <a:gd name="connsiteX4" fmla="*/ 12385376 w 12385376"/>
+              <a:gd name="connsiteY4" fmla="*/ 6120656 h 7431902"/>
+              <a:gd name="connsiteX5" fmla="*/ 11161216 w 12385376"/>
+              <a:gd name="connsiteY5" fmla="*/ 7431902 h 7431902"/>
+              <a:gd name="connsiteX6" fmla="*/ 1224160 w 12385376"/>
+              <a:gd name="connsiteY6" fmla="*/ 7344816 h 7431902"/>
+              <a:gd name="connsiteX7" fmla="*/ 0 w 12385376"/>
+              <a:gd name="connsiteY7" fmla="*/ 6120656 h 7431902"/>
+              <a:gd name="connsiteX8" fmla="*/ 0 w 12385376"/>
+              <a:gd name="connsiteY8" fmla="*/ 1224160 h 7431902"/>
+              <a:gd name="connsiteX0" fmla="*/ 0 w 12385376"/>
+              <a:gd name="connsiteY0" fmla="*/ 1224160 h 7431902"/>
+              <a:gd name="connsiteX1" fmla="*/ 1224160 w 12385376"/>
+              <a:gd name="connsiteY1" fmla="*/ 0 h 7431902"/>
+              <a:gd name="connsiteX2" fmla="*/ 11161216 w 12385376"/>
+              <a:gd name="connsiteY2" fmla="*/ 0 h 7431902"/>
+              <a:gd name="connsiteX3" fmla="*/ 12385376 w 12385376"/>
+              <a:gd name="connsiteY3" fmla="*/ 1224160 h 7431902"/>
+              <a:gd name="connsiteX4" fmla="*/ 12385376 w 12385376"/>
+              <a:gd name="connsiteY4" fmla="*/ 6120656 h 7431902"/>
+              <a:gd name="connsiteX5" fmla="*/ 11161216 w 12385376"/>
+              <a:gd name="connsiteY5" fmla="*/ 7431902 h 7431902"/>
+              <a:gd name="connsiteX6" fmla="*/ 1224160 w 12385376"/>
+              <a:gd name="connsiteY6" fmla="*/ 7344816 h 7431902"/>
+              <a:gd name="connsiteX7" fmla="*/ 0 w 12385376"/>
+              <a:gd name="connsiteY7" fmla="*/ 6120656 h 7431902"/>
+              <a:gd name="connsiteX8" fmla="*/ 0 w 12385376"/>
+              <a:gd name="connsiteY8" fmla="*/ 1224160 h 7431902"/>
+              <a:gd name="connsiteX0" fmla="*/ 0 w 12385376"/>
+              <a:gd name="connsiteY0" fmla="*/ 1224160 h 7431902"/>
+              <a:gd name="connsiteX1" fmla="*/ 1224160 w 12385376"/>
+              <a:gd name="connsiteY1" fmla="*/ 0 h 7431902"/>
+              <a:gd name="connsiteX2" fmla="*/ 11161216 w 12385376"/>
+              <a:gd name="connsiteY2" fmla="*/ 0 h 7431902"/>
+              <a:gd name="connsiteX3" fmla="*/ 12385376 w 12385376"/>
+              <a:gd name="connsiteY3" fmla="*/ 1224160 h 7431902"/>
+              <a:gd name="connsiteX4" fmla="*/ 12385376 w 12385376"/>
+              <a:gd name="connsiteY4" fmla="*/ 6120656 h 7431902"/>
+              <a:gd name="connsiteX5" fmla="*/ 11161216 w 12385376"/>
+              <a:gd name="connsiteY5" fmla="*/ 7431902 h 7431902"/>
+              <a:gd name="connsiteX6" fmla="*/ 1224160 w 12385376"/>
+              <a:gd name="connsiteY6" fmla="*/ 7344816 h 7431902"/>
+              <a:gd name="connsiteX7" fmla="*/ 0 w 12385376"/>
+              <a:gd name="connsiteY7" fmla="*/ 6120656 h 7431902"/>
+              <a:gd name="connsiteX8" fmla="*/ 0 w 12385376"/>
+              <a:gd name="connsiteY8" fmla="*/ 1224160 h 7431902"/>
+              <a:gd name="connsiteX0" fmla="*/ 0 w 12385376"/>
+              <a:gd name="connsiteY0" fmla="*/ 1224160 h 7431902"/>
+              <a:gd name="connsiteX1" fmla="*/ 1224160 w 12385376"/>
+              <a:gd name="connsiteY1" fmla="*/ 0 h 7431902"/>
+              <a:gd name="connsiteX2" fmla="*/ 11161216 w 12385376"/>
+              <a:gd name="connsiteY2" fmla="*/ 0 h 7431902"/>
+              <a:gd name="connsiteX3" fmla="*/ 12385376 w 12385376"/>
+              <a:gd name="connsiteY3" fmla="*/ 1224160 h 7431902"/>
+              <a:gd name="connsiteX4" fmla="*/ 12385376 w 12385376"/>
+              <a:gd name="connsiteY4" fmla="*/ 6120656 h 7431902"/>
+              <a:gd name="connsiteX5" fmla="*/ 11161216 w 12385376"/>
+              <a:gd name="connsiteY5" fmla="*/ 7431902 h 7431902"/>
+              <a:gd name="connsiteX6" fmla="*/ 1224160 w 12385376"/>
+              <a:gd name="connsiteY6" fmla="*/ 7344816 h 7431902"/>
+              <a:gd name="connsiteX7" fmla="*/ 0 w 12385376"/>
+              <a:gd name="connsiteY7" fmla="*/ 6120656 h 7431902"/>
+              <a:gd name="connsiteX8" fmla="*/ 0 w 12385376"/>
+              <a:gd name="connsiteY8" fmla="*/ 1224160 h 7431902"/>
+            </a:gdLst>
+            <a:ahLst/>
+            <a:cxnLst>
+              <a:cxn ang="0">
+                <a:pos x="connsiteX0" y="connsiteY0"/>
+              </a:cxn>
+              <a:cxn ang="0">
+                <a:pos x="connsiteX1" y="connsiteY1"/>
+              </a:cxn>
+              <a:cxn ang="0">
+                <a:pos x="connsiteX2" y="connsiteY2"/>
+              </a:cxn>
+              <a:cxn ang="0">
+                <a:pos x="connsiteX3" y="connsiteY3"/>
+              </a:cxn>
+              <a:cxn ang="0">
+                <a:pos x="connsiteX4" y="connsiteY4"/>
+              </a:cxn>
+              <a:cxn ang="0">
+                <a:pos x="connsiteX5" y="connsiteY5"/>
+              </a:cxn>
+              <a:cxn ang="0">
+                <a:pos x="connsiteX6" y="connsiteY6"/>
+              </a:cxn>
+              <a:cxn ang="0">
+                <a:pos x="connsiteX7" y="connsiteY7"/>
+              </a:cxn>
+              <a:cxn ang="0">
+                <a:pos x="connsiteX8" y="connsiteY8"/>
+              </a:cxn>
+            </a:cxnLst>
+            <a:rect l="l" t="t" r="r" b="b"/>
+            <a:pathLst>
+              <a:path w="12385376" h="7431902">
+                <a:moveTo>
+                  <a:pt x="0" y="1224160"/>
+                </a:moveTo>
+                <a:cubicBezTo>
+                  <a:pt x="43543" y="112646"/>
+                  <a:pt x="-17983" y="43543"/>
+                  <a:pt x="1224160" y="0"/>
+                </a:cubicBezTo>
+                <a:lnTo>
+                  <a:pt x="11161216" y="0"/>
+                </a:lnTo>
+                <a:cubicBezTo>
+                  <a:pt x="12344933" y="46298"/>
+                  <a:pt x="12382068" y="43199"/>
+                  <a:pt x="12385376" y="1224160"/>
+                </a:cubicBezTo>
+                <a:lnTo>
+                  <a:pt x="12385376" y="6120656"/>
+                </a:lnTo>
+                <a:cubicBezTo>
+                  <a:pt x="12341834" y="7319256"/>
+                  <a:pt x="12359815" y="7388359"/>
+                  <a:pt x="11161216" y="7431902"/>
+                </a:cubicBezTo>
+                <a:lnTo>
+                  <a:pt x="1224160" y="7344816"/>
+                </a:lnTo>
+                <a:cubicBezTo>
+                  <a:pt x="28317" y="7339303"/>
+                  <a:pt x="0" y="7319255"/>
+                  <a:pt x="0" y="6120656"/>
+                </a:cubicBezTo>
+                <a:lnTo>
+                  <a:pt x="0" y="1224160"/>
+                </a:lnTo>
+                <a:close/>
+              </a:path>
+            </a:pathLst>
+          </a:custGeom>
+          <a:solidFill>
+            <a:schemeClr val="bg1"/>
+          </a:solidFill>
+          <a:ln w="76200">
+            <a:solidFill>
+              <a:schemeClr val="tx2">
+                <a:lumMod val="60000"/>
+                <a:lumOff val="40000"/>
+              </a:schemeClr>
+            </a:solidFill>
+          </a:ln>
+        </p:spPr>
+        <p:style>
+          <a:lnRef idx="2">
+            <a:schemeClr val="accent1">
+              <a:shade val="50000"/>
+            </a:schemeClr>
+          </a:lnRef>
+          <a:fillRef idx="1">
+            <a:schemeClr val="accent1"/>
+          </a:fillRef>
+          <a:effectRef idx="0">
+            <a:schemeClr val="accent1"/>
+          </a:effectRef>
+          <a:fontRef idx="minor">
+            <a:schemeClr val="lt1"/>
+          </a:fontRef>
+        </p:style>
+        <p:txBody>
+          <a:bodyPr rtlCol="0" anchor="ctr"/>
+          <a:lstStyle/>
+          <a:p>
+            <a:pPr algn="ctr"/>
+            <a:endParaRPr lang="en-US"/>
+          </a:p>
+        </p:txBody>
+      </p:sp>
+      <p:sp>
+        <p:nvSpPr>
+          <p:cNvPr id="29" name="Rounded Rectangle 28"/>
+          <p:cNvSpPr/>
+          <p:nvPr/>
+        </p:nvSpPr>
+        <p:spPr>
+          <a:xfrm>
+            <a:off x="31974248" y="20993545"/>
+            <a:ext cx="8787321" cy="1195671"/>
+          </a:xfrm>
+          <a:prstGeom prst="roundRect">
+            <a:avLst/>
+          </a:prstGeom>
+          <a:solidFill>
+            <a:srgbClr val="FF5A9C"/>
+          </a:solidFill>
+          <a:ln>
+            <a:solidFill>
+              <a:srgbClr val="FF5A9C"/>
+            </a:solidFill>
+          </a:ln>
+        </p:spPr>
+        <p:style>
+          <a:lnRef idx="2">
+            <a:schemeClr val="accent1">
+              <a:shade val="50000"/>
+            </a:schemeClr>
+          </a:lnRef>
+          <a:fillRef idx="1">
+            <a:schemeClr val="accent1"/>
+          </a:fillRef>
+          <a:effectRef idx="0">
+            <a:schemeClr val="accent1"/>
+          </a:effectRef>
+          <a:fontRef idx="minor">
+            <a:schemeClr val="lt1"/>
+          </a:fontRef>
+        </p:style>
+        <p:txBody>
+          <a:bodyPr rtlCol="0" anchor="ctr"/>
+          <a:lstStyle/>
+          <a:p>
+            <a:pPr algn="ctr"/>
+            <a:endParaRPr lang="en-US"/>
+          </a:p>
+        </p:txBody>
+      </p:sp>
+      <p:sp>
+        <p:nvSpPr>
           <p:cNvPr id="3" name="Rounded Rectangle 2"/>
           <p:cNvSpPr/>
           <p:nvPr/>
@@ -1205,8 +1647,8 @@
         </p:nvSpPr>
         <p:spPr>
           <a:xfrm>
-            <a:off x="263216" y="4971361"/>
-            <a:ext cx="11273568" cy="16134012"/>
+            <a:off x="263216" y="4637023"/>
+            <a:ext cx="11273568" cy="16603272"/>
           </a:xfrm>
           <a:custGeom>
             <a:avLst/>
@@ -1491,8 +1933,8 @@
         </p:nvSpPr>
         <p:spPr>
           <a:xfrm>
-            <a:off x="11680801" y="4992897"/>
-            <a:ext cx="18146016" cy="7607548"/>
+            <a:off x="11680801" y="4442964"/>
+            <a:ext cx="18146016" cy="8254839"/>
           </a:xfrm>
           <a:custGeom>
             <a:avLst/>
@@ -1795,8 +2237,8 @@
         </p:nvSpPr>
         <p:spPr>
           <a:xfrm>
-            <a:off x="29982053" y="4912470"/>
-            <a:ext cx="12530121" cy="8235662"/>
+            <a:off x="29982053" y="4283139"/>
+            <a:ext cx="12530121" cy="9157190"/>
           </a:xfrm>
           <a:custGeom>
             <a:avLst/>
@@ -2745,8 +3187,8 @@
         </p:nvSpPr>
         <p:spPr>
           <a:xfrm>
-            <a:off x="29982053" y="21546318"/>
-            <a:ext cx="12518172" cy="7431902"/>
+            <a:off x="29982053" y="26211260"/>
+            <a:ext cx="12518172" cy="2766960"/>
           </a:xfrm>
           <a:custGeom>
             <a:avLst/>
@@ -3139,8 +3581,8 @@
         </p:nvSpPr>
         <p:spPr>
           <a:xfrm>
-            <a:off x="1167633" y="4087081"/>
-            <a:ext cx="9145016" cy="1959078"/>
+            <a:off x="1162579" y="3939632"/>
+            <a:ext cx="9145016" cy="1347778"/>
           </a:xfrm>
           <a:prstGeom prst="roundRect">
             <a:avLst/>
@@ -3187,8 +3629,8 @@
         </p:nvSpPr>
         <p:spPr>
           <a:xfrm>
-            <a:off x="15641241" y="4087081"/>
-            <a:ext cx="9145016" cy="1959078"/>
+            <a:off x="15722367" y="3934070"/>
+            <a:ext cx="9145016" cy="1353340"/>
           </a:xfrm>
           <a:prstGeom prst="roundRect">
             <a:avLst/>
@@ -3235,8 +3677,8 @@
         </p:nvSpPr>
         <p:spPr>
           <a:xfrm>
-            <a:off x="15641241" y="12667171"/>
-            <a:ext cx="9145016" cy="1959078"/>
+            <a:off x="14957165" y="12624483"/>
+            <a:ext cx="12756048" cy="1478117"/>
           </a:xfrm>
           <a:prstGeom prst="roundRect">
             <a:avLst/>
@@ -3283,8 +3725,8 @@
         </p:nvSpPr>
         <p:spPr>
           <a:xfrm>
-            <a:off x="879601" y="21281453"/>
-            <a:ext cx="9145016" cy="1959078"/>
+            <a:off x="1071978" y="21148812"/>
+            <a:ext cx="9227375" cy="1313189"/>
           </a:xfrm>
           <a:prstGeom prst="roundRect">
             <a:avLst/>
@@ -3331,8 +3773,8 @@
         </p:nvSpPr>
         <p:spPr>
           <a:xfrm>
-            <a:off x="31735029" y="4149855"/>
-            <a:ext cx="9145016" cy="1959078"/>
+            <a:off x="31201335" y="3745043"/>
+            <a:ext cx="10333148" cy="1959078"/>
           </a:xfrm>
           <a:prstGeom prst="roundRect">
             <a:avLst/>
@@ -3379,8 +3821,8 @@
         </p:nvSpPr>
         <p:spPr>
           <a:xfrm>
-            <a:off x="31730496" y="21141873"/>
-            <a:ext cx="9145016" cy="1959078"/>
+            <a:off x="31890058" y="26082256"/>
+            <a:ext cx="8787321" cy="1195671"/>
           </a:xfrm>
           <a:prstGeom prst="roundRect">
             <a:avLst/>
@@ -3427,7 +3869,7 @@
         </p:nvSpPr>
         <p:spPr>
           <a:xfrm>
-            <a:off x="1687057" y="4392731"/>
+            <a:off x="1621216" y="4005002"/>
             <a:ext cx="8758388" cy="1200329"/>
           </a:xfrm>
           <a:prstGeom prst="rect">
@@ -3493,7 +3935,7 @@
         </p:nvSpPr>
         <p:spPr>
           <a:xfrm>
-            <a:off x="1673782" y="21652212"/>
+            <a:off x="1762853" y="20998203"/>
             <a:ext cx="9304941" cy="1200329"/>
           </a:xfrm>
           <a:prstGeom prst="rect">
@@ -3559,7 +4001,7 @@
         </p:nvSpPr>
         <p:spPr>
           <a:xfrm>
-            <a:off x="16139431" y="4345606"/>
+            <a:off x="16127408" y="3939632"/>
             <a:ext cx="9304941" cy="1200329"/>
           </a:xfrm>
           <a:prstGeom prst="rect">
@@ -3625,8 +4067,8 @@
         </p:nvSpPr>
         <p:spPr>
           <a:xfrm>
-            <a:off x="16357263" y="13105568"/>
-            <a:ext cx="9304941" cy="1200329"/>
+            <a:off x="15502454" y="12697803"/>
+            <a:ext cx="11665470" cy="1200329"/>
           </a:xfrm>
           <a:prstGeom prst="rect">
             <a:avLst/>
@@ -3640,7 +4082,7 @@
           <a:lstStyle/>
           <a:p>
             <a:r>
-              <a:rPr lang="en-US" altLang="zh-CN" sz="7200" dirty="0" smtClean="0">
+              <a:rPr lang="en-US" altLang="zh-CN" sz="7200" dirty="0">
                 <a:solidFill>
                   <a:schemeClr val="bg1"/>
                 </a:solidFill>
@@ -3648,29 +4090,7 @@
                 <a:ea typeface="Arial" charset="0"/>
                 <a:cs typeface="Arial" charset="0"/>
               </a:rPr>
-              <a:t>System</a:t>
-            </a:r>
-            <a:r>
-              <a:rPr lang="zh-CN" altLang="en-US" sz="7200" dirty="0" smtClean="0">
-                <a:solidFill>
-                  <a:schemeClr val="bg1"/>
-                </a:solidFill>
-                <a:latin typeface="Arial" charset="0"/>
-                <a:ea typeface="Arial" charset="0"/>
-                <a:cs typeface="Arial" charset="0"/>
-              </a:rPr>
-              <a:t> </a:t>
-            </a:r>
-            <a:r>
-              <a:rPr lang="en-US" altLang="zh-CN" sz="7200" dirty="0" smtClean="0">
-                <a:solidFill>
-                  <a:schemeClr val="bg1"/>
-                </a:solidFill>
-                <a:latin typeface="Arial" charset="0"/>
-                <a:ea typeface="Arial" charset="0"/>
-                <a:cs typeface="Arial" charset="0"/>
-              </a:rPr>
-              <a:t>Font-end</a:t>
+              <a:t>Charts and analysis module</a:t>
             </a:r>
             <a:endParaRPr lang="en-US" sz="7200" dirty="0">
               <a:solidFill>
@@ -3691,8 +4111,8 @@
         </p:nvSpPr>
         <p:spPr>
           <a:xfrm>
-            <a:off x="32779145" y="4473865"/>
-            <a:ext cx="9304941" cy="1200329"/>
+            <a:off x="31066377" y="3638486"/>
+            <a:ext cx="10929792" cy="1954574"/>
           </a:xfrm>
           <a:prstGeom prst="rect">
             <a:avLst/>
@@ -3705,40 +4125,64 @@
           </a:bodyPr>
           <a:lstStyle/>
           <a:p>
+            <a:pPr algn="ctr"/>
             <a:r>
-              <a:rPr lang="en-US" altLang="zh-CN" sz="7200" dirty="0" smtClean="0">
+              <a:rPr lang="en-US" altLang="zh-CN" sz="6000" dirty="0">
                 <a:solidFill>
                   <a:schemeClr val="bg1"/>
                 </a:solidFill>
-                <a:latin typeface="Arial" charset="0"/>
-                <a:ea typeface="Arial" charset="0"/>
-                <a:cs typeface="Arial" charset="0"/>
               </a:rPr>
-              <a:t>System</a:t>
+              <a:t>D</a:t>
             </a:r>
             <a:r>
-              <a:rPr lang="zh-CN" altLang="en-US" sz="7200" dirty="0" smtClean="0">
+              <a:rPr lang="en-US" sz="6000" dirty="0" smtClean="0">
                 <a:solidFill>
                   <a:schemeClr val="bg1"/>
                 </a:solidFill>
-                <a:latin typeface="Arial" charset="0"/>
-                <a:ea typeface="Arial" charset="0"/>
-                <a:cs typeface="Arial" charset="0"/>
+              </a:rPr>
+              <a:t>ata </a:t>
+            </a:r>
+            <a:r>
+              <a:rPr lang="en-US" sz="6000" dirty="0">
+                <a:solidFill>
+                  <a:schemeClr val="bg1"/>
+                </a:solidFill>
+              </a:rPr>
+              <a:t>query </a:t>
+            </a:r>
+            <a:r>
+              <a:rPr lang="en-US" sz="6000" dirty="0" smtClean="0">
+                <a:solidFill>
+                  <a:schemeClr val="bg1"/>
+                </a:solidFill>
+              </a:rPr>
+              <a:t>module,</a:t>
+            </a:r>
+            <a:r>
+              <a:rPr lang="zh-CN" altLang="en-US" sz="6000" dirty="0" smtClean="0">
+                <a:solidFill>
+                  <a:schemeClr val="bg1"/>
+                </a:solidFill>
               </a:rPr>
               <a:t> </a:t>
             </a:r>
             <a:r>
-              <a:rPr lang="en-US" altLang="zh-CN" sz="7200" dirty="0" smtClean="0">
+              <a:rPr lang="en-US" sz="6000" dirty="0" smtClean="0">
                 <a:solidFill>
                   <a:schemeClr val="bg1"/>
                 </a:solidFill>
-                <a:latin typeface="Arial" charset="0"/>
-                <a:ea typeface="Arial" charset="0"/>
-                <a:cs typeface="Arial" charset="0"/>
               </a:rPr>
-              <a:t>Back-end</a:t>
+              <a:t>importer</a:t>
             </a:r>
-            <a:endParaRPr lang="en-US" sz="7200" dirty="0">
+            <a:r>
+              <a:rPr lang="en-US" sz="6000" dirty="0">
+                <a:solidFill>
+                  <a:schemeClr val="bg1"/>
+                </a:solidFill>
+              </a:rPr>
+              <a:t>, database.</a:t>
+            </a:r>
+            <a:endParaRPr lang="en-US" sz="6000" dirty="0">
               <a:solidFill>
                 <a:schemeClr val="bg1"/>
               </a:solidFill>
@@ -4080,7 +4524,7 @@
         <p:spPr>
           <a:xfrm>
             <a:off x="31730496" y="13297968"/>
-            <a:ext cx="9145016" cy="1959078"/>
+            <a:ext cx="9145016" cy="1404797"/>
           </a:xfrm>
           <a:prstGeom prst="roundRect">
             <a:avLst/>
@@ -4127,8 +4571,8 @@
         </p:nvSpPr>
         <p:spPr>
           <a:xfrm>
-            <a:off x="32385194" y="21413652"/>
-            <a:ext cx="9304941" cy="1200329"/>
+            <a:off x="32315323" y="26077598"/>
+            <a:ext cx="7936789" cy="1200329"/>
           </a:xfrm>
           <a:prstGeom prst="rect">
             <a:avLst/>
@@ -4171,7 +4615,7 @@
         </p:nvSpPr>
         <p:spPr>
           <a:xfrm>
-            <a:off x="33715249" y="13502436"/>
+            <a:off x="33670567" y="13222589"/>
             <a:ext cx="5544616" cy="1200329"/>
           </a:xfrm>
           <a:prstGeom prst="rect">
@@ -4421,6 +4865,73 @@
               <a:solidFill>
                 <a:schemeClr val="bg1"/>
               </a:solidFill>
+            </a:endParaRPr>
+          </a:p>
+        </p:txBody>
+      </p:sp>
+      <p:sp>
+        <p:nvSpPr>
+          <p:cNvPr id="28" name="TextBox 27"/>
+          <p:cNvSpPr txBox="1"/>
+          <p:nvPr/>
+        </p:nvSpPr>
+        <p:spPr>
+          <a:xfrm>
+            <a:off x="32272743" y="20902660"/>
+            <a:ext cx="7936789" cy="1200329"/>
+          </a:xfrm>
+          <a:prstGeom prst="rect">
+            <a:avLst/>
+          </a:prstGeom>
+          <a:noFill/>
+        </p:spPr>
+        <p:txBody>
+          <a:bodyPr wrap="square" rtlCol="0">
+            <a:spAutoFit/>
+          </a:bodyPr>
+          <a:lstStyle/>
+          <a:p>
+            <a:pPr algn="ctr"/>
+            <a:r>
+              <a:rPr lang="en-US" altLang="zh-CN" sz="7200" dirty="0" smtClean="0">
+                <a:solidFill>
+                  <a:schemeClr val="bg1"/>
+                </a:solidFill>
+                <a:latin typeface="Arial" charset="0"/>
+                <a:ea typeface="Arial" charset="0"/>
+                <a:cs typeface="Arial" charset="0"/>
+              </a:rPr>
+              <a:t>Future</a:t>
+            </a:r>
+            <a:r>
+              <a:rPr lang="zh-CN" altLang="en-US" sz="7200" dirty="0" smtClean="0">
+                <a:solidFill>
+                  <a:schemeClr val="bg1"/>
+                </a:solidFill>
+                <a:latin typeface="Arial" charset="0"/>
+                <a:ea typeface="Arial" charset="0"/>
+                <a:cs typeface="Arial" charset="0"/>
+              </a:rPr>
+              <a:t> </a:t>
+            </a:r>
+            <a:r>
+              <a:rPr lang="en-US" altLang="zh-CN" sz="7200" dirty="0" smtClean="0">
+                <a:solidFill>
+                  <a:schemeClr val="bg1"/>
+                </a:solidFill>
+                <a:latin typeface="Arial" charset="0"/>
+                <a:ea typeface="Arial" charset="0"/>
+                <a:cs typeface="Arial" charset="0"/>
+              </a:rPr>
+              <a:t>Work</a:t>
+            </a:r>
+            <a:endParaRPr lang="en-US" sz="7200" dirty="0">
+              <a:solidFill>
+                <a:schemeClr val="bg1"/>
+              </a:solidFill>
+              <a:latin typeface="Arial" charset="0"/>
+              <a:ea typeface="Arial" charset="0"/>
+              <a:cs typeface="Arial" charset="0"/>
             </a:endParaRPr>
           </a:p>
         </p:txBody>

</xml_diff>

<commit_message>
fix #161 - Design the poster
</commit_message>
<xml_diff>
--- a/Poster/Stu_data Poster.pptx
+++ b/Poster/Stu_data Poster.pptx
@@ -143,6 +143,10 @@
 </p:presentation>
 </file>
 
+<file path=ppt/revisionInfo.xml><?xml version="1.0" encoding="utf-8"?>
+<p1510:revInfo xmlns:a="http://schemas.openxmlformats.org/drawingml/2006/main" xmlns:r="http://schemas.openxmlformats.org/officeDocument/2006/relationships" xmlns:p1510="http://schemas.microsoft.com/office/powerpoint/2015/10/main"/>
+</file>
+
 <file path=ppt/handoutMasters/handoutMaster1.xml><?xml version="1.0" encoding="utf-8"?>
 <p:handoutMaster xmlns:a="http://schemas.openxmlformats.org/drawingml/2006/main" xmlns:r="http://schemas.openxmlformats.org/officeDocument/2006/relationships" xmlns:p="http://schemas.openxmlformats.org/presentationml/2006/main">
   <p:cSld>
@@ -226,7 +230,7 @@
             <a:fld id="{59D7332B-1442-4F8C-A160-0D5EB57A24C0}" type="datetimeFigureOut">
               <a:rPr lang="en-AU" smtClean="0"/>
               <a:pPr/>
-              <a:t>9/10/17</a:t>
+              <a:t>9/10/2017</a:t>
             </a:fld>
             <a:endParaRPr lang="en-AU"/>
           </a:p>
@@ -393,7 +397,7 @@
             <a:fld id="{33744820-F59C-490B-A624-3CEFDFE2581B}" type="datetimeFigureOut">
               <a:rPr lang="en-AU" smtClean="0"/>
               <a:pPr/>
-              <a:t>9/10/17</a:t>
+              <a:t>9/10/2017</a:t>
             </a:fld>
             <a:endParaRPr lang="en-AU"/>
           </a:p>
@@ -459,35 +463,35 @@
           <a:p>
             <a:pPr lvl="0"/>
             <a:r>
-              <a:rPr lang="en-US" smtClean="0"/>
+              <a:rPr lang="en-US"/>
               <a:t>Click to edit Master text styles</a:t>
             </a:r>
           </a:p>
           <a:p>
             <a:pPr lvl="1"/>
             <a:r>
-              <a:rPr lang="en-US" smtClean="0"/>
+              <a:rPr lang="en-US"/>
               <a:t>Second level</a:t>
             </a:r>
           </a:p>
           <a:p>
             <a:pPr lvl="2"/>
             <a:r>
-              <a:rPr lang="en-US" smtClean="0"/>
+              <a:rPr lang="en-US"/>
               <a:t>Third level</a:t>
             </a:r>
           </a:p>
           <a:p>
             <a:pPr lvl="3"/>
             <a:r>
-              <a:rPr lang="en-US" smtClean="0"/>
+              <a:rPr lang="en-US"/>
               <a:t>Fourth level</a:t>
             </a:r>
           </a:p>
           <a:p>
             <a:pPr lvl="4"/>
             <a:r>
-              <a:rPr lang="en-US" smtClean="0"/>
+              <a:rPr lang="en-US"/>
               <a:t>Fifth level</a:t>
             </a:r>
             <a:endParaRPr lang="en-AU"/>
@@ -746,10 +750,9 @@
           </a:lstStyle>
           <a:p>
             <a:r>
-              <a:rPr lang="en-AU" dirty="0" smtClean="0"/>
+              <a:rPr lang="en-AU" dirty="0"/>
               <a:t>University of Adelaide</a:t>
             </a:r>
-            <a:endParaRPr lang="en-AU" dirty="0"/>
           </a:p>
         </p:txBody>
       </p:sp>
@@ -2225,7 +2228,7 @@
           <a:lstStyle/>
           <a:p>
             <a:pPr algn="ctr"/>
-            <a:endParaRPr lang="en-US"/>
+            <a:endParaRPr lang="en-US" dirty="0"/>
           </a:p>
         </p:txBody>
       </p:sp>
@@ -3884,7 +3887,7 @@
           <a:lstStyle/>
           <a:p>
             <a:r>
-              <a:rPr lang="en-US" altLang="zh-CN" sz="7200" dirty="0" smtClean="0">
+              <a:rPr lang="en-US" altLang="zh-CN" sz="7200" dirty="0">
                 <a:solidFill>
                   <a:schemeClr val="bg1"/>
                 </a:solidFill>
@@ -3895,7 +3898,7 @@
               <a:t>Project</a:t>
             </a:r>
             <a:r>
-              <a:rPr lang="zh-CN" altLang="en-US" sz="7200" dirty="0" smtClean="0">
+              <a:rPr lang="zh-CN" altLang="en-US" sz="7200" dirty="0">
                 <a:solidFill>
                   <a:schemeClr val="bg1"/>
                 </a:solidFill>
@@ -3906,7 +3909,7 @@
               <a:t> </a:t>
             </a:r>
             <a:r>
-              <a:rPr lang="en-US" altLang="zh-CN" sz="7200" dirty="0" smtClean="0">
+              <a:rPr lang="en-US" altLang="zh-CN" sz="7200" dirty="0">
                 <a:solidFill>
                   <a:schemeClr val="bg1"/>
                 </a:solidFill>
@@ -3950,7 +3953,7 @@
           <a:lstStyle/>
           <a:p>
             <a:r>
-              <a:rPr lang="en-US" altLang="zh-CN" sz="7200" dirty="0" smtClean="0">
+              <a:rPr lang="en-US" altLang="zh-CN" sz="7200" dirty="0">
                 <a:solidFill>
                   <a:schemeClr val="bg1"/>
                 </a:solidFill>
@@ -3961,7 +3964,7 @@
               <a:t>Project</a:t>
             </a:r>
             <a:r>
-              <a:rPr lang="zh-CN" altLang="en-US" sz="7200" dirty="0" smtClean="0">
+              <a:rPr lang="zh-CN" altLang="en-US" sz="7200" dirty="0">
                 <a:solidFill>
                   <a:schemeClr val="bg1"/>
                 </a:solidFill>
@@ -3972,7 +3975,7 @@
               <a:t> </a:t>
             </a:r>
             <a:r>
-              <a:rPr lang="en-US" altLang="zh-CN" sz="7200" dirty="0" smtClean="0">
+              <a:rPr lang="en-US" altLang="zh-CN" sz="7200" dirty="0">
                 <a:solidFill>
                   <a:schemeClr val="bg1"/>
                 </a:solidFill>
@@ -4016,7 +4019,7 @@
           <a:lstStyle/>
           <a:p>
             <a:r>
-              <a:rPr lang="en-US" altLang="zh-CN" sz="7200" dirty="0" smtClean="0">
+              <a:rPr lang="en-US" altLang="zh-CN" sz="7200" dirty="0">
                 <a:solidFill>
                   <a:schemeClr val="bg1"/>
                 </a:solidFill>
@@ -4027,7 +4030,7 @@
               <a:t>System</a:t>
             </a:r>
             <a:r>
-              <a:rPr lang="zh-CN" altLang="en-US" sz="7200" dirty="0" smtClean="0">
+              <a:rPr lang="zh-CN" altLang="en-US" sz="7200" dirty="0">
                 <a:solidFill>
                   <a:schemeClr val="bg1"/>
                 </a:solidFill>
@@ -4038,7 +4041,7 @@
               <a:t> </a:t>
             </a:r>
             <a:r>
-              <a:rPr lang="en-US" altLang="zh-CN" sz="7200" dirty="0" smtClean="0">
+              <a:rPr lang="en-US" altLang="zh-CN" sz="7200" dirty="0">
                 <a:solidFill>
                   <a:schemeClr val="bg1"/>
                 </a:solidFill>
@@ -4135,31 +4138,15 @@
               <a:t>D</a:t>
             </a:r>
             <a:r>
-              <a:rPr lang="en-US" sz="6000" dirty="0" smtClean="0">
-                <a:solidFill>
-                  <a:schemeClr val="bg1"/>
-                </a:solidFill>
-              </a:rPr>
-              <a:t>ata </a:t>
-            </a:r>
-            <a:r>
               <a:rPr lang="en-US" sz="6000" dirty="0">
                 <a:solidFill>
                   <a:schemeClr val="bg1"/>
                 </a:solidFill>
               </a:rPr>
-              <a:t>query </a:t>
-            </a:r>
-            <a:r>
-              <a:rPr lang="en-US" sz="6000" dirty="0" smtClean="0">
-                <a:solidFill>
-                  <a:schemeClr val="bg1"/>
-                </a:solidFill>
-              </a:rPr>
-              <a:t>module,</a:t>
-            </a:r>
-            <a:r>
-              <a:rPr lang="zh-CN" altLang="en-US" sz="6000" dirty="0" smtClean="0">
+              <a:t>ata query module,</a:t>
+            </a:r>
+            <a:r>
+              <a:rPr lang="zh-CN" altLang="en-US" sz="6000" dirty="0">
                 <a:solidFill>
                   <a:schemeClr val="bg1"/>
                 </a:solidFill>
@@ -4167,20 +4154,12 @@
               <a:t> </a:t>
             </a:r>
             <a:r>
-              <a:rPr lang="en-US" sz="6000" dirty="0" smtClean="0">
-                <a:solidFill>
-                  <a:schemeClr val="bg1"/>
-                </a:solidFill>
-              </a:rPr>
-              <a:t>importer</a:t>
-            </a:r>
-            <a:r>
               <a:rPr lang="en-US" sz="6000" dirty="0">
                 <a:solidFill>
                   <a:schemeClr val="bg1"/>
                 </a:solidFill>
               </a:rPr>
-              <a:t>, database.</a:t>
+              <a:t>importer, database.</a:t>
             </a:r>
             <a:endParaRPr lang="en-US" sz="6000" dirty="0">
               <a:solidFill>
@@ -4586,7 +4565,7 @@
           <a:lstStyle/>
           <a:p>
             <a:r>
-              <a:rPr lang="en-US" altLang="zh-CN" sz="7200" dirty="0" smtClean="0">
+              <a:rPr lang="en-US" altLang="zh-CN" sz="7200" dirty="0">
                 <a:solidFill>
                   <a:schemeClr val="bg1"/>
                 </a:solidFill>
@@ -4630,7 +4609,7 @@
           <a:lstStyle/>
           <a:p>
             <a:r>
-              <a:rPr lang="en-US" altLang="zh-CN" sz="7200" smtClean="0">
+              <a:rPr lang="en-US" altLang="zh-CN" sz="7200">
                 <a:solidFill>
                   <a:schemeClr val="bg1"/>
                 </a:solidFill>
@@ -4696,18 +4675,10 @@
                   <a:schemeClr val="bg1"/>
                 </a:solidFill>
               </a:rPr>
-              <a:t> Lin, Minh Tam </a:t>
-            </a:r>
-            <a:r>
-              <a:rPr lang="en-US" altLang="zh-CN" sz="3200" dirty="0" smtClean="0">
-                <a:solidFill>
-                  <a:schemeClr val="bg1"/>
-                </a:solidFill>
-              </a:rPr>
-              <a:t>Phan</a:t>
-            </a:r>
-            <a:r>
-              <a:rPr lang="zh-CN" altLang="en-US" sz="3200" dirty="0" smtClean="0">
+              <a:t> Lin, Minh Tam Phan</a:t>
+            </a:r>
+            <a:r>
+              <a:rPr lang="zh-CN" altLang="en-US" sz="3200" dirty="0">
                 <a:solidFill>
                   <a:schemeClr val="bg1"/>
                 </a:solidFill>
@@ -4715,7 +4686,7 @@
               <a:t> </a:t>
             </a:r>
             <a:r>
-              <a:rPr lang="en-US" altLang="zh-CN" sz="3200" dirty="0" smtClean="0">
+              <a:rPr lang="en-US" altLang="zh-CN" sz="3200" dirty="0">
                 <a:solidFill>
                   <a:schemeClr val="bg1"/>
                 </a:solidFill>
@@ -4723,7 +4694,7 @@
               <a:t>@</a:t>
             </a:r>
             <a:r>
-              <a:rPr lang="en-US" altLang="zh-CN" sz="3200" dirty="0" err="1" smtClean="0">
+              <a:rPr lang="en-US" altLang="zh-CN" sz="3200" dirty="0" err="1">
                 <a:solidFill>
                   <a:schemeClr val="bg1"/>
                 </a:solidFill>
@@ -4739,7 +4710,7 @@
           <a:p>
             <a:pPr algn="ctr"/>
             <a:r>
-              <a:rPr lang="en-US" altLang="zh-CN" sz="3200" dirty="0" smtClean="0">
+              <a:rPr lang="en-US" altLang="zh-CN" sz="3200" dirty="0">
                 <a:solidFill>
                   <a:schemeClr val="bg1"/>
                 </a:solidFill>
@@ -4747,7 +4718,7 @@
               <a:t>Supervised</a:t>
             </a:r>
             <a:r>
-              <a:rPr lang="zh-CN" altLang="en-US" sz="3200" dirty="0" smtClean="0">
+              <a:rPr lang="zh-CN" altLang="en-US" sz="3200" dirty="0">
                 <a:solidFill>
                   <a:schemeClr val="bg1"/>
                 </a:solidFill>
@@ -4755,7 +4726,7 @@
               <a:t> </a:t>
             </a:r>
             <a:r>
-              <a:rPr lang="en-US" altLang="zh-CN" sz="3200" dirty="0" smtClean="0">
+              <a:rPr lang="en-US" altLang="zh-CN" sz="3200" dirty="0">
                 <a:solidFill>
                   <a:schemeClr val="bg1"/>
                 </a:solidFill>
@@ -4763,7 +4734,7 @@
               <a:t>by</a:t>
             </a:r>
             <a:r>
-              <a:rPr lang="zh-CN" altLang="en-US" sz="3200" dirty="0" smtClean="0">
+              <a:rPr lang="zh-CN" altLang="en-US" sz="3200" dirty="0">
                 <a:solidFill>
                   <a:schemeClr val="bg1"/>
                 </a:solidFill>
@@ -4795,7 +4766,7 @@
               <a:t>, Claudia Szabo, Marian </a:t>
             </a:r>
             <a:r>
-              <a:rPr lang="en-US" sz="3200" dirty="0" err="1" smtClean="0">
+              <a:rPr lang="en-US" sz="3200" dirty="0" err="1">
                 <a:solidFill>
                   <a:schemeClr val="bg1"/>
                 </a:solidFill>
@@ -4806,7 +4777,7 @@
           <a:p>
             <a:pPr algn="ctr"/>
             <a:r>
-              <a:rPr lang="en-US" altLang="zh-CN" sz="3200" dirty="0" smtClean="0">
+              <a:rPr lang="en-US" altLang="zh-CN" sz="3200" dirty="0">
                 <a:solidFill>
                   <a:schemeClr val="bg1"/>
                 </a:solidFill>
@@ -4814,7 +4785,7 @@
               <a:t>School</a:t>
             </a:r>
             <a:r>
-              <a:rPr lang="zh-CN" altLang="en-US" sz="3200" dirty="0" smtClean="0">
+              <a:rPr lang="zh-CN" altLang="en-US" sz="3200" dirty="0">
                 <a:solidFill>
                   <a:schemeClr val="bg1"/>
                 </a:solidFill>
@@ -4822,7 +4793,7 @@
               <a:t> </a:t>
             </a:r>
             <a:r>
-              <a:rPr lang="en-US" altLang="zh-CN" sz="3200" dirty="0" smtClean="0">
+              <a:rPr lang="en-US" altLang="zh-CN" sz="3200" dirty="0">
                 <a:solidFill>
                   <a:schemeClr val="bg1"/>
                 </a:solidFill>
@@ -4830,7 +4801,7 @@
               <a:t>of</a:t>
             </a:r>
             <a:r>
-              <a:rPr lang="zh-CN" altLang="en-US" sz="3200" dirty="0" smtClean="0">
+              <a:rPr lang="zh-CN" altLang="en-US" sz="3200" dirty="0">
                 <a:solidFill>
                   <a:schemeClr val="bg1"/>
                 </a:solidFill>
@@ -4838,7 +4809,7 @@
               <a:t> </a:t>
             </a:r>
             <a:r>
-              <a:rPr lang="en-US" altLang="zh-CN" sz="3200" dirty="0" smtClean="0">
+              <a:rPr lang="en-US" altLang="zh-CN" sz="3200" dirty="0">
                 <a:solidFill>
                   <a:schemeClr val="bg1"/>
                 </a:solidFill>
@@ -4846,7 +4817,7 @@
               <a:t>Computer</a:t>
             </a:r>
             <a:r>
-              <a:rPr lang="zh-CN" altLang="en-US" sz="3200" dirty="0" smtClean="0">
+              <a:rPr lang="zh-CN" altLang="en-US" sz="3200" dirty="0">
                 <a:solidFill>
                   <a:schemeClr val="bg1"/>
                 </a:solidFill>
@@ -4854,7 +4825,7 @@
               <a:t> </a:t>
             </a:r>
             <a:r>
-              <a:rPr lang="en-US" altLang="zh-CN" sz="3200" dirty="0" smtClean="0">
+              <a:rPr lang="en-US" altLang="zh-CN" sz="3200" dirty="0">
                 <a:solidFill>
                   <a:schemeClr val="bg1"/>
                 </a:solidFill>
@@ -4893,7 +4864,7 @@
           <a:p>
             <a:pPr algn="ctr"/>
             <a:r>
-              <a:rPr lang="en-US" altLang="zh-CN" sz="7200" dirty="0" smtClean="0">
+              <a:rPr lang="en-US" altLang="zh-CN" sz="7200" dirty="0">
                 <a:solidFill>
                   <a:schemeClr val="bg1"/>
                 </a:solidFill>
@@ -4904,7 +4875,7 @@
               <a:t>Future</a:t>
             </a:r>
             <a:r>
-              <a:rPr lang="zh-CN" altLang="en-US" sz="7200" dirty="0" smtClean="0">
+              <a:rPr lang="zh-CN" altLang="en-US" sz="7200" dirty="0">
                 <a:solidFill>
                   <a:schemeClr val="bg1"/>
                 </a:solidFill>
@@ -4915,7 +4886,7 @@
               <a:t> </a:t>
             </a:r>
             <a:r>
-              <a:rPr lang="en-US" altLang="zh-CN" sz="7200" dirty="0" smtClean="0">
+              <a:rPr lang="en-US" altLang="zh-CN" sz="7200" dirty="0">
                 <a:solidFill>
                   <a:schemeClr val="bg1"/>
                 </a:solidFill>
@@ -4933,6 +4904,556 @@
               <a:ea typeface="Arial" charset="0"/>
               <a:cs typeface="Arial" charset="0"/>
             </a:endParaRPr>
+          </a:p>
+        </p:txBody>
+      </p:sp>
+      <p:sp>
+        <p:nvSpPr>
+          <p:cNvPr id="4" name="TextBox 3">
+            <a:extLst>
+              <a:ext uri="{FF2B5EF4-FFF2-40B4-BE49-F238E27FC236}">
+                <a16:creationId xmlns:a16="http://schemas.microsoft.com/office/drawing/2014/main" id="{D335579D-9BA7-4FF2-BA55-7C6390B98CEF}"/>
+              </a:ext>
+            </a:extLst>
+          </p:cNvPr>
+          <p:cNvSpPr txBox="1"/>
+          <p:nvPr/>
+        </p:nvSpPr>
+        <p:spPr>
+          <a:xfrm>
+            <a:off x="12184858" y="5893992"/>
+            <a:ext cx="10106994" cy="3046988"/>
+          </a:xfrm>
+          <a:prstGeom prst="rect">
+            <a:avLst/>
+          </a:prstGeom>
+          <a:noFill/>
+        </p:spPr>
+        <p:txBody>
+          <a:bodyPr wrap="square" rtlCol="0">
+            <a:spAutoFit/>
+          </a:bodyPr>
+          <a:lstStyle/>
+          <a:p>
+            <a:pPr marL="1143000" indent="-1143000">
+              <a:buFont typeface="Arial" panose="020B0604020202020204" pitchFamily="34" charset="0"/>
+              <a:buChar char="•"/>
+            </a:pPr>
+            <a:r>
+              <a:rPr lang="en-US" sz="3200" dirty="0"/>
+              <a:t>The database schema is built based on two Moodle Forum and </a:t>
+            </a:r>
+            <a:r>
+              <a:rPr lang="en-US" sz="3200" dirty="0" err="1"/>
+              <a:t>WebSubmission</a:t>
+            </a:r>
+            <a:r>
+              <a:rPr lang="en-US" sz="3200" dirty="0"/>
+              <a:t> data sources.</a:t>
+            </a:r>
+          </a:p>
+          <a:p>
+            <a:pPr marL="1143000" indent="-1143000">
+              <a:buFont typeface="Arial" panose="020B0604020202020204" pitchFamily="34" charset="0"/>
+              <a:buChar char="•"/>
+            </a:pPr>
+            <a:r>
+              <a:rPr lang="en-US" sz="3200" dirty="0"/>
+              <a:t>Data Importer tool extracts data from data sources to database.</a:t>
+            </a:r>
+          </a:p>
+          <a:p>
+            <a:pPr marL="1143000" indent="-1143000">
+              <a:buFont typeface="Arial" panose="020B0604020202020204" pitchFamily="34" charset="0"/>
+              <a:buChar char="•"/>
+            </a:pPr>
+            <a:r>
+              <a:rPr lang="en-US" sz="3200" dirty="0"/>
+              <a:t>The website displays and analyzes data by charts and tables.</a:t>
+            </a:r>
+          </a:p>
+        </p:txBody>
+      </p:sp>
+      <p:pic>
+        <p:nvPicPr>
+          <p:cNvPr id="31" name="Picture 30">
+            <a:extLst>
+              <a:ext uri="{FF2B5EF4-FFF2-40B4-BE49-F238E27FC236}">
+                <a16:creationId xmlns:a16="http://schemas.microsoft.com/office/drawing/2014/main" id="{49FE897D-F032-49C9-95DD-CCF761D9E0B8}"/>
+              </a:ext>
+            </a:extLst>
+          </p:cNvPr>
+          <p:cNvPicPr>
+            <a:picLocks noChangeAspect="1"/>
+          </p:cNvPicPr>
+          <p:nvPr/>
+        </p:nvPicPr>
+        <p:blipFill>
+          <a:blip r:embed="rId2">
+            <a:extLst>
+              <a:ext uri="{28A0092B-C50C-407E-A947-70E740481C1C}">
+                <a14:useLocalDpi xmlns:a14="http://schemas.microsoft.com/office/drawing/2010/main" val="0"/>
+              </a:ext>
+            </a:extLst>
+          </a:blip>
+          <a:stretch>
+            <a:fillRect/>
+          </a:stretch>
+        </p:blipFill>
+        <p:spPr>
+          <a:xfrm>
+            <a:off x="36549436" y="8512870"/>
+            <a:ext cx="5564874" cy="2553287"/>
+          </a:xfrm>
+          <a:prstGeom prst="rect">
+            <a:avLst/>
+          </a:prstGeom>
+        </p:spPr>
+      </p:pic>
+      <p:pic>
+        <p:nvPicPr>
+          <p:cNvPr id="33" name="Picture 32">
+            <a:extLst>
+              <a:ext uri="{FF2B5EF4-FFF2-40B4-BE49-F238E27FC236}">
+                <a16:creationId xmlns:a16="http://schemas.microsoft.com/office/drawing/2014/main" id="{6AD46D6C-29E3-4501-AF10-81B444FA599A}"/>
+              </a:ext>
+            </a:extLst>
+          </p:cNvPr>
+          <p:cNvPicPr>
+            <a:picLocks noChangeAspect="1"/>
+          </p:cNvPicPr>
+          <p:nvPr/>
+        </p:nvPicPr>
+        <p:blipFill>
+          <a:blip r:embed="rId3">
+            <a:extLst>
+              <a:ext uri="{28A0092B-C50C-407E-A947-70E740481C1C}">
+                <a14:useLocalDpi xmlns:a14="http://schemas.microsoft.com/office/drawing/2010/main" val="0"/>
+              </a:ext>
+            </a:extLst>
+          </a:blip>
+          <a:stretch>
+            <a:fillRect/>
+          </a:stretch>
+        </p:blipFill>
+        <p:spPr>
+          <a:xfrm>
+            <a:off x="36805173" y="5841973"/>
+            <a:ext cx="5307906" cy="2094833"/>
+          </a:xfrm>
+          <a:prstGeom prst="rect">
+            <a:avLst/>
+          </a:prstGeom>
+        </p:spPr>
+      </p:pic>
+      <p:pic>
+        <p:nvPicPr>
+          <p:cNvPr id="35" name="Picture 34">
+            <a:extLst>
+              <a:ext uri="{FF2B5EF4-FFF2-40B4-BE49-F238E27FC236}">
+                <a16:creationId xmlns:a16="http://schemas.microsoft.com/office/drawing/2014/main" id="{84A8944C-C2C3-4E5B-AA53-82A178642EA6}"/>
+              </a:ext>
+            </a:extLst>
+          </p:cNvPr>
+          <p:cNvPicPr>
+            <a:picLocks noChangeAspect="1"/>
+          </p:cNvPicPr>
+          <p:nvPr/>
+        </p:nvPicPr>
+        <p:blipFill>
+          <a:blip r:embed="rId4">
+            <a:extLst>
+              <a:ext uri="{28A0092B-C50C-407E-A947-70E740481C1C}">
+                <a14:useLocalDpi xmlns:a14="http://schemas.microsoft.com/office/drawing/2010/main" val="0"/>
+              </a:ext>
+            </a:extLst>
+          </a:blip>
+          <a:stretch>
+            <a:fillRect/>
+          </a:stretch>
+        </p:blipFill>
+        <p:spPr>
+          <a:xfrm>
+            <a:off x="37027617" y="11609214"/>
+            <a:ext cx="4506866" cy="1644534"/>
+          </a:xfrm>
+          <a:prstGeom prst="rect">
+            <a:avLst/>
+          </a:prstGeom>
+        </p:spPr>
+      </p:pic>
+      <p:cxnSp>
+        <p:nvCxnSpPr>
+          <p:cNvPr id="37" name="Straight Arrow Connector 36">
+            <a:extLst>
+              <a:ext uri="{FF2B5EF4-FFF2-40B4-BE49-F238E27FC236}">
+                <a16:creationId xmlns:a16="http://schemas.microsoft.com/office/drawing/2014/main" id="{6A14BA03-E8AE-48DE-B2C7-6A9F54D0C8F4}"/>
+              </a:ext>
+            </a:extLst>
+          </p:cNvPr>
+          <p:cNvCxnSpPr>
+            <a:cxnSpLocks/>
+            <a:endCxn id="31" idx="2"/>
+          </p:cNvCxnSpPr>
+          <p:nvPr/>
+        </p:nvCxnSpPr>
+        <p:spPr>
+          <a:xfrm flipV="1">
+            <a:off x="39331873" y="11066157"/>
+            <a:ext cx="0" cy="543058"/>
+          </a:xfrm>
+          <a:prstGeom prst="straightConnector1">
+            <a:avLst/>
+          </a:prstGeom>
+          <a:ln>
+            <a:tailEnd type="triangle"/>
+          </a:ln>
+        </p:spPr>
+        <p:style>
+          <a:lnRef idx="3">
+            <a:schemeClr val="accent4"/>
+          </a:lnRef>
+          <a:fillRef idx="0">
+            <a:schemeClr val="accent4"/>
+          </a:fillRef>
+          <a:effectRef idx="2">
+            <a:schemeClr val="accent4"/>
+          </a:effectRef>
+          <a:fontRef idx="minor">
+            <a:schemeClr val="tx1"/>
+          </a:fontRef>
+        </p:style>
+      </p:cxnSp>
+      <p:cxnSp>
+        <p:nvCxnSpPr>
+          <p:cNvPr id="39" name="Straight Arrow Connector 38">
+            <a:extLst>
+              <a:ext uri="{FF2B5EF4-FFF2-40B4-BE49-F238E27FC236}">
+                <a16:creationId xmlns:a16="http://schemas.microsoft.com/office/drawing/2014/main" id="{3EFA15DA-D2B0-42C3-B2EC-A14C96D8DCC1}"/>
+              </a:ext>
+            </a:extLst>
+          </p:cNvPr>
+          <p:cNvCxnSpPr>
+            <a:cxnSpLocks/>
+          </p:cNvCxnSpPr>
+          <p:nvPr/>
+        </p:nvCxnSpPr>
+        <p:spPr>
+          <a:xfrm flipV="1">
+            <a:off x="39331873" y="7864799"/>
+            <a:ext cx="0" cy="705584"/>
+          </a:xfrm>
+          <a:prstGeom prst="straightConnector1">
+            <a:avLst/>
+          </a:prstGeom>
+          <a:ln>
+            <a:tailEnd type="triangle"/>
+          </a:ln>
+        </p:spPr>
+        <p:style>
+          <a:lnRef idx="3">
+            <a:schemeClr val="accent4"/>
+          </a:lnRef>
+          <a:fillRef idx="0">
+            <a:schemeClr val="accent4"/>
+          </a:fillRef>
+          <a:effectRef idx="2">
+            <a:schemeClr val="accent4"/>
+          </a:effectRef>
+          <a:fontRef idx="minor">
+            <a:schemeClr val="tx1"/>
+          </a:fontRef>
+        </p:style>
+      </p:cxnSp>
+      <p:sp>
+        <p:nvSpPr>
+          <p:cNvPr id="49" name="TextBox 48">
+            <a:extLst>
+              <a:ext uri="{FF2B5EF4-FFF2-40B4-BE49-F238E27FC236}">
+                <a16:creationId xmlns:a16="http://schemas.microsoft.com/office/drawing/2014/main" id="{4C7268DB-F52B-4228-A14F-253306C33498}"/>
+              </a:ext>
+            </a:extLst>
+          </p:cNvPr>
+          <p:cNvSpPr txBox="1"/>
+          <p:nvPr/>
+        </p:nvSpPr>
+        <p:spPr>
+          <a:xfrm>
+            <a:off x="30042841" y="5776566"/>
+            <a:ext cx="6506595" cy="6001643"/>
+          </a:xfrm>
+          <a:prstGeom prst="rect">
+            <a:avLst/>
+          </a:prstGeom>
+          <a:noFill/>
+        </p:spPr>
+        <p:txBody>
+          <a:bodyPr wrap="square" rtlCol="0">
+            <a:spAutoFit/>
+          </a:bodyPr>
+          <a:lstStyle/>
+          <a:p>
+            <a:pPr marL="1143000" indent="-1143000">
+              <a:buFont typeface="Arial" panose="020B0604020202020204" pitchFamily="34" charset="0"/>
+              <a:buChar char="•"/>
+            </a:pPr>
+            <a:r>
+              <a:rPr lang="en-US" sz="3200" dirty="0"/>
+              <a:t>Data Query module can support staff to query and extract data.</a:t>
+            </a:r>
+          </a:p>
+          <a:p>
+            <a:pPr marL="1143000" indent="-1143000">
+              <a:buFont typeface="Arial" panose="020B0604020202020204" pitchFamily="34" charset="0"/>
+              <a:buChar char="•"/>
+            </a:pPr>
+            <a:r>
+              <a:rPr lang="en-US" sz="3200" dirty="0"/>
+              <a:t>A combined database of Moodle Forum and </a:t>
+            </a:r>
+            <a:r>
+              <a:rPr lang="en-US" sz="3200" dirty="0" err="1"/>
+              <a:t>WebSubmission</a:t>
+            </a:r>
+            <a:r>
+              <a:rPr lang="en-US" sz="3200" dirty="0"/>
+              <a:t> data sources.</a:t>
+            </a:r>
+          </a:p>
+          <a:p>
+            <a:pPr marL="1143000" indent="-1143000">
+              <a:buFont typeface="Arial" panose="020B0604020202020204" pitchFamily="34" charset="0"/>
+              <a:buChar char="•"/>
+            </a:pPr>
+            <a:r>
+              <a:rPr lang="en-US" sz="3200" dirty="0"/>
+              <a:t>Can be flexibly applied for newly added data sources such as Canvas.</a:t>
+            </a:r>
+          </a:p>
+          <a:p>
+            <a:pPr marL="1143000" indent="-1143000">
+              <a:buFont typeface="Arial" panose="020B0604020202020204" pitchFamily="34" charset="0"/>
+              <a:buChar char="•"/>
+            </a:pPr>
+            <a:r>
+              <a:rPr lang="en-US" sz="3200" dirty="0"/>
+              <a:t>Data importing tool can assist to import data from data sources into database.</a:t>
+            </a:r>
+          </a:p>
+        </p:txBody>
+      </p:sp>
+      <p:pic>
+        <p:nvPicPr>
+          <p:cNvPr id="51" name="Picture 50">
+            <a:extLst>
+              <a:ext uri="{FF2B5EF4-FFF2-40B4-BE49-F238E27FC236}">
+                <a16:creationId xmlns:a16="http://schemas.microsoft.com/office/drawing/2014/main" id="{0C5B7859-114B-4E51-B787-275E022F7536}"/>
+              </a:ext>
+            </a:extLst>
+          </p:cNvPr>
+          <p:cNvPicPr>
+            <a:picLocks noChangeAspect="1"/>
+          </p:cNvPicPr>
+          <p:nvPr/>
+        </p:nvPicPr>
+        <p:blipFill>
+          <a:blip r:embed="rId5">
+            <a:extLst>
+              <a:ext uri="{28A0092B-C50C-407E-A947-70E740481C1C}">
+                <a14:useLocalDpi xmlns:a14="http://schemas.microsoft.com/office/drawing/2010/main" val="0"/>
+              </a:ext>
+            </a:extLst>
+          </a:blip>
+          <a:stretch>
+            <a:fillRect/>
+          </a:stretch>
+        </p:blipFill>
+        <p:spPr>
+          <a:xfrm>
+            <a:off x="22770033" y="5690662"/>
+            <a:ext cx="6632693" cy="6394468"/>
+          </a:xfrm>
+          <a:prstGeom prst="rect">
+            <a:avLst/>
+          </a:prstGeom>
+        </p:spPr>
+      </p:pic>
+      <p:sp>
+        <p:nvSpPr>
+          <p:cNvPr id="53" name="TextBox 52">
+            <a:extLst>
+              <a:ext uri="{FF2B5EF4-FFF2-40B4-BE49-F238E27FC236}">
+                <a16:creationId xmlns:a16="http://schemas.microsoft.com/office/drawing/2014/main" id="{ACE6854B-2C28-45DF-90F8-367CA667E897}"/>
+              </a:ext>
+            </a:extLst>
+          </p:cNvPr>
+          <p:cNvSpPr txBox="1"/>
+          <p:nvPr/>
+        </p:nvSpPr>
+        <p:spPr>
+          <a:xfrm>
+            <a:off x="30470914" y="15197537"/>
+            <a:ext cx="7060759" cy="3539430"/>
+          </a:xfrm>
+          <a:prstGeom prst="rect">
+            <a:avLst/>
+          </a:prstGeom>
+          <a:noFill/>
+        </p:spPr>
+        <p:txBody>
+          <a:bodyPr wrap="square" rtlCol="0">
+            <a:spAutoFit/>
+          </a:bodyPr>
+          <a:lstStyle/>
+          <a:p>
+            <a:pPr marL="1143000" indent="-1143000">
+              <a:buFont typeface="Arial" panose="020B0604020202020204" pitchFamily="34" charset="0"/>
+              <a:buChar char="•"/>
+            </a:pPr>
+            <a:r>
+              <a:rPr lang="en-US" sz="3200" dirty="0"/>
+              <a:t>The database is flexible and can be applied for multiple data sources.</a:t>
+            </a:r>
+          </a:p>
+          <a:p>
+            <a:pPr marL="1143000" indent="-1143000">
+              <a:buFont typeface="Arial" panose="020B0604020202020204" pitchFamily="34" charset="0"/>
+              <a:buChar char="•"/>
+            </a:pPr>
+            <a:r>
+              <a:rPr lang="en-US" sz="3200" dirty="0"/>
+              <a:t>Having tools to import data from external files.</a:t>
+            </a:r>
+          </a:p>
+          <a:p>
+            <a:pPr marL="1143000" indent="-1143000">
+              <a:buFont typeface="Arial" panose="020B0604020202020204" pitchFamily="34" charset="0"/>
+              <a:buChar char="•"/>
+            </a:pPr>
+            <a:r>
+              <a:rPr lang="en-US" sz="3200" dirty="0"/>
+              <a:t>The website can be used to query, analyze and extract data with the support of charts and tables.</a:t>
+            </a:r>
+          </a:p>
+        </p:txBody>
+      </p:sp>
+      <p:sp>
+        <p:nvSpPr>
+          <p:cNvPr id="54" name="TextBox 53">
+            <a:extLst>
+              <a:ext uri="{FF2B5EF4-FFF2-40B4-BE49-F238E27FC236}">
+                <a16:creationId xmlns:a16="http://schemas.microsoft.com/office/drawing/2014/main" id="{029BBC3E-E42A-4C5E-920A-A9E22A559A8D}"/>
+              </a:ext>
+            </a:extLst>
+          </p:cNvPr>
+          <p:cNvSpPr txBox="1"/>
+          <p:nvPr/>
+        </p:nvSpPr>
+        <p:spPr>
+          <a:xfrm>
+            <a:off x="30521023" y="22189216"/>
+            <a:ext cx="8041930" cy="1077218"/>
+          </a:xfrm>
+          <a:prstGeom prst="rect">
+            <a:avLst/>
+          </a:prstGeom>
+          <a:noFill/>
+        </p:spPr>
+        <p:txBody>
+          <a:bodyPr wrap="square" rtlCol="0">
+            <a:spAutoFit/>
+          </a:bodyPr>
+          <a:lstStyle/>
+          <a:p>
+            <a:pPr marL="1143000" indent="-1143000">
+              <a:buFont typeface="Arial" panose="020B0604020202020204" pitchFamily="34" charset="0"/>
+              <a:buChar char="•"/>
+            </a:pPr>
+            <a:r>
+              <a:rPr lang="en-US" sz="3200" dirty="0"/>
+              <a:t>Modify the schema to work with new Canvas data source.</a:t>
+            </a:r>
+          </a:p>
+        </p:txBody>
+      </p:sp>
+      <p:pic>
+        <p:nvPicPr>
+          <p:cNvPr id="52" name="Picture 51">
+            <a:extLst>
+              <a:ext uri="{FF2B5EF4-FFF2-40B4-BE49-F238E27FC236}">
+                <a16:creationId xmlns:a16="http://schemas.microsoft.com/office/drawing/2014/main" id="{C8887F1F-1EC5-412B-9D53-658DE6D27ADB}"/>
+              </a:ext>
+            </a:extLst>
+          </p:cNvPr>
+          <p:cNvPicPr>
+            <a:picLocks noChangeAspect="1"/>
+          </p:cNvPicPr>
+          <p:nvPr/>
+        </p:nvPicPr>
+        <p:blipFill>
+          <a:blip r:embed="rId6"/>
+          <a:stretch>
+            <a:fillRect/>
+          </a:stretch>
+        </p:blipFill>
+        <p:spPr>
+          <a:xfrm>
+            <a:off x="38107737" y="22223887"/>
+            <a:ext cx="4052477" cy="3626418"/>
+          </a:xfrm>
+          <a:prstGeom prst="rect">
+            <a:avLst/>
+          </a:prstGeom>
+        </p:spPr>
+      </p:pic>
+      <p:sp>
+        <p:nvSpPr>
+          <p:cNvPr id="58" name="TextBox 57">
+            <a:extLst>
+              <a:ext uri="{FF2B5EF4-FFF2-40B4-BE49-F238E27FC236}">
+                <a16:creationId xmlns:a16="http://schemas.microsoft.com/office/drawing/2014/main" id="{3B8CF5F7-7340-4E24-8644-D8C68E8EAD91}"/>
+              </a:ext>
+            </a:extLst>
+          </p:cNvPr>
+          <p:cNvSpPr txBox="1"/>
+          <p:nvPr/>
+        </p:nvSpPr>
+        <p:spPr>
+          <a:xfrm>
+            <a:off x="30546897" y="27258757"/>
+            <a:ext cx="12108564" cy="1569660"/>
+          </a:xfrm>
+          <a:prstGeom prst="rect">
+            <a:avLst/>
+          </a:prstGeom>
+          <a:noFill/>
+        </p:spPr>
+        <p:txBody>
+          <a:bodyPr wrap="square" rtlCol="0">
+            <a:spAutoFit/>
+          </a:bodyPr>
+          <a:lstStyle/>
+          <a:p>
+            <a:r>
+              <a:rPr lang="en-US" sz="3200" dirty="0"/>
+              <a:t>This project was supported by the School of Computer Science. We gratefully acknowledge the feedback and contribution of Nickolas Falkner, Claudio Szabo, Christoph </a:t>
+            </a:r>
+            <a:r>
+              <a:rPr lang="en-US" sz="3200" dirty="0" err="1"/>
+              <a:t>Treude</a:t>
+            </a:r>
+            <a:r>
+              <a:rPr lang="en-US" sz="3200" dirty="0"/>
+              <a:t> and Marian </a:t>
+            </a:r>
+            <a:r>
+              <a:rPr lang="en-US" sz="3200" dirty="0" err="1"/>
+              <a:t>Mihailescu</a:t>
+            </a:r>
+            <a:r>
+              <a:rPr lang="en-US" sz="3200" dirty="0"/>
+              <a:t>.</a:t>
+            </a:r>
           </a:p>
         </p:txBody>
       </p:sp>
@@ -4946,13 +5467,6 @@
   <p:clrMapOvr>
     <a:masterClrMapping/>
   </p:clrMapOvr>
-  <p:timing>
-    <p:tnLst>
-      <p:par>
-        <p:cTn id="1" dur="indefinite" restart="never" nodeType="tmRoot"/>
-      </p:par>
-    </p:tnLst>
-  </p:timing>
 </p:sld>
 </file>
 

</xml_diff>

<commit_message>
Add text for "introduction" #170
Add text for "introduction" and add it to ppt.
</commit_message>
<xml_diff>
--- a/Poster/Stu_data Poster.pptx
+++ b/Poster/Stu_data Poster.pptx
@@ -112,7 +112,7 @@
   </p:defaultTextStyle>
   <p:extLst>
     <p:ext uri="{EFAFB233-063F-42B5-8137-9DF3F51BA10A}">
-      <p15:sldGuideLst xmlns:p15="http://schemas.microsoft.com/office/powerpoint/2012/main">
+      <p15:sldGuideLst xmlns="" xmlns:p15="http://schemas.microsoft.com/office/powerpoint/2012/main">
         <p15:guide id="1" orient="horz" pos="4050">
           <p15:clr>
             <a:srgbClr val="A4A3A4"/>
@@ -126,7 +126,7 @@
       </p15:sldGuideLst>
     </p:ext>
     <p:ext uri="{2D200454-40CA-4A62-9FC3-DE9A4176ACB9}">
-      <p15:notesGuideLst xmlns:p15="http://schemas.microsoft.com/office/powerpoint/2012/main">
+      <p15:notesGuideLst xmlns="" xmlns:p15="http://schemas.microsoft.com/office/powerpoint/2012/main">
         <p15:guide id="1" orient="horz" pos="2880">
           <p15:clr>
             <a:srgbClr val="A4A3A4"/>
@@ -230,7 +230,7 @@
             <a:fld id="{59D7332B-1442-4F8C-A160-0D5EB57A24C0}" type="datetimeFigureOut">
               <a:rPr lang="en-AU" smtClean="0"/>
               <a:pPr/>
-              <a:t>9/10/2017</a:t>
+              <a:t>10/10/2017</a:t>
             </a:fld>
             <a:endParaRPr lang="en-AU"/>
           </a:p>
@@ -306,7 +306,7 @@
     </p:spTree>
     <p:extLst>
       <p:ext uri="{BB962C8B-B14F-4D97-AF65-F5344CB8AC3E}">
-        <p14:creationId xmlns:p14="http://schemas.microsoft.com/office/powerpoint/2010/main" val="4029272196"/>
+        <p14:creationId xmlns:p14="http://schemas.microsoft.com/office/powerpoint/2010/main" xmlns="" val="4029272196"/>
       </p:ext>
     </p:extLst>
   </p:cSld>
@@ -397,7 +397,7 @@
             <a:fld id="{33744820-F59C-490B-A624-3CEFDFE2581B}" type="datetimeFigureOut">
               <a:rPr lang="en-AU" smtClean="0"/>
               <a:pPr/>
-              <a:t>9/10/2017</a:t>
+              <a:t>10/10/2017</a:t>
             </a:fld>
             <a:endParaRPr lang="en-AU"/>
           </a:p>
@@ -568,7 +568,7 @@
     </p:spTree>
     <p:extLst>
       <p:ext uri="{BB962C8B-B14F-4D97-AF65-F5344CB8AC3E}">
-        <p14:creationId xmlns:p14="http://schemas.microsoft.com/office/powerpoint/2010/main" val="3122356856"/>
+        <p14:creationId xmlns:p14="http://schemas.microsoft.com/office/powerpoint/2010/main" xmlns="" val="3122356856"/>
       </p:ext>
     </p:extLst>
   </p:cSld>
@@ -4638,8 +4638,8 @@
         </p:nvSpPr>
         <p:spPr>
           <a:xfrm>
-            <a:off x="16055287" y="1973572"/>
-            <a:ext cx="14941660" cy="1569660"/>
+            <a:off x="14543833" y="1973572"/>
+            <a:ext cx="17276740" cy="1569660"/>
           </a:xfrm>
           <a:prstGeom prst="rect">
             <a:avLst/>
@@ -4654,12 +4654,28 @@
           <a:p>
             <a:pPr algn="ctr"/>
             <a:r>
+              <a:rPr lang="en-US" altLang="zh-CN" sz="3200" dirty="0" smtClean="0">
+                <a:solidFill>
+                  <a:schemeClr val="bg1"/>
+                </a:solidFill>
+              </a:rPr>
+              <a:t>Zeyu </a:t>
+            </a:r>
+            <a:r>
               <a:rPr lang="en-US" altLang="zh-CN" sz="3200" dirty="0">
                 <a:solidFill>
                   <a:schemeClr val="bg1"/>
                 </a:solidFill>
               </a:rPr>
-              <a:t>Zeqi Fu, </a:t>
+              <a:t>Lin, Minh Tam </a:t>
+            </a:r>
+            <a:r>
+              <a:rPr lang="en-US" altLang="zh-CN" sz="3200" dirty="0" smtClean="0">
+                <a:solidFill>
+                  <a:schemeClr val="bg1"/>
+                </a:solidFill>
+              </a:rPr>
+              <a:t>Phan, </a:t>
             </a:r>
             <a:r>
               <a:rPr lang="en-US" altLang="zh-CN" sz="3200" dirty="0" err="1">
@@ -4667,7 +4683,7 @@
                   <a:schemeClr val="bg1"/>
                 </a:solidFill>
               </a:rPr>
-              <a:t>Zeyu</a:t>
+              <a:t>Zeqi</a:t>
             </a:r>
             <a:r>
               <a:rPr lang="en-US" altLang="zh-CN" sz="3200" dirty="0">
@@ -4675,10 +4691,50 @@
                   <a:schemeClr val="bg1"/>
                 </a:solidFill>
               </a:rPr>
-              <a:t> Lin, Minh Tam Phan</a:t>
-            </a:r>
-            <a:r>
-              <a:rPr lang="zh-CN" altLang="en-US" sz="3200" dirty="0">
+              <a:t> </a:t>
+            </a:r>
+            <a:r>
+              <a:rPr lang="en-US" altLang="zh-CN" sz="3200" dirty="0" smtClean="0">
+                <a:solidFill>
+                  <a:schemeClr val="bg1"/>
+                </a:solidFill>
+              </a:rPr>
+              <a:t>Fu (zeyu.lin, </a:t>
+            </a:r>
+            <a:r>
+              <a:rPr lang="en-US" altLang="zh-CN" sz="3200" dirty="0" err="1" smtClean="0">
+                <a:solidFill>
+                  <a:schemeClr val="bg1"/>
+                </a:solidFill>
+              </a:rPr>
+              <a:t>minhtam.phan</a:t>
+            </a:r>
+            <a:r>
+              <a:rPr lang="en-US" altLang="zh-CN" sz="3200" dirty="0" smtClean="0">
+                <a:solidFill>
+                  <a:schemeClr val="bg1"/>
+                </a:solidFill>
+              </a:rPr>
+              <a:t>, </a:t>
+            </a:r>
+            <a:r>
+              <a:rPr lang="en-US" altLang="zh-CN" sz="3200" dirty="0" err="1" smtClean="0">
+                <a:solidFill>
+                  <a:schemeClr val="bg1"/>
+                </a:solidFill>
+              </a:rPr>
+              <a:t>zeqi.fu</a:t>
+            </a:r>
+            <a:r>
+              <a:rPr lang="en-US" altLang="zh-CN" sz="3200" dirty="0" smtClean="0">
+                <a:solidFill>
+                  <a:schemeClr val="bg1"/>
+                </a:solidFill>
+              </a:rPr>
+              <a:t>)</a:t>
+            </a:r>
+            <a:r>
+              <a:rPr lang="zh-CN" altLang="en-US" sz="3200" dirty="0" smtClean="0">
                 <a:solidFill>
                   <a:schemeClr val="bg1"/>
                 </a:solidFill>
@@ -4686,7 +4742,7 @@
               <a:t> </a:t>
             </a:r>
             <a:r>
-              <a:rPr lang="en-US" altLang="zh-CN" sz="3200" dirty="0">
+              <a:rPr lang="en-US" altLang="zh-CN" sz="3200" dirty="0" smtClean="0">
                 <a:solidFill>
                   <a:schemeClr val="bg1"/>
                 </a:solidFill>
@@ -4912,7 +4968,7 @@
           <p:cNvPr id="4" name="TextBox 3">
             <a:extLst>
               <a:ext uri="{FF2B5EF4-FFF2-40B4-BE49-F238E27FC236}">
-                <a16:creationId xmlns:a16="http://schemas.microsoft.com/office/drawing/2014/main" id="{D335579D-9BA7-4FF2-BA55-7C6390B98CEF}"/>
+                <a16:creationId xmlns="" xmlns:a16="http://schemas.microsoft.com/office/drawing/2014/main" id="{D335579D-9BA7-4FF2-BA55-7C6390B98CEF}"/>
               </a:ext>
             </a:extLst>
           </p:cNvPr>
@@ -4941,16 +4997,29 @@
             </a:pPr>
             <a:r>
               <a:rPr lang="en-US" sz="3200" dirty="0"/>
-              <a:t>The database schema is built based on two Moodle Forum and </a:t>
-            </a:r>
-            <a:r>
-              <a:rPr lang="en-US" sz="3200" dirty="0" err="1"/>
+              <a:t>The database schema is built based on two </a:t>
+            </a:r>
+            <a:r>
+              <a:rPr lang="en-US" sz="3200" dirty="0" smtClean="0"/>
+              <a:t>data sources (</a:t>
+            </a:r>
+            <a:r>
+              <a:rPr lang="en-US" sz="3200" dirty="0" err="1" smtClean="0"/>
+              <a:t>Moodle</a:t>
+            </a:r>
+            <a:r>
+              <a:rPr lang="en-US" sz="3200" dirty="0" smtClean="0"/>
+              <a:t> Forum and </a:t>
+            </a:r>
+            <a:r>
+              <a:rPr lang="en-US" sz="3200" dirty="0" err="1" smtClean="0"/>
               <a:t>WebSubmission</a:t>
             </a:r>
             <a:r>
-              <a:rPr lang="en-US" sz="3200" dirty="0"/>
-              <a:t> data sources.</a:t>
-            </a:r>
+              <a:rPr lang="en-US" sz="3200" dirty="0" smtClean="0"/>
+              <a:t>).</a:t>
+            </a:r>
+            <a:endParaRPr lang="en-US" sz="3200" dirty="0"/>
           </a:p>
           <a:p>
             <a:pPr marL="1143000" indent="-1143000">
@@ -4979,7 +5048,7 @@
           <p:cNvPr id="31" name="Picture 30">
             <a:extLst>
               <a:ext uri="{FF2B5EF4-FFF2-40B4-BE49-F238E27FC236}">
-                <a16:creationId xmlns:a16="http://schemas.microsoft.com/office/drawing/2014/main" id="{49FE897D-F032-49C9-95DD-CCF761D9E0B8}"/>
+                <a16:creationId xmlns="" xmlns:a16="http://schemas.microsoft.com/office/drawing/2014/main" id="{49FE897D-F032-49C9-95DD-CCF761D9E0B8}"/>
               </a:ext>
             </a:extLst>
           </p:cNvPr>
@@ -4992,7 +5061,7 @@
           <a:blip r:embed="rId2">
             <a:extLst>
               <a:ext uri="{28A0092B-C50C-407E-A947-70E740481C1C}">
-                <a14:useLocalDpi xmlns:a14="http://schemas.microsoft.com/office/drawing/2010/main" val="0"/>
+                <a14:useLocalDpi xmlns:a14="http://schemas.microsoft.com/office/drawing/2010/main" xmlns="" val="0"/>
               </a:ext>
             </a:extLst>
           </a:blip>
@@ -5015,7 +5084,7 @@
           <p:cNvPr id="33" name="Picture 32">
             <a:extLst>
               <a:ext uri="{FF2B5EF4-FFF2-40B4-BE49-F238E27FC236}">
-                <a16:creationId xmlns:a16="http://schemas.microsoft.com/office/drawing/2014/main" id="{6AD46D6C-29E3-4501-AF10-81B444FA599A}"/>
+                <a16:creationId xmlns="" xmlns:a16="http://schemas.microsoft.com/office/drawing/2014/main" id="{6AD46D6C-29E3-4501-AF10-81B444FA599A}"/>
               </a:ext>
             </a:extLst>
           </p:cNvPr>
@@ -5028,7 +5097,7 @@
           <a:blip r:embed="rId3">
             <a:extLst>
               <a:ext uri="{28A0092B-C50C-407E-A947-70E740481C1C}">
-                <a14:useLocalDpi xmlns:a14="http://schemas.microsoft.com/office/drawing/2010/main" val="0"/>
+                <a14:useLocalDpi xmlns:a14="http://schemas.microsoft.com/office/drawing/2010/main" xmlns="" val="0"/>
               </a:ext>
             </a:extLst>
           </a:blip>
@@ -5051,7 +5120,7 @@
           <p:cNvPr id="35" name="Picture 34">
             <a:extLst>
               <a:ext uri="{FF2B5EF4-FFF2-40B4-BE49-F238E27FC236}">
-                <a16:creationId xmlns:a16="http://schemas.microsoft.com/office/drawing/2014/main" id="{84A8944C-C2C3-4E5B-AA53-82A178642EA6}"/>
+                <a16:creationId xmlns="" xmlns:a16="http://schemas.microsoft.com/office/drawing/2014/main" id="{84A8944C-C2C3-4E5B-AA53-82A178642EA6}"/>
               </a:ext>
             </a:extLst>
           </p:cNvPr>
@@ -5064,7 +5133,7 @@
           <a:blip r:embed="rId4">
             <a:extLst>
               <a:ext uri="{28A0092B-C50C-407E-A947-70E740481C1C}">
-                <a14:useLocalDpi xmlns:a14="http://schemas.microsoft.com/office/drawing/2010/main" val="0"/>
+                <a14:useLocalDpi xmlns:a14="http://schemas.microsoft.com/office/drawing/2010/main" xmlns="" val="0"/>
               </a:ext>
             </a:extLst>
           </a:blip>
@@ -5087,7 +5156,7 @@
           <p:cNvPr id="37" name="Straight Arrow Connector 36">
             <a:extLst>
               <a:ext uri="{FF2B5EF4-FFF2-40B4-BE49-F238E27FC236}">
-                <a16:creationId xmlns:a16="http://schemas.microsoft.com/office/drawing/2014/main" id="{6A14BA03-E8AE-48DE-B2C7-6A9F54D0C8F4}"/>
+                <a16:creationId xmlns="" xmlns:a16="http://schemas.microsoft.com/office/drawing/2014/main" id="{6A14BA03-E8AE-48DE-B2C7-6A9F54D0C8F4}"/>
               </a:ext>
             </a:extLst>
           </p:cNvPr>
@@ -5129,7 +5198,7 @@
           <p:cNvPr id="39" name="Straight Arrow Connector 38">
             <a:extLst>
               <a:ext uri="{FF2B5EF4-FFF2-40B4-BE49-F238E27FC236}">
-                <a16:creationId xmlns:a16="http://schemas.microsoft.com/office/drawing/2014/main" id="{3EFA15DA-D2B0-42C3-B2EC-A14C96D8DCC1}"/>
+                <a16:creationId xmlns="" xmlns:a16="http://schemas.microsoft.com/office/drawing/2014/main" id="{3EFA15DA-D2B0-42C3-B2EC-A14C96D8DCC1}"/>
               </a:ext>
             </a:extLst>
           </p:cNvPr>
@@ -5170,7 +5239,7 @@
           <p:cNvPr id="49" name="TextBox 48">
             <a:extLst>
               <a:ext uri="{FF2B5EF4-FFF2-40B4-BE49-F238E27FC236}">
-                <a16:creationId xmlns:a16="http://schemas.microsoft.com/office/drawing/2014/main" id="{4C7268DB-F52B-4228-A14F-253306C33498}"/>
+                <a16:creationId xmlns="" xmlns:a16="http://schemas.microsoft.com/office/drawing/2014/main" id="{4C7268DB-F52B-4228-A14F-253306C33498}"/>
               </a:ext>
             </a:extLst>
           </p:cNvPr>
@@ -5247,7 +5316,7 @@
           <p:cNvPr id="51" name="Picture 50">
             <a:extLst>
               <a:ext uri="{FF2B5EF4-FFF2-40B4-BE49-F238E27FC236}">
-                <a16:creationId xmlns:a16="http://schemas.microsoft.com/office/drawing/2014/main" id="{0C5B7859-114B-4E51-B787-275E022F7536}"/>
+                <a16:creationId xmlns="" xmlns:a16="http://schemas.microsoft.com/office/drawing/2014/main" id="{0C5B7859-114B-4E51-B787-275E022F7536}"/>
               </a:ext>
             </a:extLst>
           </p:cNvPr>
@@ -5260,7 +5329,7 @@
           <a:blip r:embed="rId5">
             <a:extLst>
               <a:ext uri="{28A0092B-C50C-407E-A947-70E740481C1C}">
-                <a14:useLocalDpi xmlns:a14="http://schemas.microsoft.com/office/drawing/2010/main" val="0"/>
+                <a14:useLocalDpi xmlns:a14="http://schemas.microsoft.com/office/drawing/2010/main" xmlns="" val="0"/>
               </a:ext>
             </a:extLst>
           </a:blip>
@@ -5283,7 +5352,7 @@
           <p:cNvPr id="53" name="TextBox 52">
             <a:extLst>
               <a:ext uri="{FF2B5EF4-FFF2-40B4-BE49-F238E27FC236}">
-                <a16:creationId xmlns:a16="http://schemas.microsoft.com/office/drawing/2014/main" id="{ACE6854B-2C28-45DF-90F8-367CA667E897}"/>
+                <a16:creationId xmlns="" xmlns:a16="http://schemas.microsoft.com/office/drawing/2014/main" id="{ACE6854B-2C28-45DF-90F8-367CA667E897}"/>
               </a:ext>
             </a:extLst>
           </p:cNvPr>
@@ -5342,7 +5411,7 @@
           <p:cNvPr id="54" name="TextBox 53">
             <a:extLst>
               <a:ext uri="{FF2B5EF4-FFF2-40B4-BE49-F238E27FC236}">
-                <a16:creationId xmlns:a16="http://schemas.microsoft.com/office/drawing/2014/main" id="{029BBC3E-E42A-4C5E-920A-A9E22A559A8D}"/>
+                <a16:creationId xmlns="" xmlns:a16="http://schemas.microsoft.com/office/drawing/2014/main" id="{029BBC3E-E42A-4C5E-920A-A9E22A559A8D}"/>
               </a:ext>
             </a:extLst>
           </p:cNvPr>
@@ -5381,7 +5450,7 @@
           <p:cNvPr id="52" name="Picture 51">
             <a:extLst>
               <a:ext uri="{FF2B5EF4-FFF2-40B4-BE49-F238E27FC236}">
-                <a16:creationId xmlns:a16="http://schemas.microsoft.com/office/drawing/2014/main" id="{C8887F1F-1EC5-412B-9D53-658DE6D27ADB}"/>
+                <a16:creationId xmlns="" xmlns:a16="http://schemas.microsoft.com/office/drawing/2014/main" id="{C8887F1F-1EC5-412B-9D53-658DE6D27ADB}"/>
               </a:ext>
             </a:extLst>
           </p:cNvPr>
@@ -5411,7 +5480,7 @@
           <p:cNvPr id="58" name="TextBox 57">
             <a:extLst>
               <a:ext uri="{FF2B5EF4-FFF2-40B4-BE49-F238E27FC236}">
-                <a16:creationId xmlns:a16="http://schemas.microsoft.com/office/drawing/2014/main" id="{3B8CF5F7-7340-4E24-8644-D8C68E8EAD91}"/>
+                <a16:creationId xmlns="" xmlns:a16="http://schemas.microsoft.com/office/drawing/2014/main" id="{3B8CF5F7-7340-4E24-8644-D8C68E8EAD91}"/>
               </a:ext>
             </a:extLst>
           </p:cNvPr>
@@ -5457,10 +5526,264 @@
           </a:p>
         </p:txBody>
       </p:sp>
+      <p:sp>
+        <p:nvSpPr>
+          <p:cNvPr id="41" name="TextBox 40">
+            <a:extLst>
+              <a:ext uri="{FF2B5EF4-FFF2-40B4-BE49-F238E27FC236}">
+                <a16:creationId xmlns="" xmlns:a16="http://schemas.microsoft.com/office/drawing/2014/main" id="{D335579D-9BA7-4FF2-BA55-7C6390B98CEF}"/>
+              </a:ext>
+            </a:extLst>
+          </p:cNvPr>
+          <p:cNvSpPr txBox="1"/>
+          <p:nvPr/>
+        </p:nvSpPr>
+        <p:spPr>
+          <a:xfrm>
+            <a:off x="807593" y="6046392"/>
+            <a:ext cx="10106994" cy="15358050"/>
+          </a:xfrm>
+          <a:prstGeom prst="rect">
+            <a:avLst/>
+          </a:prstGeom>
+          <a:noFill/>
+        </p:spPr>
+        <p:txBody>
+          <a:bodyPr wrap="square" rtlCol="0">
+            <a:spAutoFit/>
+          </a:bodyPr>
+          <a:lstStyle/>
+          <a:p>
+            <a:pPr marL="1143000" indent="-1143000">
+              <a:buFont typeface="Arial" panose="020B0604020202020204" pitchFamily="34" charset="0"/>
+              <a:buChar char="•"/>
+            </a:pPr>
+            <a:r>
+              <a:rPr lang="en-US" sz="3200" dirty="0" smtClean="0"/>
+              <a:t>12 </a:t>
+            </a:r>
+            <a:r>
+              <a:rPr lang="en-US" sz="3200" dirty="0" smtClean="0"/>
+              <a:t>years of </a:t>
+            </a:r>
+            <a:r>
+              <a:rPr lang="en-US" sz="3200" dirty="0" err="1" smtClean="0"/>
+              <a:t>Moodle</a:t>
+            </a:r>
+            <a:r>
+              <a:rPr lang="en-US" sz="3200" dirty="0" smtClean="0"/>
+              <a:t> and </a:t>
+            </a:r>
+            <a:r>
+              <a:rPr lang="en-US" sz="3200" dirty="0" err="1" smtClean="0"/>
+              <a:t>WebSubmission</a:t>
+            </a:r>
+            <a:r>
+              <a:rPr lang="en-US" sz="3200" dirty="0" smtClean="0"/>
+              <a:t> data </a:t>
+            </a:r>
+            <a:r>
+              <a:rPr lang="en-US" sz="3200" dirty="0" smtClean="0"/>
+              <a:t>has </a:t>
+            </a:r>
+            <a:r>
+              <a:rPr lang="en-US" sz="3200" dirty="0" smtClean="0"/>
+              <a:t>been collected and the problem now is </a:t>
+            </a:r>
+            <a:r>
+              <a:rPr lang="en-US" sz="3200" dirty="0" err="1" smtClean="0"/>
+              <a:t>organising</a:t>
+            </a:r>
+            <a:r>
+              <a:rPr lang="en-US" sz="3200" dirty="0" smtClean="0"/>
+              <a:t> it for searching and trend analysis</a:t>
+            </a:r>
+            <a:r>
+              <a:rPr lang="en-US" sz="3200" dirty="0" smtClean="0"/>
+              <a:t>.</a:t>
+            </a:r>
+          </a:p>
+          <a:p>
+            <a:pPr marL="1143000" indent="-1143000">
+              <a:buFont typeface="Arial" panose="020B0604020202020204" pitchFamily="34" charset="0"/>
+              <a:buChar char="•"/>
+            </a:pPr>
+            <a:r>
+              <a:rPr lang="en-US" sz="3200" dirty="0" err="1" smtClean="0"/>
+              <a:t>Moodle</a:t>
+            </a:r>
+            <a:r>
+              <a:rPr lang="en-US" sz="3200" dirty="0" smtClean="0"/>
+              <a:t> and </a:t>
+            </a:r>
+            <a:r>
+              <a:rPr lang="en-US" sz="3200" dirty="0" err="1" smtClean="0"/>
+              <a:t>WebSubmission</a:t>
+            </a:r>
+            <a:r>
+              <a:rPr lang="en-US" sz="3200" dirty="0" smtClean="0"/>
+              <a:t> are separate systems. What we are doing is to tie the two systems together by designing a database schema that will take into consideration and incorporate both systems</a:t>
+            </a:r>
+            <a:r>
+              <a:rPr lang="en-US" sz="3200" dirty="0" smtClean="0"/>
+              <a:t>.</a:t>
+            </a:r>
+          </a:p>
+          <a:p>
+            <a:pPr marL="1143000" indent="-1143000">
+              <a:buFont typeface="Arial" panose="020B0604020202020204" pitchFamily="34" charset="0"/>
+              <a:buChar char="•"/>
+            </a:pPr>
+            <a:r>
+              <a:rPr lang="en-US" sz="3200" dirty="0" smtClean="0"/>
+              <a:t>All </a:t>
+            </a:r>
+            <a:r>
+              <a:rPr lang="en-US" sz="3200" dirty="0" smtClean="0"/>
+              <a:t>data is </a:t>
+            </a:r>
+            <a:r>
+              <a:rPr lang="en-US" sz="3200" dirty="0" err="1" smtClean="0"/>
+              <a:t>anonymised</a:t>
+            </a:r>
+            <a:r>
+              <a:rPr lang="en-US" sz="3200" dirty="0" smtClean="0"/>
+              <a:t> and is identified in a way that allows us to associate actions without identifying the students, which ensures the privacy</a:t>
+            </a:r>
+            <a:r>
+              <a:rPr lang="en-US" sz="3200" dirty="0" smtClean="0"/>
+              <a:t>.</a:t>
+            </a:r>
+          </a:p>
+          <a:p>
+            <a:pPr marL="1143000" indent="-1143000">
+              <a:buFont typeface="Arial" panose="020B0604020202020204" pitchFamily="34" charset="0"/>
+              <a:buChar char="•"/>
+            </a:pPr>
+            <a:r>
+              <a:rPr lang="en-US" sz="3200" dirty="0" smtClean="0"/>
+              <a:t>Raw data is not logically well organized and hard to read.</a:t>
+            </a:r>
+            <a:endParaRPr lang="zh-CN" altLang="en-US" sz="3200" dirty="0" smtClean="0"/>
+          </a:p>
+          <a:p>
+            <a:pPr marL="1143000" indent="-1143000">
+              <a:buFont typeface="Arial" panose="020B0604020202020204" pitchFamily="34" charset="0"/>
+              <a:buChar char="•"/>
+            </a:pPr>
+            <a:r>
+              <a:rPr lang="en-US" sz="3200" dirty="0" smtClean="0"/>
+              <a:t>Visualization is provided by presenting data in the form of charts, which makes the data more intuitive.</a:t>
+            </a:r>
+            <a:endParaRPr lang="zh-CN" altLang="en-US" sz="3200" dirty="0" smtClean="0"/>
+          </a:p>
+          <a:p>
+            <a:pPr marL="1143000" indent="-1143000">
+              <a:buFont typeface="Arial" panose="020B0604020202020204" pitchFamily="34" charset="0"/>
+              <a:buChar char="•"/>
+            </a:pPr>
+            <a:r>
+              <a:rPr lang="en-US" sz="3200" dirty="0" smtClean="0"/>
+              <a:t>A lot of configuration options are provided to allow users to manipulate the data displayed in the charts and allow users to interact with the charts.</a:t>
+            </a:r>
+            <a:endParaRPr lang="zh-CN" altLang="en-US" sz="3200" dirty="0" smtClean="0"/>
+          </a:p>
+          <a:p>
+            <a:pPr marL="1143000" indent="-1143000">
+              <a:buFont typeface="Arial" panose="020B0604020202020204" pitchFamily="34" charset="0"/>
+              <a:buChar char="•"/>
+            </a:pPr>
+            <a:r>
+              <a:rPr lang="en-US" sz="3200" dirty="0" smtClean="0"/>
+              <a:t>Analysis module is provided to allow users to explore the relationship between </a:t>
+            </a:r>
+            <a:r>
+              <a:rPr lang="en-US" sz="3200" dirty="0" smtClean="0"/>
+              <a:t>students‘ </a:t>
+            </a:r>
+            <a:r>
+              <a:rPr lang="en-US" sz="3200" dirty="0" smtClean="0"/>
+              <a:t>activities and academic performances.</a:t>
+            </a:r>
+            <a:endParaRPr lang="zh-CN" altLang="en-US" sz="3200" dirty="0" smtClean="0"/>
+          </a:p>
+          <a:p>
+            <a:pPr marL="1143000" indent="-1143000">
+              <a:buFont typeface="Arial" panose="020B0604020202020204" pitchFamily="34" charset="0"/>
+              <a:buChar char="•"/>
+            </a:pPr>
+            <a:r>
+              <a:rPr lang="en-US" sz="3200" dirty="0" smtClean="0"/>
+              <a:t>Staffs </a:t>
+            </a:r>
+            <a:r>
+              <a:rPr lang="en-US" sz="3200" dirty="0" smtClean="0"/>
+              <a:t>are allowed to query the database, extract data, aggregate it, and export it</a:t>
+            </a:r>
+            <a:r>
+              <a:rPr lang="en-US" sz="3200" dirty="0" smtClean="0"/>
+              <a:t>.</a:t>
+            </a:r>
+          </a:p>
+          <a:p>
+            <a:pPr marL="1143000" indent="-1143000">
+              <a:buFont typeface="Arial" panose="020B0604020202020204" pitchFamily="34" charset="0"/>
+              <a:buChar char="•"/>
+            </a:pPr>
+            <a:r>
+              <a:rPr lang="en-US" sz="3200" dirty="0" smtClean="0"/>
+              <a:t>Extraction and insertion scripts that work with the file-based storage for the current data are provided.</a:t>
+            </a:r>
+            <a:endParaRPr lang="zh-CN" altLang="en-US" sz="3200" dirty="0" smtClean="0"/>
+          </a:p>
+          <a:p>
+            <a:pPr marL="1143000" indent="-1143000">
+              <a:buFont typeface="Arial" panose="020B0604020202020204" pitchFamily="34" charset="0"/>
+              <a:buChar char="•"/>
+            </a:pPr>
+            <a:endParaRPr lang="zh-CN" altLang="en-US" sz="3200" dirty="0" smtClean="0"/>
+          </a:p>
+          <a:p>
+            <a:pPr marL="1143000" indent="-1143000">
+              <a:buFont typeface="Arial" panose="020B0604020202020204" pitchFamily="34" charset="0"/>
+              <a:buChar char="•"/>
+            </a:pPr>
+            <a:endParaRPr lang="zh-CN" altLang="en-US" sz="3200" dirty="0" smtClean="0"/>
+          </a:p>
+          <a:p>
+            <a:pPr marL="1143000" indent="-1143000">
+              <a:buFont typeface="Arial" panose="020B0604020202020204" pitchFamily="34" charset="0"/>
+              <a:buChar char="•"/>
+            </a:pPr>
+            <a:endParaRPr lang="zh-CN" altLang="en-US" sz="3200" dirty="0" smtClean="0"/>
+          </a:p>
+          <a:p>
+            <a:pPr marL="1143000" indent="-1143000">
+              <a:buFont typeface="Arial" panose="020B0604020202020204" pitchFamily="34" charset="0"/>
+              <a:buChar char="•"/>
+            </a:pPr>
+            <a:endParaRPr lang="zh-CN" altLang="en-US" sz="3200" dirty="0" smtClean="0"/>
+          </a:p>
+          <a:p>
+            <a:pPr marL="1143000" indent="-1143000">
+              <a:buFont typeface="Arial" panose="020B0604020202020204" pitchFamily="34" charset="0"/>
+              <a:buChar char="•"/>
+            </a:pPr>
+            <a:endParaRPr lang="en-US" sz="3200" dirty="0" smtClean="0"/>
+          </a:p>
+          <a:p>
+            <a:pPr marL="1143000" indent="-1143000">
+              <a:buFont typeface="Arial" panose="020B0604020202020204" pitchFamily="34" charset="0"/>
+              <a:buChar char="•"/>
+            </a:pPr>
+            <a:endParaRPr lang="en-US" sz="3200" dirty="0"/>
+          </a:p>
+        </p:txBody>
+      </p:sp>
     </p:spTree>
     <p:extLst>
       <p:ext uri="{BB962C8B-B14F-4D97-AF65-F5344CB8AC3E}">
-        <p14:creationId xmlns:p14="http://schemas.microsoft.com/office/powerpoint/2010/main" val="707856342"/>
+        <p14:creationId xmlns:p14="http://schemas.microsoft.com/office/powerpoint/2010/main" xmlns="" val="707856342"/>
       </p:ext>
     </p:extLst>
   </p:cSld>
@@ -5478,7 +5801,7 @@
         <a:sysClr val="windowText" lastClr="000000"/>
       </a:dk1>
       <a:lt1>
-        <a:sysClr val="window" lastClr="FFFFFF"/>
+        <a:sysClr val="window" lastClr="C7EDCC"/>
       </a:lt1>
       <a:dk2>
         <a:srgbClr val="0F497B"/>
@@ -5761,7 +6084,7 @@
         <a:sysClr val="windowText" lastClr="000000"/>
       </a:dk1>
       <a:lt1>
-        <a:sysClr val="window" lastClr="FFFFFF"/>
+        <a:sysClr val="window" lastClr="C7EDCC"/>
       </a:lt1>
       <a:dk2>
         <a:srgbClr val="1F497D"/>
@@ -6044,7 +6367,7 @@
         <a:sysClr val="windowText" lastClr="000000"/>
       </a:dk1>
       <a:lt1>
-        <a:sysClr val="window" lastClr="FFFFFF"/>
+        <a:sysClr val="window" lastClr="C7EDCC"/>
       </a:lt1>
       <a:dk2>
         <a:srgbClr val="1F497D"/>

</xml_diff>

<commit_message>
Add text for "objective" #170
Add text for "objective" and add it to ppt.
</commit_message>
<xml_diff>
--- a/Poster/Stu_data Poster.pptx
+++ b/Poster/Stu_data Poster.pptx
@@ -5770,6 +5770,169 @@
               <a:buChar char="•"/>
             </a:pPr>
             <a:endParaRPr lang="en-US" sz="3200" dirty="0" smtClean="0"/>
+          </a:p>
+          <a:p>
+            <a:pPr marL="1143000" indent="-1143000">
+              <a:buFont typeface="Arial" panose="020B0604020202020204" pitchFamily="34" charset="0"/>
+              <a:buChar char="•"/>
+            </a:pPr>
+            <a:endParaRPr lang="en-US" sz="3200" dirty="0"/>
+          </a:p>
+        </p:txBody>
+      </p:sp>
+      <p:sp>
+        <p:nvSpPr>
+          <p:cNvPr id="42" name="TextBox 41">
+            <a:extLst>
+              <a:ext uri="{FF2B5EF4-FFF2-40B4-BE49-F238E27FC236}">
+                <a16:creationId xmlns="" xmlns:a16="http://schemas.microsoft.com/office/drawing/2014/main" id="{D335579D-9BA7-4FF2-BA55-7C6390B98CEF}"/>
+              </a:ext>
+            </a:extLst>
+          </p:cNvPr>
+          <p:cNvSpPr txBox="1"/>
+          <p:nvPr/>
+        </p:nvSpPr>
+        <p:spPr>
+          <a:xfrm>
+            <a:off x="684861" y="22638596"/>
+            <a:ext cx="10106994" cy="7478970"/>
+          </a:xfrm>
+          <a:prstGeom prst="rect">
+            <a:avLst/>
+          </a:prstGeom>
+          <a:noFill/>
+        </p:spPr>
+        <p:txBody>
+          <a:bodyPr wrap="square" rtlCol="0">
+            <a:spAutoFit/>
+          </a:bodyPr>
+          <a:lstStyle/>
+          <a:p>
+            <a:pPr marL="1143000" indent="-1143000">
+              <a:buFont typeface="Arial" panose="020B0604020202020204" pitchFamily="34" charset="0"/>
+              <a:buChar char="•"/>
+            </a:pPr>
+            <a:r>
+              <a:rPr lang="en-US" sz="3200" dirty="0" smtClean="0"/>
+              <a:t>Design </a:t>
+            </a:r>
+            <a:r>
+              <a:rPr lang="en-US" sz="3200" dirty="0" smtClean="0"/>
+              <a:t>a database schema that incorporate the two separate systems (</a:t>
+            </a:r>
+            <a:r>
+              <a:rPr lang="en-US" sz="3200" dirty="0" err="1" smtClean="0"/>
+              <a:t>Moodle</a:t>
+            </a:r>
+            <a:r>
+              <a:rPr lang="en-US" sz="3200" dirty="0" smtClean="0"/>
+              <a:t> and </a:t>
+            </a:r>
+            <a:r>
+              <a:rPr lang="en-US" sz="3200" dirty="0" err="1" smtClean="0"/>
+              <a:t>WebSubmission</a:t>
+            </a:r>
+            <a:r>
+              <a:rPr lang="en-US" sz="3200" dirty="0" smtClean="0"/>
+              <a:t>).</a:t>
+            </a:r>
+          </a:p>
+          <a:p>
+            <a:pPr marL="1143000" indent="-1143000">
+              <a:buFont typeface="Arial" panose="020B0604020202020204" pitchFamily="34" charset="0"/>
+              <a:buChar char="•"/>
+            </a:pPr>
+            <a:r>
+              <a:rPr lang="en-US" sz="3200" dirty="0" smtClean="0"/>
+              <a:t>Link two data sources and link the users (which are </a:t>
+            </a:r>
+            <a:r>
+              <a:rPr lang="en-US" sz="3200" dirty="0" err="1" smtClean="0"/>
+              <a:t>anonymized</a:t>
+            </a:r>
+            <a:r>
+              <a:rPr lang="en-US" sz="3200" dirty="0" smtClean="0"/>
+              <a:t>) of two data sources.</a:t>
+            </a:r>
+            <a:endParaRPr lang="zh-CN" altLang="en-US" sz="3200" dirty="0" smtClean="0"/>
+          </a:p>
+          <a:p>
+            <a:pPr marL="1143000" indent="-1143000">
+              <a:buFont typeface="Arial" panose="020B0604020202020204" pitchFamily="34" charset="0"/>
+              <a:buChar char="•"/>
+            </a:pPr>
+            <a:r>
+              <a:rPr lang="en-US" sz="3200" dirty="0" smtClean="0"/>
+              <a:t>Write extraction and insertion scripts to import current file-based data</a:t>
+            </a:r>
+            <a:r>
+              <a:rPr lang="en-US" sz="3200" dirty="0" smtClean="0"/>
+              <a:t>.</a:t>
+            </a:r>
+          </a:p>
+          <a:p>
+            <a:pPr marL="1143000" indent="-1143000">
+              <a:buFont typeface="Arial" panose="020B0604020202020204" pitchFamily="34" charset="0"/>
+              <a:buChar char="•"/>
+            </a:pPr>
+            <a:r>
+              <a:rPr lang="en-US" sz="3200" dirty="0" smtClean="0"/>
+              <a:t>Provide visualization of data by using charts and make them configurable.</a:t>
+            </a:r>
+            <a:endParaRPr lang="zh-CN" altLang="en-US" sz="3200" dirty="0" smtClean="0"/>
+          </a:p>
+          <a:p>
+            <a:pPr marL="1143000" indent="-1143000">
+              <a:buFont typeface="Arial" panose="020B0604020202020204" pitchFamily="34" charset="0"/>
+              <a:buChar char="•"/>
+            </a:pPr>
+            <a:r>
+              <a:rPr lang="en-US" sz="3200" dirty="0" smtClean="0"/>
+              <a:t>Analyze </a:t>
+            </a:r>
+            <a:r>
+              <a:rPr lang="en-US" sz="3200" dirty="0" smtClean="0"/>
+              <a:t>the </a:t>
+            </a:r>
+            <a:r>
+              <a:rPr lang="en-US" sz="3200" dirty="0" smtClean="0"/>
+              <a:t>relationship between </a:t>
+            </a:r>
+            <a:r>
+              <a:rPr lang="en-US" sz="3200" dirty="0" smtClean="0"/>
+              <a:t>students‘ </a:t>
+            </a:r>
+            <a:r>
+              <a:rPr lang="en-US" sz="3200" dirty="0" smtClean="0"/>
+              <a:t>activities and academic performances.</a:t>
+            </a:r>
+            <a:endParaRPr lang="zh-CN" altLang="en-US" sz="3200" dirty="0" smtClean="0"/>
+          </a:p>
+          <a:p>
+            <a:pPr marL="1143000" indent="-1143000">
+              <a:buFont typeface="Arial" panose="020B0604020202020204" pitchFamily="34" charset="0"/>
+              <a:buChar char="•"/>
+            </a:pPr>
+            <a:r>
+              <a:rPr lang="en-US" sz="3200" dirty="0" smtClean="0"/>
+              <a:t>Allow </a:t>
+            </a:r>
+            <a:r>
+              <a:rPr lang="en-US" sz="3200" dirty="0" smtClean="0"/>
+              <a:t>staffs to query the database, extract data, aggregate it, and export it.</a:t>
+            </a:r>
+            <a:endParaRPr lang="zh-CN" altLang="en-US" sz="3200" dirty="0" smtClean="0"/>
+          </a:p>
+          <a:p>
+            <a:pPr marL="1143000" indent="-1143000">
+              <a:buFont typeface="Arial" panose="020B0604020202020204" pitchFamily="34" charset="0"/>
+              <a:buChar char="•"/>
+            </a:pPr>
+            <a:endParaRPr lang="zh-CN" altLang="en-US" sz="3200" dirty="0" smtClean="0"/>
+          </a:p>
+          <a:p>
+            <a:pPr marL="1143000" indent="-1143000"/>
+            <a:endParaRPr lang="zh-CN" altLang="en-US" sz="3200" dirty="0" smtClean="0"/>
           </a:p>
           <a:p>
             <a:pPr marL="1143000" indent="-1143000">

</xml_diff>

<commit_message>
Provide the rest of text and images #170
Provide the rest of the text, Website architecture diagram, screenshots
and add them to the ppt.
</commit_message>
<xml_diff>
--- a/Poster/Stu_data Poster.pptx
+++ b/Poster/Stu_data Poster.pptx
@@ -4978,7 +4978,7 @@
         <p:spPr>
           <a:xfrm>
             <a:off x="12184858" y="5893992"/>
-            <a:ext cx="10106994" cy="3046988"/>
+            <a:ext cx="8216891" cy="5509200"/>
           </a:xfrm>
           <a:prstGeom prst="rect">
             <a:avLst/>
@@ -5038,8 +5038,23 @@
             </a:pPr>
             <a:r>
               <a:rPr lang="en-US" sz="3200" dirty="0"/>
-              <a:t>The website displays and analyzes data by charts and tables.</a:t>
-            </a:r>
+              <a:t>The website displays and analyzes data by charts and tables</a:t>
+            </a:r>
+            <a:r>
+              <a:rPr lang="en-US" sz="3200" dirty="0" smtClean="0"/>
+              <a:t>.</a:t>
+            </a:r>
+          </a:p>
+          <a:p>
+            <a:pPr marL="1143000" indent="-1143000">
+              <a:buFont typeface="Arial" panose="020B0604020202020204" pitchFamily="34" charset="0"/>
+              <a:buChar char="•"/>
+            </a:pPr>
+            <a:r>
+              <a:rPr lang="en-US" sz="3200" dirty="0" smtClean="0"/>
+              <a:t>The website is designed in a decoupled way. It adopts two-tier model, which separates the front-end and the back-end.</a:t>
+            </a:r>
+            <a:endParaRPr lang="en-US" sz="3200" dirty="0"/>
           </a:p>
         </p:txBody>
       </p:sp>
@@ -5339,8 +5354,8 @@
         </p:blipFill>
         <p:spPr>
           <a:xfrm>
-            <a:off x="22770033" y="5690662"/>
-            <a:ext cx="6632693" cy="6394468"/>
+            <a:off x="20473187" y="5707790"/>
+            <a:ext cx="4357718" cy="6188054"/>
           </a:xfrm>
           <a:prstGeom prst="rect">
             <a:avLst/>
@@ -5362,7 +5377,7 @@
         <p:spPr>
           <a:xfrm>
             <a:off x="30470914" y="15197537"/>
-            <a:ext cx="7060759" cy="3539430"/>
+            <a:ext cx="11719425" cy="5509200"/>
           </a:xfrm>
           <a:prstGeom prst="rect">
             <a:avLst/>
@@ -5391,8 +5406,43 @@
             </a:pPr>
             <a:r>
               <a:rPr lang="en-US" sz="3200" dirty="0"/>
-              <a:t>Having tools to import data from external files.</a:t>
-            </a:r>
+              <a:t>Having tools to import data from external files</a:t>
+            </a:r>
+            <a:r>
+              <a:rPr lang="en-US" sz="3200" dirty="0" smtClean="0"/>
+              <a:t>.</a:t>
+            </a:r>
+          </a:p>
+          <a:p>
+            <a:pPr marL="1143000" indent="-1143000">
+              <a:buFont typeface="Arial" panose="020B0604020202020204" pitchFamily="34" charset="0"/>
+              <a:buChar char="•"/>
+            </a:pPr>
+            <a:r>
+              <a:rPr lang="en-US" sz="3200" dirty="0" smtClean="0"/>
+              <a:t>Visualization makes the data intuitive.</a:t>
+            </a:r>
+          </a:p>
+          <a:p>
+            <a:pPr marL="1143000" indent="-1143000">
+              <a:buFont typeface="Arial" panose="020B0604020202020204" pitchFamily="34" charset="0"/>
+              <a:buChar char="•"/>
+            </a:pPr>
+            <a:r>
+              <a:rPr lang="en-US" sz="3200" dirty="0" smtClean="0"/>
+              <a:t>Charts are configurable, which allows user to manipulate and further explore data.</a:t>
+            </a:r>
+          </a:p>
+          <a:p>
+            <a:pPr marL="1143000" indent="-1143000">
+              <a:buFont typeface="Arial" panose="020B0604020202020204" pitchFamily="34" charset="0"/>
+              <a:buChar char="•"/>
+            </a:pPr>
+            <a:r>
+              <a:rPr lang="en-US" sz="3200" dirty="0" smtClean="0"/>
+              <a:t>Provide analysis across two data sources. Link two data sources and link the users of two data sources without identifying their names.</a:t>
+            </a:r>
+            <a:endParaRPr lang="en-US" sz="3200" dirty="0"/>
           </a:p>
           <a:p>
             <a:pPr marL="1143000" indent="-1143000">
@@ -5420,8 +5470,8 @@
         </p:nvSpPr>
         <p:spPr>
           <a:xfrm>
-            <a:off x="30521023" y="22189216"/>
-            <a:ext cx="8041930" cy="1077218"/>
+            <a:off x="30521023" y="22189217"/>
+            <a:ext cx="7525912" cy="4031873"/>
           </a:xfrm>
           <a:prstGeom prst="rect">
             <a:avLst/>
@@ -5440,8 +5490,43 @@
             </a:pPr>
             <a:r>
               <a:rPr lang="en-US" sz="3200" dirty="0"/>
-              <a:t>Modify the schema to work with new Canvas data source.</a:t>
-            </a:r>
+              <a:t>Modify the schema to work with new </a:t>
+            </a:r>
+            <a:r>
+              <a:rPr lang="en-US" sz="3200" dirty="0" smtClean="0"/>
+              <a:t>data source (</a:t>
+            </a:r>
+            <a:r>
+              <a:rPr lang="en-US" sz="3200" dirty="0" smtClean="0"/>
+              <a:t>Canvas).</a:t>
+            </a:r>
+          </a:p>
+          <a:p>
+            <a:pPr marL="1143000" indent="-1143000">
+              <a:buFont typeface="Arial" panose="020B0604020202020204" pitchFamily="34" charset="0"/>
+              <a:buChar char="•"/>
+            </a:pPr>
+            <a:r>
+              <a:rPr lang="en-US" sz="3200" dirty="0" smtClean="0"/>
+              <a:t>Add new data sources (e.g. student GPA) for further cross data analysis.</a:t>
+            </a:r>
+          </a:p>
+          <a:p>
+            <a:pPr marL="1143000" indent="-1143000">
+              <a:buFont typeface="Arial" panose="020B0604020202020204" pitchFamily="34" charset="0"/>
+              <a:buChar char="•"/>
+            </a:pPr>
+            <a:r>
+              <a:rPr lang="en-US" sz="3200" dirty="0" smtClean="0"/>
+              <a:t>Provide charts (across semesters) of the same course for trend analysis and comparison.</a:t>
+            </a:r>
+          </a:p>
+          <a:p>
+            <a:pPr marL="1143000" indent="-1143000">
+              <a:buFont typeface="Arial" panose="020B0604020202020204" pitchFamily="34" charset="0"/>
+              <a:buChar char="•"/>
+            </a:pPr>
+            <a:endParaRPr lang="en-US" sz="3200" dirty="0"/>
           </a:p>
         </p:txBody>
       </p:sp>
@@ -5541,7 +5626,7 @@
         <p:spPr>
           <a:xfrm>
             <a:off x="807593" y="6046392"/>
-            <a:ext cx="10106994" cy="15358050"/>
+            <a:ext cx="10106994" cy="15850493"/>
           </a:xfrm>
           <a:prstGeom prst="rect">
             <a:avLst/>
@@ -5695,11 +5780,19 @@
             </a:pPr>
             <a:r>
               <a:rPr lang="en-US" sz="3200" dirty="0" smtClean="0"/>
-              <a:t>Analysis module is provided to allow users to explore the relationship between </a:t>
+              <a:t>Analysis module is provided to allow users to explore the relationship </a:t>
             </a:r>
             <a:r>
               <a:rPr lang="en-US" sz="3200" dirty="0" smtClean="0"/>
-              <a:t>students‘ </a:t>
+              <a:t>between</a:t>
+            </a:r>
+            <a:r>
+              <a:rPr lang="en-US" sz="3200" dirty="0" smtClean="0"/>
+              <a:t> the amount of</a:t>
+            </a:r>
+            <a:r>
+              <a:rPr lang="en-US" sz="3200" dirty="0" smtClean="0"/>
+              <a:t> students‘ </a:t>
             </a:r>
             <a:r>
               <a:rPr lang="en-US" sz="3200" dirty="0" smtClean="0"/>
@@ -5732,8 +5825,19 @@
             </a:pPr>
             <a:r>
               <a:rPr lang="en-US" sz="3200" dirty="0" smtClean="0"/>
-              <a:t>Extraction and insertion scripts that work with the file-based storage for the current data are provided.</a:t>
-            </a:r>
+              <a:t>Extraction </a:t>
+            </a:r>
+            <a:r>
+              <a:rPr lang="en-US" sz="3200" dirty="0" smtClean="0"/>
+              <a:t>and insertion scripts (data importer) that work with the file-based storage for the current data are provided.</a:t>
+            </a:r>
+            <a:endParaRPr lang="zh-CN" altLang="en-US" sz="3200" dirty="0" smtClean="0"/>
+          </a:p>
+          <a:p>
+            <a:pPr marL="1143000" indent="-1143000">
+              <a:buFont typeface="Arial" panose="020B0604020202020204" pitchFamily="34" charset="0"/>
+              <a:buChar char="•"/>
+            </a:pPr>
             <a:endParaRPr lang="zh-CN" altLang="en-US" sz="3200" dirty="0" smtClean="0"/>
           </a:p>
           <a:p>
@@ -5794,8 +5898,8 @@
         </p:nvSpPr>
         <p:spPr>
           <a:xfrm>
-            <a:off x="684861" y="22638596"/>
-            <a:ext cx="10106994" cy="7478970"/>
+            <a:off x="684861" y="22567158"/>
+            <a:ext cx="10106994" cy="7971413"/>
           </a:xfrm>
           <a:prstGeom prst="rect">
             <a:avLst/>
@@ -5863,7 +5967,23 @@
             </a:pPr>
             <a:r>
               <a:rPr lang="en-US" sz="3200" dirty="0" smtClean="0"/>
-              <a:t>Write extraction and insertion scripts to import current file-based data</a:t>
+              <a:t>Write extraction and insertion </a:t>
+            </a:r>
+            <a:r>
+              <a:rPr lang="en-US" sz="3200" dirty="0" smtClean="0"/>
+              <a:t>scripts</a:t>
+            </a:r>
+            <a:r>
+              <a:rPr lang="en-US" sz="3200" dirty="0" smtClean="0"/>
+              <a:t> (data importer)</a:t>
+            </a:r>
+            <a:r>
+              <a:rPr lang="en-US" sz="3200" dirty="0" smtClean="0"/>
+              <a:t> </a:t>
+            </a:r>
+            <a:r>
+              <a:rPr lang="en-US" sz="3200" dirty="0" smtClean="0"/>
+              <a:t>to import current file-based data</a:t>
             </a:r>
             <a:r>
               <a:rPr lang="en-US" sz="3200" dirty="0" smtClean="0"/>
@@ -5877,7 +5997,15 @@
             </a:pPr>
             <a:r>
               <a:rPr lang="en-US" sz="3200" dirty="0" smtClean="0"/>
-              <a:t>Provide visualization of data by using charts and make them configurable.</a:t>
+              <a:t>Provide </a:t>
+            </a:r>
+            <a:r>
+              <a:rPr lang="en-US" sz="3200" dirty="0" smtClean="0"/>
+              <a:t>visualization of data by using charts and make them configurable to allow users to manipulate and interact with data</a:t>
+            </a:r>
+            <a:r>
+              <a:rPr lang="en-US" sz="3200" dirty="0" smtClean="0"/>
+              <a:t>.</a:t>
             </a:r>
             <a:endParaRPr lang="zh-CN" altLang="en-US" sz="3200" dirty="0" smtClean="0"/>
           </a:p>
@@ -5888,19 +6016,23 @@
             </a:pPr>
             <a:r>
               <a:rPr lang="en-US" sz="3200" dirty="0" smtClean="0"/>
-              <a:t>Analyze </a:t>
+              <a:t>Analyze the </a:t>
             </a:r>
             <a:r>
               <a:rPr lang="en-US" sz="3200" dirty="0" smtClean="0"/>
-              <a:t>the </a:t>
+              <a:t>relationship </a:t>
             </a:r>
             <a:r>
               <a:rPr lang="en-US" sz="3200" dirty="0" smtClean="0"/>
-              <a:t>relationship between </a:t>
+              <a:t>between</a:t>
             </a:r>
             <a:r>
               <a:rPr lang="en-US" sz="3200" dirty="0" smtClean="0"/>
-              <a:t>students‘ </a:t>
+              <a:t> the amount of</a:t>
+            </a:r>
+            <a:r>
+              <a:rPr lang="en-US" sz="3200" dirty="0" smtClean="0"/>
+              <a:t> students‘ </a:t>
             </a:r>
             <a:r>
               <a:rPr lang="en-US" sz="3200" dirty="0" smtClean="0"/>
@@ -5943,6 +6075,263 @@
           </a:p>
         </p:txBody>
       </p:sp>
+      <p:pic>
+        <p:nvPicPr>
+          <p:cNvPr id="1027" name="Picture 3" descr="D:\阿大课程\projA\Ingenuity\1.jpg"/>
+          <p:cNvPicPr>
+            <a:picLocks noChangeAspect="1" noChangeArrowheads="1"/>
+          </p:cNvPicPr>
+          <p:nvPr/>
+        </p:nvPicPr>
+        <p:blipFill>
+          <a:blip r:embed="rId7"/>
+          <a:srcRect/>
+          <a:stretch>
+            <a:fillRect/>
+          </a:stretch>
+        </p:blipFill>
+        <p:spPr bwMode="auto">
+          <a:xfrm>
+            <a:off x="21259005" y="14280350"/>
+            <a:ext cx="8065140" cy="4357717"/>
+          </a:xfrm>
+          <a:prstGeom prst="rect">
+            <a:avLst/>
+          </a:prstGeom>
+          <a:noFill/>
+        </p:spPr>
+      </p:pic>
+      <p:pic>
+        <p:nvPicPr>
+          <p:cNvPr id="1029" name="Picture 5" descr="D:\阿大课程\projA\Ingenuity\3.jpg"/>
+          <p:cNvPicPr>
+            <a:picLocks noChangeAspect="1" noChangeArrowheads="1"/>
+          </p:cNvPicPr>
+          <p:nvPr/>
+        </p:nvPicPr>
+        <p:blipFill>
+          <a:blip r:embed="rId8"/>
+          <a:srcRect/>
+          <a:stretch>
+            <a:fillRect/>
+          </a:stretch>
+        </p:blipFill>
+        <p:spPr bwMode="auto">
+          <a:xfrm>
+            <a:off x="21187567" y="19209572"/>
+            <a:ext cx="8239126" cy="4357718"/>
+          </a:xfrm>
+          <a:prstGeom prst="rect">
+            <a:avLst/>
+          </a:prstGeom>
+          <a:noFill/>
+        </p:spPr>
+      </p:pic>
+      <p:pic>
+        <p:nvPicPr>
+          <p:cNvPr id="1030" name="Picture 6" descr="D:\阿大课程\projA\Ingenuity\4.jpg"/>
+          <p:cNvPicPr>
+            <a:picLocks noChangeAspect="1" noChangeArrowheads="1"/>
+          </p:cNvPicPr>
+          <p:nvPr/>
+        </p:nvPicPr>
+        <p:blipFill>
+          <a:blip r:embed="rId9"/>
+          <a:srcRect/>
+          <a:stretch>
+            <a:fillRect/>
+          </a:stretch>
+        </p:blipFill>
+        <p:spPr bwMode="auto">
+          <a:xfrm>
+            <a:off x="12972197" y="25000587"/>
+            <a:ext cx="6786610" cy="3710239"/>
+          </a:xfrm>
+          <a:prstGeom prst="rect">
+            <a:avLst/>
+          </a:prstGeom>
+          <a:noFill/>
+        </p:spPr>
+      </p:pic>
+      <p:pic>
+        <p:nvPicPr>
+          <p:cNvPr id="1033" name="Picture 9" descr="D:\阿大课程\projA\Ingenuity\7.jpg"/>
+          <p:cNvPicPr>
+            <a:picLocks noChangeAspect="1" noChangeArrowheads="1"/>
+          </p:cNvPicPr>
+          <p:nvPr/>
+        </p:nvPicPr>
+        <p:blipFill>
+          <a:blip r:embed="rId10"/>
+          <a:srcRect/>
+          <a:stretch>
+            <a:fillRect/>
+          </a:stretch>
+        </p:blipFill>
+        <p:spPr bwMode="auto">
+          <a:xfrm>
+            <a:off x="21313924" y="24210232"/>
+            <a:ext cx="7588947" cy="4509306"/>
+          </a:xfrm>
+          <a:prstGeom prst="rect">
+            <a:avLst/>
+          </a:prstGeom>
+          <a:noFill/>
+        </p:spPr>
+      </p:pic>
+      <p:sp>
+        <p:nvSpPr>
+          <p:cNvPr id="55" name="TextBox 54">
+            <a:extLst>
+              <a:ext uri="{FF2B5EF4-FFF2-40B4-BE49-F238E27FC236}">
+                <a16:creationId xmlns="" xmlns:a16="http://schemas.microsoft.com/office/drawing/2014/main" id="{D335579D-9BA7-4FF2-BA55-7C6390B98CEF}"/>
+              </a:ext>
+            </a:extLst>
+          </p:cNvPr>
+          <p:cNvSpPr txBox="1"/>
+          <p:nvPr/>
+        </p:nvSpPr>
+        <p:spPr>
+          <a:xfrm>
+            <a:off x="11900627" y="14066036"/>
+            <a:ext cx="8572560" cy="11910953"/>
+          </a:xfrm>
+          <a:prstGeom prst="rect">
+            <a:avLst/>
+          </a:prstGeom>
+          <a:noFill/>
+        </p:spPr>
+        <p:txBody>
+          <a:bodyPr wrap="square" rtlCol="0">
+            <a:spAutoFit/>
+          </a:bodyPr>
+          <a:lstStyle/>
+          <a:p>
+            <a:pPr marL="1143000" indent="-1143000">
+              <a:buFont typeface="Arial" panose="020B0604020202020204" pitchFamily="34" charset="0"/>
+              <a:buChar char="•"/>
+            </a:pPr>
+            <a:r>
+              <a:rPr lang="en-US" sz="3200" dirty="0" smtClean="0"/>
+              <a:t>Provide </a:t>
+            </a:r>
+            <a:r>
+              <a:rPr lang="en-US" sz="3200" dirty="0" smtClean="0"/>
+              <a:t>visualization by using charts, which make the data intuitive and easy to read</a:t>
+            </a:r>
+            <a:r>
+              <a:rPr lang="en-US" sz="3200" dirty="0" smtClean="0"/>
+              <a:t>.</a:t>
+            </a:r>
+          </a:p>
+          <a:p>
+            <a:pPr marL="1143000" indent="-1143000">
+              <a:buFont typeface="Arial" panose="020B0604020202020204" pitchFamily="34" charset="0"/>
+              <a:buChar char="•"/>
+            </a:pPr>
+            <a:r>
+              <a:rPr lang="en-US" sz="3200" dirty="0" smtClean="0"/>
+              <a:t>Provide lots of configuration options and related functions (set period, change presentation order, threshold function, export data in CSV format, event name/ event context auto-complete), which allow user to further explore and manipulate data.</a:t>
+            </a:r>
+            <a:endParaRPr lang="zh-CN" altLang="en-US" sz="3200" dirty="0" smtClean="0"/>
+          </a:p>
+          <a:p>
+            <a:pPr marL="1143000" indent="-1143000">
+              <a:buFont typeface="Arial" panose="020B0604020202020204" pitchFamily="34" charset="0"/>
+              <a:buChar char="•"/>
+            </a:pPr>
+            <a:r>
+              <a:rPr lang="en-US" sz="3200" dirty="0" smtClean="0"/>
+              <a:t>Allow user to choose course, year, semester, assignment.</a:t>
+            </a:r>
+            <a:endParaRPr lang="zh-CN" altLang="en-US" sz="3200" dirty="0" smtClean="0"/>
+          </a:p>
+          <a:p>
+            <a:pPr marL="1143000" indent="-1143000">
+              <a:buFont typeface="Arial" panose="020B0604020202020204" pitchFamily="34" charset="0"/>
+              <a:buChar char="•"/>
+            </a:pPr>
+            <a:r>
+              <a:rPr lang="en-US" sz="3200" dirty="0" smtClean="0"/>
+              <a:t>Provide data of individual student as well as the whole class.</a:t>
+            </a:r>
+            <a:endParaRPr lang="zh-CN" altLang="en-US" sz="3200" dirty="0" smtClean="0"/>
+          </a:p>
+          <a:p>
+            <a:pPr marL="1143000" indent="-1143000">
+              <a:buFont typeface="Arial" panose="020B0604020202020204" pitchFamily="34" charset="0"/>
+              <a:buChar char="•"/>
+            </a:pPr>
+            <a:r>
+              <a:rPr lang="en-US" sz="3200" dirty="0" smtClean="0"/>
+              <a:t>Provide the amount of different events in a given period as well as the amount of specific event of each day.</a:t>
+            </a:r>
+            <a:endParaRPr lang="zh-CN" altLang="en-US" sz="3200" dirty="0" smtClean="0"/>
+          </a:p>
+          <a:p>
+            <a:pPr marL="1143000" indent="-1143000">
+              <a:buFont typeface="Arial" panose="020B0604020202020204" pitchFamily="34" charset="0"/>
+              <a:buChar char="•"/>
+            </a:pPr>
+            <a:r>
+              <a:rPr lang="en-US" sz="3200" dirty="0" smtClean="0"/>
+              <a:t>Link two data sources and link the users of two data sources.</a:t>
+            </a:r>
+            <a:endParaRPr lang="zh-CN" altLang="en-US" sz="3200" dirty="0" smtClean="0"/>
+          </a:p>
+          <a:p>
+            <a:pPr marL="1143000" indent="-1143000">
+              <a:buFont typeface="Arial" panose="020B0604020202020204" pitchFamily="34" charset="0"/>
+              <a:buChar char="•"/>
+            </a:pPr>
+            <a:r>
+              <a:rPr lang="en-US" sz="3200" dirty="0" smtClean="0"/>
+              <a:t>Provide cross data analysis: allow user to explore the relationship between the amount of students' activities and academic performances.</a:t>
+            </a:r>
+            <a:endParaRPr lang="zh-CN" altLang="en-US" sz="3200" dirty="0" smtClean="0"/>
+          </a:p>
+          <a:p>
+            <a:pPr marL="1143000" indent="-1143000">
+              <a:buFont typeface="Arial" panose="020B0604020202020204" pitchFamily="34" charset="0"/>
+              <a:buChar char="•"/>
+            </a:pPr>
+            <a:endParaRPr lang="zh-CN" altLang="en-US" sz="3200" dirty="0" smtClean="0"/>
+          </a:p>
+          <a:p>
+            <a:pPr marL="1143000" indent="-1143000">
+              <a:buFont typeface="Arial" panose="020B0604020202020204" pitchFamily="34" charset="0"/>
+              <a:buChar char="•"/>
+            </a:pPr>
+            <a:endParaRPr lang="en-US" sz="3200" dirty="0"/>
+          </a:p>
+        </p:txBody>
+      </p:sp>
+      <p:pic>
+        <p:nvPicPr>
+          <p:cNvPr id="1034" name="Picture 10" descr="D:\阿大课程\projA\Ingenuity\Architecture.jpg"/>
+          <p:cNvPicPr>
+            <a:picLocks noChangeAspect="1" noChangeArrowheads="1"/>
+          </p:cNvPicPr>
+          <p:nvPr/>
+        </p:nvPicPr>
+        <p:blipFill>
+          <a:blip r:embed="rId11"/>
+          <a:srcRect/>
+          <a:stretch>
+            <a:fillRect/>
+          </a:stretch>
+        </p:blipFill>
+        <p:spPr bwMode="auto">
+          <a:xfrm>
+            <a:off x="25902475" y="5493476"/>
+            <a:ext cx="2896688" cy="6867507"/>
+          </a:xfrm>
+          <a:prstGeom prst="rect">
+            <a:avLst/>
+          </a:prstGeom>
+          <a:noFill/>
+        </p:spPr>
+      </p:pic>
     </p:spTree>
     <p:extLst>
       <p:ext uri="{BB962C8B-B14F-4D97-AF65-F5344CB8AC3E}">
@@ -5953,6 +6342,13 @@
   <p:clrMapOvr>
     <a:masterClrMapping/>
   </p:clrMapOvr>
+  <p:timing>
+    <p:tnLst>
+      <p:par>
+        <p:cTn id="1" dur="indefinite" restart="never" nodeType="tmRoot"/>
+      </p:par>
+    </p:tnLst>
+  </p:timing>
 </p:sld>
 </file>
 

</xml_diff>

<commit_message>
Generate PPT into PDF to submit poster close #157
Update the format of PPT and generate PPT into PDF to submit poster
</commit_message>
<xml_diff>
--- a/Poster/Stu_data Poster.pptx
+++ b/Poster/Stu_data Poster.pptx
@@ -143,6 +143,10 @@
 </p:presentation>
 </file>
 
+<file path=ppt/revisionInfo.xml><?xml version="1.0" encoding="utf-8"?>
+<p1510:revInfo xmlns:a="http://schemas.openxmlformats.org/drawingml/2006/main" xmlns:r="http://schemas.openxmlformats.org/officeDocument/2006/relationships" xmlns:p1510="http://schemas.microsoft.com/office/powerpoint/2015/10/main"/>
+</file>
+
 <file path=ppt/handoutMasters/handoutMaster1.xml><?xml version="1.0" encoding="utf-8"?>
 <p:handoutMaster xmlns:a="http://schemas.openxmlformats.org/drawingml/2006/main" xmlns:r="http://schemas.openxmlformats.org/officeDocument/2006/relationships" xmlns:p="http://schemas.openxmlformats.org/presentationml/2006/main">
   <p:cSld>
@@ -226,7 +230,7 @@
             <a:fld id="{59D7332B-1442-4F8C-A160-0D5EB57A24C0}" type="datetimeFigureOut">
               <a:rPr lang="en-AU" smtClean="0"/>
               <a:pPr/>
-              <a:t>9/10/17</a:t>
+              <a:t>10/10/17</a:t>
             </a:fld>
             <a:endParaRPr lang="en-AU"/>
           </a:p>
@@ -393,7 +397,7 @@
             <a:fld id="{33744820-F59C-490B-A624-3CEFDFE2581B}" type="datetimeFigureOut">
               <a:rPr lang="en-AU" smtClean="0"/>
               <a:pPr/>
-              <a:t>9/10/17</a:t>
+              <a:t>10/10/17</a:t>
             </a:fld>
             <a:endParaRPr lang="en-AU"/>
           </a:p>
@@ -459,35 +463,35 @@
           <a:p>
             <a:pPr lvl="0"/>
             <a:r>
-              <a:rPr lang="en-US" smtClean="0"/>
+              <a:rPr lang="en-US"/>
               <a:t>Click to edit Master text styles</a:t>
             </a:r>
           </a:p>
           <a:p>
             <a:pPr lvl="1"/>
             <a:r>
-              <a:rPr lang="en-US" smtClean="0"/>
+              <a:rPr lang="en-US"/>
               <a:t>Second level</a:t>
             </a:r>
           </a:p>
           <a:p>
             <a:pPr lvl="2"/>
             <a:r>
-              <a:rPr lang="en-US" smtClean="0"/>
+              <a:rPr lang="en-US"/>
               <a:t>Third level</a:t>
             </a:r>
           </a:p>
           <a:p>
             <a:pPr lvl="3"/>
             <a:r>
-              <a:rPr lang="en-US" smtClean="0"/>
+              <a:rPr lang="en-US"/>
               <a:t>Fourth level</a:t>
             </a:r>
           </a:p>
           <a:p>
             <a:pPr lvl="4"/>
             <a:r>
-              <a:rPr lang="en-US" smtClean="0"/>
+              <a:rPr lang="en-US"/>
               <a:t>Fifth level</a:t>
             </a:r>
             <a:endParaRPr lang="en-AU"/>
@@ -746,10 +750,9 @@
           </a:lstStyle>
           <a:p>
             <a:r>
-              <a:rPr lang="en-AU" dirty="0" smtClean="0"/>
+              <a:rPr lang="en-AU" dirty="0"/>
               <a:t>University of Adelaide</a:t>
             </a:r>
-            <a:endParaRPr lang="en-AU" dirty="0"/>
           </a:p>
         </p:txBody>
       </p:sp>
@@ -1497,7 +1500,7 @@
         </p:nvSpPr>
         <p:spPr>
           <a:xfrm>
-            <a:off x="31974248" y="20993545"/>
+            <a:off x="32012146" y="20938317"/>
             <a:ext cx="8787321" cy="1195671"/>
           </a:xfrm>
           <a:prstGeom prst="roundRect">
@@ -1648,7 +1651,7 @@
         <p:spPr>
           <a:xfrm>
             <a:off x="263216" y="4637023"/>
-            <a:ext cx="11273568" cy="16603272"/>
+            <a:ext cx="11273568" cy="14994981"/>
           </a:xfrm>
           <a:custGeom>
             <a:avLst/>
@@ -2225,7 +2228,7 @@
           <a:lstStyle/>
           <a:p>
             <a:pPr algn="ctr"/>
-            <a:endParaRPr lang="en-US"/>
+            <a:endParaRPr lang="en-US" dirty="0"/>
           </a:p>
         </p:txBody>
       </p:sp>
@@ -2541,8 +2544,8 @@
         </p:nvSpPr>
         <p:spPr>
           <a:xfrm>
-            <a:off x="303537" y="21402303"/>
-            <a:ext cx="11233247" cy="7619460"/>
+            <a:off x="303537" y="20234183"/>
+            <a:ext cx="11233247" cy="8787580"/>
           </a:xfrm>
           <a:custGeom>
             <a:avLst/>
@@ -3677,8 +3680,8 @@
         </p:nvSpPr>
         <p:spPr>
           <a:xfrm>
-            <a:off x="14957165" y="12624483"/>
-            <a:ext cx="12756048" cy="1478117"/>
+            <a:off x="14850843" y="12712912"/>
+            <a:ext cx="12349372" cy="1170112"/>
           </a:xfrm>
           <a:prstGeom prst="roundRect">
             <a:avLst/>
@@ -3725,7 +3728,7 @@
         </p:nvSpPr>
         <p:spPr>
           <a:xfrm>
-            <a:off x="1071978" y="21148812"/>
+            <a:off x="1109286" y="19784944"/>
             <a:ext cx="9227375" cy="1313189"/>
           </a:xfrm>
           <a:prstGeom prst="roundRect">
@@ -3821,7 +3824,7 @@
         </p:nvSpPr>
         <p:spPr>
           <a:xfrm>
-            <a:off x="31890058" y="26082256"/>
+            <a:off x="31936965" y="26009011"/>
             <a:ext cx="8787321" cy="1195671"/>
           </a:xfrm>
           <a:prstGeom prst="roundRect">
@@ -3884,7 +3887,7 @@
           <a:lstStyle/>
           <a:p>
             <a:r>
-              <a:rPr lang="en-US" altLang="zh-CN" sz="7200" dirty="0" smtClean="0">
+              <a:rPr lang="en-US" altLang="zh-CN" sz="7200" dirty="0">
                 <a:solidFill>
                   <a:schemeClr val="bg1"/>
                 </a:solidFill>
@@ -3895,7 +3898,7 @@
               <a:t>Project</a:t>
             </a:r>
             <a:r>
-              <a:rPr lang="zh-CN" altLang="en-US" sz="7200" dirty="0" smtClean="0">
+              <a:rPr lang="zh-CN" altLang="en-US" sz="7200" dirty="0">
                 <a:solidFill>
                   <a:schemeClr val="bg1"/>
                 </a:solidFill>
@@ -3906,7 +3909,7 @@
               <a:t> </a:t>
             </a:r>
             <a:r>
-              <a:rPr lang="en-US" altLang="zh-CN" sz="7200" dirty="0" smtClean="0">
+              <a:rPr lang="en-US" altLang="zh-CN" sz="7200" dirty="0">
                 <a:solidFill>
                   <a:schemeClr val="bg1"/>
                 </a:solidFill>
@@ -3935,7 +3938,7 @@
         </p:nvSpPr>
         <p:spPr>
           <a:xfrm>
-            <a:off x="1762853" y="20998203"/>
+            <a:off x="1869073" y="19885495"/>
             <a:ext cx="9304941" cy="1200329"/>
           </a:xfrm>
           <a:prstGeom prst="rect">
@@ -3950,7 +3953,7 @@
           <a:lstStyle/>
           <a:p>
             <a:r>
-              <a:rPr lang="en-US" altLang="zh-CN" sz="7200" dirty="0" smtClean="0">
+              <a:rPr lang="en-US" altLang="zh-CN" sz="7200" dirty="0">
                 <a:solidFill>
                   <a:schemeClr val="bg1"/>
                 </a:solidFill>
@@ -3961,7 +3964,7 @@
               <a:t>Project</a:t>
             </a:r>
             <a:r>
-              <a:rPr lang="zh-CN" altLang="en-US" sz="7200" dirty="0" smtClean="0">
+              <a:rPr lang="zh-CN" altLang="en-US" sz="7200" dirty="0">
                 <a:solidFill>
                   <a:schemeClr val="bg1"/>
                 </a:solidFill>
@@ -3972,7 +3975,7 @@
               <a:t> </a:t>
             </a:r>
             <a:r>
-              <a:rPr lang="en-US" altLang="zh-CN" sz="7200" dirty="0" smtClean="0">
+              <a:rPr lang="en-US" altLang="zh-CN" sz="7200" dirty="0">
                 <a:solidFill>
                   <a:schemeClr val="bg1"/>
                 </a:solidFill>
@@ -4016,7 +4019,7 @@
           <a:lstStyle/>
           <a:p>
             <a:r>
-              <a:rPr lang="en-US" altLang="zh-CN" sz="7200" dirty="0" smtClean="0">
+              <a:rPr lang="en-US" altLang="zh-CN" sz="7200" dirty="0">
                 <a:solidFill>
                   <a:schemeClr val="bg1"/>
                 </a:solidFill>
@@ -4027,7 +4030,7 @@
               <a:t>System</a:t>
             </a:r>
             <a:r>
-              <a:rPr lang="zh-CN" altLang="en-US" sz="7200" dirty="0" smtClean="0">
+              <a:rPr lang="zh-CN" altLang="en-US" sz="7200" dirty="0">
                 <a:solidFill>
                   <a:schemeClr val="bg1"/>
                 </a:solidFill>
@@ -4038,7 +4041,7 @@
               <a:t> </a:t>
             </a:r>
             <a:r>
-              <a:rPr lang="en-US" altLang="zh-CN" sz="7200" dirty="0" smtClean="0">
+              <a:rPr lang="en-US" altLang="zh-CN" sz="7200" dirty="0">
                 <a:solidFill>
                   <a:schemeClr val="bg1"/>
                 </a:solidFill>
@@ -4067,7 +4070,7 @@
         </p:nvSpPr>
         <p:spPr>
           <a:xfrm>
-            <a:off x="15502454" y="12697803"/>
+            <a:off x="15246311" y="12652098"/>
             <a:ext cx="11665470" cy="1200329"/>
           </a:xfrm>
           <a:prstGeom prst="rect">
@@ -4135,31 +4138,15 @@
               <a:t>D</a:t>
             </a:r>
             <a:r>
-              <a:rPr lang="en-US" sz="6000" dirty="0" smtClean="0">
-                <a:solidFill>
-                  <a:schemeClr val="bg1"/>
-                </a:solidFill>
-              </a:rPr>
-              <a:t>ata </a:t>
-            </a:r>
-            <a:r>
               <a:rPr lang="en-US" sz="6000" dirty="0">
                 <a:solidFill>
                   <a:schemeClr val="bg1"/>
                 </a:solidFill>
               </a:rPr>
-              <a:t>query </a:t>
-            </a:r>
-            <a:r>
-              <a:rPr lang="en-US" sz="6000" dirty="0" smtClean="0">
-                <a:solidFill>
-                  <a:schemeClr val="bg1"/>
-                </a:solidFill>
-              </a:rPr>
-              <a:t>module,</a:t>
-            </a:r>
-            <a:r>
-              <a:rPr lang="zh-CN" altLang="en-US" sz="6000" dirty="0" smtClean="0">
+              <a:t>ata query module,</a:t>
+            </a:r>
+            <a:r>
+              <a:rPr lang="zh-CN" altLang="en-US" sz="6000" dirty="0">
                 <a:solidFill>
                   <a:schemeClr val="bg1"/>
                 </a:solidFill>
@@ -4167,20 +4154,12 @@
               <a:t> </a:t>
             </a:r>
             <a:r>
-              <a:rPr lang="en-US" sz="6000" dirty="0" smtClean="0">
-                <a:solidFill>
-                  <a:schemeClr val="bg1"/>
-                </a:solidFill>
-              </a:rPr>
-              <a:t>importer</a:t>
-            </a:r>
-            <a:r>
               <a:rPr lang="en-US" sz="6000" dirty="0">
                 <a:solidFill>
                   <a:schemeClr val="bg1"/>
                 </a:solidFill>
               </a:rPr>
-              <a:t>, database.</a:t>
+              <a:t>importer, database.</a:t>
             </a:r>
             <a:endParaRPr lang="en-US" sz="6000" dirty="0">
               <a:solidFill>
@@ -4201,8 +4180,8 @@
         </p:nvSpPr>
         <p:spPr>
           <a:xfrm>
-            <a:off x="29982053" y="13653045"/>
-            <a:ext cx="12518171" cy="7345158"/>
+            <a:off x="29982053" y="14104989"/>
+            <a:ext cx="12518171" cy="6757828"/>
           </a:xfrm>
           <a:custGeom>
             <a:avLst/>
@@ -4523,7 +4502,7 @@
         </p:nvSpPr>
         <p:spPr>
           <a:xfrm>
-            <a:off x="31730496" y="13297968"/>
+            <a:off x="31982345" y="13589016"/>
             <a:ext cx="9145016" cy="1404797"/>
           </a:xfrm>
           <a:prstGeom prst="roundRect">
@@ -4571,7 +4550,7 @@
         </p:nvSpPr>
         <p:spPr>
           <a:xfrm>
-            <a:off x="32315323" y="26077598"/>
+            <a:off x="32362230" y="25919794"/>
             <a:ext cx="7936789" cy="1200329"/>
           </a:xfrm>
           <a:prstGeom prst="rect">
@@ -4586,7 +4565,7 @@
           <a:lstStyle/>
           <a:p>
             <a:r>
-              <a:rPr lang="en-US" altLang="zh-CN" sz="7200" dirty="0" smtClean="0">
+              <a:rPr lang="en-US" altLang="zh-CN" sz="7200" dirty="0">
                 <a:solidFill>
                   <a:schemeClr val="bg1"/>
                 </a:solidFill>
@@ -4615,7 +4594,7 @@
         </p:nvSpPr>
         <p:spPr>
           <a:xfrm>
-            <a:off x="33670567" y="13222589"/>
+            <a:off x="33787257" y="13568486"/>
             <a:ext cx="5544616" cy="1200329"/>
           </a:xfrm>
           <a:prstGeom prst="rect">
@@ -4630,7 +4609,7 @@
           <a:lstStyle/>
           <a:p>
             <a:r>
-              <a:rPr lang="en-US" altLang="zh-CN" sz="7200" smtClean="0">
+              <a:rPr lang="en-US" altLang="zh-CN" sz="7200">
                 <a:solidFill>
                   <a:schemeClr val="bg1"/>
                 </a:solidFill>
@@ -4659,8 +4638,8 @@
         </p:nvSpPr>
         <p:spPr>
           <a:xfrm>
-            <a:off x="16055287" y="1973572"/>
-            <a:ext cx="14941660" cy="1569660"/>
+            <a:off x="14543833" y="1973572"/>
+            <a:ext cx="17276740" cy="1569660"/>
           </a:xfrm>
           <a:prstGeom prst="rect">
             <a:avLst/>
@@ -4675,12 +4654,28 @@
           <a:p>
             <a:pPr algn="ctr"/>
             <a:r>
+              <a:rPr lang="en-US" altLang="zh-CN" sz="3200" dirty="0" smtClean="0">
+                <a:solidFill>
+                  <a:schemeClr val="bg1"/>
+                </a:solidFill>
+              </a:rPr>
+              <a:t>Zeyu </a:t>
+            </a:r>
+            <a:r>
               <a:rPr lang="en-US" altLang="zh-CN" sz="3200" dirty="0">
                 <a:solidFill>
                   <a:schemeClr val="bg1"/>
                 </a:solidFill>
               </a:rPr>
-              <a:t>Zeqi Fu, </a:t>
+              <a:t>Lin, Minh Tam </a:t>
+            </a:r>
+            <a:r>
+              <a:rPr lang="en-US" altLang="zh-CN" sz="3200" dirty="0" smtClean="0">
+                <a:solidFill>
+                  <a:schemeClr val="bg1"/>
+                </a:solidFill>
+              </a:rPr>
+              <a:t>Phan, </a:t>
             </a:r>
             <a:r>
               <a:rPr lang="en-US" altLang="zh-CN" sz="3200" dirty="0" err="1">
@@ -4688,7 +4683,7 @@
                   <a:schemeClr val="bg1"/>
                 </a:solidFill>
               </a:rPr>
-              <a:t>Zeyu</a:t>
+              <a:t>Zeqi</a:t>
             </a:r>
             <a:r>
               <a:rPr lang="en-US" altLang="zh-CN" sz="3200" dirty="0">
@@ -4696,7 +4691,7 @@
                   <a:schemeClr val="bg1"/>
                 </a:solidFill>
               </a:rPr>
-              <a:t> Lin, Minh Tam </a:t>
+              <a:t> </a:t>
             </a:r>
             <a:r>
               <a:rPr lang="en-US" altLang="zh-CN" sz="3200" dirty="0" smtClean="0">
@@ -4704,7 +4699,39 @@
                   <a:schemeClr val="bg1"/>
                 </a:solidFill>
               </a:rPr>
-              <a:t>Phan</a:t>
+              <a:t>Fu (zeyu.lin, </a:t>
+            </a:r>
+            <a:r>
+              <a:rPr lang="en-US" altLang="zh-CN" sz="3200" dirty="0" err="1" smtClean="0">
+                <a:solidFill>
+                  <a:schemeClr val="bg1"/>
+                </a:solidFill>
+              </a:rPr>
+              <a:t>minhtam.phan</a:t>
+            </a:r>
+            <a:r>
+              <a:rPr lang="en-US" altLang="zh-CN" sz="3200" dirty="0" smtClean="0">
+                <a:solidFill>
+                  <a:schemeClr val="bg1"/>
+                </a:solidFill>
+              </a:rPr>
+              <a:t>, </a:t>
+            </a:r>
+            <a:r>
+              <a:rPr lang="en-US" altLang="zh-CN" sz="3200" dirty="0" err="1" smtClean="0">
+                <a:solidFill>
+                  <a:schemeClr val="bg1"/>
+                </a:solidFill>
+              </a:rPr>
+              <a:t>zeqi.fu</a:t>
+            </a:r>
+            <a:r>
+              <a:rPr lang="en-US" altLang="zh-CN" sz="3200" dirty="0" smtClean="0">
+                <a:solidFill>
+                  <a:schemeClr val="bg1"/>
+                </a:solidFill>
+              </a:rPr>
+              <a:t>)</a:t>
             </a:r>
             <a:r>
               <a:rPr lang="zh-CN" altLang="en-US" sz="3200" dirty="0" smtClean="0">
@@ -4723,7 +4750,7 @@
               <a:t>@</a:t>
             </a:r>
             <a:r>
-              <a:rPr lang="en-US" altLang="zh-CN" sz="3200" dirty="0" err="1" smtClean="0">
+              <a:rPr lang="en-US" altLang="zh-CN" sz="3200" dirty="0" err="1">
                 <a:solidFill>
                   <a:schemeClr val="bg1"/>
                 </a:solidFill>
@@ -4739,7 +4766,7 @@
           <a:p>
             <a:pPr algn="ctr"/>
             <a:r>
-              <a:rPr lang="en-US" altLang="zh-CN" sz="3200" dirty="0" smtClean="0">
+              <a:rPr lang="en-US" altLang="zh-CN" sz="3200" dirty="0">
                 <a:solidFill>
                   <a:schemeClr val="bg1"/>
                 </a:solidFill>
@@ -4747,7 +4774,7 @@
               <a:t>Supervised</a:t>
             </a:r>
             <a:r>
-              <a:rPr lang="zh-CN" altLang="en-US" sz="3200" dirty="0" smtClean="0">
+              <a:rPr lang="zh-CN" altLang="en-US" sz="3200" dirty="0">
                 <a:solidFill>
                   <a:schemeClr val="bg1"/>
                 </a:solidFill>
@@ -4755,7 +4782,7 @@
               <a:t> </a:t>
             </a:r>
             <a:r>
-              <a:rPr lang="en-US" altLang="zh-CN" sz="3200" dirty="0" smtClean="0">
+              <a:rPr lang="en-US" altLang="zh-CN" sz="3200" dirty="0">
                 <a:solidFill>
                   <a:schemeClr val="bg1"/>
                 </a:solidFill>
@@ -4763,7 +4790,7 @@
               <a:t>by</a:t>
             </a:r>
             <a:r>
-              <a:rPr lang="zh-CN" altLang="en-US" sz="3200" dirty="0" smtClean="0">
+              <a:rPr lang="zh-CN" altLang="en-US" sz="3200" dirty="0">
                 <a:solidFill>
                   <a:schemeClr val="bg1"/>
                 </a:solidFill>
@@ -4795,7 +4822,7 @@
               <a:t>, Claudia Szabo, Marian </a:t>
             </a:r>
             <a:r>
-              <a:rPr lang="en-US" sz="3200" dirty="0" err="1" smtClean="0">
+              <a:rPr lang="en-US" sz="3200" dirty="0" err="1">
                 <a:solidFill>
                   <a:schemeClr val="bg1"/>
                 </a:solidFill>
@@ -4806,7 +4833,7 @@
           <a:p>
             <a:pPr algn="ctr"/>
             <a:r>
-              <a:rPr lang="en-US" altLang="zh-CN" sz="3200" dirty="0" smtClean="0">
+              <a:rPr lang="en-US" altLang="zh-CN" sz="3200" dirty="0">
                 <a:solidFill>
                   <a:schemeClr val="bg1"/>
                 </a:solidFill>
@@ -4814,7 +4841,7 @@
               <a:t>School</a:t>
             </a:r>
             <a:r>
-              <a:rPr lang="zh-CN" altLang="en-US" sz="3200" dirty="0" smtClean="0">
+              <a:rPr lang="zh-CN" altLang="en-US" sz="3200" dirty="0">
                 <a:solidFill>
                   <a:schemeClr val="bg1"/>
                 </a:solidFill>
@@ -4822,7 +4849,7 @@
               <a:t> </a:t>
             </a:r>
             <a:r>
-              <a:rPr lang="en-US" altLang="zh-CN" sz="3200" dirty="0" smtClean="0">
+              <a:rPr lang="en-US" altLang="zh-CN" sz="3200" dirty="0">
                 <a:solidFill>
                   <a:schemeClr val="bg1"/>
                 </a:solidFill>
@@ -4830,7 +4857,7 @@
               <a:t>of</a:t>
             </a:r>
             <a:r>
-              <a:rPr lang="zh-CN" altLang="en-US" sz="3200" dirty="0" smtClean="0">
+              <a:rPr lang="zh-CN" altLang="en-US" sz="3200" dirty="0">
                 <a:solidFill>
                   <a:schemeClr val="bg1"/>
                 </a:solidFill>
@@ -4838,7 +4865,7 @@
               <a:t> </a:t>
             </a:r>
             <a:r>
-              <a:rPr lang="en-US" altLang="zh-CN" sz="3200" dirty="0" smtClean="0">
+              <a:rPr lang="en-US" altLang="zh-CN" sz="3200" dirty="0">
                 <a:solidFill>
                   <a:schemeClr val="bg1"/>
                 </a:solidFill>
@@ -4846,7 +4873,7 @@
               <a:t>Computer</a:t>
             </a:r>
             <a:r>
-              <a:rPr lang="zh-CN" altLang="en-US" sz="3200" dirty="0" smtClean="0">
+              <a:rPr lang="zh-CN" altLang="en-US" sz="3200" dirty="0">
                 <a:solidFill>
                   <a:schemeClr val="bg1"/>
                 </a:solidFill>
@@ -4854,7 +4881,7 @@
               <a:t> </a:t>
             </a:r>
             <a:r>
-              <a:rPr lang="en-US" altLang="zh-CN" sz="3200" dirty="0" smtClean="0">
+              <a:rPr lang="en-US" altLang="zh-CN" sz="3200" dirty="0">
                 <a:solidFill>
                   <a:schemeClr val="bg1"/>
                 </a:solidFill>
@@ -4877,7 +4904,7 @@
         </p:nvSpPr>
         <p:spPr>
           <a:xfrm>
-            <a:off x="32272743" y="20902660"/>
+            <a:off x="32197186" y="20939470"/>
             <a:ext cx="7936789" cy="1200329"/>
           </a:xfrm>
           <a:prstGeom prst="rect">
@@ -4893,7 +4920,7 @@
           <a:p>
             <a:pPr algn="ctr"/>
             <a:r>
-              <a:rPr lang="en-US" altLang="zh-CN" sz="7200" dirty="0" smtClean="0">
+              <a:rPr lang="en-US" altLang="zh-CN" sz="7200" dirty="0">
                 <a:solidFill>
                   <a:schemeClr val="bg1"/>
                 </a:solidFill>
@@ -4904,7 +4931,7 @@
               <a:t>Future</a:t>
             </a:r>
             <a:r>
-              <a:rPr lang="zh-CN" altLang="en-US" sz="7200" dirty="0" smtClean="0">
+              <a:rPr lang="zh-CN" altLang="en-US" sz="7200" dirty="0">
                 <a:solidFill>
                   <a:schemeClr val="bg1"/>
                 </a:solidFill>
@@ -4915,7 +4942,7 @@
               <a:t> </a:t>
             </a:r>
             <a:r>
-              <a:rPr lang="en-US" altLang="zh-CN" sz="7200" dirty="0" smtClean="0">
+              <a:rPr lang="en-US" altLang="zh-CN" sz="7200" dirty="0">
                 <a:solidFill>
                   <a:schemeClr val="bg1"/>
                 </a:solidFill>
@@ -4936,6 +4963,1251 @@
           </a:p>
         </p:txBody>
       </p:sp>
+      <p:sp>
+        <p:nvSpPr>
+          <p:cNvPr id="4" name="TextBox 3">
+            <a:extLst>
+              <a:ext uri="{FF2B5EF4-FFF2-40B4-BE49-F238E27FC236}">
+                <a16:creationId xmlns:a16="http://schemas.microsoft.com/office/drawing/2014/main" xmlns="" id="{D335579D-9BA7-4FF2-BA55-7C6390B98CEF}"/>
+              </a:ext>
+            </a:extLst>
+          </p:cNvPr>
+          <p:cNvSpPr txBox="1"/>
+          <p:nvPr/>
+        </p:nvSpPr>
+        <p:spPr>
+          <a:xfrm>
+            <a:off x="12184858" y="5893992"/>
+            <a:ext cx="8216891" cy="5509200"/>
+          </a:xfrm>
+          <a:prstGeom prst="rect">
+            <a:avLst/>
+          </a:prstGeom>
+          <a:noFill/>
+        </p:spPr>
+        <p:txBody>
+          <a:bodyPr wrap="square" rtlCol="0">
+            <a:spAutoFit/>
+          </a:bodyPr>
+          <a:lstStyle/>
+          <a:p>
+            <a:pPr marL="1143000" indent="-1143000">
+              <a:buFont typeface="Wingdings" charset="2"/>
+              <a:buChar char="v"/>
+            </a:pPr>
+            <a:r>
+              <a:rPr lang="en-US" sz="3200" dirty="0"/>
+              <a:t>The database schema is built based on two </a:t>
+            </a:r>
+            <a:r>
+              <a:rPr lang="en-US" sz="3200" dirty="0" smtClean="0"/>
+              <a:t>data sources (</a:t>
+            </a:r>
+            <a:r>
+              <a:rPr lang="en-US" sz="3200" dirty="0" err="1" smtClean="0"/>
+              <a:t>Moodle</a:t>
+            </a:r>
+            <a:r>
+              <a:rPr lang="en-US" sz="3200" dirty="0" smtClean="0"/>
+              <a:t> Forum and </a:t>
+            </a:r>
+            <a:r>
+              <a:rPr lang="en-US" sz="3200" dirty="0" err="1" smtClean="0"/>
+              <a:t>WebSubmission</a:t>
+            </a:r>
+            <a:r>
+              <a:rPr lang="en-US" sz="3200" dirty="0" smtClean="0"/>
+              <a:t>).</a:t>
+            </a:r>
+            <a:endParaRPr lang="en-US" sz="3200" dirty="0"/>
+          </a:p>
+          <a:p>
+            <a:pPr marL="1143000" indent="-1143000">
+              <a:buFont typeface="Wingdings" charset="2"/>
+              <a:buChar char="v"/>
+            </a:pPr>
+            <a:r>
+              <a:rPr lang="en-US" sz="3200" dirty="0"/>
+              <a:t>Data Importer tool extracts data from data sources to database.</a:t>
+            </a:r>
+          </a:p>
+          <a:p>
+            <a:pPr marL="1143000" indent="-1143000">
+              <a:buFont typeface="Wingdings" charset="2"/>
+              <a:buChar char="v"/>
+            </a:pPr>
+            <a:r>
+              <a:rPr lang="en-US" sz="3200" dirty="0"/>
+              <a:t>The website displays and analyzes data by charts and tables</a:t>
+            </a:r>
+            <a:r>
+              <a:rPr lang="en-US" sz="3200" dirty="0" smtClean="0"/>
+              <a:t>.</a:t>
+            </a:r>
+          </a:p>
+          <a:p>
+            <a:pPr marL="1143000" indent="-1143000">
+              <a:buFont typeface="Wingdings" charset="2"/>
+              <a:buChar char="v"/>
+            </a:pPr>
+            <a:r>
+              <a:rPr lang="en-US" sz="3200" dirty="0" smtClean="0"/>
+              <a:t>The website is designed in a decoupled way. It adopts two-tier model, which separates the front-end and the back-end.</a:t>
+            </a:r>
+            <a:endParaRPr lang="en-US" sz="3200" dirty="0"/>
+          </a:p>
+        </p:txBody>
+      </p:sp>
+      <p:pic>
+        <p:nvPicPr>
+          <p:cNvPr id="31" name="Picture 30">
+            <a:extLst>
+              <a:ext uri="{FF2B5EF4-FFF2-40B4-BE49-F238E27FC236}">
+                <a16:creationId xmlns:a16="http://schemas.microsoft.com/office/drawing/2014/main" xmlns="" id="{49FE897D-F032-49C9-95DD-CCF761D9E0B8}"/>
+              </a:ext>
+            </a:extLst>
+          </p:cNvPr>
+          <p:cNvPicPr>
+            <a:picLocks noChangeAspect="1"/>
+          </p:cNvPicPr>
+          <p:nvPr/>
+        </p:nvPicPr>
+        <p:blipFill>
+          <a:blip r:embed="rId2">
+            <a:extLst>
+              <a:ext uri="{28A0092B-C50C-407E-A947-70E740481C1C}">
+                <a14:useLocalDpi xmlns:a14="http://schemas.microsoft.com/office/drawing/2010/main" val="0"/>
+              </a:ext>
+            </a:extLst>
+          </a:blip>
+          <a:stretch>
+            <a:fillRect/>
+          </a:stretch>
+        </p:blipFill>
+        <p:spPr>
+          <a:xfrm>
+            <a:off x="36549436" y="8512870"/>
+            <a:ext cx="5564874" cy="2553287"/>
+          </a:xfrm>
+          <a:prstGeom prst="rect">
+            <a:avLst/>
+          </a:prstGeom>
+        </p:spPr>
+      </p:pic>
+      <p:pic>
+        <p:nvPicPr>
+          <p:cNvPr id="33" name="Picture 32">
+            <a:extLst>
+              <a:ext uri="{FF2B5EF4-FFF2-40B4-BE49-F238E27FC236}">
+                <a16:creationId xmlns:a16="http://schemas.microsoft.com/office/drawing/2014/main" xmlns="" id="{6AD46D6C-29E3-4501-AF10-81B444FA599A}"/>
+              </a:ext>
+            </a:extLst>
+          </p:cNvPr>
+          <p:cNvPicPr>
+            <a:picLocks noChangeAspect="1"/>
+          </p:cNvPicPr>
+          <p:nvPr/>
+        </p:nvPicPr>
+        <p:blipFill>
+          <a:blip r:embed="rId3">
+            <a:extLst>
+              <a:ext uri="{28A0092B-C50C-407E-A947-70E740481C1C}">
+                <a14:useLocalDpi xmlns:a14="http://schemas.microsoft.com/office/drawing/2010/main" val="0"/>
+              </a:ext>
+            </a:extLst>
+          </a:blip>
+          <a:stretch>
+            <a:fillRect/>
+          </a:stretch>
+        </p:blipFill>
+        <p:spPr>
+          <a:xfrm>
+            <a:off x="36805173" y="5841973"/>
+            <a:ext cx="5307906" cy="2094833"/>
+          </a:xfrm>
+          <a:prstGeom prst="rect">
+            <a:avLst/>
+          </a:prstGeom>
+        </p:spPr>
+      </p:pic>
+      <p:pic>
+        <p:nvPicPr>
+          <p:cNvPr id="35" name="Picture 34">
+            <a:extLst>
+              <a:ext uri="{FF2B5EF4-FFF2-40B4-BE49-F238E27FC236}">
+                <a16:creationId xmlns:a16="http://schemas.microsoft.com/office/drawing/2014/main" xmlns="" id="{84A8944C-C2C3-4E5B-AA53-82A178642EA6}"/>
+              </a:ext>
+            </a:extLst>
+          </p:cNvPr>
+          <p:cNvPicPr>
+            <a:picLocks noChangeAspect="1"/>
+          </p:cNvPicPr>
+          <p:nvPr/>
+        </p:nvPicPr>
+        <p:blipFill>
+          <a:blip r:embed="rId4">
+            <a:extLst>
+              <a:ext uri="{28A0092B-C50C-407E-A947-70E740481C1C}">
+                <a14:useLocalDpi xmlns:a14="http://schemas.microsoft.com/office/drawing/2010/main" val="0"/>
+              </a:ext>
+            </a:extLst>
+          </a:blip>
+          <a:stretch>
+            <a:fillRect/>
+          </a:stretch>
+        </p:blipFill>
+        <p:spPr>
+          <a:xfrm>
+            <a:off x="37027617" y="11609214"/>
+            <a:ext cx="4506866" cy="1644534"/>
+          </a:xfrm>
+          <a:prstGeom prst="rect">
+            <a:avLst/>
+          </a:prstGeom>
+        </p:spPr>
+      </p:pic>
+      <p:cxnSp>
+        <p:nvCxnSpPr>
+          <p:cNvPr id="37" name="Straight Arrow Connector 36">
+            <a:extLst>
+              <a:ext uri="{FF2B5EF4-FFF2-40B4-BE49-F238E27FC236}">
+                <a16:creationId xmlns:a16="http://schemas.microsoft.com/office/drawing/2014/main" xmlns="" id="{6A14BA03-E8AE-48DE-B2C7-6A9F54D0C8F4}"/>
+              </a:ext>
+            </a:extLst>
+          </p:cNvPr>
+          <p:cNvCxnSpPr>
+            <a:cxnSpLocks/>
+            <a:endCxn id="31" idx="2"/>
+          </p:cNvCxnSpPr>
+          <p:nvPr/>
+        </p:nvCxnSpPr>
+        <p:spPr>
+          <a:xfrm flipV="1">
+            <a:off x="39331873" y="11066157"/>
+            <a:ext cx="0" cy="543058"/>
+          </a:xfrm>
+          <a:prstGeom prst="straightConnector1">
+            <a:avLst/>
+          </a:prstGeom>
+          <a:ln>
+            <a:tailEnd type="triangle"/>
+          </a:ln>
+        </p:spPr>
+        <p:style>
+          <a:lnRef idx="3">
+            <a:schemeClr val="accent4"/>
+          </a:lnRef>
+          <a:fillRef idx="0">
+            <a:schemeClr val="accent4"/>
+          </a:fillRef>
+          <a:effectRef idx="2">
+            <a:schemeClr val="accent4"/>
+          </a:effectRef>
+          <a:fontRef idx="minor">
+            <a:schemeClr val="tx1"/>
+          </a:fontRef>
+        </p:style>
+      </p:cxnSp>
+      <p:cxnSp>
+        <p:nvCxnSpPr>
+          <p:cNvPr id="39" name="Straight Arrow Connector 38">
+            <a:extLst>
+              <a:ext uri="{FF2B5EF4-FFF2-40B4-BE49-F238E27FC236}">
+                <a16:creationId xmlns:a16="http://schemas.microsoft.com/office/drawing/2014/main" xmlns="" id="{3EFA15DA-D2B0-42C3-B2EC-A14C96D8DCC1}"/>
+              </a:ext>
+            </a:extLst>
+          </p:cNvPr>
+          <p:cNvCxnSpPr>
+            <a:cxnSpLocks/>
+          </p:cNvCxnSpPr>
+          <p:nvPr/>
+        </p:nvCxnSpPr>
+        <p:spPr>
+          <a:xfrm flipV="1">
+            <a:off x="39331873" y="7864799"/>
+            <a:ext cx="0" cy="705584"/>
+          </a:xfrm>
+          <a:prstGeom prst="straightConnector1">
+            <a:avLst/>
+          </a:prstGeom>
+          <a:ln>
+            <a:tailEnd type="triangle"/>
+          </a:ln>
+        </p:spPr>
+        <p:style>
+          <a:lnRef idx="3">
+            <a:schemeClr val="accent4"/>
+          </a:lnRef>
+          <a:fillRef idx="0">
+            <a:schemeClr val="accent4"/>
+          </a:fillRef>
+          <a:effectRef idx="2">
+            <a:schemeClr val="accent4"/>
+          </a:effectRef>
+          <a:fontRef idx="minor">
+            <a:schemeClr val="tx1"/>
+          </a:fontRef>
+        </p:style>
+      </p:cxnSp>
+      <p:sp>
+        <p:nvSpPr>
+          <p:cNvPr id="49" name="TextBox 48">
+            <a:extLst>
+              <a:ext uri="{FF2B5EF4-FFF2-40B4-BE49-F238E27FC236}">
+                <a16:creationId xmlns:a16="http://schemas.microsoft.com/office/drawing/2014/main" xmlns="" id="{4C7268DB-F52B-4228-A14F-253306C33498}"/>
+              </a:ext>
+            </a:extLst>
+          </p:cNvPr>
+          <p:cNvSpPr txBox="1"/>
+          <p:nvPr/>
+        </p:nvSpPr>
+        <p:spPr>
+          <a:xfrm>
+            <a:off x="30042841" y="5776566"/>
+            <a:ext cx="6506595" cy="6001643"/>
+          </a:xfrm>
+          <a:prstGeom prst="rect">
+            <a:avLst/>
+          </a:prstGeom>
+          <a:noFill/>
+        </p:spPr>
+        <p:txBody>
+          <a:bodyPr wrap="square" rtlCol="0">
+            <a:spAutoFit/>
+          </a:bodyPr>
+          <a:lstStyle/>
+          <a:p>
+            <a:pPr marL="1143000" indent="-1143000">
+              <a:buFont typeface="Wingdings" charset="2"/>
+              <a:buChar char="v"/>
+            </a:pPr>
+            <a:r>
+              <a:rPr lang="en-US" sz="3200" dirty="0"/>
+              <a:t>Data Query module can support staff to query and extract data.</a:t>
+            </a:r>
+          </a:p>
+          <a:p>
+            <a:pPr marL="1143000" indent="-1143000">
+              <a:buFont typeface="Wingdings" charset="2"/>
+              <a:buChar char="v"/>
+            </a:pPr>
+            <a:r>
+              <a:rPr lang="en-US" sz="3200" dirty="0"/>
+              <a:t>A combined database of Moodle Forum and </a:t>
+            </a:r>
+            <a:r>
+              <a:rPr lang="en-US" sz="3200" dirty="0" err="1"/>
+              <a:t>WebSubmission</a:t>
+            </a:r>
+            <a:r>
+              <a:rPr lang="en-US" sz="3200" dirty="0"/>
+              <a:t> data sources.</a:t>
+            </a:r>
+          </a:p>
+          <a:p>
+            <a:pPr marL="1143000" indent="-1143000">
+              <a:buFont typeface="Wingdings" charset="2"/>
+              <a:buChar char="v"/>
+            </a:pPr>
+            <a:r>
+              <a:rPr lang="en-US" sz="3200" dirty="0"/>
+              <a:t>Can be flexibly applied for newly added data sources such as Canvas.</a:t>
+            </a:r>
+          </a:p>
+          <a:p>
+            <a:pPr marL="1143000" indent="-1143000">
+              <a:buFont typeface="Wingdings" charset="2"/>
+              <a:buChar char="v"/>
+            </a:pPr>
+            <a:r>
+              <a:rPr lang="en-US" sz="3200" dirty="0"/>
+              <a:t>Data importing tool can assist to import data from data sources into database.</a:t>
+            </a:r>
+          </a:p>
+        </p:txBody>
+      </p:sp>
+      <p:pic>
+        <p:nvPicPr>
+          <p:cNvPr id="51" name="Picture 50">
+            <a:extLst>
+              <a:ext uri="{FF2B5EF4-FFF2-40B4-BE49-F238E27FC236}">
+                <a16:creationId xmlns:a16="http://schemas.microsoft.com/office/drawing/2014/main" xmlns="" id="{0C5B7859-114B-4E51-B787-275E022F7536}"/>
+              </a:ext>
+            </a:extLst>
+          </p:cNvPr>
+          <p:cNvPicPr>
+            <a:picLocks noChangeAspect="1"/>
+          </p:cNvPicPr>
+          <p:nvPr/>
+        </p:nvPicPr>
+        <p:blipFill>
+          <a:blip r:embed="rId5">
+            <a:extLst>
+              <a:ext uri="{28A0092B-C50C-407E-A947-70E740481C1C}">
+                <a14:useLocalDpi xmlns:a14="http://schemas.microsoft.com/office/drawing/2010/main" val="0"/>
+              </a:ext>
+            </a:extLst>
+          </a:blip>
+          <a:stretch>
+            <a:fillRect/>
+          </a:stretch>
+        </p:blipFill>
+        <p:spPr>
+          <a:xfrm>
+            <a:off x="20473187" y="5707790"/>
+            <a:ext cx="4357718" cy="6188054"/>
+          </a:xfrm>
+          <a:prstGeom prst="rect">
+            <a:avLst/>
+          </a:prstGeom>
+        </p:spPr>
+      </p:pic>
+      <p:sp>
+        <p:nvSpPr>
+          <p:cNvPr id="53" name="TextBox 52">
+            <a:extLst>
+              <a:ext uri="{FF2B5EF4-FFF2-40B4-BE49-F238E27FC236}">
+                <a16:creationId xmlns:a16="http://schemas.microsoft.com/office/drawing/2014/main" xmlns="" id="{ACE6854B-2C28-45DF-90F8-367CA667E897}"/>
+              </a:ext>
+            </a:extLst>
+          </p:cNvPr>
+          <p:cNvSpPr txBox="1"/>
+          <p:nvPr/>
+        </p:nvSpPr>
+        <p:spPr>
+          <a:xfrm>
+            <a:off x="30470914" y="15197537"/>
+            <a:ext cx="11719425" cy="5509200"/>
+          </a:xfrm>
+          <a:prstGeom prst="rect">
+            <a:avLst/>
+          </a:prstGeom>
+          <a:noFill/>
+        </p:spPr>
+        <p:txBody>
+          <a:bodyPr wrap="square" rtlCol="0">
+            <a:spAutoFit/>
+          </a:bodyPr>
+          <a:lstStyle/>
+          <a:p>
+            <a:pPr marL="1143000" indent="-1143000">
+              <a:buFont typeface="Wingdings" charset="2"/>
+              <a:buChar char="v"/>
+            </a:pPr>
+            <a:r>
+              <a:rPr lang="en-US" sz="3200" dirty="0"/>
+              <a:t>The database is flexible and can be applied for multiple data sources.</a:t>
+            </a:r>
+          </a:p>
+          <a:p>
+            <a:pPr marL="1143000" indent="-1143000">
+              <a:buFont typeface="Wingdings" charset="2"/>
+              <a:buChar char="v"/>
+            </a:pPr>
+            <a:r>
+              <a:rPr lang="en-US" sz="3200" dirty="0"/>
+              <a:t>Having tools to import data from external files</a:t>
+            </a:r>
+            <a:r>
+              <a:rPr lang="en-US" sz="3200" dirty="0" smtClean="0"/>
+              <a:t>.</a:t>
+            </a:r>
+          </a:p>
+          <a:p>
+            <a:pPr marL="1143000" indent="-1143000">
+              <a:buFont typeface="Wingdings" charset="2"/>
+              <a:buChar char="v"/>
+            </a:pPr>
+            <a:r>
+              <a:rPr lang="en-US" sz="3200" dirty="0" smtClean="0"/>
+              <a:t>Visualization makes the data intuitive.</a:t>
+            </a:r>
+          </a:p>
+          <a:p>
+            <a:pPr marL="1143000" indent="-1143000">
+              <a:buFont typeface="Wingdings" charset="2"/>
+              <a:buChar char="v"/>
+            </a:pPr>
+            <a:r>
+              <a:rPr lang="en-US" sz="3200" dirty="0" smtClean="0"/>
+              <a:t>Charts are configurable, which allows user to manipulate and further explore data.</a:t>
+            </a:r>
+          </a:p>
+          <a:p>
+            <a:pPr marL="1143000" indent="-1143000">
+              <a:buFont typeface="Wingdings" charset="2"/>
+              <a:buChar char="v"/>
+            </a:pPr>
+            <a:r>
+              <a:rPr lang="en-US" sz="3200" dirty="0" smtClean="0"/>
+              <a:t>Provide analysis across two data sources. Link two data sources and link the users of two data sources without identifying their names.</a:t>
+            </a:r>
+            <a:endParaRPr lang="en-US" sz="3200" dirty="0"/>
+          </a:p>
+          <a:p>
+            <a:pPr marL="1143000" indent="-1143000">
+              <a:buFont typeface="Wingdings" charset="2"/>
+              <a:buChar char="v"/>
+            </a:pPr>
+            <a:r>
+              <a:rPr lang="en-US" sz="3200" dirty="0"/>
+              <a:t>The website can be used to query, analyze and extract data with the support of charts and tables.</a:t>
+            </a:r>
+          </a:p>
+        </p:txBody>
+      </p:sp>
+      <p:sp>
+        <p:nvSpPr>
+          <p:cNvPr id="54" name="TextBox 53">
+            <a:extLst>
+              <a:ext uri="{FF2B5EF4-FFF2-40B4-BE49-F238E27FC236}">
+                <a16:creationId xmlns:a16="http://schemas.microsoft.com/office/drawing/2014/main" xmlns="" id="{029BBC3E-E42A-4C5E-920A-A9E22A559A8D}"/>
+              </a:ext>
+            </a:extLst>
+          </p:cNvPr>
+          <p:cNvSpPr txBox="1"/>
+          <p:nvPr/>
+        </p:nvSpPr>
+        <p:spPr>
+          <a:xfrm>
+            <a:off x="30521023" y="22189217"/>
+            <a:ext cx="7525912" cy="4031873"/>
+          </a:xfrm>
+          <a:prstGeom prst="rect">
+            <a:avLst/>
+          </a:prstGeom>
+          <a:noFill/>
+        </p:spPr>
+        <p:txBody>
+          <a:bodyPr wrap="square" rtlCol="0">
+            <a:spAutoFit/>
+          </a:bodyPr>
+          <a:lstStyle/>
+          <a:p>
+            <a:pPr marL="1143000" indent="-1143000">
+              <a:buFont typeface="Wingdings" charset="2"/>
+              <a:buChar char="v"/>
+            </a:pPr>
+            <a:r>
+              <a:rPr lang="en-US" sz="3200" dirty="0"/>
+              <a:t>Modify the schema to work with new </a:t>
+            </a:r>
+            <a:r>
+              <a:rPr lang="en-US" sz="3200" dirty="0" smtClean="0"/>
+              <a:t>data source (Canvas).</a:t>
+            </a:r>
+          </a:p>
+          <a:p>
+            <a:pPr marL="1143000" indent="-1143000">
+              <a:buFont typeface="Wingdings" charset="2"/>
+              <a:buChar char="v"/>
+            </a:pPr>
+            <a:r>
+              <a:rPr lang="en-US" sz="3200" dirty="0" smtClean="0"/>
+              <a:t>Add new data sources (e.g. student GPA) for further cross data analysis.</a:t>
+            </a:r>
+          </a:p>
+          <a:p>
+            <a:pPr marL="1143000" indent="-1143000">
+              <a:buFont typeface="Wingdings" charset="2"/>
+              <a:buChar char="v"/>
+            </a:pPr>
+            <a:r>
+              <a:rPr lang="en-US" sz="3200" dirty="0" smtClean="0"/>
+              <a:t>Provide charts (across semesters) of the same course for trend analysis and comparison.</a:t>
+            </a:r>
+          </a:p>
+          <a:p>
+            <a:pPr marL="1143000" indent="-1143000">
+              <a:buFont typeface="Arial" panose="020B0604020202020204" pitchFamily="34" charset="0"/>
+              <a:buChar char="•"/>
+            </a:pPr>
+            <a:endParaRPr lang="en-US" sz="3200" dirty="0"/>
+          </a:p>
+        </p:txBody>
+      </p:sp>
+      <p:pic>
+        <p:nvPicPr>
+          <p:cNvPr id="52" name="Picture 51">
+            <a:extLst>
+              <a:ext uri="{FF2B5EF4-FFF2-40B4-BE49-F238E27FC236}">
+                <a16:creationId xmlns:a16="http://schemas.microsoft.com/office/drawing/2014/main" xmlns="" id="{C8887F1F-1EC5-412B-9D53-658DE6D27ADB}"/>
+              </a:ext>
+            </a:extLst>
+          </p:cNvPr>
+          <p:cNvPicPr>
+            <a:picLocks noChangeAspect="1"/>
+          </p:cNvPicPr>
+          <p:nvPr/>
+        </p:nvPicPr>
+        <p:blipFill>
+          <a:blip r:embed="rId6"/>
+          <a:stretch>
+            <a:fillRect/>
+          </a:stretch>
+        </p:blipFill>
+        <p:spPr>
+          <a:xfrm>
+            <a:off x="38107737" y="22223887"/>
+            <a:ext cx="4052477" cy="3626418"/>
+          </a:xfrm>
+          <a:prstGeom prst="rect">
+            <a:avLst/>
+          </a:prstGeom>
+        </p:spPr>
+      </p:pic>
+      <p:sp>
+        <p:nvSpPr>
+          <p:cNvPr id="58" name="TextBox 57">
+            <a:extLst>
+              <a:ext uri="{FF2B5EF4-FFF2-40B4-BE49-F238E27FC236}">
+                <a16:creationId xmlns:a16="http://schemas.microsoft.com/office/drawing/2014/main" xmlns="" id="{3B8CF5F7-7340-4E24-8644-D8C68E8EAD91}"/>
+              </a:ext>
+            </a:extLst>
+          </p:cNvPr>
+          <p:cNvSpPr txBox="1"/>
+          <p:nvPr/>
+        </p:nvSpPr>
+        <p:spPr>
+          <a:xfrm>
+            <a:off x="30546897" y="27258757"/>
+            <a:ext cx="12108564" cy="1569660"/>
+          </a:xfrm>
+          <a:prstGeom prst="rect">
+            <a:avLst/>
+          </a:prstGeom>
+          <a:noFill/>
+        </p:spPr>
+        <p:txBody>
+          <a:bodyPr wrap="square" rtlCol="0">
+            <a:spAutoFit/>
+          </a:bodyPr>
+          <a:lstStyle/>
+          <a:p>
+            <a:r>
+              <a:rPr lang="en-US" sz="3200" dirty="0"/>
+              <a:t>This project was supported by the School of Computer Science. We gratefully acknowledge the feedback and contribution of Nickolas Falkner, Claudio Szabo, Christoph </a:t>
+            </a:r>
+            <a:r>
+              <a:rPr lang="en-US" sz="3200" dirty="0" err="1"/>
+              <a:t>Treude</a:t>
+            </a:r>
+            <a:r>
+              <a:rPr lang="en-US" sz="3200" dirty="0"/>
+              <a:t> and Marian </a:t>
+            </a:r>
+            <a:r>
+              <a:rPr lang="en-US" sz="3200" dirty="0" err="1"/>
+              <a:t>Mihailescu</a:t>
+            </a:r>
+            <a:r>
+              <a:rPr lang="en-US" sz="3200" dirty="0"/>
+              <a:t>.</a:t>
+            </a:r>
+          </a:p>
+        </p:txBody>
+      </p:sp>
+      <p:sp>
+        <p:nvSpPr>
+          <p:cNvPr id="41" name="TextBox 40">
+            <a:extLst>
+              <a:ext uri="{FF2B5EF4-FFF2-40B4-BE49-F238E27FC236}">
+                <a16:creationId xmlns:a16="http://schemas.microsoft.com/office/drawing/2014/main" xmlns="" id="{D335579D-9BA7-4FF2-BA55-7C6390B98CEF}"/>
+              </a:ext>
+            </a:extLst>
+          </p:cNvPr>
+          <p:cNvSpPr txBox="1"/>
+          <p:nvPr/>
+        </p:nvSpPr>
+        <p:spPr>
+          <a:xfrm>
+            <a:off x="565400" y="6177353"/>
+            <a:ext cx="10474113" cy="15850493"/>
+          </a:xfrm>
+          <a:prstGeom prst="rect">
+            <a:avLst/>
+          </a:prstGeom>
+          <a:noFill/>
+        </p:spPr>
+        <p:txBody>
+          <a:bodyPr wrap="square" rtlCol="0">
+            <a:spAutoFit/>
+          </a:bodyPr>
+          <a:lstStyle/>
+          <a:p>
+            <a:pPr marL="1143000" indent="-1143000">
+              <a:buFont typeface="Wingdings" charset="2"/>
+              <a:buChar char="v"/>
+            </a:pPr>
+            <a:r>
+              <a:rPr lang="en-US" sz="3200" dirty="0" smtClean="0"/>
+              <a:t>12 years of </a:t>
+            </a:r>
+            <a:r>
+              <a:rPr lang="en-US" sz="3200" dirty="0" err="1" smtClean="0"/>
+              <a:t>Moodle</a:t>
+            </a:r>
+            <a:r>
+              <a:rPr lang="en-US" sz="3200" dirty="0" smtClean="0"/>
+              <a:t> and </a:t>
+            </a:r>
+            <a:r>
+              <a:rPr lang="en-US" sz="3200" dirty="0" err="1" smtClean="0"/>
+              <a:t>WebSubmission</a:t>
+            </a:r>
+            <a:r>
+              <a:rPr lang="en-US" sz="3200" dirty="0" smtClean="0"/>
+              <a:t> data has been collected and the problem now is </a:t>
+            </a:r>
+            <a:r>
+              <a:rPr lang="en-US" sz="3200" dirty="0" err="1" smtClean="0"/>
+              <a:t>organising</a:t>
+            </a:r>
+            <a:r>
+              <a:rPr lang="en-US" sz="3200" dirty="0" smtClean="0"/>
+              <a:t> it for searching and trend analysis.</a:t>
+            </a:r>
+          </a:p>
+          <a:p>
+            <a:pPr marL="1143000" indent="-1143000">
+              <a:buFont typeface="Wingdings" charset="2"/>
+              <a:buChar char="v"/>
+            </a:pPr>
+            <a:r>
+              <a:rPr lang="en-US" sz="3200" dirty="0" err="1" smtClean="0"/>
+              <a:t>Moodle</a:t>
+            </a:r>
+            <a:r>
+              <a:rPr lang="en-US" sz="3200" dirty="0" smtClean="0"/>
+              <a:t> and </a:t>
+            </a:r>
+            <a:r>
+              <a:rPr lang="en-US" sz="3200" dirty="0" err="1" smtClean="0"/>
+              <a:t>WebSubmission</a:t>
+            </a:r>
+            <a:r>
+              <a:rPr lang="en-US" sz="3200" dirty="0" smtClean="0"/>
+              <a:t> are separate systems. What we are doing is to tie the two systems together by designing a database schema that will take into consideration and incorporate both systems.</a:t>
+            </a:r>
+          </a:p>
+          <a:p>
+            <a:pPr marL="1143000" indent="-1143000">
+              <a:buFont typeface="Wingdings" charset="2"/>
+              <a:buChar char="v"/>
+            </a:pPr>
+            <a:r>
+              <a:rPr lang="en-US" sz="3200" dirty="0" smtClean="0"/>
+              <a:t>All data is </a:t>
+            </a:r>
+            <a:r>
+              <a:rPr lang="en-US" sz="3200" dirty="0" err="1" smtClean="0"/>
+              <a:t>anonymised</a:t>
+            </a:r>
+            <a:r>
+              <a:rPr lang="en-US" sz="3200" dirty="0" smtClean="0"/>
+              <a:t> and is identified in a way that allows us to associate actions without identifying the students, which ensures the privacy.</a:t>
+            </a:r>
+          </a:p>
+          <a:p>
+            <a:pPr marL="1143000" indent="-1143000">
+              <a:buFont typeface="Wingdings" charset="2"/>
+              <a:buChar char="v"/>
+            </a:pPr>
+            <a:r>
+              <a:rPr lang="en-US" sz="3200" dirty="0" smtClean="0"/>
+              <a:t>Raw data is not logically well organized and hard to read.</a:t>
+            </a:r>
+            <a:endParaRPr lang="zh-CN" altLang="en-US" sz="3200" dirty="0" smtClean="0"/>
+          </a:p>
+          <a:p>
+            <a:pPr marL="1143000" indent="-1143000">
+              <a:buFont typeface="Wingdings" charset="2"/>
+              <a:buChar char="v"/>
+            </a:pPr>
+            <a:r>
+              <a:rPr lang="en-US" sz="3200" dirty="0" smtClean="0"/>
+              <a:t>Visualization is provided by presenting data in the form of charts, which makes the data more intuitive.</a:t>
+            </a:r>
+            <a:endParaRPr lang="zh-CN" altLang="en-US" sz="3200" dirty="0" smtClean="0"/>
+          </a:p>
+          <a:p>
+            <a:pPr marL="1143000" indent="-1143000">
+              <a:buFont typeface="Wingdings" charset="2"/>
+              <a:buChar char="v"/>
+            </a:pPr>
+            <a:r>
+              <a:rPr lang="en-US" sz="3200" dirty="0" smtClean="0"/>
+              <a:t>A lot of configuration options are provided to allow users to manipulate the data displayed in the charts and allow users to interact with the charts.</a:t>
+            </a:r>
+            <a:endParaRPr lang="zh-CN" altLang="en-US" sz="3200" dirty="0" smtClean="0"/>
+          </a:p>
+          <a:p>
+            <a:pPr marL="1143000" indent="-1143000">
+              <a:buFont typeface="Wingdings" charset="2"/>
+              <a:buChar char="v"/>
+            </a:pPr>
+            <a:r>
+              <a:rPr lang="en-US" sz="3200" dirty="0" smtClean="0"/>
+              <a:t>Analysis module is provided to allow users to explore the relationship between the amount of students‘ activities and academic performances.</a:t>
+            </a:r>
+            <a:endParaRPr lang="zh-CN" altLang="en-US" sz="3200" dirty="0" smtClean="0"/>
+          </a:p>
+          <a:p>
+            <a:pPr marL="1143000" indent="-1143000">
+              <a:buFont typeface="Wingdings" charset="2"/>
+              <a:buChar char="v"/>
+            </a:pPr>
+            <a:r>
+              <a:rPr lang="en-US" sz="3200" dirty="0" smtClean="0"/>
+              <a:t>Staffs are allowed to query the database, extract data, aggregate it, and export it.</a:t>
+            </a:r>
+          </a:p>
+          <a:p>
+            <a:pPr marL="1143000" indent="-1143000">
+              <a:buFont typeface="Wingdings" charset="2"/>
+              <a:buChar char="v"/>
+            </a:pPr>
+            <a:r>
+              <a:rPr lang="en-US" sz="3200" dirty="0" smtClean="0"/>
+              <a:t>Extraction and insertion scripts (data importer) that work with the file-based storage for the current data are provided.</a:t>
+            </a:r>
+            <a:endParaRPr lang="zh-CN" altLang="en-US" sz="3200" dirty="0" smtClean="0"/>
+          </a:p>
+          <a:p>
+            <a:pPr marL="1143000" indent="-1143000">
+              <a:buFont typeface="Arial" panose="020B0604020202020204" pitchFamily="34" charset="0"/>
+              <a:buChar char="•"/>
+            </a:pPr>
+            <a:endParaRPr lang="zh-CN" altLang="en-US" sz="3200" dirty="0" smtClean="0"/>
+          </a:p>
+          <a:p>
+            <a:pPr marL="1143000" indent="-1143000">
+              <a:buFont typeface="Arial" panose="020B0604020202020204" pitchFamily="34" charset="0"/>
+              <a:buChar char="•"/>
+            </a:pPr>
+            <a:endParaRPr lang="zh-CN" altLang="en-US" sz="3200" dirty="0" smtClean="0"/>
+          </a:p>
+          <a:p>
+            <a:pPr marL="1143000" indent="-1143000">
+              <a:buFont typeface="Arial" panose="020B0604020202020204" pitchFamily="34" charset="0"/>
+              <a:buChar char="•"/>
+            </a:pPr>
+            <a:endParaRPr lang="zh-CN" altLang="en-US" sz="3200" dirty="0" smtClean="0"/>
+          </a:p>
+          <a:p>
+            <a:pPr marL="1143000" indent="-1143000">
+              <a:buFont typeface="Arial" panose="020B0604020202020204" pitchFamily="34" charset="0"/>
+              <a:buChar char="•"/>
+            </a:pPr>
+            <a:endParaRPr lang="zh-CN" altLang="en-US" sz="3200" dirty="0" smtClean="0"/>
+          </a:p>
+          <a:p>
+            <a:pPr marL="1143000" indent="-1143000">
+              <a:buFont typeface="Arial" panose="020B0604020202020204" pitchFamily="34" charset="0"/>
+              <a:buChar char="•"/>
+            </a:pPr>
+            <a:endParaRPr lang="zh-CN" altLang="en-US" sz="3200" dirty="0" smtClean="0"/>
+          </a:p>
+          <a:p>
+            <a:pPr marL="1143000" indent="-1143000">
+              <a:buFont typeface="Arial" panose="020B0604020202020204" pitchFamily="34" charset="0"/>
+              <a:buChar char="•"/>
+            </a:pPr>
+            <a:endParaRPr lang="en-US" sz="3200" dirty="0" smtClean="0"/>
+          </a:p>
+          <a:p>
+            <a:pPr marL="1143000" indent="-1143000">
+              <a:buFont typeface="Arial" panose="020B0604020202020204" pitchFamily="34" charset="0"/>
+              <a:buChar char="•"/>
+            </a:pPr>
+            <a:endParaRPr lang="en-US" sz="3200" dirty="0"/>
+          </a:p>
+        </p:txBody>
+      </p:sp>
+      <p:sp>
+        <p:nvSpPr>
+          <p:cNvPr id="42" name="TextBox 41">
+            <a:extLst>
+              <a:ext uri="{FF2B5EF4-FFF2-40B4-BE49-F238E27FC236}">
+                <a16:creationId xmlns:a16="http://schemas.microsoft.com/office/drawing/2014/main" xmlns="" id="{D335579D-9BA7-4FF2-BA55-7C6390B98CEF}"/>
+              </a:ext>
+            </a:extLst>
+          </p:cNvPr>
+          <p:cNvSpPr txBox="1"/>
+          <p:nvPr/>
+        </p:nvSpPr>
+        <p:spPr>
+          <a:xfrm>
+            <a:off x="669476" y="21688003"/>
+            <a:ext cx="10106994" cy="7971413"/>
+          </a:xfrm>
+          <a:prstGeom prst="rect">
+            <a:avLst/>
+          </a:prstGeom>
+          <a:noFill/>
+        </p:spPr>
+        <p:txBody>
+          <a:bodyPr wrap="square" rtlCol="0">
+            <a:spAutoFit/>
+          </a:bodyPr>
+          <a:lstStyle/>
+          <a:p>
+            <a:pPr marL="1143000" indent="-1143000">
+              <a:buFont typeface="Wingdings" charset="2"/>
+              <a:buChar char="v"/>
+            </a:pPr>
+            <a:r>
+              <a:rPr lang="en-US" sz="3200" dirty="0" smtClean="0"/>
+              <a:t>Design a database schema that incorporate the two separate systems (</a:t>
+            </a:r>
+            <a:r>
+              <a:rPr lang="en-US" sz="3200" dirty="0" err="1" smtClean="0"/>
+              <a:t>Moodle</a:t>
+            </a:r>
+            <a:r>
+              <a:rPr lang="en-US" sz="3200" dirty="0" smtClean="0"/>
+              <a:t> and </a:t>
+            </a:r>
+            <a:r>
+              <a:rPr lang="en-US" sz="3200" dirty="0" err="1" smtClean="0"/>
+              <a:t>WebSubmission</a:t>
+            </a:r>
+            <a:r>
+              <a:rPr lang="en-US" sz="3200" dirty="0" smtClean="0"/>
+              <a:t>).</a:t>
+            </a:r>
+          </a:p>
+          <a:p>
+            <a:pPr marL="1143000" indent="-1143000">
+              <a:buFont typeface="Wingdings" charset="2"/>
+              <a:buChar char="v"/>
+            </a:pPr>
+            <a:r>
+              <a:rPr lang="en-US" sz="3200" dirty="0" smtClean="0"/>
+              <a:t>Link two data sources and link the users (which are </a:t>
+            </a:r>
+            <a:r>
+              <a:rPr lang="en-US" sz="3200" dirty="0" err="1" smtClean="0"/>
+              <a:t>anonymized</a:t>
+            </a:r>
+            <a:r>
+              <a:rPr lang="en-US" sz="3200" dirty="0" smtClean="0"/>
+              <a:t>) of two data sources.</a:t>
+            </a:r>
+            <a:endParaRPr lang="zh-CN" altLang="en-US" sz="3200" dirty="0" smtClean="0"/>
+          </a:p>
+          <a:p>
+            <a:pPr marL="1143000" indent="-1143000">
+              <a:buFont typeface="Wingdings" charset="2"/>
+              <a:buChar char="v"/>
+            </a:pPr>
+            <a:r>
+              <a:rPr lang="en-US" sz="3200" dirty="0" smtClean="0"/>
+              <a:t>Write extraction and insertion scripts (data importer) to import current file-based data.</a:t>
+            </a:r>
+          </a:p>
+          <a:p>
+            <a:pPr marL="1143000" indent="-1143000">
+              <a:buFont typeface="Wingdings" charset="2"/>
+              <a:buChar char="v"/>
+            </a:pPr>
+            <a:r>
+              <a:rPr lang="en-US" sz="3200" dirty="0" smtClean="0"/>
+              <a:t>Provide visualization of data by using charts and make them configurable to allow users to manipulate and interact with data.</a:t>
+            </a:r>
+            <a:endParaRPr lang="zh-CN" altLang="en-US" sz="3200" dirty="0" smtClean="0"/>
+          </a:p>
+          <a:p>
+            <a:pPr marL="1143000" indent="-1143000">
+              <a:buFont typeface="Wingdings" charset="2"/>
+              <a:buChar char="v"/>
+            </a:pPr>
+            <a:r>
+              <a:rPr lang="en-US" sz="3200" dirty="0" smtClean="0"/>
+              <a:t>Analyze the relationship between the amount of students‘ activities and academic performances.</a:t>
+            </a:r>
+            <a:endParaRPr lang="zh-CN" altLang="en-US" sz="3200" dirty="0" smtClean="0"/>
+          </a:p>
+          <a:p>
+            <a:pPr marL="1143000" indent="-1143000">
+              <a:buFont typeface="Wingdings" charset="2"/>
+              <a:buChar char="v"/>
+            </a:pPr>
+            <a:r>
+              <a:rPr lang="en-US" sz="3200" dirty="0" smtClean="0"/>
+              <a:t>Allow staffs to query the database, extract data, aggregate it, and export it.</a:t>
+            </a:r>
+            <a:endParaRPr lang="zh-CN" altLang="en-US" sz="3200" dirty="0" smtClean="0"/>
+          </a:p>
+          <a:p>
+            <a:pPr marL="1143000" indent="-1143000">
+              <a:buFont typeface="Arial" panose="020B0604020202020204" pitchFamily="34" charset="0"/>
+              <a:buChar char="•"/>
+            </a:pPr>
+            <a:endParaRPr lang="zh-CN" altLang="en-US" sz="3200" dirty="0" smtClean="0"/>
+          </a:p>
+          <a:p>
+            <a:pPr marL="1143000" indent="-1143000"/>
+            <a:endParaRPr lang="zh-CN" altLang="en-US" sz="3200" dirty="0" smtClean="0"/>
+          </a:p>
+          <a:p>
+            <a:pPr marL="1143000" indent="-1143000">
+              <a:buFont typeface="Arial" panose="020B0604020202020204" pitchFamily="34" charset="0"/>
+              <a:buChar char="•"/>
+            </a:pPr>
+            <a:endParaRPr lang="en-US" sz="3200" dirty="0"/>
+          </a:p>
+        </p:txBody>
+      </p:sp>
+      <p:pic>
+        <p:nvPicPr>
+          <p:cNvPr id="1027" name="Picture 3" descr="D:\阿大课程\projA\Ingenuity\1.jpg"/>
+          <p:cNvPicPr>
+            <a:picLocks noChangeAspect="1" noChangeArrowheads="1"/>
+          </p:cNvPicPr>
+          <p:nvPr/>
+        </p:nvPicPr>
+        <p:blipFill>
+          <a:blip r:embed="rId7"/>
+          <a:srcRect/>
+          <a:stretch>
+            <a:fillRect/>
+          </a:stretch>
+        </p:blipFill>
+        <p:spPr bwMode="auto">
+          <a:xfrm>
+            <a:off x="21259005" y="14280350"/>
+            <a:ext cx="8065140" cy="4357717"/>
+          </a:xfrm>
+          <a:prstGeom prst="rect">
+            <a:avLst/>
+          </a:prstGeom>
+          <a:noFill/>
+        </p:spPr>
+      </p:pic>
+      <p:pic>
+        <p:nvPicPr>
+          <p:cNvPr id="1029" name="Picture 5" descr="D:\阿大课程\projA\Ingenuity\3.jpg"/>
+          <p:cNvPicPr>
+            <a:picLocks noChangeAspect="1" noChangeArrowheads="1"/>
+          </p:cNvPicPr>
+          <p:nvPr/>
+        </p:nvPicPr>
+        <p:blipFill>
+          <a:blip r:embed="rId8"/>
+          <a:srcRect/>
+          <a:stretch>
+            <a:fillRect/>
+          </a:stretch>
+        </p:blipFill>
+        <p:spPr bwMode="auto">
+          <a:xfrm>
+            <a:off x="21187567" y="19209572"/>
+            <a:ext cx="8239126" cy="4357718"/>
+          </a:xfrm>
+          <a:prstGeom prst="rect">
+            <a:avLst/>
+          </a:prstGeom>
+          <a:noFill/>
+        </p:spPr>
+      </p:pic>
+      <p:pic>
+        <p:nvPicPr>
+          <p:cNvPr id="1030" name="Picture 6" descr="D:\阿大课程\projA\Ingenuity\4.jpg"/>
+          <p:cNvPicPr>
+            <a:picLocks noChangeAspect="1" noChangeArrowheads="1"/>
+          </p:cNvPicPr>
+          <p:nvPr/>
+        </p:nvPicPr>
+        <p:blipFill>
+          <a:blip r:embed="rId9"/>
+          <a:srcRect/>
+          <a:stretch>
+            <a:fillRect/>
+          </a:stretch>
+        </p:blipFill>
+        <p:spPr bwMode="auto">
+          <a:xfrm>
+            <a:off x="12972197" y="25000587"/>
+            <a:ext cx="6786610" cy="3710239"/>
+          </a:xfrm>
+          <a:prstGeom prst="rect">
+            <a:avLst/>
+          </a:prstGeom>
+          <a:noFill/>
+        </p:spPr>
+      </p:pic>
+      <p:pic>
+        <p:nvPicPr>
+          <p:cNvPr id="1033" name="Picture 9" descr="D:\阿大课程\projA\Ingenuity\7.jpg"/>
+          <p:cNvPicPr>
+            <a:picLocks noChangeAspect="1" noChangeArrowheads="1"/>
+          </p:cNvPicPr>
+          <p:nvPr/>
+        </p:nvPicPr>
+        <p:blipFill>
+          <a:blip r:embed="rId10"/>
+          <a:srcRect/>
+          <a:stretch>
+            <a:fillRect/>
+          </a:stretch>
+        </p:blipFill>
+        <p:spPr bwMode="auto">
+          <a:xfrm>
+            <a:off x="21313924" y="24210232"/>
+            <a:ext cx="7588947" cy="4509306"/>
+          </a:xfrm>
+          <a:prstGeom prst="rect">
+            <a:avLst/>
+          </a:prstGeom>
+          <a:noFill/>
+        </p:spPr>
+      </p:pic>
+      <p:sp>
+        <p:nvSpPr>
+          <p:cNvPr id="55" name="TextBox 54">
+            <a:extLst>
+              <a:ext uri="{FF2B5EF4-FFF2-40B4-BE49-F238E27FC236}">
+                <a16:creationId xmlns:a16="http://schemas.microsoft.com/office/drawing/2014/main" xmlns="" id="{D335579D-9BA7-4FF2-BA55-7C6390B98CEF}"/>
+              </a:ext>
+            </a:extLst>
+          </p:cNvPr>
+          <p:cNvSpPr txBox="1"/>
+          <p:nvPr/>
+        </p:nvSpPr>
+        <p:spPr>
+          <a:xfrm>
+            <a:off x="11900627" y="14066036"/>
+            <a:ext cx="8572560" cy="11910953"/>
+          </a:xfrm>
+          <a:prstGeom prst="rect">
+            <a:avLst/>
+          </a:prstGeom>
+          <a:noFill/>
+        </p:spPr>
+        <p:txBody>
+          <a:bodyPr wrap="square" rtlCol="0">
+            <a:spAutoFit/>
+          </a:bodyPr>
+          <a:lstStyle/>
+          <a:p>
+            <a:pPr marL="1143000" indent="-1143000">
+              <a:buFont typeface="Wingdings" charset="2"/>
+              <a:buChar char="v"/>
+            </a:pPr>
+            <a:r>
+              <a:rPr lang="en-US" sz="3200" dirty="0" smtClean="0"/>
+              <a:t>Provide visualization by using charts, which make the data intuitive and easy to read.</a:t>
+            </a:r>
+          </a:p>
+          <a:p>
+            <a:pPr marL="1143000" indent="-1143000">
+              <a:buFont typeface="Wingdings" charset="2"/>
+              <a:buChar char="v"/>
+            </a:pPr>
+            <a:r>
+              <a:rPr lang="en-US" sz="3200" dirty="0" smtClean="0"/>
+              <a:t>Provide lots of configuration options and related functions (set period, change presentation order, threshold function, export data in CSV format, event name/ event context auto-complete), which allow user to further explore and manipulate data.</a:t>
+            </a:r>
+            <a:endParaRPr lang="zh-CN" altLang="en-US" sz="3200" dirty="0" smtClean="0"/>
+          </a:p>
+          <a:p>
+            <a:pPr marL="1143000" indent="-1143000">
+              <a:buFont typeface="Wingdings" charset="2"/>
+              <a:buChar char="v"/>
+            </a:pPr>
+            <a:r>
+              <a:rPr lang="en-US" sz="3200" dirty="0" smtClean="0"/>
+              <a:t>Allow user to choose course, year, semester, assignment.</a:t>
+            </a:r>
+            <a:endParaRPr lang="zh-CN" altLang="en-US" sz="3200" dirty="0" smtClean="0"/>
+          </a:p>
+          <a:p>
+            <a:pPr marL="1143000" indent="-1143000">
+              <a:buFont typeface="Wingdings" charset="2"/>
+              <a:buChar char="v"/>
+            </a:pPr>
+            <a:r>
+              <a:rPr lang="en-US" sz="3200" dirty="0" smtClean="0"/>
+              <a:t>Provide data of individual student as well as the whole class.</a:t>
+            </a:r>
+            <a:endParaRPr lang="zh-CN" altLang="en-US" sz="3200" dirty="0" smtClean="0"/>
+          </a:p>
+          <a:p>
+            <a:pPr marL="1143000" indent="-1143000">
+              <a:buFont typeface="Wingdings" charset="2"/>
+              <a:buChar char="v"/>
+            </a:pPr>
+            <a:r>
+              <a:rPr lang="en-US" sz="3200" dirty="0" smtClean="0"/>
+              <a:t>Provide the amount of different events in a given period as well as the amount of specific event of each day.</a:t>
+            </a:r>
+            <a:endParaRPr lang="zh-CN" altLang="en-US" sz="3200" dirty="0" smtClean="0"/>
+          </a:p>
+          <a:p>
+            <a:pPr marL="1143000" indent="-1143000">
+              <a:buFont typeface="Wingdings" charset="2"/>
+              <a:buChar char="v"/>
+            </a:pPr>
+            <a:r>
+              <a:rPr lang="en-US" sz="3200" dirty="0" smtClean="0"/>
+              <a:t>Link two data sources and link the users of two data sources.</a:t>
+            </a:r>
+            <a:endParaRPr lang="zh-CN" altLang="en-US" sz="3200" dirty="0" smtClean="0"/>
+          </a:p>
+          <a:p>
+            <a:pPr marL="1143000" indent="-1143000">
+              <a:buFont typeface="Wingdings" charset="2"/>
+              <a:buChar char="v"/>
+            </a:pPr>
+            <a:r>
+              <a:rPr lang="en-US" sz="3200" dirty="0" smtClean="0"/>
+              <a:t>Provide cross data analysis: allow user to explore the relationship between the amount of students' activities and academic performances.</a:t>
+            </a:r>
+            <a:endParaRPr lang="zh-CN" altLang="en-US" sz="3200" dirty="0" smtClean="0"/>
+          </a:p>
+          <a:p>
+            <a:pPr marL="1143000" indent="-1143000">
+              <a:buFont typeface="Arial" panose="020B0604020202020204" pitchFamily="34" charset="0"/>
+              <a:buChar char="•"/>
+            </a:pPr>
+            <a:endParaRPr lang="zh-CN" altLang="en-US" sz="3200" dirty="0" smtClean="0"/>
+          </a:p>
+          <a:p>
+            <a:pPr marL="1143000" indent="-1143000">
+              <a:buFont typeface="Arial" panose="020B0604020202020204" pitchFamily="34" charset="0"/>
+              <a:buChar char="•"/>
+            </a:pPr>
+            <a:endParaRPr lang="en-US" sz="3200" dirty="0"/>
+          </a:p>
+        </p:txBody>
+      </p:sp>
+      <p:pic>
+        <p:nvPicPr>
+          <p:cNvPr id="1034" name="Picture 10" descr="D:\阿大课程\projA\Ingenuity\Architecture.jpg"/>
+          <p:cNvPicPr>
+            <a:picLocks noChangeAspect="1" noChangeArrowheads="1"/>
+          </p:cNvPicPr>
+          <p:nvPr/>
+        </p:nvPicPr>
+        <p:blipFill>
+          <a:blip r:embed="rId11"/>
+          <a:srcRect/>
+          <a:stretch>
+            <a:fillRect/>
+          </a:stretch>
+        </p:blipFill>
+        <p:spPr bwMode="auto">
+          <a:xfrm>
+            <a:off x="25902475" y="5493476"/>
+            <a:ext cx="2896688" cy="6867507"/>
+          </a:xfrm>
+          <a:prstGeom prst="rect">
+            <a:avLst/>
+          </a:prstGeom>
+          <a:noFill/>
+        </p:spPr>
+      </p:pic>
     </p:spTree>
     <p:extLst>
       <p:ext uri="{BB962C8B-B14F-4D97-AF65-F5344CB8AC3E}">

</xml_diff>

<commit_message>
Modify some texts of the poster in the correct grammar
</commit_message>
<xml_diff>
--- a/Poster/Stu_data Poster.pptx
+++ b/Poster/Stu_data Poster.pptx
@@ -230,7 +230,7 @@
             <a:fld id="{59D7332B-1442-4F8C-A160-0D5EB57A24C0}" type="datetimeFigureOut">
               <a:rPr lang="en-AU" smtClean="0"/>
               <a:pPr/>
-              <a:t>10/10/17</a:t>
+              <a:t>10/10/2017</a:t>
             </a:fld>
             <a:endParaRPr lang="en-AU"/>
           </a:p>
@@ -397,7 +397,7 @@
             <a:fld id="{33744820-F59C-490B-A624-3CEFDFE2581B}" type="datetimeFigureOut">
               <a:rPr lang="en-AU" smtClean="0"/>
               <a:pPr/>
-              <a:t>10/10/17</a:t>
+              <a:t>10/10/2017</a:t>
             </a:fld>
             <a:endParaRPr lang="en-AU"/>
           </a:p>
@@ -4654,28 +4654,12 @@
           <a:p>
             <a:pPr algn="ctr"/>
             <a:r>
-              <a:rPr lang="en-US" altLang="zh-CN" sz="3200" dirty="0" smtClean="0">
-                <a:solidFill>
-                  <a:schemeClr val="bg1"/>
-                </a:solidFill>
-              </a:rPr>
-              <a:t>Zeyu </a:t>
-            </a:r>
-            <a:r>
               <a:rPr lang="en-US" altLang="zh-CN" sz="3200" dirty="0">
                 <a:solidFill>
                   <a:schemeClr val="bg1"/>
                 </a:solidFill>
               </a:rPr>
-              <a:t>Lin, Minh Tam </a:t>
-            </a:r>
-            <a:r>
-              <a:rPr lang="en-US" altLang="zh-CN" sz="3200" dirty="0" smtClean="0">
-                <a:solidFill>
-                  <a:schemeClr val="bg1"/>
-                </a:solidFill>
-              </a:rPr>
-              <a:t>Phan, </a:t>
+              <a:t>Zeyu Lin, Minh Tam Phan, </a:t>
             </a:r>
             <a:r>
               <a:rPr lang="en-US" altLang="zh-CN" sz="3200" dirty="0" err="1">
@@ -4691,18 +4675,10 @@
                   <a:schemeClr val="bg1"/>
                 </a:solidFill>
               </a:rPr>
-              <a:t> </a:t>
-            </a:r>
-            <a:r>
-              <a:rPr lang="en-US" altLang="zh-CN" sz="3200" dirty="0" smtClean="0">
-                <a:solidFill>
-                  <a:schemeClr val="bg1"/>
-                </a:solidFill>
-              </a:rPr>
-              <a:t>Fu (zeyu.lin, </a:t>
-            </a:r>
-            <a:r>
-              <a:rPr lang="en-US" altLang="zh-CN" sz="3200" dirty="0" err="1" smtClean="0">
+              <a:t> Fu (zeyu.lin, </a:t>
+            </a:r>
+            <a:r>
+              <a:rPr lang="en-US" altLang="zh-CN" sz="3200" dirty="0" err="1">
                 <a:solidFill>
                   <a:schemeClr val="bg1"/>
                 </a:solidFill>
@@ -4710,7 +4686,7 @@
               <a:t>minhtam.phan</a:t>
             </a:r>
             <a:r>
-              <a:rPr lang="en-US" altLang="zh-CN" sz="3200" dirty="0" smtClean="0">
+              <a:rPr lang="en-US" altLang="zh-CN" sz="3200" dirty="0">
                 <a:solidFill>
                   <a:schemeClr val="bg1"/>
                 </a:solidFill>
@@ -4718,7 +4694,7 @@
               <a:t>, </a:t>
             </a:r>
             <a:r>
-              <a:rPr lang="en-US" altLang="zh-CN" sz="3200" dirty="0" err="1" smtClean="0">
+              <a:rPr lang="en-US" altLang="zh-CN" sz="3200" dirty="0" err="1">
                 <a:solidFill>
                   <a:schemeClr val="bg1"/>
                 </a:solidFill>
@@ -4726,7 +4702,7 @@
               <a:t>zeqi.fu</a:t>
             </a:r>
             <a:r>
-              <a:rPr lang="en-US" altLang="zh-CN" sz="3200" dirty="0" smtClean="0">
+              <a:rPr lang="en-US" altLang="zh-CN" sz="3200" dirty="0">
                 <a:solidFill>
                   <a:schemeClr val="bg1"/>
                 </a:solidFill>
@@ -4734,7 +4710,7 @@
               <a:t>)</a:t>
             </a:r>
             <a:r>
-              <a:rPr lang="zh-CN" altLang="en-US" sz="3200" dirty="0" smtClean="0">
+              <a:rPr lang="zh-CN" altLang="en-US" sz="3200" dirty="0">
                 <a:solidFill>
                   <a:schemeClr val="bg1"/>
                 </a:solidFill>
@@ -4742,7 +4718,7 @@
               <a:t> </a:t>
             </a:r>
             <a:r>
-              <a:rPr lang="en-US" altLang="zh-CN" sz="3200" dirty="0" smtClean="0">
+              <a:rPr lang="en-US" altLang="zh-CN" sz="3200" dirty="0">
                 <a:solidFill>
                   <a:schemeClr val="bg1"/>
                 </a:solidFill>
@@ -4968,7 +4944,7 @@
           <p:cNvPr id="4" name="TextBox 3">
             <a:extLst>
               <a:ext uri="{FF2B5EF4-FFF2-40B4-BE49-F238E27FC236}">
-                <a16:creationId xmlns:a16="http://schemas.microsoft.com/office/drawing/2014/main" xmlns="" id="{D335579D-9BA7-4FF2-BA55-7C6390B98CEF}"/>
+                <a16:creationId xmlns:a16="http://schemas.microsoft.com/office/drawing/2014/main" id="{D335579D-9BA7-4FF2-BA55-7C6390B98CEF}"/>
               </a:ext>
             </a:extLst>
           </p:cNvPr>
@@ -4997,29 +4973,24 @@
             </a:pPr>
             <a:r>
               <a:rPr lang="en-US" sz="3200" dirty="0"/>
-              <a:t>The database schema is built based on two </a:t>
-            </a:r>
-            <a:r>
-              <a:rPr lang="en-US" sz="3200" dirty="0" smtClean="0"/>
-              <a:t>data sources (</a:t>
-            </a:r>
-            <a:r>
-              <a:rPr lang="en-US" sz="3200" dirty="0" err="1" smtClean="0"/>
+              <a:t>The database schema is built based on two data sources (</a:t>
+            </a:r>
+            <a:r>
+              <a:rPr lang="en-US" sz="3200" dirty="0" err="1"/>
               <a:t>Moodle</a:t>
             </a:r>
             <a:r>
-              <a:rPr lang="en-US" sz="3200" dirty="0" smtClean="0"/>
+              <a:rPr lang="en-US" sz="3200" dirty="0"/>
               <a:t> Forum and </a:t>
             </a:r>
             <a:r>
-              <a:rPr lang="en-US" sz="3200" dirty="0" err="1" smtClean="0"/>
+              <a:rPr lang="en-US" sz="3200" dirty="0" err="1"/>
               <a:t>WebSubmission</a:t>
             </a:r>
             <a:r>
-              <a:rPr lang="en-US" sz="3200" dirty="0" smtClean="0"/>
+              <a:rPr lang="en-US" sz="3200" dirty="0"/>
               <a:t>).</a:t>
             </a:r>
-            <a:endParaRPr lang="en-US" sz="3200" dirty="0"/>
           </a:p>
           <a:p>
             <a:pPr marL="1143000" indent="-1143000">
@@ -5038,11 +5009,7 @@
             </a:pPr>
             <a:r>
               <a:rPr lang="en-US" sz="3200" dirty="0"/>
-              <a:t>The website displays and analyzes data by charts and tables</a:t>
-            </a:r>
-            <a:r>
-              <a:rPr lang="en-US" sz="3200" dirty="0" smtClean="0"/>
-              <a:t>.</a:t>
+              <a:t>The website displays and analyzes data by charts and tables.</a:t>
             </a:r>
           </a:p>
           <a:p>
@@ -5051,10 +5018,9 @@
               <a:buChar char="v"/>
             </a:pPr>
             <a:r>
-              <a:rPr lang="en-US" sz="3200" dirty="0" smtClean="0"/>
+              <a:rPr lang="en-US" sz="3200" dirty="0"/>
               <a:t>The website is designed in a decoupled way. It adopts two-tier model, which separates the front-end and the back-end.</a:t>
             </a:r>
-            <a:endParaRPr lang="en-US" sz="3200" dirty="0"/>
           </a:p>
         </p:txBody>
       </p:sp>
@@ -5063,7 +5029,7 @@
           <p:cNvPr id="31" name="Picture 30">
             <a:extLst>
               <a:ext uri="{FF2B5EF4-FFF2-40B4-BE49-F238E27FC236}">
-                <a16:creationId xmlns:a16="http://schemas.microsoft.com/office/drawing/2014/main" xmlns="" id="{49FE897D-F032-49C9-95DD-CCF761D9E0B8}"/>
+                <a16:creationId xmlns:a16="http://schemas.microsoft.com/office/drawing/2014/main" id="{49FE897D-F032-49C9-95DD-CCF761D9E0B8}"/>
               </a:ext>
             </a:extLst>
           </p:cNvPr>
@@ -5099,7 +5065,7 @@
           <p:cNvPr id="33" name="Picture 32">
             <a:extLst>
               <a:ext uri="{FF2B5EF4-FFF2-40B4-BE49-F238E27FC236}">
-                <a16:creationId xmlns:a16="http://schemas.microsoft.com/office/drawing/2014/main" xmlns="" id="{6AD46D6C-29E3-4501-AF10-81B444FA599A}"/>
+                <a16:creationId xmlns:a16="http://schemas.microsoft.com/office/drawing/2014/main" id="{6AD46D6C-29E3-4501-AF10-81B444FA599A}"/>
               </a:ext>
             </a:extLst>
           </p:cNvPr>
@@ -5135,7 +5101,7 @@
           <p:cNvPr id="35" name="Picture 34">
             <a:extLst>
               <a:ext uri="{FF2B5EF4-FFF2-40B4-BE49-F238E27FC236}">
-                <a16:creationId xmlns:a16="http://schemas.microsoft.com/office/drawing/2014/main" xmlns="" id="{84A8944C-C2C3-4E5B-AA53-82A178642EA6}"/>
+                <a16:creationId xmlns:a16="http://schemas.microsoft.com/office/drawing/2014/main" id="{84A8944C-C2C3-4E5B-AA53-82A178642EA6}"/>
               </a:ext>
             </a:extLst>
           </p:cNvPr>
@@ -5171,7 +5137,7 @@
           <p:cNvPr id="37" name="Straight Arrow Connector 36">
             <a:extLst>
               <a:ext uri="{FF2B5EF4-FFF2-40B4-BE49-F238E27FC236}">
-                <a16:creationId xmlns:a16="http://schemas.microsoft.com/office/drawing/2014/main" xmlns="" id="{6A14BA03-E8AE-48DE-B2C7-6A9F54D0C8F4}"/>
+                <a16:creationId xmlns:a16="http://schemas.microsoft.com/office/drawing/2014/main" id="{6A14BA03-E8AE-48DE-B2C7-6A9F54D0C8F4}"/>
               </a:ext>
             </a:extLst>
           </p:cNvPr>
@@ -5213,7 +5179,7 @@
           <p:cNvPr id="39" name="Straight Arrow Connector 38">
             <a:extLst>
               <a:ext uri="{FF2B5EF4-FFF2-40B4-BE49-F238E27FC236}">
-                <a16:creationId xmlns:a16="http://schemas.microsoft.com/office/drawing/2014/main" xmlns="" id="{3EFA15DA-D2B0-42C3-B2EC-A14C96D8DCC1}"/>
+                <a16:creationId xmlns:a16="http://schemas.microsoft.com/office/drawing/2014/main" id="{3EFA15DA-D2B0-42C3-B2EC-A14C96D8DCC1}"/>
               </a:ext>
             </a:extLst>
           </p:cNvPr>
@@ -5254,7 +5220,7 @@
           <p:cNvPr id="49" name="TextBox 48">
             <a:extLst>
               <a:ext uri="{FF2B5EF4-FFF2-40B4-BE49-F238E27FC236}">
-                <a16:creationId xmlns:a16="http://schemas.microsoft.com/office/drawing/2014/main" xmlns="" id="{4C7268DB-F52B-4228-A14F-253306C33498}"/>
+                <a16:creationId xmlns:a16="http://schemas.microsoft.com/office/drawing/2014/main" id="{4C7268DB-F52B-4228-A14F-253306C33498}"/>
               </a:ext>
             </a:extLst>
           </p:cNvPr>
@@ -5293,7 +5259,7 @@
             </a:pPr>
             <a:r>
               <a:rPr lang="en-US" sz="3200" dirty="0"/>
-              <a:t>A combined database of Moodle Forum and </a:t>
+              <a:t>This is a combined database of Moodle Forum and </a:t>
             </a:r>
             <a:r>
               <a:rPr lang="en-US" sz="3200" dirty="0" err="1"/>
@@ -5311,7 +5277,7 @@
             </a:pPr>
             <a:r>
               <a:rPr lang="en-US" sz="3200" dirty="0"/>
-              <a:t>Can be flexibly applied for newly added data sources such as Canvas.</a:t>
+              <a:t>This database can be flexibly applied for newly added data sources such as Canvas.</a:t>
             </a:r>
           </a:p>
           <a:p>
@@ -5331,7 +5297,7 @@
           <p:cNvPr id="51" name="Picture 50">
             <a:extLst>
               <a:ext uri="{FF2B5EF4-FFF2-40B4-BE49-F238E27FC236}">
-                <a16:creationId xmlns:a16="http://schemas.microsoft.com/office/drawing/2014/main" xmlns="" id="{0C5B7859-114B-4E51-B787-275E022F7536}"/>
+                <a16:creationId xmlns:a16="http://schemas.microsoft.com/office/drawing/2014/main" id="{0C5B7859-114B-4E51-B787-275E022F7536}"/>
               </a:ext>
             </a:extLst>
           </p:cNvPr>
@@ -5367,7 +5333,7 @@
           <p:cNvPr id="53" name="TextBox 52">
             <a:extLst>
               <a:ext uri="{FF2B5EF4-FFF2-40B4-BE49-F238E27FC236}">
-                <a16:creationId xmlns:a16="http://schemas.microsoft.com/office/drawing/2014/main" xmlns="" id="{ACE6854B-2C28-45DF-90F8-367CA667E897}"/>
+                <a16:creationId xmlns:a16="http://schemas.microsoft.com/office/drawing/2014/main" id="{ACE6854B-2C28-45DF-90F8-367CA667E897}"/>
               </a:ext>
             </a:extLst>
           </p:cNvPr>
@@ -5406,11 +5372,7 @@
             </a:pPr>
             <a:r>
               <a:rPr lang="en-US" sz="3200" dirty="0"/>
-              <a:t>Having tools to import data from external files</a:t>
-            </a:r>
-            <a:r>
-              <a:rPr lang="en-US" sz="3200" dirty="0" smtClean="0"/>
-              <a:t>.</a:t>
+              <a:t>Having tools to import data from external files.</a:t>
             </a:r>
           </a:p>
           <a:p>
@@ -5419,7 +5381,7 @@
               <a:buChar char="v"/>
             </a:pPr>
             <a:r>
-              <a:rPr lang="en-US" sz="3200" dirty="0" smtClean="0"/>
+              <a:rPr lang="en-US" sz="3200" dirty="0"/>
               <a:t>Visualization makes the data intuitive.</a:t>
             </a:r>
           </a:p>
@@ -5429,7 +5391,7 @@
               <a:buChar char="v"/>
             </a:pPr>
             <a:r>
-              <a:rPr lang="en-US" sz="3200" dirty="0" smtClean="0"/>
+              <a:rPr lang="en-US" sz="3200" dirty="0"/>
               <a:t>Charts are configurable, which allows user to manipulate and further explore data.</a:t>
             </a:r>
           </a:p>
@@ -5439,10 +5401,9 @@
               <a:buChar char="v"/>
             </a:pPr>
             <a:r>
-              <a:rPr lang="en-US" sz="3200" dirty="0" smtClean="0"/>
+              <a:rPr lang="en-US" sz="3200" dirty="0"/>
               <a:t>Provide analysis across two data sources. Link two data sources and link the users of two data sources without identifying their names.</a:t>
             </a:r>
-            <a:endParaRPr lang="en-US" sz="3200" dirty="0"/>
           </a:p>
           <a:p>
             <a:pPr marL="1143000" indent="-1143000">
@@ -5461,7 +5422,7 @@
           <p:cNvPr id="54" name="TextBox 53">
             <a:extLst>
               <a:ext uri="{FF2B5EF4-FFF2-40B4-BE49-F238E27FC236}">
-                <a16:creationId xmlns:a16="http://schemas.microsoft.com/office/drawing/2014/main" xmlns="" id="{029BBC3E-E42A-4C5E-920A-A9E22A559A8D}"/>
+                <a16:creationId xmlns:a16="http://schemas.microsoft.com/office/drawing/2014/main" id="{029BBC3E-E42A-4C5E-920A-A9E22A559A8D}"/>
               </a:ext>
             </a:extLst>
           </p:cNvPr>
@@ -5490,11 +5451,7 @@
             </a:pPr>
             <a:r>
               <a:rPr lang="en-US" sz="3200" dirty="0"/>
-              <a:t>Modify the schema to work with new </a:t>
-            </a:r>
-            <a:r>
-              <a:rPr lang="en-US" sz="3200" dirty="0" smtClean="0"/>
-              <a:t>data source (Canvas).</a:t>
+              <a:t>Modify the schema to work with new data source (Canvas).</a:t>
             </a:r>
           </a:p>
           <a:p>
@@ -5503,7 +5460,7 @@
               <a:buChar char="v"/>
             </a:pPr>
             <a:r>
-              <a:rPr lang="en-US" sz="3200" dirty="0" smtClean="0"/>
+              <a:rPr lang="en-US" sz="3200" dirty="0"/>
               <a:t>Add new data sources (e.g. student GPA) for further cross data analysis.</a:t>
             </a:r>
           </a:p>
@@ -5513,7 +5470,7 @@
               <a:buChar char="v"/>
             </a:pPr>
             <a:r>
-              <a:rPr lang="en-US" sz="3200" dirty="0" smtClean="0"/>
+              <a:rPr lang="en-US" sz="3200" dirty="0"/>
               <a:t>Provide charts (across semesters) of the same course for trend analysis and comparison.</a:t>
             </a:r>
           </a:p>
@@ -5531,7 +5488,7 @@
           <p:cNvPr id="52" name="Picture 51">
             <a:extLst>
               <a:ext uri="{FF2B5EF4-FFF2-40B4-BE49-F238E27FC236}">
-                <a16:creationId xmlns:a16="http://schemas.microsoft.com/office/drawing/2014/main" xmlns="" id="{C8887F1F-1EC5-412B-9D53-658DE6D27ADB}"/>
+                <a16:creationId xmlns:a16="http://schemas.microsoft.com/office/drawing/2014/main" id="{C8887F1F-1EC5-412B-9D53-658DE6D27ADB}"/>
               </a:ext>
             </a:extLst>
           </p:cNvPr>
@@ -5561,7 +5518,7 @@
           <p:cNvPr id="58" name="TextBox 57">
             <a:extLst>
               <a:ext uri="{FF2B5EF4-FFF2-40B4-BE49-F238E27FC236}">
-                <a16:creationId xmlns:a16="http://schemas.microsoft.com/office/drawing/2014/main" xmlns="" id="{3B8CF5F7-7340-4E24-8644-D8C68E8EAD91}"/>
+                <a16:creationId xmlns:a16="http://schemas.microsoft.com/office/drawing/2014/main" id="{3B8CF5F7-7340-4E24-8644-D8C68E8EAD91}"/>
               </a:ext>
             </a:extLst>
           </p:cNvPr>
@@ -5612,7 +5569,7 @@
           <p:cNvPr id="41" name="TextBox 40">
             <a:extLst>
               <a:ext uri="{FF2B5EF4-FFF2-40B4-BE49-F238E27FC236}">
-                <a16:creationId xmlns:a16="http://schemas.microsoft.com/office/drawing/2014/main" xmlns="" id="{D335579D-9BA7-4FF2-BA55-7C6390B98CEF}"/>
+                <a16:creationId xmlns:a16="http://schemas.microsoft.com/office/drawing/2014/main" id="{D335579D-9BA7-4FF2-BA55-7C6390B98CEF}"/>
               </a:ext>
             </a:extLst>
           </p:cNvPr>
@@ -5640,31 +5597,31 @@
               <a:buChar char="v"/>
             </a:pPr>
             <a:r>
-              <a:rPr lang="en-US" sz="3200" dirty="0" smtClean="0"/>
+              <a:rPr lang="en-US" sz="3200" dirty="0"/>
               <a:t>12 years of </a:t>
             </a:r>
             <a:r>
-              <a:rPr lang="en-US" sz="3200" dirty="0" err="1" smtClean="0"/>
+              <a:rPr lang="en-US" sz="3200" dirty="0" err="1"/>
               <a:t>Moodle</a:t>
             </a:r>
             <a:r>
-              <a:rPr lang="en-US" sz="3200" dirty="0" smtClean="0"/>
+              <a:rPr lang="en-US" sz="3200" dirty="0"/>
               <a:t> and </a:t>
             </a:r>
             <a:r>
-              <a:rPr lang="en-US" sz="3200" dirty="0" err="1" smtClean="0"/>
+              <a:rPr lang="en-US" sz="3200" dirty="0" err="1"/>
               <a:t>WebSubmission</a:t>
             </a:r>
             <a:r>
-              <a:rPr lang="en-US" sz="3200" dirty="0" smtClean="0"/>
+              <a:rPr lang="en-US" sz="3200" dirty="0"/>
               <a:t> data has been collected and the problem now is </a:t>
             </a:r>
             <a:r>
-              <a:rPr lang="en-US" sz="3200" dirty="0" err="1" smtClean="0"/>
+              <a:rPr lang="en-US" sz="3200" dirty="0" err="1"/>
               <a:t>organising</a:t>
             </a:r>
             <a:r>
-              <a:rPr lang="en-US" sz="3200" dirty="0" smtClean="0"/>
+              <a:rPr lang="en-US" sz="3200" dirty="0"/>
               <a:t> it for searching and trend analysis.</a:t>
             </a:r>
           </a:p>
@@ -5674,19 +5631,19 @@
               <a:buChar char="v"/>
             </a:pPr>
             <a:r>
-              <a:rPr lang="en-US" sz="3200" dirty="0" err="1" smtClean="0"/>
+              <a:rPr lang="en-US" sz="3200" dirty="0" err="1"/>
               <a:t>Moodle</a:t>
             </a:r>
             <a:r>
-              <a:rPr lang="en-US" sz="3200" dirty="0" smtClean="0"/>
+              <a:rPr lang="en-US" sz="3200" dirty="0"/>
               <a:t> and </a:t>
             </a:r>
             <a:r>
-              <a:rPr lang="en-US" sz="3200" dirty="0" err="1" smtClean="0"/>
+              <a:rPr lang="en-US" sz="3200" dirty="0" err="1"/>
               <a:t>WebSubmission</a:t>
             </a:r>
             <a:r>
-              <a:rPr lang="en-US" sz="3200" dirty="0" smtClean="0"/>
+              <a:rPr lang="en-US" sz="3200" dirty="0"/>
               <a:t> are separate systems. What we are doing is to tie the two systems together by designing a database schema that will take into consideration and incorporate both systems.</a:t>
             </a:r>
           </a:p>
@@ -5696,15 +5653,15 @@
               <a:buChar char="v"/>
             </a:pPr>
             <a:r>
-              <a:rPr lang="en-US" sz="3200" dirty="0" smtClean="0"/>
+              <a:rPr lang="en-US" sz="3200" dirty="0"/>
               <a:t>All data is </a:t>
             </a:r>
             <a:r>
-              <a:rPr lang="en-US" sz="3200" dirty="0" err="1" smtClean="0"/>
+              <a:rPr lang="en-US" sz="3200" dirty="0" err="1"/>
               <a:t>anonymised</a:t>
             </a:r>
             <a:r>
-              <a:rPr lang="en-US" sz="3200" dirty="0" smtClean="0"/>
+              <a:rPr lang="en-US" sz="3200" dirty="0"/>
               <a:t> and is identified in a way that allows us to associate actions without identifying the students, which ensures the privacy.</a:t>
             </a:r>
           </a:p>
@@ -5714,10 +5671,10 @@
               <a:buChar char="v"/>
             </a:pPr>
             <a:r>
-              <a:rPr lang="en-US" sz="3200" dirty="0" smtClean="0"/>
+              <a:rPr lang="en-US" sz="3200" dirty="0"/>
               <a:t>Raw data is not logically well organized and hard to read.</a:t>
             </a:r>
-            <a:endParaRPr lang="zh-CN" altLang="en-US" sz="3200" dirty="0" smtClean="0"/>
+            <a:endParaRPr lang="zh-CN" altLang="en-US" sz="3200" dirty="0"/>
           </a:p>
           <a:p>
             <a:pPr marL="1143000" indent="-1143000">
@@ -5725,10 +5682,10 @@
               <a:buChar char="v"/>
             </a:pPr>
             <a:r>
-              <a:rPr lang="en-US" sz="3200" dirty="0" smtClean="0"/>
+              <a:rPr lang="en-US" sz="3200" dirty="0"/>
               <a:t>Visualization is provided by presenting data in the form of charts, which makes the data more intuitive.</a:t>
             </a:r>
-            <a:endParaRPr lang="zh-CN" altLang="en-US" sz="3200" dirty="0" smtClean="0"/>
+            <a:endParaRPr lang="zh-CN" altLang="en-US" sz="3200" dirty="0"/>
           </a:p>
           <a:p>
             <a:pPr marL="1143000" indent="-1143000">
@@ -5736,10 +5693,10 @@
               <a:buChar char="v"/>
             </a:pPr>
             <a:r>
-              <a:rPr lang="en-US" sz="3200" dirty="0" smtClean="0"/>
+              <a:rPr lang="en-US" sz="3200" dirty="0"/>
               <a:t>A lot of configuration options are provided to allow users to manipulate the data displayed in the charts and allow users to interact with the charts.</a:t>
             </a:r>
-            <a:endParaRPr lang="zh-CN" altLang="en-US" sz="3200" dirty="0" smtClean="0"/>
+            <a:endParaRPr lang="zh-CN" altLang="en-US" sz="3200" dirty="0"/>
           </a:p>
           <a:p>
             <a:pPr marL="1143000" indent="-1143000">
@@ -5747,10 +5704,10 @@
               <a:buChar char="v"/>
             </a:pPr>
             <a:r>
-              <a:rPr lang="en-US" sz="3200" dirty="0" smtClean="0"/>
+              <a:rPr lang="en-US" sz="3200" dirty="0"/>
               <a:t>Analysis module is provided to allow users to explore the relationship between the amount of students‘ activities and academic performances.</a:t>
             </a:r>
-            <a:endParaRPr lang="zh-CN" altLang="en-US" sz="3200" dirty="0" smtClean="0"/>
+            <a:endParaRPr lang="zh-CN" altLang="en-US" sz="3200" dirty="0"/>
           </a:p>
           <a:p>
             <a:pPr marL="1143000" indent="-1143000">
@@ -5758,7 +5715,7 @@
               <a:buChar char="v"/>
             </a:pPr>
             <a:r>
-              <a:rPr lang="en-US" sz="3200" dirty="0" smtClean="0"/>
+              <a:rPr lang="en-US" sz="3200" dirty="0"/>
               <a:t>Staffs are allowed to query the database, extract data, aggregate it, and export it.</a:t>
             </a:r>
           </a:p>
@@ -5768,52 +5725,52 @@
               <a:buChar char="v"/>
             </a:pPr>
             <a:r>
-              <a:rPr lang="en-US" sz="3200" dirty="0" smtClean="0"/>
+              <a:rPr lang="en-US" sz="3200" dirty="0"/>
               <a:t>Extraction and insertion scripts (data importer) that work with the file-based storage for the current data are provided.</a:t>
             </a:r>
-            <a:endParaRPr lang="zh-CN" altLang="en-US" sz="3200" dirty="0" smtClean="0"/>
+            <a:endParaRPr lang="zh-CN" altLang="en-US" sz="3200" dirty="0"/>
           </a:p>
           <a:p>
             <a:pPr marL="1143000" indent="-1143000">
               <a:buFont typeface="Arial" panose="020B0604020202020204" pitchFamily="34" charset="0"/>
               <a:buChar char="•"/>
             </a:pPr>
-            <a:endParaRPr lang="zh-CN" altLang="en-US" sz="3200" dirty="0" smtClean="0"/>
+            <a:endParaRPr lang="zh-CN" altLang="en-US" sz="3200" dirty="0"/>
           </a:p>
           <a:p>
             <a:pPr marL="1143000" indent="-1143000">
               <a:buFont typeface="Arial" panose="020B0604020202020204" pitchFamily="34" charset="0"/>
               <a:buChar char="•"/>
             </a:pPr>
-            <a:endParaRPr lang="zh-CN" altLang="en-US" sz="3200" dirty="0" smtClean="0"/>
+            <a:endParaRPr lang="zh-CN" altLang="en-US" sz="3200" dirty="0"/>
           </a:p>
           <a:p>
             <a:pPr marL="1143000" indent="-1143000">
               <a:buFont typeface="Arial" panose="020B0604020202020204" pitchFamily="34" charset="0"/>
               <a:buChar char="•"/>
             </a:pPr>
-            <a:endParaRPr lang="zh-CN" altLang="en-US" sz="3200" dirty="0" smtClean="0"/>
+            <a:endParaRPr lang="zh-CN" altLang="en-US" sz="3200" dirty="0"/>
           </a:p>
           <a:p>
             <a:pPr marL="1143000" indent="-1143000">
               <a:buFont typeface="Arial" panose="020B0604020202020204" pitchFamily="34" charset="0"/>
               <a:buChar char="•"/>
             </a:pPr>
-            <a:endParaRPr lang="zh-CN" altLang="en-US" sz="3200" dirty="0" smtClean="0"/>
+            <a:endParaRPr lang="zh-CN" altLang="en-US" sz="3200" dirty="0"/>
           </a:p>
           <a:p>
             <a:pPr marL="1143000" indent="-1143000">
               <a:buFont typeface="Arial" panose="020B0604020202020204" pitchFamily="34" charset="0"/>
               <a:buChar char="•"/>
             </a:pPr>
-            <a:endParaRPr lang="zh-CN" altLang="en-US" sz="3200" dirty="0" smtClean="0"/>
+            <a:endParaRPr lang="zh-CN" altLang="en-US" sz="3200" dirty="0"/>
           </a:p>
           <a:p>
             <a:pPr marL="1143000" indent="-1143000">
               <a:buFont typeface="Arial" panose="020B0604020202020204" pitchFamily="34" charset="0"/>
               <a:buChar char="•"/>
             </a:pPr>
-            <a:endParaRPr lang="en-US" sz="3200" dirty="0" smtClean="0"/>
+            <a:endParaRPr lang="en-US" sz="3200" dirty="0"/>
           </a:p>
           <a:p>
             <a:pPr marL="1143000" indent="-1143000">
@@ -5829,7 +5786,7 @@
           <p:cNvPr id="42" name="TextBox 41">
             <a:extLst>
               <a:ext uri="{FF2B5EF4-FFF2-40B4-BE49-F238E27FC236}">
-                <a16:creationId xmlns:a16="http://schemas.microsoft.com/office/drawing/2014/main" xmlns="" id="{D335579D-9BA7-4FF2-BA55-7C6390B98CEF}"/>
+                <a16:creationId xmlns:a16="http://schemas.microsoft.com/office/drawing/2014/main" id="{D335579D-9BA7-4FF2-BA55-7C6390B98CEF}"/>
               </a:ext>
             </a:extLst>
           </p:cNvPr>
@@ -5857,23 +5814,23 @@
               <a:buChar char="v"/>
             </a:pPr>
             <a:r>
-              <a:rPr lang="en-US" sz="3200" dirty="0" smtClean="0"/>
+              <a:rPr lang="en-US" sz="3200" dirty="0"/>
               <a:t>Design a database schema that incorporate the two separate systems (</a:t>
             </a:r>
             <a:r>
-              <a:rPr lang="en-US" sz="3200" dirty="0" err="1" smtClean="0"/>
+              <a:rPr lang="en-US" sz="3200" dirty="0" err="1"/>
               <a:t>Moodle</a:t>
             </a:r>
             <a:r>
-              <a:rPr lang="en-US" sz="3200" dirty="0" smtClean="0"/>
+              <a:rPr lang="en-US" sz="3200" dirty="0"/>
               <a:t> and </a:t>
             </a:r>
             <a:r>
-              <a:rPr lang="en-US" sz="3200" dirty="0" err="1" smtClean="0"/>
+              <a:rPr lang="en-US" sz="3200" dirty="0" err="1"/>
               <a:t>WebSubmission</a:t>
             </a:r>
             <a:r>
-              <a:rPr lang="en-US" sz="3200" dirty="0" smtClean="0"/>
+              <a:rPr lang="en-US" sz="3200" dirty="0"/>
               <a:t>).</a:t>
             </a:r>
           </a:p>
@@ -5883,18 +5840,18 @@
               <a:buChar char="v"/>
             </a:pPr>
             <a:r>
-              <a:rPr lang="en-US" sz="3200" dirty="0" smtClean="0"/>
+              <a:rPr lang="en-US" sz="3200" dirty="0"/>
               <a:t>Link two data sources and link the users (which are </a:t>
             </a:r>
             <a:r>
-              <a:rPr lang="en-US" sz="3200" dirty="0" err="1" smtClean="0"/>
+              <a:rPr lang="en-US" sz="3200" dirty="0" err="1"/>
               <a:t>anonymized</a:t>
             </a:r>
             <a:r>
-              <a:rPr lang="en-US" sz="3200" dirty="0" smtClean="0"/>
+              <a:rPr lang="en-US" sz="3200" dirty="0"/>
               <a:t>) of two data sources.</a:t>
             </a:r>
-            <a:endParaRPr lang="zh-CN" altLang="en-US" sz="3200" dirty="0" smtClean="0"/>
+            <a:endParaRPr lang="zh-CN" altLang="en-US" sz="3200" dirty="0"/>
           </a:p>
           <a:p>
             <a:pPr marL="1143000" indent="-1143000">
@@ -5902,7 +5859,7 @@
               <a:buChar char="v"/>
             </a:pPr>
             <a:r>
-              <a:rPr lang="en-US" sz="3200" dirty="0" smtClean="0"/>
+              <a:rPr lang="en-US" sz="3200" dirty="0"/>
               <a:t>Write extraction and insertion scripts (data importer) to import current file-based data.</a:t>
             </a:r>
           </a:p>
@@ -5912,10 +5869,10 @@
               <a:buChar char="v"/>
             </a:pPr>
             <a:r>
-              <a:rPr lang="en-US" sz="3200" dirty="0" smtClean="0"/>
+              <a:rPr lang="en-US" sz="3200" dirty="0"/>
               <a:t>Provide visualization of data by using charts and make them configurable to allow users to manipulate and interact with data.</a:t>
             </a:r>
-            <a:endParaRPr lang="zh-CN" altLang="en-US" sz="3200" dirty="0" smtClean="0"/>
+            <a:endParaRPr lang="zh-CN" altLang="en-US" sz="3200" dirty="0"/>
           </a:p>
           <a:p>
             <a:pPr marL="1143000" indent="-1143000">
@@ -5923,10 +5880,10 @@
               <a:buChar char="v"/>
             </a:pPr>
             <a:r>
-              <a:rPr lang="en-US" sz="3200" dirty="0" smtClean="0"/>
+              <a:rPr lang="en-US" sz="3200" dirty="0"/>
               <a:t>Analyze the relationship between the amount of students‘ activities and academic performances.</a:t>
             </a:r>
-            <a:endParaRPr lang="zh-CN" altLang="en-US" sz="3200" dirty="0" smtClean="0"/>
+            <a:endParaRPr lang="zh-CN" altLang="en-US" sz="3200" dirty="0"/>
           </a:p>
           <a:p>
             <a:pPr marL="1143000" indent="-1143000">
@@ -5934,21 +5891,21 @@
               <a:buChar char="v"/>
             </a:pPr>
             <a:r>
-              <a:rPr lang="en-US" sz="3200" dirty="0" smtClean="0"/>
+              <a:rPr lang="en-US" sz="3200" dirty="0"/>
               <a:t>Allow staffs to query the database, extract data, aggregate it, and export it.</a:t>
             </a:r>
-            <a:endParaRPr lang="zh-CN" altLang="en-US" sz="3200" dirty="0" smtClean="0"/>
+            <a:endParaRPr lang="zh-CN" altLang="en-US" sz="3200" dirty="0"/>
           </a:p>
           <a:p>
             <a:pPr marL="1143000" indent="-1143000">
               <a:buFont typeface="Arial" panose="020B0604020202020204" pitchFamily="34" charset="0"/>
               <a:buChar char="•"/>
             </a:pPr>
-            <a:endParaRPr lang="zh-CN" altLang="en-US" sz="3200" dirty="0" smtClean="0"/>
+            <a:endParaRPr lang="zh-CN" altLang="en-US" sz="3200" dirty="0"/>
           </a:p>
           <a:p>
             <a:pPr marL="1143000" indent="-1143000"/>
-            <a:endParaRPr lang="zh-CN" altLang="en-US" sz="3200" dirty="0" smtClean="0"/>
+            <a:endParaRPr lang="zh-CN" altLang="en-US" sz="3200" dirty="0"/>
           </a:p>
           <a:p>
             <a:pPr marL="1143000" indent="-1143000">
@@ -6068,7 +6025,7 @@
           <p:cNvPr id="55" name="TextBox 54">
             <a:extLst>
               <a:ext uri="{FF2B5EF4-FFF2-40B4-BE49-F238E27FC236}">
-                <a16:creationId xmlns:a16="http://schemas.microsoft.com/office/drawing/2014/main" xmlns="" id="{D335579D-9BA7-4FF2-BA55-7C6390B98CEF}"/>
+                <a16:creationId xmlns:a16="http://schemas.microsoft.com/office/drawing/2014/main" id="{D335579D-9BA7-4FF2-BA55-7C6390B98CEF}"/>
               </a:ext>
             </a:extLst>
           </p:cNvPr>
@@ -6096,7 +6053,7 @@
               <a:buChar char="v"/>
             </a:pPr>
             <a:r>
-              <a:rPr lang="en-US" sz="3200" dirty="0" smtClean="0"/>
+              <a:rPr lang="en-US" sz="3200" dirty="0"/>
               <a:t>Provide visualization by using charts, which make the data intuitive and easy to read.</a:t>
             </a:r>
           </a:p>
@@ -6106,10 +6063,10 @@
               <a:buChar char="v"/>
             </a:pPr>
             <a:r>
-              <a:rPr lang="en-US" sz="3200" dirty="0" smtClean="0"/>
+              <a:rPr lang="en-US" sz="3200" dirty="0"/>
               <a:t>Provide lots of configuration options and related functions (set period, change presentation order, threshold function, export data in CSV format, event name/ event context auto-complete), which allow user to further explore and manipulate data.</a:t>
             </a:r>
-            <a:endParaRPr lang="zh-CN" altLang="en-US" sz="3200" dirty="0" smtClean="0"/>
+            <a:endParaRPr lang="zh-CN" altLang="en-US" sz="3200" dirty="0"/>
           </a:p>
           <a:p>
             <a:pPr marL="1143000" indent="-1143000">
@@ -6117,10 +6074,10 @@
               <a:buChar char="v"/>
             </a:pPr>
             <a:r>
-              <a:rPr lang="en-US" sz="3200" dirty="0" smtClean="0"/>
+              <a:rPr lang="en-US" sz="3200" dirty="0"/>
               <a:t>Allow user to choose course, year, semester, assignment.</a:t>
             </a:r>
-            <a:endParaRPr lang="zh-CN" altLang="en-US" sz="3200" dirty="0" smtClean="0"/>
+            <a:endParaRPr lang="zh-CN" altLang="en-US" sz="3200" dirty="0"/>
           </a:p>
           <a:p>
             <a:pPr marL="1143000" indent="-1143000">
@@ -6128,10 +6085,10 @@
               <a:buChar char="v"/>
             </a:pPr>
             <a:r>
-              <a:rPr lang="en-US" sz="3200" dirty="0" smtClean="0"/>
+              <a:rPr lang="en-US" sz="3200" dirty="0"/>
               <a:t>Provide data of individual student as well as the whole class.</a:t>
             </a:r>
-            <a:endParaRPr lang="zh-CN" altLang="en-US" sz="3200" dirty="0" smtClean="0"/>
+            <a:endParaRPr lang="zh-CN" altLang="en-US" sz="3200" dirty="0"/>
           </a:p>
           <a:p>
             <a:pPr marL="1143000" indent="-1143000">
@@ -6139,10 +6096,10 @@
               <a:buChar char="v"/>
             </a:pPr>
             <a:r>
-              <a:rPr lang="en-US" sz="3200" dirty="0" smtClean="0"/>
+              <a:rPr lang="en-US" sz="3200" dirty="0"/>
               <a:t>Provide the amount of different events in a given period as well as the amount of specific event of each day.</a:t>
             </a:r>
-            <a:endParaRPr lang="zh-CN" altLang="en-US" sz="3200" dirty="0" smtClean="0"/>
+            <a:endParaRPr lang="zh-CN" altLang="en-US" sz="3200" dirty="0"/>
           </a:p>
           <a:p>
             <a:pPr marL="1143000" indent="-1143000">
@@ -6150,10 +6107,10 @@
               <a:buChar char="v"/>
             </a:pPr>
             <a:r>
-              <a:rPr lang="en-US" sz="3200" dirty="0" smtClean="0"/>
+              <a:rPr lang="en-US" sz="3200" dirty="0"/>
               <a:t>Link two data sources and link the users of two data sources.</a:t>
             </a:r>
-            <a:endParaRPr lang="zh-CN" altLang="en-US" sz="3200" dirty="0" smtClean="0"/>
+            <a:endParaRPr lang="zh-CN" altLang="en-US" sz="3200" dirty="0"/>
           </a:p>
           <a:p>
             <a:pPr marL="1143000" indent="-1143000">
@@ -6161,17 +6118,17 @@
               <a:buChar char="v"/>
             </a:pPr>
             <a:r>
-              <a:rPr lang="en-US" sz="3200" dirty="0" smtClean="0"/>
+              <a:rPr lang="en-US" sz="3200" dirty="0"/>
               <a:t>Provide cross data analysis: allow user to explore the relationship between the amount of students' activities and academic performances.</a:t>
             </a:r>
-            <a:endParaRPr lang="zh-CN" altLang="en-US" sz="3200" dirty="0" smtClean="0"/>
+            <a:endParaRPr lang="zh-CN" altLang="en-US" sz="3200" dirty="0"/>
           </a:p>
           <a:p>
             <a:pPr marL="1143000" indent="-1143000">
               <a:buFont typeface="Arial" panose="020B0604020202020204" pitchFamily="34" charset="0"/>
               <a:buChar char="•"/>
             </a:pPr>
-            <a:endParaRPr lang="zh-CN" altLang="en-US" sz="3200" dirty="0" smtClean="0"/>
+            <a:endParaRPr lang="zh-CN" altLang="en-US" sz="3200" dirty="0"/>
           </a:p>
           <a:p>
             <a:pPr marL="1143000" indent="-1143000">
@@ -6218,13 +6175,6 @@
   <p:clrMapOvr>
     <a:masterClrMapping/>
   </p:clrMapOvr>
-  <p:timing>
-    <p:tnLst>
-      <p:par>
-        <p:cTn id="1" dur="indefinite" restart="never" nodeType="tmRoot"/>
-      </p:par>
-    </p:tnLst>
-  </p:timing>
 </p:sld>
 </file>
 

</xml_diff>

<commit_message>
fix #185 - review the final version of poster
</commit_message>
<xml_diff>
--- a/Poster/Stu_data Poster.pptx
+++ b/Poster/Stu_data Poster.pptx
@@ -230,7 +230,7 @@
             <a:fld id="{59D7332B-1442-4F8C-A160-0D5EB57A24C0}" type="datetimeFigureOut">
               <a:rPr lang="en-AU" smtClean="0"/>
               <a:pPr/>
-              <a:t>10/10/2017</a:t>
+              <a:t>11/10/2017</a:t>
             </a:fld>
             <a:endParaRPr lang="en-AU"/>
           </a:p>
@@ -397,7 +397,7 @@
             <a:fld id="{33744820-F59C-490B-A624-3CEFDFE2581B}" type="datetimeFigureOut">
               <a:rPr lang="en-AU" smtClean="0"/>
               <a:pPr/>
-              <a:t>10/10/2017</a:t>
+              <a:t>11/10/2017</a:t>
             </a:fld>
             <a:endParaRPr lang="en-AU"/>
           </a:p>
@@ -4779,7 +4779,7 @@
                   <a:schemeClr val="bg1"/>
                 </a:solidFill>
               </a:rPr>
-              <a:t>Nickolas Falkner, Christoph </a:t>
+              <a:t>Nickolas Falkner, Claudia Szabo, Christoph </a:t>
             </a:r>
             <a:r>
               <a:rPr lang="en-US" sz="3200" dirty="0" err="1">
@@ -4795,7 +4795,7 @@
                   <a:schemeClr val="bg1"/>
                 </a:solidFill>
               </a:rPr>
-              <a:t>, Claudia Szabo, Marian </a:t>
+              <a:t>, Marian </a:t>
             </a:r>
             <a:r>
               <a:rPr lang="en-US" sz="3200" dirty="0" err="1">
@@ -4805,6 +4805,11 @@
               </a:rPr>
               <a:t>Mihailescu</a:t>
             </a:r>
+            <a:endParaRPr lang="en-US" sz="3200" dirty="0">
+              <a:solidFill>
+                <a:schemeClr val="bg1"/>
+              </a:solidFill>
+            </a:endParaRPr>
           </a:p>
           <a:p>
             <a:pPr algn="ctr"/>
@@ -5815,15 +5820,7 @@
             </a:pPr>
             <a:r>
               <a:rPr lang="en-US" sz="3200" dirty="0"/>
-              <a:t>Design a database schema that incorporate the two separate systems (</a:t>
-            </a:r>
-            <a:r>
-              <a:rPr lang="en-US" sz="3200" dirty="0" err="1"/>
-              <a:t>Moodle</a:t>
-            </a:r>
-            <a:r>
-              <a:rPr lang="en-US" sz="3200" dirty="0"/>
-              <a:t> and </a:t>
+              <a:t>Design a database schema that incorporates the two separate systems (Moodle and </a:t>
             </a:r>
             <a:r>
               <a:rPr lang="en-US" sz="3200" dirty="0" err="1"/>

</xml_diff>

<commit_message>
Add texts, images for intro, charts module #194
Add texts and images for "Introduction" and "Charts and analysis module".
</commit_message>
<xml_diff>
--- a/Poster/Stu_data Poster.pptx
+++ b/Poster/Stu_data Poster.pptx
@@ -112,7 +112,7 @@
   </p:defaultTextStyle>
   <p:extLst>
     <p:ext uri="{EFAFB233-063F-42B5-8137-9DF3F51BA10A}">
-      <p15:sldGuideLst xmlns:p15="http://schemas.microsoft.com/office/powerpoint/2012/main">
+      <p15:sldGuideLst xmlns="" xmlns:p15="http://schemas.microsoft.com/office/powerpoint/2012/main">
         <p15:guide id="1" orient="horz" pos="4050">
           <p15:clr>
             <a:srgbClr val="A4A3A4"/>
@@ -126,7 +126,7 @@
       </p15:sldGuideLst>
     </p:ext>
     <p:ext uri="{2D200454-40CA-4A62-9FC3-DE9A4176ACB9}">
-      <p15:notesGuideLst xmlns:p15="http://schemas.microsoft.com/office/powerpoint/2012/main">
+      <p15:notesGuideLst xmlns="" xmlns:p15="http://schemas.microsoft.com/office/powerpoint/2012/main">
         <p15:guide id="1" orient="horz" pos="2880">
           <p15:clr>
             <a:srgbClr val="A4A3A4"/>
@@ -230,7 +230,7 @@
             <a:fld id="{59D7332B-1442-4F8C-A160-0D5EB57A24C0}" type="datetimeFigureOut">
               <a:rPr lang="en-AU" smtClean="0"/>
               <a:pPr/>
-              <a:t>12/10/17</a:t>
+              <a:t>13/10/2017</a:t>
             </a:fld>
             <a:endParaRPr lang="en-AU"/>
           </a:p>
@@ -306,7 +306,7 @@
     </p:spTree>
     <p:extLst>
       <p:ext uri="{BB962C8B-B14F-4D97-AF65-F5344CB8AC3E}">
-        <p14:creationId xmlns:p14="http://schemas.microsoft.com/office/powerpoint/2010/main" val="4029272196"/>
+        <p14:creationId xmlns="" xmlns:p14="http://schemas.microsoft.com/office/powerpoint/2010/main" val="4029272196"/>
       </p:ext>
     </p:extLst>
   </p:cSld>
@@ -397,7 +397,7 @@
             <a:fld id="{33744820-F59C-490B-A624-3CEFDFE2581B}" type="datetimeFigureOut">
               <a:rPr lang="en-AU" smtClean="0"/>
               <a:pPr/>
-              <a:t>12/10/17</a:t>
+              <a:t>13/10/2017</a:t>
             </a:fld>
             <a:endParaRPr lang="en-AU"/>
           </a:p>
@@ -568,7 +568,7 @@
     </p:spTree>
     <p:extLst>
       <p:ext uri="{BB962C8B-B14F-4D97-AF65-F5344CB8AC3E}">
-        <p14:creationId xmlns:p14="http://schemas.microsoft.com/office/powerpoint/2010/main" val="3122356856"/>
+        <p14:creationId xmlns="" xmlns:p14="http://schemas.microsoft.com/office/powerpoint/2010/main" val="3122356856"/>
       </p:ext>
     </p:extLst>
   </p:cSld>
@@ -1929,7 +1929,7 @@
         <p:spPr>
           <a:xfrm>
             <a:off x="263216" y="4637024"/>
-            <a:ext cx="11273568" cy="7723960"/>
+            <a:ext cx="11273568" cy="3785410"/>
           </a:xfrm>
           <a:custGeom>
             <a:avLst/>
@@ -3428,7 +3428,7 @@
         </p:nvSpPr>
         <p:spPr>
           <a:xfrm>
-            <a:off x="11680801" y="4502101"/>
+            <a:off x="11543437" y="4850534"/>
             <a:ext cx="18146016" cy="19060441"/>
           </a:xfrm>
           <a:custGeom>
@@ -4583,7 +4583,7 @@
           <a:blip r:embed="rId2">
             <a:extLst>
               <a:ext uri="{28A0092B-C50C-407E-A947-70E740481C1C}">
-                <a14:useLocalDpi xmlns:a14="http://schemas.microsoft.com/office/drawing/2010/main" val="0"/>
+                <a14:useLocalDpi xmlns="" xmlns:a14="http://schemas.microsoft.com/office/drawing/2010/main" val="0"/>
               </a:ext>
             </a:extLst>
           </a:blip>
@@ -4619,7 +4619,7 @@
           <a:blip r:embed="rId3">
             <a:extLst>
               <a:ext uri="{28A0092B-C50C-407E-A947-70E740481C1C}">
-                <a14:useLocalDpi xmlns:a14="http://schemas.microsoft.com/office/drawing/2010/main" val="0"/>
+                <a14:useLocalDpi xmlns="" xmlns:a14="http://schemas.microsoft.com/office/drawing/2010/main" val="0"/>
               </a:ext>
             </a:extLst>
           </a:blip>
@@ -4655,7 +4655,7 @@
           <a:blip r:embed="rId4">
             <a:extLst>
               <a:ext uri="{28A0092B-C50C-407E-A947-70E740481C1C}">
-                <a14:useLocalDpi xmlns:a14="http://schemas.microsoft.com/office/drawing/2010/main" val="0"/>
+                <a14:useLocalDpi xmlns="" xmlns:a14="http://schemas.microsoft.com/office/drawing/2010/main" val="0"/>
               </a:ext>
             </a:extLst>
           </a:blip>
@@ -4851,7 +4851,7 @@
           <a:blip r:embed="rId5">
             <a:extLst>
               <a:ext uri="{28A0092B-C50C-407E-A947-70E740481C1C}">
-                <a14:useLocalDpi xmlns:a14="http://schemas.microsoft.com/office/drawing/2010/main" val="0"/>
+                <a14:useLocalDpi xmlns="" xmlns:a14="http://schemas.microsoft.com/office/drawing/2010/main" val="0"/>
               </a:ext>
             </a:extLst>
           </a:blip>
@@ -5105,7 +5105,7 @@
         <p:spPr>
           <a:xfrm>
             <a:off x="611096" y="5765733"/>
-            <a:ext cx="10474113" cy="5509200"/>
+            <a:ext cx="10474113" cy="2554545"/>
           </a:xfrm>
           <a:prstGeom prst="rect">
             <a:avLst/>
@@ -5123,126 +5123,8 @@
               <a:buChar char="v"/>
             </a:pPr>
             <a:r>
-              <a:rPr lang="en-US" altLang="zh-CN" sz="3200" dirty="0"/>
-              <a:t>School</a:t>
-            </a:r>
-            <a:r>
-              <a:rPr lang="zh-CN" altLang="en-US" sz="3200" dirty="0"/>
-              <a:t> </a:t>
-            </a:r>
-            <a:r>
-              <a:rPr lang="en-US" altLang="zh-CN" sz="3200" dirty="0"/>
-              <a:t>of</a:t>
-            </a:r>
-            <a:r>
-              <a:rPr lang="zh-CN" altLang="en-US" sz="3200" dirty="0"/>
-              <a:t> </a:t>
-            </a:r>
-            <a:r>
-              <a:rPr lang="en-US" altLang="zh-CN" sz="3200" dirty="0"/>
-              <a:t>Computer</a:t>
-            </a:r>
-            <a:r>
-              <a:rPr lang="zh-CN" altLang="en-US" sz="3200" dirty="0"/>
-              <a:t> </a:t>
-            </a:r>
-            <a:r>
-              <a:rPr lang="en-US" altLang="zh-CN" sz="3200" dirty="0"/>
-              <a:t>Science</a:t>
-            </a:r>
-            <a:r>
-              <a:rPr lang="zh-CN" altLang="en-US" sz="3200" dirty="0"/>
-              <a:t> </a:t>
-            </a:r>
-            <a:r>
-              <a:rPr lang="en-US" altLang="zh-CN" sz="3200" dirty="0"/>
-              <a:t>got</a:t>
-            </a:r>
-            <a:r>
-              <a:rPr lang="zh-CN" altLang="en-US" sz="3200" dirty="0"/>
-              <a:t> </a:t>
-            </a:r>
-            <a:r>
-              <a:rPr lang="en-US" sz="3200" dirty="0"/>
-              <a:t>12 </a:t>
-            </a:r>
-            <a:r>
-              <a:rPr lang="en-US" sz="3200" dirty="0"/>
-              <a:t>years of Moodle and </a:t>
-            </a:r>
-            <a:r>
-              <a:rPr lang="en-US" sz="3200" dirty="0" err="1"/>
-              <a:t>WebSubmission</a:t>
-            </a:r>
-            <a:r>
-              <a:rPr lang="en-US" sz="3200" dirty="0"/>
-              <a:t> data has been collected and the problem now is </a:t>
-            </a:r>
-            <a:r>
-              <a:rPr lang="en-US" sz="3200" dirty="0" err="1"/>
-              <a:t>organising</a:t>
-            </a:r>
-            <a:r>
-              <a:rPr lang="en-US" sz="3200" dirty="0"/>
-              <a:t> it for searching and trend analysis.</a:t>
-            </a:r>
-          </a:p>
-          <a:p>
-            <a:pPr marL="1143000" indent="-1143000">
-              <a:buFont typeface="Wingdings" charset="2"/>
-              <a:buChar char="v"/>
-            </a:pPr>
-            <a:r>
-              <a:rPr lang="en-US" sz="3200" dirty="0"/>
-              <a:t>Moodle and </a:t>
-            </a:r>
-            <a:r>
-              <a:rPr lang="en-US" sz="3200" dirty="0" err="1"/>
-              <a:t>WebSubmission</a:t>
-            </a:r>
-            <a:r>
-              <a:rPr lang="en-US" sz="3200" dirty="0"/>
-              <a:t> are separate systems. </a:t>
-            </a:r>
-            <a:endParaRPr lang="en-US" sz="3200" dirty="0"/>
-          </a:p>
-          <a:p>
-            <a:pPr marL="1143000" indent="-1143000">
-              <a:buFont typeface="Wingdings" charset="2"/>
-              <a:buChar char="v"/>
-            </a:pPr>
-            <a:r>
-              <a:rPr lang="en-US" sz="3200" dirty="0"/>
-              <a:t>Visualization </a:t>
-            </a:r>
-          </a:p>
-          <a:p>
-            <a:pPr marL="1143000" indent="-1143000">
-              <a:buFont typeface="Wingdings" charset="2"/>
-              <a:buChar char="v"/>
-            </a:pPr>
-            <a:r>
-              <a:rPr lang="en-US" sz="3200" dirty="0"/>
-              <a:t>Analysis </a:t>
-            </a:r>
-            <a:r>
-              <a:rPr lang="en-US" sz="3200" dirty="0"/>
-              <a:t>module is provided to allow users to explore the relationship between the amount of students‘ activities and academic performances.</a:t>
-            </a:r>
-            <a:endParaRPr lang="zh-CN" altLang="en-US" sz="3200" dirty="0"/>
-          </a:p>
-          <a:p>
-            <a:pPr marL="1143000" indent="-1143000">
-              <a:buFont typeface="Wingdings" charset="2"/>
-              <a:buChar char="v"/>
-            </a:pPr>
-            <a:r>
-              <a:rPr lang="en-US" sz="3200" dirty="0"/>
-              <a:t>Staffs are allowed to query the database, extract data, aggregate it, and export it</a:t>
-            </a:r>
-            <a:r>
-              <a:rPr lang="en-US" sz="3200" dirty="0" smtClean="0"/>
-              <a:t>.</a:t>
+              <a:rPr lang="en-US" altLang="zh-CN" sz="3200" dirty="0" smtClean="0"/>
+              <a:t>The school of computer science has got a large amount of student data collected over the years in a number of different sources. We have no easy way to collect that data represented in a neat visualized form to allow development decision making.</a:t>
             </a:r>
             <a:endParaRPr lang="en-US" sz="3200" dirty="0"/>
           </a:p>
@@ -5339,110 +5221,6 @@
           </a:p>
         </p:txBody>
       </p:sp>
-      <p:pic>
-        <p:nvPicPr>
-          <p:cNvPr id="1027" name="Picture 3" descr="D:\阿大课程\projA\Ingenuity\1.jpg"/>
-          <p:cNvPicPr>
-            <a:picLocks noChangeAspect="1" noChangeArrowheads="1"/>
-          </p:cNvPicPr>
-          <p:nvPr/>
-        </p:nvPicPr>
-        <p:blipFill>
-          <a:blip r:embed="rId7"/>
-          <a:srcRect/>
-          <a:stretch>
-            <a:fillRect/>
-          </a:stretch>
-        </p:blipFill>
-        <p:spPr bwMode="auto">
-          <a:xfrm>
-            <a:off x="12626928" y="6419902"/>
-            <a:ext cx="8065140" cy="4357717"/>
-          </a:xfrm>
-          <a:prstGeom prst="rect">
-            <a:avLst/>
-          </a:prstGeom>
-          <a:noFill/>
-        </p:spPr>
-      </p:pic>
-      <p:pic>
-        <p:nvPicPr>
-          <p:cNvPr id="1029" name="Picture 5" descr="D:\阿大课程\projA\Ingenuity\3.jpg"/>
-          <p:cNvPicPr>
-            <a:picLocks noChangeAspect="1" noChangeArrowheads="1"/>
-          </p:cNvPicPr>
-          <p:nvPr/>
-        </p:nvPicPr>
-        <p:blipFill>
-          <a:blip r:embed="rId8"/>
-          <a:srcRect/>
-          <a:stretch>
-            <a:fillRect/>
-          </a:stretch>
-        </p:blipFill>
-        <p:spPr bwMode="auto">
-          <a:xfrm>
-            <a:off x="21187567" y="6291811"/>
-            <a:ext cx="8239126" cy="4357718"/>
-          </a:xfrm>
-          <a:prstGeom prst="rect">
-            <a:avLst/>
-          </a:prstGeom>
-          <a:noFill/>
-        </p:spPr>
-      </p:pic>
-      <p:pic>
-        <p:nvPicPr>
-          <p:cNvPr id="1030" name="Picture 6" descr="D:\阿大课程\projA\Ingenuity\4.jpg"/>
-          <p:cNvPicPr>
-            <a:picLocks noChangeAspect="1" noChangeArrowheads="1"/>
-          </p:cNvPicPr>
-          <p:nvPr/>
-        </p:nvPicPr>
-        <p:blipFill>
-          <a:blip r:embed="rId9"/>
-          <a:srcRect/>
-          <a:stretch>
-            <a:fillRect/>
-          </a:stretch>
-        </p:blipFill>
-        <p:spPr bwMode="auto">
-          <a:xfrm>
-            <a:off x="12701917" y="12313530"/>
-            <a:ext cx="6786610" cy="3710239"/>
-          </a:xfrm>
-          <a:prstGeom prst="rect">
-            <a:avLst/>
-          </a:prstGeom>
-          <a:noFill/>
-        </p:spPr>
-      </p:pic>
-      <p:pic>
-        <p:nvPicPr>
-          <p:cNvPr id="1033" name="Picture 9" descr="D:\阿大课程\projA\Ingenuity\7.jpg"/>
-          <p:cNvPicPr>
-            <a:picLocks noChangeAspect="1" noChangeArrowheads="1"/>
-          </p:cNvPicPr>
-          <p:nvPr/>
-        </p:nvPicPr>
-        <p:blipFill>
-          <a:blip r:embed="rId10"/>
-          <a:srcRect/>
-          <a:stretch>
-            <a:fillRect/>
-          </a:stretch>
-        </p:blipFill>
-        <p:spPr bwMode="auto">
-          <a:xfrm>
-            <a:off x="21534932" y="11778209"/>
-            <a:ext cx="7588947" cy="4509306"/>
-          </a:xfrm>
-          <a:prstGeom prst="rect">
-            <a:avLst/>
-          </a:prstGeom>
-          <a:noFill/>
-        </p:spPr>
-      </p:pic>
       <p:sp>
         <p:nvSpPr>
           <p:cNvPr id="55" name="TextBox 54">
@@ -5571,7 +5349,7 @@
           <p:nvPr/>
         </p:nvPicPr>
         <p:blipFill>
-          <a:blip r:embed="rId11"/>
+          <a:blip r:embed="rId7"/>
           <a:srcRect/>
           <a:stretch>
             <a:fillRect/>
@@ -5959,58 +5737,6 @@
           </a:p>
         </p:txBody>
       </p:sp>
-      <p:pic>
-        <p:nvPicPr>
-          <p:cNvPr id="60" name="Picture 6" descr="D:\阿大课程\projA\Ingenuity\4.jpg"/>
-          <p:cNvPicPr>
-            <a:picLocks noChangeAspect="1" noChangeArrowheads="1"/>
-          </p:cNvPicPr>
-          <p:nvPr/>
-        </p:nvPicPr>
-        <p:blipFill>
-          <a:blip r:embed="rId9"/>
-          <a:srcRect/>
-          <a:stretch>
-            <a:fillRect/>
-          </a:stretch>
-        </p:blipFill>
-        <p:spPr bwMode="auto">
-          <a:xfrm>
-            <a:off x="12531793" y="17733484"/>
-            <a:ext cx="6786610" cy="3710239"/>
-          </a:xfrm>
-          <a:prstGeom prst="rect">
-            <a:avLst/>
-          </a:prstGeom>
-          <a:noFill/>
-        </p:spPr>
-      </p:pic>
-      <p:pic>
-        <p:nvPicPr>
-          <p:cNvPr id="61" name="Picture 6" descr="D:\阿大课程\projA\Ingenuity\4.jpg"/>
-          <p:cNvPicPr>
-            <a:picLocks noChangeAspect="1" noChangeArrowheads="1"/>
-          </p:cNvPicPr>
-          <p:nvPr/>
-        </p:nvPicPr>
-        <p:blipFill>
-          <a:blip r:embed="rId9"/>
-          <a:srcRect/>
-          <a:stretch>
-            <a:fillRect/>
-          </a:stretch>
-        </p:blipFill>
-        <p:spPr bwMode="auto">
-          <a:xfrm>
-            <a:off x="21739711" y="17509924"/>
-            <a:ext cx="6786610" cy="3710239"/>
-          </a:xfrm>
-          <a:prstGeom prst="rect">
-            <a:avLst/>
-          </a:prstGeom>
-          <a:noFill/>
-        </p:spPr>
-      </p:pic>
       <p:sp>
         <p:nvSpPr>
           <p:cNvPr id="30" name="TextBox 29"/>
@@ -6360,18 +6086,7 @@
                 <a:ea typeface="Arial" charset="0"/>
                 <a:cs typeface="Arial" charset="0"/>
               </a:rPr>
-              <a:t>w</a:t>
-            </a:r>
-            <a:r>
-              <a:rPr lang="en-US" altLang="zh-CN" sz="6000" dirty="0" smtClean="0">
-                <a:solidFill>
-                  <a:schemeClr val="bg1"/>
-                </a:solidFill>
-                <a:latin typeface="Arial" charset="0"/>
-                <a:ea typeface="Arial" charset="0"/>
-                <a:cs typeface="Arial" charset="0"/>
-              </a:rPr>
-              <a:t>ork</a:t>
+              <a:t>work</a:t>
             </a:r>
             <a:endParaRPr lang="en-US" sz="6000" dirty="0">
               <a:solidFill>
@@ -6429,10 +6144,1982 @@
           </a:p>
         </p:txBody>
       </p:sp>
+      <p:pic>
+        <p:nvPicPr>
+          <p:cNvPr id="1026" name="Picture 2"/>
+          <p:cNvPicPr>
+            <a:picLocks noChangeAspect="1" noChangeArrowheads="1"/>
+          </p:cNvPicPr>
+          <p:nvPr/>
+        </p:nvPicPr>
+        <p:blipFill>
+          <a:blip r:embed="rId8"/>
+          <a:srcRect/>
+          <a:stretch>
+            <a:fillRect/>
+          </a:stretch>
+        </p:blipFill>
+        <p:spPr bwMode="auto">
+          <a:xfrm>
+            <a:off x="12257817" y="6279293"/>
+            <a:ext cx="8072494" cy="2469173"/>
+          </a:xfrm>
+          <a:prstGeom prst="rect">
+            <a:avLst/>
+          </a:prstGeom>
+          <a:noFill/>
+          <a:ln w="9525">
+            <a:noFill/>
+            <a:miter lim="800000"/>
+            <a:headEnd/>
+            <a:tailEnd/>
+          </a:ln>
+          <a:effectLst/>
+        </p:spPr>
+      </p:pic>
+      <p:pic>
+        <p:nvPicPr>
+          <p:cNvPr id="13" name="Picture 3"/>
+          <p:cNvPicPr>
+            <a:picLocks noChangeAspect="1" noChangeArrowheads="1"/>
+          </p:cNvPicPr>
+          <p:nvPr/>
+        </p:nvPicPr>
+        <p:blipFill>
+          <a:blip r:embed="rId9"/>
+          <a:srcRect/>
+          <a:stretch>
+            <a:fillRect/>
+          </a:stretch>
+        </p:blipFill>
+        <p:spPr bwMode="auto">
+          <a:xfrm>
+            <a:off x="20687501" y="6279294"/>
+            <a:ext cx="8075692" cy="3000396"/>
+          </a:xfrm>
+          <a:prstGeom prst="rect">
+            <a:avLst/>
+          </a:prstGeom>
+          <a:noFill/>
+          <a:ln w="9525">
+            <a:noFill/>
+            <a:miter lim="800000"/>
+            <a:headEnd/>
+            <a:tailEnd/>
+          </a:ln>
+          <a:effectLst/>
+        </p:spPr>
+      </p:pic>
+      <p:pic>
+        <p:nvPicPr>
+          <p:cNvPr id="1028" name="Picture 4"/>
+          <p:cNvPicPr>
+            <a:picLocks noChangeAspect="1" noChangeArrowheads="1"/>
+          </p:cNvPicPr>
+          <p:nvPr/>
+        </p:nvPicPr>
+        <p:blipFill>
+          <a:blip r:embed="rId10"/>
+          <a:srcRect/>
+          <a:stretch>
+            <a:fillRect/>
+          </a:stretch>
+        </p:blipFill>
+        <p:spPr bwMode="auto">
+          <a:xfrm>
+            <a:off x="17401353" y="6729560"/>
+            <a:ext cx="1500198" cy="2663618"/>
+          </a:xfrm>
+          <a:prstGeom prst="rect">
+            <a:avLst/>
+          </a:prstGeom>
+          <a:noFill/>
+          <a:ln w="9525">
+            <a:noFill/>
+            <a:miter lim="800000"/>
+            <a:headEnd/>
+            <a:tailEnd/>
+          </a:ln>
+          <a:effectLst/>
+        </p:spPr>
+      </p:pic>
+      <p:sp>
+        <p:nvSpPr>
+          <p:cNvPr id="65" name="TextBox 64"/>
+          <p:cNvSpPr txBox="1"/>
+          <p:nvPr/>
+        </p:nvSpPr>
+        <p:spPr>
+          <a:xfrm>
+            <a:off x="21259005" y="5350600"/>
+            <a:ext cx="7286676" cy="707886"/>
+          </a:xfrm>
+          <a:prstGeom prst="rect">
+            <a:avLst/>
+          </a:prstGeom>
+          <a:noFill/>
+        </p:spPr>
+        <p:txBody>
+          <a:bodyPr wrap="square" rtlCol="0">
+            <a:spAutoFit/>
+          </a:bodyPr>
+          <a:lstStyle/>
+          <a:p>
+            <a:r>
+              <a:rPr lang="en-US" altLang="zh-CN" sz="4000" dirty="0" smtClean="0"/>
+              <a:t>A</a:t>
+            </a:r>
+            <a:r>
+              <a:rPr lang="en-US" altLang="zh-CN" sz="4000" dirty="0" smtClean="0"/>
+              <a:t>ctivities of individual student</a:t>
+            </a:r>
+            <a:endParaRPr lang="zh-CN" altLang="en-US" sz="4000" dirty="0"/>
+          </a:p>
+        </p:txBody>
+      </p:sp>
+      <p:sp>
+        <p:nvSpPr>
+          <p:cNvPr id="68" name="矩形标注 67"/>
+          <p:cNvSpPr/>
+          <p:nvPr/>
+        </p:nvSpPr>
+        <p:spPr>
+          <a:xfrm rot="10800000">
+            <a:off x="13400825" y="8993938"/>
+            <a:ext cx="2428892" cy="357190"/>
+          </a:xfrm>
+          <a:prstGeom prst="wedgeRectCallout">
+            <a:avLst/>
+          </a:prstGeom>
+          <a:noFill/>
+        </p:spPr>
+        <p:style>
+          <a:lnRef idx="2">
+            <a:schemeClr val="accent1">
+              <a:shade val="50000"/>
+            </a:schemeClr>
+          </a:lnRef>
+          <a:fillRef idx="1">
+            <a:schemeClr val="accent1"/>
+          </a:fillRef>
+          <a:effectRef idx="0">
+            <a:schemeClr val="accent1"/>
+          </a:effectRef>
+          <a:fontRef idx="minor">
+            <a:schemeClr val="lt1"/>
+          </a:fontRef>
+        </p:style>
+        <p:txBody>
+          <a:bodyPr rtlCol="0" anchor="ctr"/>
+          <a:lstStyle/>
+          <a:p>
+            <a:pPr algn="ctr"/>
+            <a:endParaRPr lang="zh-CN" altLang="en-US"/>
+          </a:p>
+        </p:txBody>
+      </p:sp>
+      <p:sp>
+        <p:nvSpPr>
+          <p:cNvPr id="69" name="TextBox 68"/>
+          <p:cNvSpPr txBox="1"/>
+          <p:nvPr/>
+        </p:nvSpPr>
+        <p:spPr>
+          <a:xfrm>
+            <a:off x="13686577" y="8951018"/>
+            <a:ext cx="2071702" cy="400110"/>
+          </a:xfrm>
+          <a:prstGeom prst="rect">
+            <a:avLst/>
+          </a:prstGeom>
+          <a:noFill/>
+        </p:spPr>
+        <p:txBody>
+          <a:bodyPr wrap="square" rtlCol="0">
+            <a:spAutoFit/>
+          </a:bodyPr>
+          <a:lstStyle/>
+          <a:p>
+            <a:r>
+              <a:rPr lang="en-US" altLang="zh-CN" sz="2000" dirty="0" smtClean="0">
+                <a:solidFill>
+                  <a:srgbClr val="FF0000"/>
+                </a:solidFill>
+              </a:rPr>
+              <a:t>Automatically  set</a:t>
+            </a:r>
+            <a:endParaRPr lang="zh-CN" altLang="en-US" sz="2000" dirty="0">
+              <a:solidFill>
+                <a:srgbClr val="FF0000"/>
+              </a:solidFill>
+            </a:endParaRPr>
+          </a:p>
+        </p:txBody>
+      </p:sp>
+      <p:sp>
+        <p:nvSpPr>
+          <p:cNvPr id="70" name="矩形标注 69"/>
+          <p:cNvSpPr/>
+          <p:nvPr/>
+        </p:nvSpPr>
+        <p:spPr>
+          <a:xfrm>
+            <a:off x="14186643" y="5723116"/>
+            <a:ext cx="5286412" cy="484740"/>
+          </a:xfrm>
+          <a:prstGeom prst="wedgeRectCallout">
+            <a:avLst/>
+          </a:prstGeom>
+          <a:noFill/>
+        </p:spPr>
+        <p:style>
+          <a:lnRef idx="2">
+            <a:schemeClr val="accent1">
+              <a:shade val="50000"/>
+            </a:schemeClr>
+          </a:lnRef>
+          <a:fillRef idx="1">
+            <a:schemeClr val="accent1"/>
+          </a:fillRef>
+          <a:effectRef idx="0">
+            <a:schemeClr val="accent1"/>
+          </a:effectRef>
+          <a:fontRef idx="minor">
+            <a:schemeClr val="lt1"/>
+          </a:fontRef>
+        </p:style>
+        <p:txBody>
+          <a:bodyPr rtlCol="0" anchor="ctr"/>
+          <a:lstStyle/>
+          <a:p>
+            <a:pPr algn="ctr"/>
+            <a:endParaRPr lang="zh-CN" altLang="en-US"/>
+          </a:p>
+        </p:txBody>
+      </p:sp>
+      <p:sp>
+        <p:nvSpPr>
+          <p:cNvPr id="71" name="TextBox 70"/>
+          <p:cNvSpPr txBox="1"/>
+          <p:nvPr/>
+        </p:nvSpPr>
+        <p:spPr>
+          <a:xfrm>
+            <a:off x="14329519" y="5736308"/>
+            <a:ext cx="5072098" cy="400110"/>
+          </a:xfrm>
+          <a:prstGeom prst="rect">
+            <a:avLst/>
+          </a:prstGeom>
+          <a:noFill/>
+        </p:spPr>
+        <p:txBody>
+          <a:bodyPr wrap="square" rtlCol="0">
+            <a:spAutoFit/>
+          </a:bodyPr>
+          <a:lstStyle/>
+          <a:p>
+            <a:r>
+              <a:rPr lang="en-US" altLang="zh-CN" sz="2000" dirty="0" smtClean="0">
+                <a:solidFill>
+                  <a:srgbClr val="FF0000"/>
+                </a:solidFill>
+              </a:rPr>
+              <a:t>Choose course, year, semester, assignment</a:t>
+            </a:r>
+            <a:endParaRPr lang="zh-CN" altLang="en-US" sz="2000" dirty="0">
+              <a:solidFill>
+                <a:srgbClr val="FF0000"/>
+              </a:solidFill>
+            </a:endParaRPr>
+          </a:p>
+        </p:txBody>
+      </p:sp>
+      <p:sp>
+        <p:nvSpPr>
+          <p:cNvPr id="75" name="矩形标注 74"/>
+          <p:cNvSpPr/>
+          <p:nvPr/>
+        </p:nvSpPr>
+        <p:spPr>
+          <a:xfrm rot="16200000" flipV="1">
+            <a:off x="28438524" y="5886385"/>
+            <a:ext cx="1143008" cy="928694"/>
+          </a:xfrm>
+          <a:prstGeom prst="wedgeRectCallout">
+            <a:avLst/>
+          </a:prstGeom>
+          <a:noFill/>
+        </p:spPr>
+        <p:style>
+          <a:lnRef idx="2">
+            <a:schemeClr val="accent1">
+              <a:shade val="50000"/>
+            </a:schemeClr>
+          </a:lnRef>
+          <a:fillRef idx="1">
+            <a:schemeClr val="accent1"/>
+          </a:fillRef>
+          <a:effectRef idx="0">
+            <a:schemeClr val="accent1"/>
+          </a:effectRef>
+          <a:fontRef idx="minor">
+            <a:schemeClr val="lt1"/>
+          </a:fontRef>
+        </p:style>
+        <p:txBody>
+          <a:bodyPr rtlCol="0" anchor="ctr"/>
+          <a:lstStyle/>
+          <a:p>
+            <a:pPr algn="ctr"/>
+            <a:endParaRPr lang="zh-CN" altLang="en-US"/>
+          </a:p>
+        </p:txBody>
+      </p:sp>
+      <p:sp>
+        <p:nvSpPr>
+          <p:cNvPr id="76" name="TextBox 75"/>
+          <p:cNvSpPr txBox="1"/>
+          <p:nvPr/>
+        </p:nvSpPr>
+        <p:spPr>
+          <a:xfrm rot="10800000" flipV="1">
+            <a:off x="28474243" y="5850666"/>
+            <a:ext cx="1214446" cy="954107"/>
+          </a:xfrm>
+          <a:prstGeom prst="rect">
+            <a:avLst/>
+          </a:prstGeom>
+          <a:noFill/>
+        </p:spPr>
+        <p:txBody>
+          <a:bodyPr wrap="square" rtlCol="0">
+            <a:spAutoFit/>
+          </a:bodyPr>
+          <a:lstStyle/>
+          <a:p>
+            <a:r>
+              <a:rPr lang="en-US" altLang="zh-CN" sz="1400" dirty="0" smtClean="0">
+                <a:solidFill>
+                  <a:srgbClr val="FF0000"/>
+                </a:solidFill>
+              </a:rPr>
+              <a:t>Alphabetical, descending</a:t>
+            </a:r>
+            <a:r>
+              <a:rPr lang="en-US" altLang="zh-CN" sz="1400" dirty="0" smtClean="0">
+                <a:solidFill>
+                  <a:srgbClr val="FF0000"/>
+                </a:solidFill>
+              </a:rPr>
+              <a:t>,</a:t>
+            </a:r>
+            <a:r>
+              <a:rPr lang="en-US" altLang="zh-CN" sz="1400" dirty="0" smtClean="0">
+                <a:solidFill>
+                  <a:srgbClr val="FF0000"/>
+                </a:solidFill>
+              </a:rPr>
+              <a:t> ascending order</a:t>
+            </a:r>
+            <a:endParaRPr lang="zh-CN" altLang="en-US" sz="1400" dirty="0">
+              <a:solidFill>
+                <a:srgbClr val="FF0000"/>
+              </a:solidFill>
+            </a:endParaRPr>
+          </a:p>
+        </p:txBody>
+      </p:sp>
+      <p:sp>
+        <p:nvSpPr>
+          <p:cNvPr id="77" name="矩形标注 76"/>
+          <p:cNvSpPr/>
+          <p:nvPr/>
+        </p:nvSpPr>
+        <p:spPr>
+          <a:xfrm rot="16200000" flipV="1">
+            <a:off x="28617119" y="7850930"/>
+            <a:ext cx="500066" cy="1500198"/>
+          </a:xfrm>
+          <a:prstGeom prst="wedgeRectCallout">
+            <a:avLst/>
+          </a:prstGeom>
+          <a:noFill/>
+        </p:spPr>
+        <p:style>
+          <a:lnRef idx="2">
+            <a:schemeClr val="accent1">
+              <a:shade val="50000"/>
+            </a:schemeClr>
+          </a:lnRef>
+          <a:fillRef idx="1">
+            <a:schemeClr val="accent1"/>
+          </a:fillRef>
+          <a:effectRef idx="0">
+            <a:schemeClr val="accent1"/>
+          </a:effectRef>
+          <a:fontRef idx="minor">
+            <a:schemeClr val="lt1"/>
+          </a:fontRef>
+        </p:style>
+        <p:txBody>
+          <a:bodyPr rtlCol="0" anchor="ctr"/>
+          <a:lstStyle/>
+          <a:p>
+            <a:pPr algn="ctr"/>
+            <a:endParaRPr lang="zh-CN" altLang="en-US"/>
+          </a:p>
+        </p:txBody>
+      </p:sp>
+      <p:sp>
+        <p:nvSpPr>
+          <p:cNvPr id="78" name="TextBox 77"/>
+          <p:cNvSpPr txBox="1"/>
+          <p:nvPr/>
+        </p:nvSpPr>
+        <p:spPr>
+          <a:xfrm rot="10800000" flipV="1">
+            <a:off x="28117053" y="8279558"/>
+            <a:ext cx="1500198" cy="646331"/>
+          </a:xfrm>
+          <a:prstGeom prst="rect">
+            <a:avLst/>
+          </a:prstGeom>
+          <a:noFill/>
+        </p:spPr>
+        <p:txBody>
+          <a:bodyPr wrap="square" rtlCol="0">
+            <a:spAutoFit/>
+          </a:bodyPr>
+          <a:lstStyle/>
+          <a:p>
+            <a:r>
+              <a:rPr lang="en-US" altLang="zh-CN" sz="1800" dirty="0" smtClean="0">
+                <a:solidFill>
+                  <a:srgbClr val="FF0000"/>
+                </a:solidFill>
+              </a:rPr>
+              <a:t>Filter data by threshold</a:t>
+            </a:r>
+            <a:endParaRPr lang="zh-CN" altLang="en-US" sz="1800" dirty="0">
+              <a:solidFill>
+                <a:srgbClr val="FF0000"/>
+              </a:solidFill>
+            </a:endParaRPr>
+          </a:p>
+        </p:txBody>
+      </p:sp>
+      <p:sp>
+        <p:nvSpPr>
+          <p:cNvPr id="79" name="矩形标注 78"/>
+          <p:cNvSpPr/>
+          <p:nvPr/>
+        </p:nvSpPr>
+        <p:spPr>
+          <a:xfrm rot="16200000" flipV="1">
+            <a:off x="28259929" y="8422434"/>
+            <a:ext cx="642942" cy="1643074"/>
+          </a:xfrm>
+          <a:prstGeom prst="wedgeRectCallout">
+            <a:avLst/>
+          </a:prstGeom>
+          <a:noFill/>
+        </p:spPr>
+        <p:style>
+          <a:lnRef idx="2">
+            <a:schemeClr val="accent1">
+              <a:shade val="50000"/>
+            </a:schemeClr>
+          </a:lnRef>
+          <a:fillRef idx="1">
+            <a:schemeClr val="accent1"/>
+          </a:fillRef>
+          <a:effectRef idx="0">
+            <a:schemeClr val="accent1"/>
+          </a:effectRef>
+          <a:fontRef idx="minor">
+            <a:schemeClr val="lt1"/>
+          </a:fontRef>
+        </p:style>
+        <p:txBody>
+          <a:bodyPr rtlCol="0" anchor="ctr"/>
+          <a:lstStyle/>
+          <a:p>
+            <a:pPr algn="ctr"/>
+            <a:endParaRPr lang="zh-CN" altLang="en-US"/>
+          </a:p>
+        </p:txBody>
+      </p:sp>
+      <p:sp>
+        <p:nvSpPr>
+          <p:cNvPr id="80" name="TextBox 79"/>
+          <p:cNvSpPr txBox="1"/>
+          <p:nvPr/>
+        </p:nvSpPr>
+        <p:spPr>
+          <a:xfrm rot="10800000" flipV="1">
+            <a:off x="27759863" y="8879579"/>
+            <a:ext cx="1714512" cy="707886"/>
+          </a:xfrm>
+          <a:prstGeom prst="rect">
+            <a:avLst/>
+          </a:prstGeom>
+          <a:noFill/>
+        </p:spPr>
+        <p:txBody>
+          <a:bodyPr wrap="square" rtlCol="0">
+            <a:spAutoFit/>
+          </a:bodyPr>
+          <a:lstStyle/>
+          <a:p>
+            <a:r>
+              <a:rPr lang="en-US" altLang="zh-CN" sz="2000" dirty="0" smtClean="0">
+                <a:solidFill>
+                  <a:srgbClr val="FF0000"/>
+                </a:solidFill>
+              </a:rPr>
+              <a:t>Export data in CSV format</a:t>
+            </a:r>
+            <a:endParaRPr lang="zh-CN" altLang="en-US" sz="2000" dirty="0">
+              <a:solidFill>
+                <a:srgbClr val="FF0000"/>
+              </a:solidFill>
+            </a:endParaRPr>
+          </a:p>
+        </p:txBody>
+      </p:sp>
+      <p:cxnSp>
+        <p:nvCxnSpPr>
+          <p:cNvPr id="82" name="直接箭头连接符 81"/>
+          <p:cNvCxnSpPr/>
+          <p:nvPr/>
+        </p:nvCxnSpPr>
+        <p:spPr>
+          <a:xfrm rot="10800000" flipV="1">
+            <a:off x="18901551" y="8350996"/>
+            <a:ext cx="4786346" cy="571504"/>
+          </a:xfrm>
+          <a:prstGeom prst="straightConnector1">
+            <a:avLst/>
+          </a:prstGeom>
+          <a:ln>
+            <a:tailEnd type="arrow"/>
+          </a:ln>
+        </p:spPr>
+        <p:style>
+          <a:lnRef idx="1">
+            <a:schemeClr val="accent1"/>
+          </a:lnRef>
+          <a:fillRef idx="0">
+            <a:schemeClr val="accent1"/>
+          </a:fillRef>
+          <a:effectRef idx="0">
+            <a:schemeClr val="accent1"/>
+          </a:effectRef>
+          <a:fontRef idx="minor">
+            <a:schemeClr val="tx1"/>
+          </a:fontRef>
+        </p:style>
+      </p:cxnSp>
+      <p:sp>
+        <p:nvSpPr>
+          <p:cNvPr id="88" name="矩形标注 87"/>
+          <p:cNvSpPr/>
+          <p:nvPr/>
+        </p:nvSpPr>
+        <p:spPr>
+          <a:xfrm>
+            <a:off x="18972989" y="7636616"/>
+            <a:ext cx="2214578" cy="1000132"/>
+          </a:xfrm>
+          <a:prstGeom prst="wedgeRectCallout">
+            <a:avLst/>
+          </a:prstGeom>
+          <a:noFill/>
+        </p:spPr>
+        <p:style>
+          <a:lnRef idx="2">
+            <a:schemeClr val="accent1">
+              <a:shade val="50000"/>
+            </a:schemeClr>
+          </a:lnRef>
+          <a:fillRef idx="1">
+            <a:schemeClr val="accent1"/>
+          </a:fillRef>
+          <a:effectRef idx="0">
+            <a:schemeClr val="accent1"/>
+          </a:effectRef>
+          <a:fontRef idx="minor">
+            <a:schemeClr val="lt1"/>
+          </a:fontRef>
+        </p:style>
+        <p:txBody>
+          <a:bodyPr rtlCol="0" anchor="ctr"/>
+          <a:lstStyle/>
+          <a:p>
+            <a:pPr algn="ctr"/>
+            <a:endParaRPr lang="zh-CN" altLang="en-US"/>
+          </a:p>
+        </p:txBody>
+      </p:sp>
+      <p:sp>
+        <p:nvSpPr>
+          <p:cNvPr id="89" name="TextBox 88"/>
+          <p:cNvSpPr txBox="1"/>
+          <p:nvPr/>
+        </p:nvSpPr>
+        <p:spPr>
+          <a:xfrm>
+            <a:off x="18972989" y="7565178"/>
+            <a:ext cx="2214578" cy="1015663"/>
+          </a:xfrm>
+          <a:prstGeom prst="rect">
+            <a:avLst/>
+          </a:prstGeom>
+          <a:noFill/>
+        </p:spPr>
+        <p:txBody>
+          <a:bodyPr wrap="square" rtlCol="0">
+            <a:spAutoFit/>
+          </a:bodyPr>
+          <a:lstStyle/>
+          <a:p>
+            <a:r>
+              <a:rPr lang="en-US" altLang="zh-CN" sz="2000" dirty="0" smtClean="0">
+                <a:solidFill>
+                  <a:srgbClr val="FF0000"/>
+                </a:solidFill>
+              </a:rPr>
+              <a:t>Clicking the bar will give details of activities</a:t>
+            </a:r>
+            <a:endParaRPr lang="zh-CN" altLang="en-US" sz="2000" dirty="0">
+              <a:solidFill>
+                <a:srgbClr val="FF0000"/>
+              </a:solidFill>
+            </a:endParaRPr>
+          </a:p>
+        </p:txBody>
+      </p:sp>
+      <p:pic>
+        <p:nvPicPr>
+          <p:cNvPr id="14" name="Picture 5"/>
+          <p:cNvPicPr>
+            <a:picLocks noChangeAspect="1" noChangeArrowheads="1"/>
+          </p:cNvPicPr>
+          <p:nvPr/>
+        </p:nvPicPr>
+        <p:blipFill>
+          <a:blip r:embed="rId11"/>
+          <a:srcRect/>
+          <a:stretch>
+            <a:fillRect/>
+          </a:stretch>
+        </p:blipFill>
+        <p:spPr bwMode="auto">
+          <a:xfrm>
+            <a:off x="11829189" y="11137078"/>
+            <a:ext cx="5857915" cy="3571900"/>
+          </a:xfrm>
+          <a:prstGeom prst="rect">
+            <a:avLst/>
+          </a:prstGeom>
+          <a:noFill/>
+          <a:ln w="9525">
+            <a:noFill/>
+            <a:miter lim="800000"/>
+            <a:headEnd/>
+            <a:tailEnd/>
+          </a:ln>
+          <a:effectLst/>
+        </p:spPr>
+      </p:pic>
+      <p:sp>
+        <p:nvSpPr>
+          <p:cNvPr id="91" name="TextBox 90"/>
+          <p:cNvSpPr txBox="1"/>
+          <p:nvPr/>
+        </p:nvSpPr>
+        <p:spPr>
+          <a:xfrm>
+            <a:off x="18187171" y="9494004"/>
+            <a:ext cx="7286676" cy="707886"/>
+          </a:xfrm>
+          <a:prstGeom prst="rect">
+            <a:avLst/>
+          </a:prstGeom>
+          <a:noFill/>
+        </p:spPr>
+        <p:txBody>
+          <a:bodyPr wrap="square" rtlCol="0">
+            <a:spAutoFit/>
+          </a:bodyPr>
+          <a:lstStyle/>
+          <a:p>
+            <a:r>
+              <a:rPr lang="en-US" altLang="zh-CN" sz="4000" dirty="0" smtClean="0"/>
+              <a:t>A</a:t>
+            </a:r>
+            <a:r>
+              <a:rPr lang="en-US" altLang="zh-CN" sz="4000" dirty="0" smtClean="0"/>
+              <a:t>ctivities of the class</a:t>
+            </a:r>
+            <a:endParaRPr lang="zh-CN" altLang="en-US" sz="4000" dirty="0"/>
+          </a:p>
+        </p:txBody>
+      </p:sp>
+      <p:pic>
+        <p:nvPicPr>
+          <p:cNvPr id="15" name="Picture 6"/>
+          <p:cNvPicPr>
+            <a:picLocks noChangeAspect="1" noChangeArrowheads="1"/>
+          </p:cNvPicPr>
+          <p:nvPr/>
+        </p:nvPicPr>
+        <p:blipFill>
+          <a:blip r:embed="rId12"/>
+          <a:srcRect/>
+          <a:stretch>
+            <a:fillRect/>
+          </a:stretch>
+        </p:blipFill>
+        <p:spPr bwMode="auto">
+          <a:xfrm>
+            <a:off x="17829981" y="11137078"/>
+            <a:ext cx="5357850" cy="3786214"/>
+          </a:xfrm>
+          <a:prstGeom prst="rect">
+            <a:avLst/>
+          </a:prstGeom>
+          <a:noFill/>
+          <a:ln w="9525">
+            <a:noFill/>
+            <a:miter lim="800000"/>
+            <a:headEnd/>
+            <a:tailEnd/>
+          </a:ln>
+          <a:effectLst/>
+        </p:spPr>
+      </p:pic>
+      <p:pic>
+        <p:nvPicPr>
+          <p:cNvPr id="1031" name="Picture 7"/>
+          <p:cNvPicPr>
+            <a:picLocks noChangeAspect="1" noChangeArrowheads="1"/>
+          </p:cNvPicPr>
+          <p:nvPr/>
+        </p:nvPicPr>
+        <p:blipFill>
+          <a:blip r:embed="rId13"/>
+          <a:srcRect/>
+          <a:stretch>
+            <a:fillRect/>
+          </a:stretch>
+        </p:blipFill>
+        <p:spPr bwMode="auto">
+          <a:xfrm>
+            <a:off x="23545021" y="11208516"/>
+            <a:ext cx="6073306" cy="3643338"/>
+          </a:xfrm>
+          <a:prstGeom prst="rect">
+            <a:avLst/>
+          </a:prstGeom>
+          <a:noFill/>
+          <a:ln w="9525">
+            <a:noFill/>
+            <a:miter lim="800000"/>
+            <a:headEnd/>
+            <a:tailEnd/>
+          </a:ln>
+          <a:effectLst/>
+        </p:spPr>
+      </p:pic>
+      <p:sp>
+        <p:nvSpPr>
+          <p:cNvPr id="92" name="TextBox 91"/>
+          <p:cNvSpPr txBox="1"/>
+          <p:nvPr/>
+        </p:nvSpPr>
+        <p:spPr>
+          <a:xfrm>
+            <a:off x="12829321" y="10565574"/>
+            <a:ext cx="3786214" cy="523220"/>
+          </a:xfrm>
+          <a:prstGeom prst="rect">
+            <a:avLst/>
+          </a:prstGeom>
+          <a:noFill/>
+        </p:spPr>
+        <p:txBody>
+          <a:bodyPr wrap="square" rtlCol="0">
+            <a:spAutoFit/>
+          </a:bodyPr>
+          <a:lstStyle/>
+          <a:p>
+            <a:r>
+              <a:rPr lang="en-US" altLang="zh-CN" sz="2800" dirty="0" smtClean="0"/>
+              <a:t>Amount of all activities</a:t>
+            </a:r>
+            <a:endParaRPr lang="zh-CN" altLang="en-US" sz="2800" dirty="0"/>
+          </a:p>
+        </p:txBody>
+      </p:sp>
+      <p:sp>
+        <p:nvSpPr>
+          <p:cNvPr id="93" name="TextBox 92"/>
+          <p:cNvSpPr txBox="1"/>
+          <p:nvPr/>
+        </p:nvSpPr>
+        <p:spPr>
+          <a:xfrm>
+            <a:off x="18544361" y="10565574"/>
+            <a:ext cx="4071966" cy="523220"/>
+          </a:xfrm>
+          <a:prstGeom prst="rect">
+            <a:avLst/>
+          </a:prstGeom>
+          <a:noFill/>
+        </p:spPr>
+        <p:txBody>
+          <a:bodyPr wrap="square" rtlCol="0">
+            <a:spAutoFit/>
+          </a:bodyPr>
+          <a:lstStyle/>
+          <a:p>
+            <a:r>
+              <a:rPr lang="en-US" altLang="zh-CN" sz="2800" dirty="0" smtClean="0"/>
+              <a:t>Breakdown of activities</a:t>
+            </a:r>
+            <a:endParaRPr lang="zh-CN" altLang="en-US" sz="2800" dirty="0"/>
+          </a:p>
+        </p:txBody>
+      </p:sp>
+      <p:sp>
+        <p:nvSpPr>
+          <p:cNvPr id="94" name="TextBox 92"/>
+          <p:cNvSpPr txBox="1"/>
+          <p:nvPr/>
+        </p:nvSpPr>
+        <p:spPr>
+          <a:xfrm>
+            <a:off x="24902343" y="10637012"/>
+            <a:ext cx="4071966" cy="523220"/>
+          </a:xfrm>
+          <a:prstGeom prst="rect">
+            <a:avLst/>
+          </a:prstGeom>
+          <a:noFill/>
+        </p:spPr>
+        <p:txBody>
+          <a:bodyPr wrap="square" rtlCol="0">
+            <a:spAutoFit/>
+          </a:bodyPr>
+          <a:lstStyle>
+            <a:defPPr>
+              <a:defRPr lang="en-US"/>
+            </a:defPPr>
+            <a:lvl1pPr marL="0" algn="l" defTabSz="4175669" rtl="0" eaLnBrk="1" latinLnBrk="0" hangingPunct="1">
+              <a:defRPr sz="8200" kern="1200">
+                <a:solidFill>
+                  <a:schemeClr val="tx1"/>
+                </a:solidFill>
+                <a:latin typeface="+mn-lt"/>
+                <a:ea typeface="+mn-ea"/>
+                <a:cs typeface="+mn-cs"/>
+              </a:defRPr>
+            </a:lvl1pPr>
+            <a:lvl2pPr marL="2087835" algn="l" defTabSz="4175669" rtl="0" eaLnBrk="1" latinLnBrk="0" hangingPunct="1">
+              <a:defRPr sz="8200" kern="1200">
+                <a:solidFill>
+                  <a:schemeClr val="tx1"/>
+                </a:solidFill>
+                <a:latin typeface="+mn-lt"/>
+                <a:ea typeface="+mn-ea"/>
+                <a:cs typeface="+mn-cs"/>
+              </a:defRPr>
+            </a:lvl2pPr>
+            <a:lvl3pPr marL="4175669" algn="l" defTabSz="4175669" rtl="0" eaLnBrk="1" latinLnBrk="0" hangingPunct="1">
+              <a:defRPr sz="8200" kern="1200">
+                <a:solidFill>
+                  <a:schemeClr val="tx1"/>
+                </a:solidFill>
+                <a:latin typeface="+mn-lt"/>
+                <a:ea typeface="+mn-ea"/>
+                <a:cs typeface="+mn-cs"/>
+              </a:defRPr>
+            </a:lvl3pPr>
+            <a:lvl4pPr marL="6263504" algn="l" defTabSz="4175669" rtl="0" eaLnBrk="1" latinLnBrk="0" hangingPunct="1">
+              <a:defRPr sz="8200" kern="1200">
+                <a:solidFill>
+                  <a:schemeClr val="tx1"/>
+                </a:solidFill>
+                <a:latin typeface="+mn-lt"/>
+                <a:ea typeface="+mn-ea"/>
+                <a:cs typeface="+mn-cs"/>
+              </a:defRPr>
+            </a:lvl4pPr>
+            <a:lvl5pPr marL="8351339" algn="l" defTabSz="4175669" rtl="0" eaLnBrk="1" latinLnBrk="0" hangingPunct="1">
+              <a:defRPr sz="8200" kern="1200">
+                <a:solidFill>
+                  <a:schemeClr val="tx1"/>
+                </a:solidFill>
+                <a:latin typeface="+mn-lt"/>
+                <a:ea typeface="+mn-ea"/>
+                <a:cs typeface="+mn-cs"/>
+              </a:defRPr>
+            </a:lvl5pPr>
+            <a:lvl6pPr marL="10439173" algn="l" defTabSz="4175669" rtl="0" eaLnBrk="1" latinLnBrk="0" hangingPunct="1">
+              <a:defRPr sz="8200" kern="1200">
+                <a:solidFill>
+                  <a:schemeClr val="tx1"/>
+                </a:solidFill>
+                <a:latin typeface="+mn-lt"/>
+                <a:ea typeface="+mn-ea"/>
+                <a:cs typeface="+mn-cs"/>
+              </a:defRPr>
+            </a:lvl6pPr>
+            <a:lvl7pPr marL="12527008" algn="l" defTabSz="4175669" rtl="0" eaLnBrk="1" latinLnBrk="0" hangingPunct="1">
+              <a:defRPr sz="8200" kern="1200">
+                <a:solidFill>
+                  <a:schemeClr val="tx1"/>
+                </a:solidFill>
+                <a:latin typeface="+mn-lt"/>
+                <a:ea typeface="+mn-ea"/>
+                <a:cs typeface="+mn-cs"/>
+              </a:defRPr>
+            </a:lvl7pPr>
+            <a:lvl8pPr marL="14614843" algn="l" defTabSz="4175669" rtl="0" eaLnBrk="1" latinLnBrk="0" hangingPunct="1">
+              <a:defRPr sz="8200" kern="1200">
+                <a:solidFill>
+                  <a:schemeClr val="tx1"/>
+                </a:solidFill>
+                <a:latin typeface="+mn-lt"/>
+                <a:ea typeface="+mn-ea"/>
+                <a:cs typeface="+mn-cs"/>
+              </a:defRPr>
+            </a:lvl8pPr>
+            <a:lvl9pPr marL="16702677" algn="l" defTabSz="4175669" rtl="0" eaLnBrk="1" latinLnBrk="0" hangingPunct="1">
+              <a:defRPr sz="8200" kern="1200">
+                <a:solidFill>
+                  <a:schemeClr val="tx1"/>
+                </a:solidFill>
+                <a:latin typeface="+mn-lt"/>
+                <a:ea typeface="+mn-ea"/>
+                <a:cs typeface="+mn-cs"/>
+              </a:defRPr>
+            </a:lvl9pPr>
+          </a:lstStyle>
+          <a:p>
+            <a:r>
+              <a:rPr lang="en-US" altLang="zh-CN" sz="2800" dirty="0" smtClean="0"/>
+              <a:t>Specific activity</a:t>
+            </a:r>
+            <a:endParaRPr lang="zh-CN" altLang="en-US" sz="2800" dirty="0"/>
+          </a:p>
+        </p:txBody>
+      </p:sp>
+      <p:cxnSp>
+        <p:nvCxnSpPr>
+          <p:cNvPr id="96" name="直接连接符 95"/>
+          <p:cNvCxnSpPr/>
+          <p:nvPr/>
+        </p:nvCxnSpPr>
+        <p:spPr>
+          <a:xfrm rot="10800000" flipV="1">
+            <a:off x="14543833" y="10065508"/>
+            <a:ext cx="5857916" cy="571504"/>
+          </a:xfrm>
+          <a:prstGeom prst="line">
+            <a:avLst/>
+          </a:prstGeom>
+          <a:ln>
+            <a:solidFill>
+              <a:schemeClr val="tx1"/>
+            </a:solidFill>
+          </a:ln>
+        </p:spPr>
+        <p:style>
+          <a:lnRef idx="1">
+            <a:schemeClr val="accent1"/>
+          </a:lnRef>
+          <a:fillRef idx="0">
+            <a:schemeClr val="accent1"/>
+          </a:fillRef>
+          <a:effectRef idx="0">
+            <a:schemeClr val="accent1"/>
+          </a:effectRef>
+          <a:fontRef idx="minor">
+            <a:schemeClr val="tx1"/>
+          </a:fontRef>
+        </p:style>
+      </p:cxnSp>
+      <p:cxnSp>
+        <p:nvCxnSpPr>
+          <p:cNvPr id="100" name="直接连接符 99"/>
+          <p:cNvCxnSpPr/>
+          <p:nvPr/>
+        </p:nvCxnSpPr>
+        <p:spPr>
+          <a:xfrm rot="5400000">
+            <a:off x="20115203" y="10351260"/>
+            <a:ext cx="572298" cy="794"/>
+          </a:xfrm>
+          <a:prstGeom prst="line">
+            <a:avLst/>
+          </a:prstGeom>
+          <a:ln>
+            <a:solidFill>
+              <a:schemeClr val="tx1"/>
+            </a:solidFill>
+          </a:ln>
+        </p:spPr>
+        <p:style>
+          <a:lnRef idx="1">
+            <a:schemeClr val="accent1"/>
+          </a:lnRef>
+          <a:fillRef idx="0">
+            <a:schemeClr val="accent1"/>
+          </a:fillRef>
+          <a:effectRef idx="0">
+            <a:schemeClr val="accent1"/>
+          </a:effectRef>
+          <a:fontRef idx="minor">
+            <a:schemeClr val="tx1"/>
+          </a:fontRef>
+        </p:style>
+      </p:cxnSp>
+      <p:cxnSp>
+        <p:nvCxnSpPr>
+          <p:cNvPr id="105" name="直接连接符 104"/>
+          <p:cNvCxnSpPr/>
+          <p:nvPr/>
+        </p:nvCxnSpPr>
+        <p:spPr>
+          <a:xfrm>
+            <a:off x="20401749" y="10065508"/>
+            <a:ext cx="5715040" cy="642942"/>
+          </a:xfrm>
+          <a:prstGeom prst="line">
+            <a:avLst/>
+          </a:prstGeom>
+          <a:ln>
+            <a:solidFill>
+              <a:schemeClr val="tx1"/>
+            </a:solidFill>
+          </a:ln>
+        </p:spPr>
+        <p:style>
+          <a:lnRef idx="1">
+            <a:schemeClr val="accent1"/>
+          </a:lnRef>
+          <a:fillRef idx="0">
+            <a:schemeClr val="accent1"/>
+          </a:fillRef>
+          <a:effectRef idx="0">
+            <a:schemeClr val="accent1"/>
+          </a:effectRef>
+          <a:fontRef idx="minor">
+            <a:schemeClr val="tx1"/>
+          </a:fontRef>
+        </p:style>
+      </p:cxnSp>
+      <p:sp>
+        <p:nvSpPr>
+          <p:cNvPr id="107" name="矩形标注 106"/>
+          <p:cNvSpPr/>
+          <p:nvPr/>
+        </p:nvSpPr>
+        <p:spPr>
+          <a:xfrm rot="5400000" flipV="1">
+            <a:off x="25938194" y="12815871"/>
+            <a:ext cx="642942" cy="3000396"/>
+          </a:xfrm>
+          <a:prstGeom prst="wedgeRectCallout">
+            <a:avLst/>
+          </a:prstGeom>
+          <a:noFill/>
+        </p:spPr>
+        <p:style>
+          <a:lnRef idx="2">
+            <a:schemeClr val="accent1">
+              <a:shade val="50000"/>
+            </a:schemeClr>
+          </a:lnRef>
+          <a:fillRef idx="1">
+            <a:schemeClr val="accent1"/>
+          </a:fillRef>
+          <a:effectRef idx="0">
+            <a:schemeClr val="accent1"/>
+          </a:effectRef>
+          <a:fontRef idx="minor">
+            <a:schemeClr val="lt1"/>
+          </a:fontRef>
+        </p:style>
+        <p:txBody>
+          <a:bodyPr rtlCol="0" anchor="ctr"/>
+          <a:lstStyle/>
+          <a:p>
+            <a:pPr algn="ctr"/>
+            <a:endParaRPr lang="zh-CN" altLang="en-US"/>
+          </a:p>
+        </p:txBody>
+      </p:sp>
+      <p:sp>
+        <p:nvSpPr>
+          <p:cNvPr id="108" name="TextBox 107"/>
+          <p:cNvSpPr txBox="1"/>
+          <p:nvPr/>
+        </p:nvSpPr>
+        <p:spPr>
+          <a:xfrm rot="10800000" flipV="1">
+            <a:off x="24759467" y="13943984"/>
+            <a:ext cx="3071834" cy="707886"/>
+          </a:xfrm>
+          <a:prstGeom prst="rect">
+            <a:avLst/>
+          </a:prstGeom>
+          <a:noFill/>
+        </p:spPr>
+        <p:txBody>
+          <a:bodyPr wrap="square" rtlCol="0">
+            <a:spAutoFit/>
+          </a:bodyPr>
+          <a:lstStyle/>
+          <a:p>
+            <a:r>
+              <a:rPr lang="en-US" altLang="zh-CN" sz="2000" dirty="0" smtClean="0">
+                <a:solidFill>
+                  <a:srgbClr val="FF0000"/>
+                </a:solidFill>
+              </a:rPr>
+              <a:t>Auto-complete, choose the activity for this chart</a:t>
+            </a:r>
+            <a:endParaRPr lang="zh-CN" altLang="en-US" sz="2000" dirty="0">
+              <a:solidFill>
+                <a:srgbClr val="FF0000"/>
+              </a:solidFill>
+            </a:endParaRPr>
+          </a:p>
+        </p:txBody>
+      </p:sp>
+      <p:sp>
+        <p:nvSpPr>
+          <p:cNvPr id="109" name="矩形标注 108"/>
+          <p:cNvSpPr/>
+          <p:nvPr/>
+        </p:nvSpPr>
+        <p:spPr>
+          <a:xfrm rot="16200000" flipV="1">
+            <a:off x="25902474" y="10065507"/>
+            <a:ext cx="357191" cy="2500330"/>
+          </a:xfrm>
+          <a:prstGeom prst="wedgeRectCallout">
+            <a:avLst/>
+          </a:prstGeom>
+          <a:noFill/>
+        </p:spPr>
+        <p:style>
+          <a:lnRef idx="2">
+            <a:schemeClr val="accent1">
+              <a:shade val="50000"/>
+            </a:schemeClr>
+          </a:lnRef>
+          <a:fillRef idx="1">
+            <a:schemeClr val="accent1"/>
+          </a:fillRef>
+          <a:effectRef idx="0">
+            <a:schemeClr val="accent1"/>
+          </a:effectRef>
+          <a:fontRef idx="minor">
+            <a:schemeClr val="lt1"/>
+          </a:fontRef>
+        </p:style>
+        <p:txBody>
+          <a:bodyPr rtlCol="0" anchor="ctr"/>
+          <a:lstStyle/>
+          <a:p>
+            <a:pPr algn="ctr"/>
+            <a:endParaRPr lang="zh-CN" altLang="en-US"/>
+          </a:p>
+        </p:txBody>
+      </p:sp>
+      <p:sp>
+        <p:nvSpPr>
+          <p:cNvPr id="110" name="TextBox 109"/>
+          <p:cNvSpPr txBox="1"/>
+          <p:nvPr/>
+        </p:nvSpPr>
+        <p:spPr>
+          <a:xfrm rot="10800000" flipV="1">
+            <a:off x="24830905" y="11091476"/>
+            <a:ext cx="3000396" cy="400110"/>
+          </a:xfrm>
+          <a:prstGeom prst="rect">
+            <a:avLst/>
+          </a:prstGeom>
+          <a:noFill/>
+        </p:spPr>
+        <p:txBody>
+          <a:bodyPr wrap="square" rtlCol="0">
+            <a:spAutoFit/>
+          </a:bodyPr>
+          <a:lstStyle/>
+          <a:p>
+            <a:r>
+              <a:rPr lang="en-US" altLang="zh-CN" sz="2000" dirty="0" smtClean="0">
+                <a:solidFill>
+                  <a:srgbClr val="FF0000"/>
+                </a:solidFill>
+              </a:rPr>
+              <a:t>The activity can be set</a:t>
+            </a:r>
+            <a:endParaRPr lang="zh-CN" altLang="en-US" sz="2000" dirty="0">
+              <a:solidFill>
+                <a:srgbClr val="FF0000"/>
+              </a:solidFill>
+            </a:endParaRPr>
+          </a:p>
+        </p:txBody>
+      </p:sp>
+      <p:sp>
+        <p:nvSpPr>
+          <p:cNvPr id="111" name="TextBox 110"/>
+          <p:cNvSpPr txBox="1"/>
+          <p:nvPr/>
+        </p:nvSpPr>
+        <p:spPr>
+          <a:xfrm>
+            <a:off x="18258609" y="14637540"/>
+            <a:ext cx="4214842" cy="707886"/>
+          </a:xfrm>
+          <a:prstGeom prst="rect">
+            <a:avLst/>
+          </a:prstGeom>
+          <a:noFill/>
+        </p:spPr>
+        <p:txBody>
+          <a:bodyPr wrap="square" rtlCol="0">
+            <a:spAutoFit/>
+          </a:bodyPr>
+          <a:lstStyle/>
+          <a:p>
+            <a:r>
+              <a:rPr lang="en-US" altLang="zh-CN" sz="4000" dirty="0" smtClean="0"/>
+              <a:t>Submission pattern</a:t>
+            </a:r>
+            <a:endParaRPr lang="zh-CN" altLang="en-US" sz="4000" dirty="0"/>
+          </a:p>
+        </p:txBody>
+      </p:sp>
+      <p:pic>
+        <p:nvPicPr>
+          <p:cNvPr id="1032" name="Picture 8"/>
+          <p:cNvPicPr>
+            <a:picLocks noChangeAspect="1" noChangeArrowheads="1"/>
+          </p:cNvPicPr>
+          <p:nvPr/>
+        </p:nvPicPr>
+        <p:blipFill>
+          <a:blip r:embed="rId14"/>
+          <a:srcRect/>
+          <a:stretch>
+            <a:fillRect/>
+          </a:stretch>
+        </p:blipFill>
+        <p:spPr bwMode="auto">
+          <a:xfrm>
+            <a:off x="11757751" y="15923424"/>
+            <a:ext cx="5929353" cy="3143272"/>
+          </a:xfrm>
+          <a:prstGeom prst="rect">
+            <a:avLst/>
+          </a:prstGeom>
+          <a:noFill/>
+          <a:ln w="9525">
+            <a:noFill/>
+            <a:miter lim="800000"/>
+            <a:headEnd/>
+            <a:tailEnd/>
+          </a:ln>
+          <a:effectLst/>
+        </p:spPr>
+      </p:pic>
+      <p:sp>
+        <p:nvSpPr>
+          <p:cNvPr id="112" name="TextBox 111"/>
+          <p:cNvSpPr txBox="1"/>
+          <p:nvPr/>
+        </p:nvSpPr>
+        <p:spPr>
+          <a:xfrm>
+            <a:off x="17687105" y="15471642"/>
+            <a:ext cx="6357982" cy="523220"/>
+          </a:xfrm>
+          <a:prstGeom prst="rect">
+            <a:avLst/>
+          </a:prstGeom>
+          <a:noFill/>
+        </p:spPr>
+        <p:txBody>
+          <a:bodyPr wrap="square" rtlCol="0">
+            <a:spAutoFit/>
+          </a:bodyPr>
+          <a:lstStyle/>
+          <a:p>
+            <a:r>
+              <a:rPr lang="en-US" altLang="zh-CN" sz="2800" dirty="0" smtClean="0"/>
+              <a:t>When do students make first submissions?</a:t>
+            </a:r>
+            <a:endParaRPr lang="zh-CN" altLang="en-US" sz="2800" dirty="0"/>
+          </a:p>
+        </p:txBody>
+      </p:sp>
+      <p:pic>
+        <p:nvPicPr>
+          <p:cNvPr id="16" name="Picture 9"/>
+          <p:cNvPicPr>
+            <a:picLocks noChangeAspect="1" noChangeArrowheads="1"/>
+          </p:cNvPicPr>
+          <p:nvPr/>
+        </p:nvPicPr>
+        <p:blipFill>
+          <a:blip r:embed="rId15"/>
+          <a:srcRect/>
+          <a:stretch>
+            <a:fillRect/>
+          </a:stretch>
+        </p:blipFill>
+        <p:spPr bwMode="auto">
+          <a:xfrm>
+            <a:off x="17829981" y="15994862"/>
+            <a:ext cx="5500726" cy="3071834"/>
+          </a:xfrm>
+          <a:prstGeom prst="rect">
+            <a:avLst/>
+          </a:prstGeom>
+          <a:noFill/>
+          <a:ln w="9525">
+            <a:noFill/>
+            <a:miter lim="800000"/>
+            <a:headEnd/>
+            <a:tailEnd/>
+          </a:ln>
+          <a:effectLst/>
+        </p:spPr>
+      </p:pic>
+      <p:pic>
+        <p:nvPicPr>
+          <p:cNvPr id="17" name="Picture 10"/>
+          <p:cNvPicPr>
+            <a:picLocks noChangeAspect="1" noChangeArrowheads="1"/>
+          </p:cNvPicPr>
+          <p:nvPr/>
+        </p:nvPicPr>
+        <p:blipFill>
+          <a:blip r:embed="rId16"/>
+          <a:srcRect/>
+          <a:stretch>
+            <a:fillRect/>
+          </a:stretch>
+        </p:blipFill>
+        <p:spPr bwMode="auto">
+          <a:xfrm>
+            <a:off x="23973649" y="15994862"/>
+            <a:ext cx="5500726" cy="3143272"/>
+          </a:xfrm>
+          <a:prstGeom prst="rect">
+            <a:avLst/>
+          </a:prstGeom>
+          <a:noFill/>
+          <a:ln w="9525">
+            <a:noFill/>
+            <a:miter lim="800000"/>
+            <a:headEnd/>
+            <a:tailEnd/>
+          </a:ln>
+          <a:effectLst/>
+        </p:spPr>
+      </p:pic>
+      <p:cxnSp>
+        <p:nvCxnSpPr>
+          <p:cNvPr id="114" name="直接连接符 113"/>
+          <p:cNvCxnSpPr/>
+          <p:nvPr/>
+        </p:nvCxnSpPr>
+        <p:spPr>
+          <a:xfrm rot="10800000" flipV="1">
+            <a:off x="13686577" y="15209044"/>
+            <a:ext cx="6715172" cy="285752"/>
+          </a:xfrm>
+          <a:prstGeom prst="line">
+            <a:avLst/>
+          </a:prstGeom>
+          <a:ln>
+            <a:solidFill>
+              <a:schemeClr val="tx1"/>
+            </a:solidFill>
+          </a:ln>
+        </p:spPr>
+        <p:style>
+          <a:lnRef idx="1">
+            <a:schemeClr val="accent1"/>
+          </a:lnRef>
+          <a:fillRef idx="0">
+            <a:schemeClr val="accent1"/>
+          </a:fillRef>
+          <a:effectRef idx="0">
+            <a:schemeClr val="accent1"/>
+          </a:effectRef>
+          <a:fontRef idx="minor">
+            <a:schemeClr val="tx1"/>
+          </a:fontRef>
+        </p:style>
+      </p:cxnSp>
+      <p:cxnSp>
+        <p:nvCxnSpPr>
+          <p:cNvPr id="115" name="直接连接符 114"/>
+          <p:cNvCxnSpPr/>
+          <p:nvPr/>
+        </p:nvCxnSpPr>
+        <p:spPr>
+          <a:xfrm rot="5400000">
+            <a:off x="20187435" y="15423358"/>
+            <a:ext cx="428628" cy="1588"/>
+          </a:xfrm>
+          <a:prstGeom prst="line">
+            <a:avLst/>
+          </a:prstGeom>
+          <a:ln>
+            <a:solidFill>
+              <a:schemeClr val="tx1"/>
+            </a:solidFill>
+          </a:ln>
+        </p:spPr>
+        <p:style>
+          <a:lnRef idx="1">
+            <a:schemeClr val="accent1"/>
+          </a:lnRef>
+          <a:fillRef idx="0">
+            <a:schemeClr val="accent1"/>
+          </a:fillRef>
+          <a:effectRef idx="0">
+            <a:schemeClr val="accent1"/>
+          </a:effectRef>
+          <a:fontRef idx="minor">
+            <a:schemeClr val="tx1"/>
+          </a:fontRef>
+        </p:style>
+      </p:cxnSp>
+      <p:cxnSp>
+        <p:nvCxnSpPr>
+          <p:cNvPr id="116" name="直接连接符 115"/>
+          <p:cNvCxnSpPr/>
+          <p:nvPr/>
+        </p:nvCxnSpPr>
+        <p:spPr>
+          <a:xfrm>
+            <a:off x="20401749" y="15209044"/>
+            <a:ext cx="5929354" cy="285752"/>
+          </a:xfrm>
+          <a:prstGeom prst="line">
+            <a:avLst/>
+          </a:prstGeom>
+          <a:ln>
+            <a:solidFill>
+              <a:schemeClr val="tx1"/>
+            </a:solidFill>
+          </a:ln>
+        </p:spPr>
+        <p:style>
+          <a:lnRef idx="1">
+            <a:schemeClr val="accent1"/>
+          </a:lnRef>
+          <a:fillRef idx="0">
+            <a:schemeClr val="accent1"/>
+          </a:fillRef>
+          <a:effectRef idx="0">
+            <a:schemeClr val="accent1"/>
+          </a:effectRef>
+          <a:fontRef idx="minor">
+            <a:schemeClr val="tx1"/>
+          </a:fontRef>
+        </p:style>
+      </p:cxnSp>
+      <p:sp>
+        <p:nvSpPr>
+          <p:cNvPr id="119" name="TextBox 118"/>
+          <p:cNvSpPr txBox="1"/>
+          <p:nvPr/>
+        </p:nvSpPr>
+        <p:spPr>
+          <a:xfrm>
+            <a:off x="25259533" y="15494796"/>
+            <a:ext cx="2786082" cy="523220"/>
+          </a:xfrm>
+          <a:prstGeom prst="rect">
+            <a:avLst/>
+          </a:prstGeom>
+          <a:noFill/>
+        </p:spPr>
+        <p:txBody>
+          <a:bodyPr wrap="square" rtlCol="0">
+            <a:spAutoFit/>
+          </a:bodyPr>
+          <a:lstStyle/>
+          <a:p>
+            <a:r>
+              <a:rPr lang="en-US" altLang="zh-CN" sz="2800" dirty="0" smtClean="0"/>
+              <a:t>Individual student</a:t>
+            </a:r>
+            <a:endParaRPr lang="zh-CN" altLang="en-US" sz="2800" dirty="0"/>
+          </a:p>
+        </p:txBody>
+      </p:sp>
+      <p:sp>
+        <p:nvSpPr>
+          <p:cNvPr id="121" name="TextBox 120"/>
+          <p:cNvSpPr txBox="1"/>
+          <p:nvPr/>
+        </p:nvSpPr>
+        <p:spPr>
+          <a:xfrm>
+            <a:off x="12829321" y="15471642"/>
+            <a:ext cx="2786082" cy="523220"/>
+          </a:xfrm>
+          <a:prstGeom prst="rect">
+            <a:avLst/>
+          </a:prstGeom>
+          <a:noFill/>
+        </p:spPr>
+        <p:txBody>
+          <a:bodyPr wrap="square" rtlCol="0">
+            <a:spAutoFit/>
+          </a:bodyPr>
+          <a:lstStyle/>
+          <a:p>
+            <a:r>
+              <a:rPr lang="en-US" altLang="zh-CN" sz="2800" dirty="0" smtClean="0"/>
+              <a:t>The class</a:t>
+            </a:r>
+            <a:endParaRPr lang="zh-CN" altLang="en-US" sz="2800" dirty="0"/>
+          </a:p>
+        </p:txBody>
+      </p:sp>
+      <p:sp>
+        <p:nvSpPr>
+          <p:cNvPr id="124" name="矩形标注 123"/>
+          <p:cNvSpPr/>
+          <p:nvPr/>
+        </p:nvSpPr>
+        <p:spPr>
+          <a:xfrm rot="10800000" flipV="1">
+            <a:off x="14543833" y="15637672"/>
+            <a:ext cx="2714644" cy="571504"/>
+          </a:xfrm>
+          <a:prstGeom prst="wedgeRectCallout">
+            <a:avLst/>
+          </a:prstGeom>
+          <a:noFill/>
+        </p:spPr>
+        <p:style>
+          <a:lnRef idx="2">
+            <a:schemeClr val="accent1">
+              <a:shade val="50000"/>
+            </a:schemeClr>
+          </a:lnRef>
+          <a:fillRef idx="1">
+            <a:schemeClr val="accent1"/>
+          </a:fillRef>
+          <a:effectRef idx="0">
+            <a:schemeClr val="accent1"/>
+          </a:effectRef>
+          <a:fontRef idx="minor">
+            <a:schemeClr val="lt1"/>
+          </a:fontRef>
+        </p:style>
+        <p:txBody>
+          <a:bodyPr rtlCol="0" anchor="ctr"/>
+          <a:lstStyle/>
+          <a:p>
+            <a:pPr algn="ctr"/>
+            <a:endParaRPr lang="zh-CN" altLang="en-US"/>
+          </a:p>
+        </p:txBody>
+      </p:sp>
+      <p:sp>
+        <p:nvSpPr>
+          <p:cNvPr id="125" name="TextBox 124"/>
+          <p:cNvSpPr txBox="1"/>
+          <p:nvPr/>
+        </p:nvSpPr>
+        <p:spPr>
+          <a:xfrm rot="10800000" flipV="1">
+            <a:off x="14543833" y="15566234"/>
+            <a:ext cx="2786082" cy="707886"/>
+          </a:xfrm>
+          <a:prstGeom prst="rect">
+            <a:avLst/>
+          </a:prstGeom>
+          <a:noFill/>
+        </p:spPr>
+        <p:txBody>
+          <a:bodyPr wrap="square" rtlCol="0">
+            <a:spAutoFit/>
+          </a:bodyPr>
+          <a:lstStyle/>
+          <a:p>
+            <a:r>
+              <a:rPr lang="en-US" altLang="zh-CN" sz="2000" dirty="0" smtClean="0">
+                <a:solidFill>
+                  <a:srgbClr val="FF0000"/>
+                </a:solidFill>
+              </a:rPr>
+              <a:t>Annotate assignment  start, due day</a:t>
+            </a:r>
+            <a:endParaRPr lang="zh-CN" altLang="en-US" sz="2000" dirty="0">
+              <a:solidFill>
+                <a:srgbClr val="FF0000"/>
+              </a:solidFill>
+            </a:endParaRPr>
+          </a:p>
+        </p:txBody>
+      </p:sp>
+      <p:pic>
+        <p:nvPicPr>
+          <p:cNvPr id="1035" name="Picture 11"/>
+          <p:cNvPicPr>
+            <a:picLocks noChangeAspect="1" noChangeArrowheads="1"/>
+          </p:cNvPicPr>
+          <p:nvPr/>
+        </p:nvPicPr>
+        <p:blipFill>
+          <a:blip r:embed="rId17"/>
+          <a:srcRect/>
+          <a:stretch>
+            <a:fillRect/>
+          </a:stretch>
+        </p:blipFill>
+        <p:spPr bwMode="auto">
+          <a:xfrm>
+            <a:off x="12186380" y="19423886"/>
+            <a:ext cx="7643865" cy="4214842"/>
+          </a:xfrm>
+          <a:prstGeom prst="rect">
+            <a:avLst/>
+          </a:prstGeom>
+          <a:noFill/>
+          <a:ln w="9525">
+            <a:noFill/>
+            <a:miter lim="800000"/>
+            <a:headEnd/>
+            <a:tailEnd/>
+          </a:ln>
+          <a:effectLst/>
+        </p:spPr>
+      </p:pic>
+      <p:pic>
+        <p:nvPicPr>
+          <p:cNvPr id="1036" name="Picture 12"/>
+          <p:cNvPicPr>
+            <a:picLocks noChangeAspect="1" noChangeArrowheads="1"/>
+          </p:cNvPicPr>
+          <p:nvPr/>
+        </p:nvPicPr>
+        <p:blipFill>
+          <a:blip r:embed="rId18"/>
+          <a:srcRect/>
+          <a:stretch>
+            <a:fillRect/>
+          </a:stretch>
+        </p:blipFill>
+        <p:spPr bwMode="auto">
+          <a:xfrm>
+            <a:off x="20901815" y="19638200"/>
+            <a:ext cx="7786742" cy="4000528"/>
+          </a:xfrm>
+          <a:prstGeom prst="rect">
+            <a:avLst/>
+          </a:prstGeom>
+          <a:noFill/>
+          <a:ln w="9525">
+            <a:noFill/>
+            <a:miter lim="800000"/>
+            <a:headEnd/>
+            <a:tailEnd/>
+          </a:ln>
+          <a:effectLst/>
+        </p:spPr>
+      </p:pic>
+      <p:sp>
+        <p:nvSpPr>
+          <p:cNvPr id="126" name="TextBox 125"/>
+          <p:cNvSpPr txBox="1"/>
+          <p:nvPr/>
+        </p:nvSpPr>
+        <p:spPr>
+          <a:xfrm>
+            <a:off x="20758939" y="19138135"/>
+            <a:ext cx="9001188" cy="523220"/>
+          </a:xfrm>
+          <a:prstGeom prst="rect">
+            <a:avLst/>
+          </a:prstGeom>
+          <a:noFill/>
+        </p:spPr>
+        <p:txBody>
+          <a:bodyPr wrap="square" rtlCol="0">
+            <a:spAutoFit/>
+          </a:bodyPr>
+          <a:lstStyle/>
+          <a:p>
+            <a:r>
+              <a:rPr lang="en-US" altLang="zh-CN" sz="2800" dirty="0" smtClean="0"/>
+              <a:t>Relationship between activities and academic performances</a:t>
+            </a:r>
+            <a:endParaRPr lang="zh-CN" altLang="en-US" sz="2800" dirty="0"/>
+          </a:p>
+        </p:txBody>
+      </p:sp>
+      <p:sp>
+        <p:nvSpPr>
+          <p:cNvPr id="127" name="矩形标注 126"/>
+          <p:cNvSpPr/>
+          <p:nvPr/>
+        </p:nvSpPr>
+        <p:spPr>
+          <a:xfrm rot="16200000" flipV="1">
+            <a:off x="26295383" y="20291024"/>
+            <a:ext cx="357191" cy="2857520"/>
+          </a:xfrm>
+          <a:prstGeom prst="wedgeRectCallout">
+            <a:avLst/>
+          </a:prstGeom>
+          <a:noFill/>
+        </p:spPr>
+        <p:style>
+          <a:lnRef idx="2">
+            <a:schemeClr val="accent1">
+              <a:shade val="50000"/>
+            </a:schemeClr>
+          </a:lnRef>
+          <a:fillRef idx="1">
+            <a:schemeClr val="accent1"/>
+          </a:fillRef>
+          <a:effectRef idx="0">
+            <a:schemeClr val="accent1"/>
+          </a:effectRef>
+          <a:fontRef idx="minor">
+            <a:schemeClr val="lt1"/>
+          </a:fontRef>
+        </p:style>
+        <p:txBody>
+          <a:bodyPr rtlCol="0" anchor="ctr"/>
+          <a:lstStyle/>
+          <a:p>
+            <a:pPr algn="ctr"/>
+            <a:endParaRPr lang="zh-CN" altLang="en-US"/>
+          </a:p>
+        </p:txBody>
+      </p:sp>
+      <p:sp>
+        <p:nvSpPr>
+          <p:cNvPr id="128" name="TextBox 127"/>
+          <p:cNvSpPr txBox="1"/>
+          <p:nvPr/>
+        </p:nvSpPr>
+        <p:spPr>
+          <a:xfrm rot="10800000" flipV="1">
+            <a:off x="25045219" y="21495588"/>
+            <a:ext cx="3000396" cy="400110"/>
+          </a:xfrm>
+          <a:prstGeom prst="rect">
+            <a:avLst/>
+          </a:prstGeom>
+          <a:noFill/>
+        </p:spPr>
+        <p:txBody>
+          <a:bodyPr wrap="square" rtlCol="0">
+            <a:spAutoFit/>
+          </a:bodyPr>
+          <a:lstStyle/>
+          <a:p>
+            <a:r>
+              <a:rPr lang="en-US" altLang="zh-CN" sz="2000" dirty="0" smtClean="0">
+                <a:solidFill>
+                  <a:srgbClr val="FF0000"/>
+                </a:solidFill>
+              </a:rPr>
+              <a:t>Automatically calculated</a:t>
+            </a:r>
+            <a:endParaRPr lang="zh-CN" altLang="en-US" sz="2000" dirty="0">
+              <a:solidFill>
+                <a:srgbClr val="FF0000"/>
+              </a:solidFill>
+            </a:endParaRPr>
+          </a:p>
+        </p:txBody>
+      </p:sp>
+      <p:sp>
+        <p:nvSpPr>
+          <p:cNvPr id="129" name="矩形标注 128"/>
+          <p:cNvSpPr/>
+          <p:nvPr/>
+        </p:nvSpPr>
+        <p:spPr>
+          <a:xfrm rot="5400000" flipV="1">
+            <a:off x="19294460" y="22010549"/>
+            <a:ext cx="642942" cy="2000264"/>
+          </a:xfrm>
+          <a:prstGeom prst="wedgeRectCallout">
+            <a:avLst/>
+          </a:prstGeom>
+          <a:noFill/>
+        </p:spPr>
+        <p:style>
+          <a:lnRef idx="2">
+            <a:schemeClr val="accent1">
+              <a:shade val="50000"/>
+            </a:schemeClr>
+          </a:lnRef>
+          <a:fillRef idx="1">
+            <a:schemeClr val="accent1"/>
+          </a:fillRef>
+          <a:effectRef idx="0">
+            <a:schemeClr val="accent1"/>
+          </a:effectRef>
+          <a:fontRef idx="minor">
+            <a:schemeClr val="lt1"/>
+          </a:fontRef>
+        </p:style>
+        <p:txBody>
+          <a:bodyPr rtlCol="0" anchor="ctr"/>
+          <a:lstStyle/>
+          <a:p>
+            <a:pPr algn="ctr"/>
+            <a:endParaRPr lang="zh-CN" altLang="en-US"/>
+          </a:p>
+        </p:txBody>
+      </p:sp>
+      <p:sp>
+        <p:nvSpPr>
+          <p:cNvPr id="130" name="TextBox 129"/>
+          <p:cNvSpPr txBox="1"/>
+          <p:nvPr/>
+        </p:nvSpPr>
+        <p:spPr>
+          <a:xfrm rot="10800000" flipV="1">
+            <a:off x="18687238" y="22638596"/>
+            <a:ext cx="2428892" cy="707886"/>
+          </a:xfrm>
+          <a:prstGeom prst="rect">
+            <a:avLst/>
+          </a:prstGeom>
+          <a:noFill/>
+        </p:spPr>
+        <p:txBody>
+          <a:bodyPr wrap="square" rtlCol="0">
+            <a:spAutoFit/>
+          </a:bodyPr>
+          <a:lstStyle/>
+          <a:p>
+            <a:r>
+              <a:rPr lang="en-US" altLang="zh-CN" sz="2000" dirty="0" smtClean="0">
+                <a:solidFill>
+                  <a:srgbClr val="FF0000"/>
+                </a:solidFill>
+              </a:rPr>
+              <a:t>Link users of two data sources</a:t>
+            </a:r>
+            <a:endParaRPr lang="zh-CN" altLang="en-US" sz="2000" dirty="0">
+              <a:solidFill>
+                <a:srgbClr val="FF0000"/>
+              </a:solidFill>
+            </a:endParaRPr>
+          </a:p>
+        </p:txBody>
+      </p:sp>
+      <p:sp>
+        <p:nvSpPr>
+          <p:cNvPr id="133" name="矩形标注 132"/>
+          <p:cNvSpPr/>
+          <p:nvPr/>
+        </p:nvSpPr>
+        <p:spPr>
+          <a:xfrm flipV="1">
+            <a:off x="17687105" y="20281142"/>
+            <a:ext cx="3000396" cy="714380"/>
+          </a:xfrm>
+          <a:prstGeom prst="wedgeRectCallout">
+            <a:avLst/>
+          </a:prstGeom>
+          <a:noFill/>
+        </p:spPr>
+        <p:style>
+          <a:lnRef idx="2">
+            <a:schemeClr val="accent1">
+              <a:shade val="50000"/>
+            </a:schemeClr>
+          </a:lnRef>
+          <a:fillRef idx="1">
+            <a:schemeClr val="accent1"/>
+          </a:fillRef>
+          <a:effectRef idx="0">
+            <a:schemeClr val="accent1"/>
+          </a:effectRef>
+          <a:fontRef idx="minor">
+            <a:schemeClr val="lt1"/>
+          </a:fontRef>
+        </p:style>
+        <p:txBody>
+          <a:bodyPr rtlCol="0" anchor="ctr"/>
+          <a:lstStyle/>
+          <a:p>
+            <a:pPr algn="ctr"/>
+            <a:endParaRPr lang="zh-CN" altLang="en-US"/>
+          </a:p>
+        </p:txBody>
+      </p:sp>
+      <p:sp>
+        <p:nvSpPr>
+          <p:cNvPr id="134" name="TextBox 133"/>
+          <p:cNvSpPr txBox="1"/>
+          <p:nvPr/>
+        </p:nvSpPr>
+        <p:spPr>
+          <a:xfrm rot="10800000" flipV="1">
+            <a:off x="17687105" y="20352580"/>
+            <a:ext cx="2928958" cy="707886"/>
+          </a:xfrm>
+          <a:prstGeom prst="rect">
+            <a:avLst/>
+          </a:prstGeom>
+          <a:noFill/>
+        </p:spPr>
+        <p:txBody>
+          <a:bodyPr wrap="square" rtlCol="0">
+            <a:spAutoFit/>
+          </a:bodyPr>
+          <a:lstStyle/>
+          <a:p>
+            <a:r>
+              <a:rPr lang="en-US" altLang="zh-CN" sz="2000" dirty="0" smtClean="0">
+                <a:solidFill>
+                  <a:srgbClr val="FF0000"/>
+                </a:solidFill>
+              </a:rPr>
+              <a:t>Configurable, by Marking Scheme 10/ by 10% step</a:t>
+            </a:r>
+            <a:endParaRPr lang="zh-CN" altLang="en-US" sz="2000" dirty="0">
+              <a:solidFill>
+                <a:srgbClr val="FF0000"/>
+              </a:solidFill>
+            </a:endParaRPr>
+          </a:p>
+        </p:txBody>
+      </p:sp>
     </p:spTree>
     <p:extLst>
       <p:ext uri="{BB962C8B-B14F-4D97-AF65-F5344CB8AC3E}">
-        <p14:creationId xmlns:p14="http://schemas.microsoft.com/office/powerpoint/2010/main" val="707856342"/>
+        <p14:creationId xmlns="" xmlns:p14="http://schemas.microsoft.com/office/powerpoint/2010/main" val="707856342"/>
       </p:ext>
     </p:extLst>
   </p:cSld>
@@ -6450,7 +8137,7 @@
         <a:sysClr val="windowText" lastClr="000000"/>
       </a:dk1>
       <a:lt1>
-        <a:sysClr val="window" lastClr="FFFFFF"/>
+        <a:sysClr val="window" lastClr="C7EDCC"/>
       </a:lt1>
       <a:dk2>
         <a:srgbClr val="0F497B"/>
@@ -6733,7 +8420,7 @@
         <a:sysClr val="windowText" lastClr="000000"/>
       </a:dk1>
       <a:lt1>
-        <a:sysClr val="window" lastClr="FFFFFF"/>
+        <a:sysClr val="window" lastClr="C7EDCC"/>
       </a:lt1>
       <a:dk2>
         <a:srgbClr val="1F497D"/>
@@ -7016,7 +8703,7 @@
         <a:sysClr val="windowText" lastClr="000000"/>
       </a:dk1>
       <a:lt1>
-        <a:sysClr val="window" lastClr="FFFFFF"/>
+        <a:sysClr val="window" lastClr="C7EDCC"/>
       </a:lt1>
       <a:dk2>
         <a:srgbClr val="1F497D"/>

</xml_diff>

<commit_message>
Add texts for "Project objective" #194
</commit_message>
<xml_diff>
--- a/Poster/Stu_data Poster.pptx
+++ b/Poster/Stu_data Poster.pptx
@@ -1929,7 +1929,7 @@
         <p:spPr>
           <a:xfrm>
             <a:off x="263216" y="4637024"/>
-            <a:ext cx="11273568" cy="3785410"/>
+            <a:ext cx="11273568" cy="3285344"/>
           </a:xfrm>
           <a:custGeom>
             <a:avLst/>
@@ -3002,8 +3002,8 @@
         </p:nvSpPr>
         <p:spPr>
           <a:xfrm>
-            <a:off x="393636" y="12839307"/>
-            <a:ext cx="11131929" cy="6906811"/>
+            <a:off x="393636" y="8708187"/>
+            <a:ext cx="11131929" cy="10930014"/>
           </a:xfrm>
           <a:custGeom>
             <a:avLst/>
@@ -4861,8 +4861,8 @@
         </p:blipFill>
         <p:spPr>
           <a:xfrm>
-            <a:off x="1038494" y="21746481"/>
-            <a:ext cx="4572447" cy="6492974"/>
+            <a:off x="1038494" y="21209836"/>
+            <a:ext cx="4950360" cy="7029619"/>
           </a:xfrm>
           <a:prstGeom prst="rect">
             <a:avLst/>
@@ -4977,7 +4977,15 @@
             </a:pPr>
             <a:r>
               <a:rPr lang="en-US" sz="3200" dirty="0"/>
-              <a:t>Modify the schema to work with new data source (Canvas).</a:t>
+              <a:t>Modify the schema to work with new data </a:t>
+            </a:r>
+            <a:r>
+              <a:rPr lang="en-US" sz="3200" dirty="0" smtClean="0"/>
+              <a:t>sources </a:t>
+            </a:r>
+            <a:r>
+              <a:rPr lang="en-US" sz="3200" dirty="0"/>
+              <a:t>(Canvas).</a:t>
             </a:r>
           </a:p>
           <a:p>
@@ -4986,7 +4994,7 @@
               <a:buChar char="v"/>
             </a:pPr>
             <a:r>
-              <a:rPr lang="en-US" sz="3200" dirty="0"/>
+              <a:rPr lang="en-US" sz="3200" dirty="0" smtClean="0"/>
               <a:t>Add new data sources (e.g. student GPA) for further cross data analysis.</a:t>
             </a:r>
           </a:p>
@@ -4996,8 +5004,12 @@
               <a:buChar char="v"/>
             </a:pPr>
             <a:r>
+              <a:rPr lang="en-US" sz="3200" dirty="0" smtClean="0"/>
+              <a:t>Provide </a:t>
+            </a:r>
+            <a:r>
               <a:rPr lang="en-US" sz="3200" dirty="0"/>
-              <a:t>Provide charts (across semesters) of the same course for trend analysis and comparison.</a:t>
+              <a:t>charts (across semesters) of the same course for trend analysis and comparison.</a:t>
             </a:r>
           </a:p>
           <a:p>
@@ -5104,7 +5116,7 @@
         </p:nvSpPr>
         <p:spPr>
           <a:xfrm>
-            <a:off x="611096" y="5765733"/>
+            <a:off x="613423" y="5207724"/>
             <a:ext cx="10474113" cy="2554545"/>
           </a:xfrm>
           <a:prstGeom prst="rect">
@@ -5144,8 +5156,8 @@
         </p:nvSpPr>
         <p:spPr>
           <a:xfrm>
-            <a:off x="793487" y="14146084"/>
-            <a:ext cx="10106994" cy="4031873"/>
+            <a:off x="793487" y="9279690"/>
+            <a:ext cx="10106994" cy="7971413"/>
           </a:xfrm>
           <a:prstGeom prst="rect">
             <a:avLst/>
@@ -5163,17 +5175,62 @@
               <a:buChar char="v"/>
             </a:pPr>
             <a:r>
+              <a:rPr lang="en-US" sz="3200" dirty="0" smtClean="0"/>
+              <a:t>Link </a:t>
+            </a:r>
+            <a:r>
               <a:rPr lang="en-US" sz="3200" dirty="0"/>
-              <a:t>Design a database schema that incorporates the two separate systems (Moodle and </a:t>
+              <a:t>two data </a:t>
+            </a:r>
+            <a:r>
+              <a:rPr lang="en-US" sz="3200" dirty="0" smtClean="0"/>
+              <a:t>sources (</a:t>
+            </a:r>
+            <a:r>
+              <a:rPr lang="en-US" sz="3200" dirty="0" err="1" smtClean="0"/>
+              <a:t>Moodle</a:t>
+            </a:r>
+            <a:r>
+              <a:rPr lang="en-US" sz="3200" dirty="0" smtClean="0"/>
+              <a:t> forum </a:t>
+            </a:r>
+            <a:r>
+              <a:rPr lang="en-US" sz="3200" dirty="0" smtClean="0"/>
+              <a:t>and </a:t>
+            </a:r>
+            <a:r>
+              <a:rPr lang="en-US" sz="3200" dirty="0" err="1" smtClean="0"/>
+              <a:t>WebSubmission</a:t>
+            </a:r>
+            <a:r>
+              <a:rPr lang="en-US" sz="3200" dirty="0" smtClean="0"/>
+              <a:t> system) </a:t>
+            </a:r>
+            <a:r>
+              <a:rPr lang="en-US" sz="3200" dirty="0"/>
+              <a:t>and link the users (which are </a:t>
             </a:r>
             <a:r>
               <a:rPr lang="en-US" sz="3200" dirty="0" err="1"/>
-              <a:t>WebSubmission</a:t>
+              <a:t>anonymized</a:t>
             </a:r>
             <a:r>
               <a:rPr lang="en-US" sz="3200" dirty="0"/>
-              <a:t>).</a:t>
-            </a:r>
+              <a:t>) of two data </a:t>
+            </a:r>
+            <a:r>
+              <a:rPr lang="en-US" sz="3200" dirty="0" smtClean="0"/>
+              <a:t>sources by </a:t>
+            </a:r>
+            <a:r>
+              <a:rPr lang="en-US" sz="3200" dirty="0" smtClean="0"/>
+              <a:t>designing </a:t>
+            </a:r>
+            <a:r>
+              <a:rPr lang="en-US" sz="3200" dirty="0" smtClean="0"/>
+              <a:t>a database schema .</a:t>
+            </a:r>
+            <a:endParaRPr lang="zh-CN" altLang="en-US" sz="3200" dirty="0"/>
           </a:p>
           <a:p>
             <a:pPr marL="1143000" indent="-1143000">
@@ -5182,17 +5239,8 @@
             </a:pPr>
             <a:r>
               <a:rPr lang="en-US" sz="3200" dirty="0"/>
-              <a:t>Link two data sources and link the users (which are </a:t>
-            </a:r>
-            <a:r>
-              <a:rPr lang="en-US" sz="3200" dirty="0" err="1"/>
-              <a:t>anonymized</a:t>
-            </a:r>
-            <a:r>
-              <a:rPr lang="en-US" sz="3200" dirty="0"/>
-              <a:t>) of two data sources.</a:t>
-            </a:r>
-            <a:endParaRPr lang="zh-CN" altLang="en-US" sz="3200" dirty="0"/>
+              <a:t>Write extraction and insertion scripts (data importer) to import current file-based data.</a:t>
+            </a:r>
           </a:p>
           <a:p>
             <a:pPr marL="1143000" indent="-1143000">
@@ -5201,7 +5249,15 @@
             </a:pPr>
             <a:r>
               <a:rPr lang="en-US" sz="3200" dirty="0"/>
-              <a:t>Write extraction and insertion scripts (data importer) to import current file-based data.</a:t>
+              <a:t>Provide visualization of data by using charts and make them configurable to allow users </a:t>
+            </a:r>
+            <a:r>
+              <a:rPr lang="en-US" sz="3200" dirty="0" smtClean="0"/>
+              <a:t>to manipulate and interac</a:t>
+            </a:r>
+            <a:r>
+              <a:rPr lang="en-US" sz="3200" dirty="0" smtClean="0"/>
+              <a:t>t with data. Configuration options include: change presentation order, set start day and end day, set threshold, set activity, set course, year, semester and assignment.</a:t>
             </a:r>
           </a:p>
           <a:p>
@@ -5210,12 +5266,18 @@
               <a:buChar char="v"/>
             </a:pPr>
             <a:r>
-              <a:rPr lang="en-US" sz="3200" dirty="0"/>
-              <a:t>Provide visualization of data by using charts and make them configurable to allow users </a:t>
-            </a:r>
-            <a:r>
               <a:rPr lang="en-US" sz="3200" dirty="0" smtClean="0"/>
-              <a:t>to</a:t>
+              <a:t>Analyze the relationship between the amount of students’ activities and academic performances.</a:t>
+            </a:r>
+          </a:p>
+          <a:p>
+            <a:pPr marL="1143000" indent="-1143000">
+              <a:buFont typeface="Wingdings" charset="2"/>
+              <a:buChar char="v"/>
+            </a:pPr>
+            <a:r>
+              <a:rPr lang="en-US" altLang="zh-CN" sz="3200" dirty="0" smtClean="0"/>
+              <a:t>Allow staff to query the database, aggregate it and export it (Copy, Print, CSV, Excel, PDF).</a:t>
             </a:r>
             <a:endParaRPr lang="zh-CN" altLang="en-US" sz="3200" dirty="0"/>
           </a:p>
@@ -5357,8 +5419,8 @@
         </p:blipFill>
         <p:spPr bwMode="auto">
           <a:xfrm>
-            <a:off x="7285158" y="21746482"/>
-            <a:ext cx="2818136" cy="6681276"/>
+            <a:off x="7285157" y="21211396"/>
+            <a:ext cx="3043833" cy="7216362"/>
           </a:xfrm>
           <a:prstGeom prst="rect">
             <a:avLst/>
@@ -5422,7 +5484,7 @@
         </p:nvSpPr>
         <p:spPr>
           <a:xfrm>
-            <a:off x="2195072" y="12439623"/>
+            <a:off x="2195072" y="8246975"/>
             <a:ext cx="7527807" cy="1015551"/>
           </a:xfrm>
           <a:prstGeom prst="roundRect">
@@ -5470,7 +5532,7 @@
         </p:nvSpPr>
         <p:spPr>
           <a:xfrm>
-            <a:off x="2630482" y="12508686"/>
+            <a:off x="2630482" y="8208120"/>
             <a:ext cx="6433004" cy="1015663"/>
           </a:xfrm>
           <a:prstGeom prst="rect">

</xml_diff>

<commit_message>
Remove "Data importer" section #198
</commit_message>
<xml_diff>
--- a/Poster/Stu_data Poster.pptx
+++ b/Poster/Stu_data Poster.pptx
@@ -230,7 +230,7 @@
             <a:fld id="{59D7332B-1442-4F8C-A160-0D5EB57A24C0}" type="datetimeFigureOut">
               <a:rPr lang="en-AU" smtClean="0"/>
               <a:pPr/>
-              <a:t>13/10/2017</a:t>
+              <a:t>14/10/2017</a:t>
             </a:fld>
             <a:endParaRPr lang="en-AU"/>
           </a:p>
@@ -397,7 +397,7 @@
             <a:fld id="{33744820-F59C-490B-A624-3CEFDFE2581B}" type="datetimeFigureOut">
               <a:rPr lang="en-AU" smtClean="0"/>
               <a:pPr/>
-              <a:t>13/10/2017</a:t>
+              <a:t>14/10/2017</a:t>
             </a:fld>
             <a:endParaRPr lang="en-AU"/>
           </a:p>
@@ -1100,340 +1100,14 @@
       </p:grpSpPr>
       <p:sp>
         <p:nvSpPr>
-          <p:cNvPr id="62" name="Rounded Rectangle 22"/>
-          <p:cNvSpPr/>
-          <p:nvPr/>
-        </p:nvSpPr>
-        <p:spPr>
-          <a:xfrm>
-            <a:off x="11680801" y="24009002"/>
-            <a:ext cx="18043009" cy="4969218"/>
-          </a:xfrm>
-          <a:custGeom>
-            <a:avLst/>
-            <a:gdLst>
-              <a:gd name="connsiteX0" fmla="*/ 0 w 12385376"/>
-              <a:gd name="connsiteY0" fmla="*/ 1224160 h 7344816"/>
-              <a:gd name="connsiteX1" fmla="*/ 1224160 w 12385376"/>
-              <a:gd name="connsiteY1" fmla="*/ 0 h 7344816"/>
-              <a:gd name="connsiteX2" fmla="*/ 11161216 w 12385376"/>
-              <a:gd name="connsiteY2" fmla="*/ 0 h 7344816"/>
-              <a:gd name="connsiteX3" fmla="*/ 12385376 w 12385376"/>
-              <a:gd name="connsiteY3" fmla="*/ 1224160 h 7344816"/>
-              <a:gd name="connsiteX4" fmla="*/ 12385376 w 12385376"/>
-              <a:gd name="connsiteY4" fmla="*/ 6120656 h 7344816"/>
-              <a:gd name="connsiteX5" fmla="*/ 11161216 w 12385376"/>
-              <a:gd name="connsiteY5" fmla="*/ 7344816 h 7344816"/>
-              <a:gd name="connsiteX6" fmla="*/ 1224160 w 12385376"/>
-              <a:gd name="connsiteY6" fmla="*/ 7344816 h 7344816"/>
-              <a:gd name="connsiteX7" fmla="*/ 0 w 12385376"/>
-              <a:gd name="connsiteY7" fmla="*/ 6120656 h 7344816"/>
-              <a:gd name="connsiteX8" fmla="*/ 0 w 12385376"/>
-              <a:gd name="connsiteY8" fmla="*/ 1224160 h 7344816"/>
-              <a:gd name="connsiteX0" fmla="*/ 0 w 12385376"/>
-              <a:gd name="connsiteY0" fmla="*/ 1224160 h 7344816"/>
-              <a:gd name="connsiteX1" fmla="*/ 1224160 w 12385376"/>
-              <a:gd name="connsiteY1" fmla="*/ 0 h 7344816"/>
-              <a:gd name="connsiteX2" fmla="*/ 11161216 w 12385376"/>
-              <a:gd name="connsiteY2" fmla="*/ 0 h 7344816"/>
-              <a:gd name="connsiteX3" fmla="*/ 12385376 w 12385376"/>
-              <a:gd name="connsiteY3" fmla="*/ 1224160 h 7344816"/>
-              <a:gd name="connsiteX4" fmla="*/ 12385376 w 12385376"/>
-              <a:gd name="connsiteY4" fmla="*/ 6120656 h 7344816"/>
-              <a:gd name="connsiteX5" fmla="*/ 11161216 w 12385376"/>
-              <a:gd name="connsiteY5" fmla="*/ 7344816 h 7344816"/>
-              <a:gd name="connsiteX6" fmla="*/ 1224160 w 12385376"/>
-              <a:gd name="connsiteY6" fmla="*/ 7344816 h 7344816"/>
-              <a:gd name="connsiteX7" fmla="*/ 0 w 12385376"/>
-              <a:gd name="connsiteY7" fmla="*/ 6120656 h 7344816"/>
-              <a:gd name="connsiteX8" fmla="*/ 0 w 12385376"/>
-              <a:gd name="connsiteY8" fmla="*/ 1224160 h 7344816"/>
-              <a:gd name="connsiteX0" fmla="*/ 0 w 12385376"/>
-              <a:gd name="connsiteY0" fmla="*/ 1224160 h 7344816"/>
-              <a:gd name="connsiteX1" fmla="*/ 1224160 w 12385376"/>
-              <a:gd name="connsiteY1" fmla="*/ 0 h 7344816"/>
-              <a:gd name="connsiteX2" fmla="*/ 11161216 w 12385376"/>
-              <a:gd name="connsiteY2" fmla="*/ 0 h 7344816"/>
-              <a:gd name="connsiteX3" fmla="*/ 12385376 w 12385376"/>
-              <a:gd name="connsiteY3" fmla="*/ 1224160 h 7344816"/>
-              <a:gd name="connsiteX4" fmla="*/ 12385376 w 12385376"/>
-              <a:gd name="connsiteY4" fmla="*/ 6120656 h 7344816"/>
-              <a:gd name="connsiteX5" fmla="*/ 11161216 w 12385376"/>
-              <a:gd name="connsiteY5" fmla="*/ 7344816 h 7344816"/>
-              <a:gd name="connsiteX6" fmla="*/ 1224160 w 12385376"/>
-              <a:gd name="connsiteY6" fmla="*/ 7344816 h 7344816"/>
-              <a:gd name="connsiteX7" fmla="*/ 0 w 12385376"/>
-              <a:gd name="connsiteY7" fmla="*/ 6120656 h 7344816"/>
-              <a:gd name="connsiteX8" fmla="*/ 0 w 12385376"/>
-              <a:gd name="connsiteY8" fmla="*/ 1224160 h 7344816"/>
-              <a:gd name="connsiteX0" fmla="*/ 0 w 12385376"/>
-              <a:gd name="connsiteY0" fmla="*/ 1224160 h 7344830"/>
-              <a:gd name="connsiteX1" fmla="*/ 1224160 w 12385376"/>
-              <a:gd name="connsiteY1" fmla="*/ 0 h 7344830"/>
-              <a:gd name="connsiteX2" fmla="*/ 11161216 w 12385376"/>
-              <a:gd name="connsiteY2" fmla="*/ 0 h 7344830"/>
-              <a:gd name="connsiteX3" fmla="*/ 12385376 w 12385376"/>
-              <a:gd name="connsiteY3" fmla="*/ 1224160 h 7344830"/>
-              <a:gd name="connsiteX4" fmla="*/ 12385376 w 12385376"/>
-              <a:gd name="connsiteY4" fmla="*/ 6120656 h 7344830"/>
-              <a:gd name="connsiteX5" fmla="*/ 11161216 w 12385376"/>
-              <a:gd name="connsiteY5" fmla="*/ 7344816 h 7344830"/>
-              <a:gd name="connsiteX6" fmla="*/ 1224160 w 12385376"/>
-              <a:gd name="connsiteY6" fmla="*/ 7344816 h 7344830"/>
-              <a:gd name="connsiteX7" fmla="*/ 0 w 12385376"/>
-              <a:gd name="connsiteY7" fmla="*/ 6120656 h 7344830"/>
-              <a:gd name="connsiteX8" fmla="*/ 0 w 12385376"/>
-              <a:gd name="connsiteY8" fmla="*/ 1224160 h 7344830"/>
-              <a:gd name="connsiteX0" fmla="*/ 0 w 12385376"/>
-              <a:gd name="connsiteY0" fmla="*/ 1224160 h 7344830"/>
-              <a:gd name="connsiteX1" fmla="*/ 1224160 w 12385376"/>
-              <a:gd name="connsiteY1" fmla="*/ 0 h 7344830"/>
-              <a:gd name="connsiteX2" fmla="*/ 11161216 w 12385376"/>
-              <a:gd name="connsiteY2" fmla="*/ 0 h 7344830"/>
-              <a:gd name="connsiteX3" fmla="*/ 12385376 w 12385376"/>
-              <a:gd name="connsiteY3" fmla="*/ 1224160 h 7344830"/>
-              <a:gd name="connsiteX4" fmla="*/ 12385376 w 12385376"/>
-              <a:gd name="connsiteY4" fmla="*/ 6120656 h 7344830"/>
-              <a:gd name="connsiteX5" fmla="*/ 11161216 w 12385376"/>
-              <a:gd name="connsiteY5" fmla="*/ 7344816 h 7344830"/>
-              <a:gd name="connsiteX6" fmla="*/ 1224160 w 12385376"/>
-              <a:gd name="connsiteY6" fmla="*/ 7344816 h 7344830"/>
-              <a:gd name="connsiteX7" fmla="*/ 0 w 12385376"/>
-              <a:gd name="connsiteY7" fmla="*/ 6120656 h 7344830"/>
-              <a:gd name="connsiteX8" fmla="*/ 0 w 12385376"/>
-              <a:gd name="connsiteY8" fmla="*/ 1224160 h 7344830"/>
-              <a:gd name="connsiteX0" fmla="*/ 0 w 12385376"/>
-              <a:gd name="connsiteY0" fmla="*/ 1224160 h 7347077"/>
-              <a:gd name="connsiteX1" fmla="*/ 1224160 w 12385376"/>
-              <a:gd name="connsiteY1" fmla="*/ 0 h 7347077"/>
-              <a:gd name="connsiteX2" fmla="*/ 11161216 w 12385376"/>
-              <a:gd name="connsiteY2" fmla="*/ 0 h 7347077"/>
-              <a:gd name="connsiteX3" fmla="*/ 12385376 w 12385376"/>
-              <a:gd name="connsiteY3" fmla="*/ 1224160 h 7347077"/>
-              <a:gd name="connsiteX4" fmla="*/ 12385376 w 12385376"/>
-              <a:gd name="connsiteY4" fmla="*/ 6120656 h 7347077"/>
-              <a:gd name="connsiteX5" fmla="*/ 11161216 w 12385376"/>
-              <a:gd name="connsiteY5" fmla="*/ 7344816 h 7347077"/>
-              <a:gd name="connsiteX6" fmla="*/ 1224160 w 12385376"/>
-              <a:gd name="connsiteY6" fmla="*/ 7344816 h 7347077"/>
-              <a:gd name="connsiteX7" fmla="*/ 0 w 12385376"/>
-              <a:gd name="connsiteY7" fmla="*/ 6120656 h 7347077"/>
-              <a:gd name="connsiteX8" fmla="*/ 0 w 12385376"/>
-              <a:gd name="connsiteY8" fmla="*/ 1224160 h 7347077"/>
-              <a:gd name="connsiteX0" fmla="*/ 0 w 12385376"/>
-              <a:gd name="connsiteY0" fmla="*/ 1224160 h 7352847"/>
-              <a:gd name="connsiteX1" fmla="*/ 1224160 w 12385376"/>
-              <a:gd name="connsiteY1" fmla="*/ 0 h 7352847"/>
-              <a:gd name="connsiteX2" fmla="*/ 11161216 w 12385376"/>
-              <a:gd name="connsiteY2" fmla="*/ 0 h 7352847"/>
-              <a:gd name="connsiteX3" fmla="*/ 12385376 w 12385376"/>
-              <a:gd name="connsiteY3" fmla="*/ 1224160 h 7352847"/>
-              <a:gd name="connsiteX4" fmla="*/ 12385376 w 12385376"/>
-              <a:gd name="connsiteY4" fmla="*/ 6120656 h 7352847"/>
-              <a:gd name="connsiteX5" fmla="*/ 11161216 w 12385376"/>
-              <a:gd name="connsiteY5" fmla="*/ 7344816 h 7352847"/>
-              <a:gd name="connsiteX6" fmla="*/ 1224160 w 12385376"/>
-              <a:gd name="connsiteY6" fmla="*/ 7344816 h 7352847"/>
-              <a:gd name="connsiteX7" fmla="*/ 0 w 12385376"/>
-              <a:gd name="connsiteY7" fmla="*/ 6120656 h 7352847"/>
-              <a:gd name="connsiteX8" fmla="*/ 0 w 12385376"/>
-              <a:gd name="connsiteY8" fmla="*/ 1224160 h 7352847"/>
-              <a:gd name="connsiteX0" fmla="*/ 0 w 12385376"/>
-              <a:gd name="connsiteY0" fmla="*/ 1224160 h 7378707"/>
-              <a:gd name="connsiteX1" fmla="*/ 1224160 w 12385376"/>
-              <a:gd name="connsiteY1" fmla="*/ 0 h 7378707"/>
-              <a:gd name="connsiteX2" fmla="*/ 11161216 w 12385376"/>
-              <a:gd name="connsiteY2" fmla="*/ 0 h 7378707"/>
-              <a:gd name="connsiteX3" fmla="*/ 12385376 w 12385376"/>
-              <a:gd name="connsiteY3" fmla="*/ 1224160 h 7378707"/>
-              <a:gd name="connsiteX4" fmla="*/ 12385376 w 12385376"/>
-              <a:gd name="connsiteY4" fmla="*/ 6120656 h 7378707"/>
-              <a:gd name="connsiteX5" fmla="*/ 11161216 w 12385376"/>
-              <a:gd name="connsiteY5" fmla="*/ 7344816 h 7378707"/>
-              <a:gd name="connsiteX6" fmla="*/ 1224160 w 12385376"/>
-              <a:gd name="connsiteY6" fmla="*/ 7344816 h 7378707"/>
-              <a:gd name="connsiteX7" fmla="*/ 0 w 12385376"/>
-              <a:gd name="connsiteY7" fmla="*/ 6120656 h 7378707"/>
-              <a:gd name="connsiteX8" fmla="*/ 0 w 12385376"/>
-              <a:gd name="connsiteY8" fmla="*/ 1224160 h 7378707"/>
-              <a:gd name="connsiteX0" fmla="*/ 2261 w 12387637"/>
-              <a:gd name="connsiteY0" fmla="*/ 1224160 h 7378707"/>
-              <a:gd name="connsiteX1" fmla="*/ 1226421 w 12387637"/>
-              <a:gd name="connsiteY1" fmla="*/ 0 h 7378707"/>
-              <a:gd name="connsiteX2" fmla="*/ 11163477 w 12387637"/>
-              <a:gd name="connsiteY2" fmla="*/ 0 h 7378707"/>
-              <a:gd name="connsiteX3" fmla="*/ 12387637 w 12387637"/>
-              <a:gd name="connsiteY3" fmla="*/ 1224160 h 7378707"/>
-              <a:gd name="connsiteX4" fmla="*/ 12387637 w 12387637"/>
-              <a:gd name="connsiteY4" fmla="*/ 6120656 h 7378707"/>
-              <a:gd name="connsiteX5" fmla="*/ 11163477 w 12387637"/>
-              <a:gd name="connsiteY5" fmla="*/ 7344816 h 7378707"/>
-              <a:gd name="connsiteX6" fmla="*/ 1226421 w 12387637"/>
-              <a:gd name="connsiteY6" fmla="*/ 7344816 h 7378707"/>
-              <a:gd name="connsiteX7" fmla="*/ 2261 w 12387637"/>
-              <a:gd name="connsiteY7" fmla="*/ 6120656 h 7378707"/>
-              <a:gd name="connsiteX8" fmla="*/ 2261 w 12387637"/>
-              <a:gd name="connsiteY8" fmla="*/ 1224160 h 7378707"/>
-              <a:gd name="connsiteX0" fmla="*/ 9063 w 12394439"/>
-              <a:gd name="connsiteY0" fmla="*/ 1224160 h 7378707"/>
-              <a:gd name="connsiteX1" fmla="*/ 1233223 w 12394439"/>
-              <a:gd name="connsiteY1" fmla="*/ 0 h 7378707"/>
-              <a:gd name="connsiteX2" fmla="*/ 11170279 w 12394439"/>
-              <a:gd name="connsiteY2" fmla="*/ 0 h 7378707"/>
-              <a:gd name="connsiteX3" fmla="*/ 12394439 w 12394439"/>
-              <a:gd name="connsiteY3" fmla="*/ 1224160 h 7378707"/>
-              <a:gd name="connsiteX4" fmla="*/ 12394439 w 12394439"/>
-              <a:gd name="connsiteY4" fmla="*/ 6120656 h 7378707"/>
-              <a:gd name="connsiteX5" fmla="*/ 11170279 w 12394439"/>
-              <a:gd name="connsiteY5" fmla="*/ 7344816 h 7378707"/>
-              <a:gd name="connsiteX6" fmla="*/ 1233223 w 12394439"/>
-              <a:gd name="connsiteY6" fmla="*/ 7344816 h 7378707"/>
-              <a:gd name="connsiteX7" fmla="*/ 9063 w 12394439"/>
-              <a:gd name="connsiteY7" fmla="*/ 6120656 h 7378707"/>
-              <a:gd name="connsiteX8" fmla="*/ 9063 w 12394439"/>
-              <a:gd name="connsiteY8" fmla="*/ 1224160 h 7378707"/>
-              <a:gd name="connsiteX0" fmla="*/ 9063 w 12394439"/>
-              <a:gd name="connsiteY0" fmla="*/ 1224160 h 7345158"/>
-              <a:gd name="connsiteX1" fmla="*/ 1233223 w 12394439"/>
-              <a:gd name="connsiteY1" fmla="*/ 0 h 7345158"/>
-              <a:gd name="connsiteX2" fmla="*/ 11170279 w 12394439"/>
-              <a:gd name="connsiteY2" fmla="*/ 0 h 7345158"/>
-              <a:gd name="connsiteX3" fmla="*/ 12394439 w 12394439"/>
-              <a:gd name="connsiteY3" fmla="*/ 1224160 h 7345158"/>
-              <a:gd name="connsiteX4" fmla="*/ 12394439 w 12394439"/>
-              <a:gd name="connsiteY4" fmla="*/ 6120656 h 7345158"/>
-              <a:gd name="connsiteX5" fmla="*/ 11170279 w 12394439"/>
-              <a:gd name="connsiteY5" fmla="*/ 7344816 h 7345158"/>
-              <a:gd name="connsiteX6" fmla="*/ 1233223 w 12394439"/>
-              <a:gd name="connsiteY6" fmla="*/ 7344816 h 7345158"/>
-              <a:gd name="connsiteX7" fmla="*/ 9063 w 12394439"/>
-              <a:gd name="connsiteY7" fmla="*/ 6120656 h 7345158"/>
-              <a:gd name="connsiteX8" fmla="*/ 9063 w 12394439"/>
-              <a:gd name="connsiteY8" fmla="*/ 1224160 h 7345158"/>
-            </a:gdLst>
-            <a:ahLst/>
-            <a:cxnLst>
-              <a:cxn ang="0">
-                <a:pos x="connsiteX0" y="connsiteY0"/>
-              </a:cxn>
-              <a:cxn ang="0">
-                <a:pos x="connsiteX1" y="connsiteY1"/>
-              </a:cxn>
-              <a:cxn ang="0">
-                <a:pos x="connsiteX2" y="connsiteY2"/>
-              </a:cxn>
-              <a:cxn ang="0">
-                <a:pos x="connsiteX3" y="connsiteY3"/>
-              </a:cxn>
-              <a:cxn ang="0">
-                <a:pos x="connsiteX4" y="connsiteY4"/>
-              </a:cxn>
-              <a:cxn ang="0">
-                <a:pos x="connsiteX5" y="connsiteY5"/>
-              </a:cxn>
-              <a:cxn ang="0">
-                <a:pos x="connsiteX6" y="connsiteY6"/>
-              </a:cxn>
-              <a:cxn ang="0">
-                <a:pos x="connsiteX7" y="connsiteY7"/>
-              </a:cxn>
-              <a:cxn ang="0">
-                <a:pos x="connsiteX8" y="connsiteY8"/>
-              </a:cxn>
-            </a:cxnLst>
-            <a:rect l="l" t="t" r="r" b="b"/>
-            <a:pathLst>
-              <a:path w="12394439" h="7345158">
-                <a:moveTo>
-                  <a:pt x="9063" y="1224160"/>
-                </a:moveTo>
-                <a:cubicBezTo>
-                  <a:pt x="-34480" y="69103"/>
-                  <a:pt x="34624" y="43542"/>
-                  <a:pt x="1233223" y="0"/>
-                </a:cubicBezTo>
-                <a:lnTo>
-                  <a:pt x="11170279" y="0"/>
-                </a:lnTo>
-                <a:cubicBezTo>
-                  <a:pt x="12281792" y="43543"/>
-                  <a:pt x="12394439" y="-17982"/>
-                  <a:pt x="12394439" y="1224160"/>
-                </a:cubicBezTo>
-                <a:lnTo>
-                  <a:pt x="12394439" y="6120656"/>
-                </a:lnTo>
-                <a:cubicBezTo>
-                  <a:pt x="12307354" y="7362798"/>
-                  <a:pt x="12412421" y="7344816"/>
-                  <a:pt x="11170279" y="7344816"/>
-                </a:cubicBezTo>
-                <a:lnTo>
-                  <a:pt x="1233223" y="7344816"/>
-                </a:lnTo>
-                <a:cubicBezTo>
-                  <a:pt x="107380" y="7339304"/>
-                  <a:pt x="9063" y="7449884"/>
-                  <a:pt x="9063" y="6120656"/>
-                </a:cubicBezTo>
-                <a:lnTo>
-                  <a:pt x="9063" y="1224160"/>
-                </a:lnTo>
-                <a:close/>
-              </a:path>
-            </a:pathLst>
-          </a:custGeom>
-          <a:solidFill>
-            <a:schemeClr val="bg1"/>
-          </a:solidFill>
-          <a:ln w="76200">
-            <a:solidFill>
-              <a:schemeClr val="tx2">
-                <a:lumMod val="60000"/>
-                <a:lumOff val="40000"/>
-              </a:schemeClr>
-            </a:solidFill>
-          </a:ln>
-        </p:spPr>
-        <p:style>
-          <a:lnRef idx="2">
-            <a:schemeClr val="accent1">
-              <a:shade val="50000"/>
-            </a:schemeClr>
-          </a:lnRef>
-          <a:fillRef idx="1">
-            <a:schemeClr val="accent1"/>
-          </a:fillRef>
-          <a:effectRef idx="0">
-            <a:schemeClr val="accent1"/>
-          </a:effectRef>
-          <a:fontRef idx="minor">
-            <a:schemeClr val="lt1"/>
-          </a:fontRef>
-        </p:style>
-        <p:txBody>
-          <a:bodyPr rtlCol="0" anchor="ctr"/>
-          <a:lstStyle/>
-          <a:p>
-            <a:pPr algn="ctr"/>
-            <a:endParaRPr lang="en-US" dirty="0">
-              <a:solidFill>
-                <a:schemeClr val="tx1"/>
-              </a:solidFill>
-            </a:endParaRPr>
-          </a:p>
-        </p:txBody>
-      </p:sp>
-      <p:sp>
-        <p:nvSpPr>
           <p:cNvPr id="27" name="Rounded Rectangle 10"/>
           <p:cNvSpPr/>
           <p:nvPr/>
         </p:nvSpPr>
         <p:spPr>
           <a:xfrm>
-            <a:off x="29994002" y="21240295"/>
-            <a:ext cx="12506104" cy="4693271"/>
+            <a:off x="29994002" y="19266030"/>
+            <a:ext cx="12506104" cy="6515610"/>
           </a:xfrm>
           <a:custGeom>
             <a:avLst/>
@@ -2214,7 +1888,7 @@
         </p:nvSpPr>
         <p:spPr>
           <a:xfrm>
-            <a:off x="355709" y="21093837"/>
+            <a:off x="365812" y="21130813"/>
             <a:ext cx="11119651" cy="7869305"/>
           </a:xfrm>
           <a:custGeom>
@@ -2518,8 +2192,8 @@
         </p:nvSpPr>
         <p:spPr>
           <a:xfrm>
-            <a:off x="29859082" y="4850534"/>
-            <a:ext cx="12518053" cy="10549914"/>
+            <a:off x="29844568" y="4725474"/>
+            <a:ext cx="12518053" cy="8359366"/>
           </a:xfrm>
           <a:custGeom>
             <a:avLst/>
@@ -3429,7 +3103,7 @@
         <p:spPr>
           <a:xfrm>
             <a:off x="11543437" y="4850534"/>
-            <a:ext cx="18146016" cy="19060441"/>
+            <a:ext cx="18146016" cy="24127686"/>
           </a:xfrm>
           <a:custGeom>
             <a:avLst/>
@@ -4567,10 +4241,10 @@
       </p:sp>
       <p:pic>
         <p:nvPicPr>
-          <p:cNvPr id="35" name="Picture 34">
+          <p:cNvPr id="51" name="Picture 50">
             <a:extLst>
               <a:ext uri="{FF2B5EF4-FFF2-40B4-BE49-F238E27FC236}">
-                <a16:creationId xmlns:a16="http://schemas.microsoft.com/office/drawing/2014/main" id="{84A8944C-C2C3-4E5B-AA53-82A178642EA6}"/>
+                <a16:creationId xmlns:a16="http://schemas.microsoft.com/office/drawing/2014/main" id="{0C5B7859-114B-4E51-B787-275E022F7536}"/>
               </a:ext>
             </a:extLst>
           </p:cNvPr>
@@ -4593,119 +4267,6 @@
         </p:blipFill>
         <p:spPr>
           <a:xfrm>
-            <a:off x="31303490" y="5723116"/>
-            <a:ext cx="9875298" cy="4478773"/>
-          </a:xfrm>
-          <a:prstGeom prst="rect">
-            <a:avLst/>
-          </a:prstGeom>
-        </p:spPr>
-      </p:pic>
-      <p:sp>
-        <p:nvSpPr>
-          <p:cNvPr id="49" name="TextBox 48">
-            <a:extLst>
-              <a:ext uri="{FF2B5EF4-FFF2-40B4-BE49-F238E27FC236}">
-                <a16:creationId xmlns:a16="http://schemas.microsoft.com/office/drawing/2014/main" id="{4C7268DB-F52B-4228-A14F-253306C33498}"/>
-              </a:ext>
-            </a:extLst>
-          </p:cNvPr>
-          <p:cNvSpPr txBox="1"/>
-          <p:nvPr/>
-        </p:nvSpPr>
-        <p:spPr>
-          <a:xfrm>
-            <a:off x="31184598" y="10643988"/>
-            <a:ext cx="10338878" cy="4031873"/>
-          </a:xfrm>
-          <a:prstGeom prst="rect">
-            <a:avLst/>
-          </a:prstGeom>
-          <a:noFill/>
-        </p:spPr>
-        <p:txBody>
-          <a:bodyPr wrap="square" rtlCol="0">
-            <a:spAutoFit/>
-          </a:bodyPr>
-          <a:lstStyle/>
-          <a:p>
-            <a:pPr marL="1143000" indent="-1143000">
-              <a:buFont typeface="Wingdings" charset="2"/>
-              <a:buChar char="v"/>
-            </a:pPr>
-            <a:r>
-              <a:rPr lang="en-US" sz="3200" dirty="0"/>
-              <a:t>Data Query module can support staff to query and extract data.</a:t>
-            </a:r>
-          </a:p>
-          <a:p>
-            <a:pPr marL="1143000" indent="-1143000">
-              <a:buFont typeface="Wingdings" charset="2"/>
-              <a:buChar char="v"/>
-            </a:pPr>
-            <a:r>
-              <a:rPr lang="en-US" sz="3200" dirty="0"/>
-              <a:t>This is a combined database of Moodle Forum and </a:t>
-            </a:r>
-            <a:r>
-              <a:rPr lang="en-US" sz="3200" dirty="0" err="1"/>
-              <a:t>WebSubmission</a:t>
-            </a:r>
-            <a:r>
-              <a:rPr lang="en-US" sz="3200" dirty="0"/>
-              <a:t> data sources.</a:t>
-            </a:r>
-          </a:p>
-          <a:p>
-            <a:pPr marL="1143000" indent="-1143000">
-              <a:buFont typeface="Wingdings" charset="2"/>
-              <a:buChar char="v"/>
-            </a:pPr>
-            <a:r>
-              <a:rPr lang="en-US" sz="3200" dirty="0"/>
-              <a:t>This database can be flexibly applied for newly added data sources such as Canvas.</a:t>
-            </a:r>
-          </a:p>
-          <a:p>
-            <a:pPr marL="1143000" indent="-1143000">
-              <a:buFont typeface="Wingdings" charset="2"/>
-              <a:buChar char="v"/>
-            </a:pPr>
-            <a:r>
-              <a:rPr lang="en-US" sz="3200" dirty="0"/>
-              <a:t>Data importing tool can assist to import data from data sources into database.</a:t>
-            </a:r>
-          </a:p>
-        </p:txBody>
-      </p:sp>
-      <p:pic>
-        <p:nvPicPr>
-          <p:cNvPr id="51" name="Picture 50">
-            <a:extLst>
-              <a:ext uri="{FF2B5EF4-FFF2-40B4-BE49-F238E27FC236}">
-                <a16:creationId xmlns:a16="http://schemas.microsoft.com/office/drawing/2014/main" id="{0C5B7859-114B-4E51-B787-275E022F7536}"/>
-              </a:ext>
-            </a:extLst>
-          </p:cNvPr>
-          <p:cNvPicPr>
-            <a:picLocks noChangeAspect="1"/>
-          </p:cNvPicPr>
-          <p:nvPr/>
-        </p:nvPicPr>
-        <p:blipFill>
-          <a:blip r:embed="rId3">
-            <a:extLst>
-              <a:ext uri="{28A0092B-C50C-407E-A947-70E740481C1C}">
-                <a14:useLocalDpi xmlns:a14="http://schemas.microsoft.com/office/drawing/2010/main" val="0"/>
-              </a:ext>
-            </a:extLst>
-          </a:blip>
-          <a:stretch>
-            <a:fillRect/>
-          </a:stretch>
-        </p:blipFill>
-        <p:spPr>
-          <a:xfrm>
             <a:off x="1038494" y="21601204"/>
             <a:ext cx="4950360" cy="7029619"/>
           </a:xfrm>
@@ -4797,8 +4358,8 @@
         </p:nvSpPr>
         <p:spPr>
           <a:xfrm>
-            <a:off x="34809132" y="22153006"/>
-            <a:ext cx="7525912" cy="4031873"/>
+            <a:off x="35611916" y="20178741"/>
+            <a:ext cx="6723128" cy="5016758"/>
           </a:xfrm>
           <a:prstGeom prst="rect">
             <a:avLst/>
@@ -4864,15 +4425,15 @@
           <p:nvPr/>
         </p:nvPicPr>
         <p:blipFill>
-          <a:blip r:embed="rId4"/>
+          <a:blip r:embed="rId3"/>
           <a:stretch>
             <a:fillRect/>
           </a:stretch>
         </p:blipFill>
         <p:spPr>
           <a:xfrm>
-            <a:off x="30413287" y="22057190"/>
-            <a:ext cx="4052477" cy="3626418"/>
+            <a:off x="30413287" y="20082925"/>
+            <a:ext cx="4580012" cy="5387284"/>
           </a:xfrm>
           <a:prstGeom prst="rect">
             <a:avLst/>
@@ -5183,7 +4744,7 @@
           <p:nvPr/>
         </p:nvPicPr>
         <p:blipFill>
-          <a:blip r:embed="rId5"/>
+          <a:blip r:embed="rId4"/>
           <a:srcRect/>
           <a:stretch>
             <a:fillRect/>
@@ -5192,7 +4753,7 @@
         <p:spPr bwMode="auto">
           <a:xfrm>
             <a:off x="7285157" y="21602764"/>
-            <a:ext cx="3043833" cy="7216362"/>
+            <a:ext cx="3257384" cy="7216362"/>
           </a:xfrm>
           <a:prstGeom prst="rect">
             <a:avLst/>
@@ -5480,54 +5041,6 @@
       </p:sp>
       <p:sp>
         <p:nvSpPr>
-          <p:cNvPr id="59" name="Rounded Rectangle 58"/>
-          <p:cNvSpPr/>
-          <p:nvPr/>
-        </p:nvSpPr>
-        <p:spPr>
-          <a:xfrm>
-            <a:off x="16964803" y="23697377"/>
-            <a:ext cx="7527807" cy="1015551"/>
-          </a:xfrm>
-          <a:prstGeom prst="roundRect">
-            <a:avLst/>
-          </a:prstGeom>
-          <a:solidFill>
-            <a:srgbClr val="FF5A9C"/>
-          </a:solidFill>
-          <a:ln>
-            <a:solidFill>
-              <a:srgbClr val="FF5A9C"/>
-            </a:solidFill>
-          </a:ln>
-        </p:spPr>
-        <p:style>
-          <a:lnRef idx="2">
-            <a:schemeClr val="accent1">
-              <a:shade val="50000"/>
-            </a:schemeClr>
-          </a:lnRef>
-          <a:fillRef idx="1">
-            <a:schemeClr val="accent1"/>
-          </a:fillRef>
-          <a:effectRef idx="0">
-            <a:schemeClr val="accent1"/>
-          </a:effectRef>
-          <a:fontRef idx="minor">
-            <a:schemeClr val="lt1"/>
-          </a:fontRef>
-        </p:style>
-        <p:txBody>
-          <a:bodyPr rtlCol="0" anchor="ctr"/>
-          <a:lstStyle/>
-          <a:p>
-            <a:pPr algn="ctr"/>
-            <a:endParaRPr lang="en-US"/>
-          </a:p>
-        </p:txBody>
-      </p:sp>
-      <p:sp>
-        <p:nvSpPr>
           <p:cNvPr id="21" name="TextBox 20"/>
           <p:cNvSpPr txBox="1"/>
           <p:nvPr/>
@@ -5573,80 +5086,14 @@
       </p:sp>
       <p:sp>
         <p:nvSpPr>
-          <p:cNvPr id="30" name="TextBox 29"/>
-          <p:cNvSpPr txBox="1"/>
+          <p:cNvPr id="64" name="Rounded Rectangle 63"/>
+          <p:cNvSpPr/>
           <p:nvPr/>
         </p:nvSpPr>
         <p:spPr>
           <a:xfrm>
-            <a:off x="17403843" y="23675559"/>
-            <a:ext cx="6816747" cy="1015663"/>
-          </a:xfrm>
-          <a:prstGeom prst="rect">
-            <a:avLst/>
-          </a:prstGeom>
-          <a:noFill/>
-        </p:spPr>
-        <p:txBody>
-          <a:bodyPr wrap="square" rtlCol="0">
-            <a:spAutoFit/>
-          </a:bodyPr>
-          <a:lstStyle/>
-          <a:p>
-            <a:r>
-              <a:rPr lang="en-US" altLang="zh-CN" sz="6000" dirty="0">
-                <a:solidFill>
-                  <a:schemeClr val="bg1"/>
-                </a:solidFill>
-                <a:latin typeface="Arial" charset="0"/>
-                <a:ea typeface="Arial" charset="0"/>
-                <a:cs typeface="Arial" charset="0"/>
-              </a:rPr>
-              <a:t>D</a:t>
-            </a:r>
-            <a:r>
-              <a:rPr lang="en-US" sz="6000" dirty="0">
-                <a:solidFill>
-                  <a:schemeClr val="bg1"/>
-                </a:solidFill>
-                <a:latin typeface="Arial" charset="0"/>
-                <a:ea typeface="Arial" charset="0"/>
-                <a:cs typeface="Arial" charset="0"/>
-              </a:rPr>
-              <a:t>ata </a:t>
-            </a:r>
-            <a:r>
-              <a:rPr lang="en-US" sz="6000">
-                <a:solidFill>
-                  <a:schemeClr val="bg1"/>
-                </a:solidFill>
-                <a:latin typeface="Arial" charset="0"/>
-                <a:ea typeface="Arial" charset="0"/>
-                <a:cs typeface="Arial" charset="0"/>
-              </a:rPr>
-              <a:t>query module</a:t>
-            </a:r>
-            <a:endParaRPr lang="en-US" sz="6000" dirty="0">
-              <a:solidFill>
-                <a:schemeClr val="bg1"/>
-              </a:solidFill>
-              <a:latin typeface="Arial" charset="0"/>
-              <a:ea typeface="Arial" charset="0"/>
-              <a:cs typeface="Arial" charset="0"/>
-            </a:endParaRPr>
-          </a:p>
-        </p:txBody>
-      </p:sp>
-      <p:sp>
-        <p:nvSpPr>
-          <p:cNvPr id="63" name="Rounded Rectangle 62"/>
-          <p:cNvSpPr/>
-          <p:nvPr/>
-        </p:nvSpPr>
-        <p:spPr>
-          <a:xfrm>
-            <a:off x="32639957" y="4087966"/>
-            <a:ext cx="6219549" cy="1125529"/>
+            <a:off x="32964565" y="26050915"/>
+            <a:ext cx="7527807" cy="1015551"/>
           </a:xfrm>
           <a:prstGeom prst="roundRect">
             <a:avLst/>
@@ -5687,13 +5134,13 @@
       </p:sp>
       <p:sp>
         <p:nvSpPr>
-          <p:cNvPr id="64" name="Rounded Rectangle 63"/>
+          <p:cNvPr id="66" name="Rounded Rectangle 65"/>
           <p:cNvSpPr/>
           <p:nvPr/>
         </p:nvSpPr>
         <p:spPr>
           <a:xfrm>
-            <a:off x="32964565" y="26050915"/>
+            <a:off x="32710213" y="18741989"/>
             <a:ext cx="7527807" cy="1015551"/>
           </a:xfrm>
           <a:prstGeom prst="roundRect">
@@ -5735,136 +5182,14 @@
       </p:sp>
       <p:sp>
         <p:nvSpPr>
-          <p:cNvPr id="22" name="TextBox 21"/>
-          <p:cNvSpPr txBox="1"/>
-          <p:nvPr/>
-        </p:nvSpPr>
-        <p:spPr>
-          <a:xfrm>
-            <a:off x="32587414" y="4120382"/>
-            <a:ext cx="6168395" cy="1015663"/>
-          </a:xfrm>
-          <a:prstGeom prst="rect">
-            <a:avLst/>
-          </a:prstGeom>
-          <a:noFill/>
-        </p:spPr>
-        <p:txBody>
-          <a:bodyPr wrap="square" rtlCol="0">
-            <a:spAutoFit/>
-          </a:bodyPr>
-          <a:lstStyle/>
-          <a:p>
-            <a:pPr algn="ctr"/>
-            <a:r>
-              <a:rPr lang="en-US" altLang="zh-CN" sz="6000" dirty="0">
-                <a:solidFill>
-                  <a:schemeClr val="bg1"/>
-                </a:solidFill>
-              </a:rPr>
-              <a:t>Data</a:t>
-            </a:r>
-            <a:r>
-              <a:rPr lang="zh-CN" altLang="en-US" sz="6000" dirty="0">
-                <a:solidFill>
-                  <a:schemeClr val="bg1"/>
-                </a:solidFill>
-              </a:rPr>
-              <a:t> </a:t>
-            </a:r>
-            <a:r>
-              <a:rPr lang="en-US" sz="6000" dirty="0">
-                <a:solidFill>
-                  <a:schemeClr val="bg1"/>
-                </a:solidFill>
-              </a:rPr>
-              <a:t>importer</a:t>
-            </a:r>
-            <a:r>
-              <a:rPr lang="zh-CN" altLang="en-US" sz="6000" dirty="0">
-                <a:solidFill>
-                  <a:schemeClr val="bg1"/>
-                </a:solidFill>
-              </a:rPr>
-              <a:t> </a:t>
-            </a:r>
-            <a:r>
-              <a:rPr lang="en-US" altLang="zh-CN" sz="6000" dirty="0">
-                <a:solidFill>
-                  <a:schemeClr val="bg1"/>
-                </a:solidFill>
-              </a:rPr>
-              <a:t>tool</a:t>
-            </a:r>
-            <a:endParaRPr lang="en-US" sz="6000" dirty="0">
-              <a:solidFill>
-                <a:schemeClr val="bg1"/>
-              </a:solidFill>
-              <a:latin typeface="Arial" charset="0"/>
-              <a:ea typeface="Arial" charset="0"/>
-              <a:cs typeface="Arial" charset="0"/>
-            </a:endParaRPr>
-          </a:p>
-        </p:txBody>
-      </p:sp>
-      <p:sp>
-        <p:nvSpPr>
-          <p:cNvPr id="66" name="Rounded Rectangle 65"/>
-          <p:cNvSpPr/>
-          <p:nvPr/>
-        </p:nvSpPr>
-        <p:spPr>
-          <a:xfrm>
-            <a:off x="32710213" y="20943685"/>
-            <a:ext cx="7527807" cy="1015551"/>
-          </a:xfrm>
-          <a:prstGeom prst="roundRect">
-            <a:avLst/>
-          </a:prstGeom>
-          <a:solidFill>
-            <a:srgbClr val="FF5A9C"/>
-          </a:solidFill>
-          <a:ln>
-            <a:solidFill>
-              <a:srgbClr val="FF5A9C"/>
-            </a:solidFill>
-          </a:ln>
-        </p:spPr>
-        <p:style>
-          <a:lnRef idx="2">
-            <a:schemeClr val="accent1">
-              <a:shade val="50000"/>
-            </a:schemeClr>
-          </a:lnRef>
-          <a:fillRef idx="1">
-            <a:schemeClr val="accent1"/>
-          </a:fillRef>
-          <a:effectRef idx="0">
-            <a:schemeClr val="accent1"/>
-          </a:effectRef>
-          <a:fontRef idx="minor">
-            <a:schemeClr val="lt1"/>
-          </a:fontRef>
-        </p:style>
-        <p:txBody>
-          <a:bodyPr rtlCol="0" anchor="ctr"/>
-          <a:lstStyle/>
-          <a:p>
-            <a:pPr algn="ctr"/>
-            <a:endParaRPr lang="en-US"/>
-          </a:p>
-        </p:txBody>
-      </p:sp>
-      <p:sp>
-        <p:nvSpPr>
           <p:cNvPr id="28" name="TextBox 27"/>
           <p:cNvSpPr txBox="1"/>
           <p:nvPr/>
         </p:nvSpPr>
         <p:spPr>
           <a:xfrm>
-            <a:off x="32505721" y="20939702"/>
-            <a:ext cx="7936789" cy="1015663"/>
+            <a:off x="32505721" y="18738006"/>
+            <a:ext cx="7103587" cy="1015663"/>
           </a:xfrm>
           <a:prstGeom prst="rect">
             <a:avLst/>
@@ -5970,6 +5295,39 @@
       <p:pic>
         <p:nvPicPr>
           <p:cNvPr id="1026" name="Picture 2"/>
+          <p:cNvPicPr>
+            <a:picLocks noChangeAspect="1" noChangeArrowheads="1"/>
+          </p:cNvPicPr>
+          <p:nvPr/>
+        </p:nvPicPr>
+        <p:blipFill>
+          <a:blip r:embed="rId5"/>
+          <a:srcRect/>
+          <a:stretch>
+            <a:fillRect/>
+          </a:stretch>
+        </p:blipFill>
+        <p:spPr bwMode="auto">
+          <a:xfrm>
+            <a:off x="12257817" y="6279293"/>
+            <a:ext cx="8072494" cy="2469173"/>
+          </a:xfrm>
+          <a:prstGeom prst="rect">
+            <a:avLst/>
+          </a:prstGeom>
+          <a:noFill/>
+          <a:ln w="9525">
+            <a:noFill/>
+            <a:miter lim="800000"/>
+            <a:headEnd/>
+            <a:tailEnd/>
+          </a:ln>
+          <a:effectLst/>
+        </p:spPr>
+      </p:pic>
+      <p:pic>
+        <p:nvPicPr>
+          <p:cNvPr id="13" name="Picture 3"/>
           <p:cNvPicPr>
             <a:picLocks noChangeAspect="1" noChangeArrowheads="1"/>
           </p:cNvPicPr>
@@ -5984,8 +5342,8 @@
         </p:blipFill>
         <p:spPr bwMode="auto">
           <a:xfrm>
-            <a:off x="12257817" y="6279293"/>
-            <a:ext cx="8072494" cy="2469173"/>
+            <a:off x="20687501" y="6279294"/>
+            <a:ext cx="8075692" cy="3000396"/>
           </a:xfrm>
           <a:prstGeom prst="rect">
             <a:avLst/>
@@ -6002,7 +5360,7 @@
       </p:pic>
       <p:pic>
         <p:nvPicPr>
-          <p:cNvPr id="13" name="Picture 3"/>
+          <p:cNvPr id="1028" name="Picture 4"/>
           <p:cNvPicPr>
             <a:picLocks noChangeAspect="1" noChangeArrowheads="1"/>
           </p:cNvPicPr>
@@ -6017,8 +5375,8 @@
         </p:blipFill>
         <p:spPr bwMode="auto">
           <a:xfrm>
-            <a:off x="20687501" y="6279294"/>
-            <a:ext cx="8075692" cy="3000396"/>
+            <a:off x="17401353" y="6729560"/>
+            <a:ext cx="1500198" cy="2663618"/>
           </a:xfrm>
           <a:prstGeom prst="rect">
             <a:avLst/>
@@ -6033,9 +5391,546 @@
           <a:effectLst/>
         </p:spPr>
       </p:pic>
+      <p:sp>
+        <p:nvSpPr>
+          <p:cNvPr id="65" name="TextBox 64"/>
+          <p:cNvSpPr txBox="1"/>
+          <p:nvPr/>
+        </p:nvSpPr>
+        <p:spPr>
+          <a:xfrm>
+            <a:off x="21259005" y="5350600"/>
+            <a:ext cx="7286676" cy="707886"/>
+          </a:xfrm>
+          <a:prstGeom prst="rect">
+            <a:avLst/>
+          </a:prstGeom>
+          <a:noFill/>
+        </p:spPr>
+        <p:txBody>
+          <a:bodyPr wrap="square" rtlCol="0">
+            <a:spAutoFit/>
+          </a:bodyPr>
+          <a:lstStyle/>
+          <a:p>
+            <a:r>
+              <a:rPr lang="en-US" altLang="zh-CN" sz="4000" dirty="0"/>
+              <a:t>Activities of individual student</a:t>
+            </a:r>
+            <a:endParaRPr lang="zh-CN" altLang="en-US" sz="4000" dirty="0"/>
+          </a:p>
+        </p:txBody>
+      </p:sp>
+      <p:sp>
+        <p:nvSpPr>
+          <p:cNvPr id="68" name="矩形标注 67"/>
+          <p:cNvSpPr/>
+          <p:nvPr/>
+        </p:nvSpPr>
+        <p:spPr>
+          <a:xfrm rot="10800000">
+            <a:off x="13400825" y="8993938"/>
+            <a:ext cx="2428892" cy="357190"/>
+          </a:xfrm>
+          <a:prstGeom prst="wedgeRectCallout">
+            <a:avLst/>
+          </a:prstGeom>
+          <a:noFill/>
+        </p:spPr>
+        <p:style>
+          <a:lnRef idx="2">
+            <a:schemeClr val="accent1">
+              <a:shade val="50000"/>
+            </a:schemeClr>
+          </a:lnRef>
+          <a:fillRef idx="1">
+            <a:schemeClr val="accent1"/>
+          </a:fillRef>
+          <a:effectRef idx="0">
+            <a:schemeClr val="accent1"/>
+          </a:effectRef>
+          <a:fontRef idx="minor">
+            <a:schemeClr val="lt1"/>
+          </a:fontRef>
+        </p:style>
+        <p:txBody>
+          <a:bodyPr rtlCol="0" anchor="ctr"/>
+          <a:lstStyle/>
+          <a:p>
+            <a:pPr algn="ctr"/>
+            <a:endParaRPr lang="zh-CN" altLang="en-US"/>
+          </a:p>
+        </p:txBody>
+      </p:sp>
+      <p:sp>
+        <p:nvSpPr>
+          <p:cNvPr id="69" name="TextBox 68"/>
+          <p:cNvSpPr txBox="1"/>
+          <p:nvPr/>
+        </p:nvSpPr>
+        <p:spPr>
+          <a:xfrm>
+            <a:off x="13686577" y="8951018"/>
+            <a:ext cx="2071702" cy="400110"/>
+          </a:xfrm>
+          <a:prstGeom prst="rect">
+            <a:avLst/>
+          </a:prstGeom>
+          <a:noFill/>
+        </p:spPr>
+        <p:txBody>
+          <a:bodyPr wrap="square" rtlCol="0">
+            <a:spAutoFit/>
+          </a:bodyPr>
+          <a:lstStyle/>
+          <a:p>
+            <a:r>
+              <a:rPr lang="en-US" altLang="zh-CN" sz="2000" dirty="0">
+                <a:solidFill>
+                  <a:srgbClr val="FF0000"/>
+                </a:solidFill>
+              </a:rPr>
+              <a:t>Automatically  set</a:t>
+            </a:r>
+            <a:endParaRPr lang="zh-CN" altLang="en-US" sz="2000" dirty="0">
+              <a:solidFill>
+                <a:srgbClr val="FF0000"/>
+              </a:solidFill>
+            </a:endParaRPr>
+          </a:p>
+        </p:txBody>
+      </p:sp>
+      <p:sp>
+        <p:nvSpPr>
+          <p:cNvPr id="70" name="矩形标注 69"/>
+          <p:cNvSpPr/>
+          <p:nvPr/>
+        </p:nvSpPr>
+        <p:spPr>
+          <a:xfrm>
+            <a:off x="14186643" y="5723116"/>
+            <a:ext cx="5286412" cy="484740"/>
+          </a:xfrm>
+          <a:prstGeom prst="wedgeRectCallout">
+            <a:avLst/>
+          </a:prstGeom>
+          <a:noFill/>
+        </p:spPr>
+        <p:style>
+          <a:lnRef idx="2">
+            <a:schemeClr val="accent1">
+              <a:shade val="50000"/>
+            </a:schemeClr>
+          </a:lnRef>
+          <a:fillRef idx="1">
+            <a:schemeClr val="accent1"/>
+          </a:fillRef>
+          <a:effectRef idx="0">
+            <a:schemeClr val="accent1"/>
+          </a:effectRef>
+          <a:fontRef idx="minor">
+            <a:schemeClr val="lt1"/>
+          </a:fontRef>
+        </p:style>
+        <p:txBody>
+          <a:bodyPr rtlCol="0" anchor="ctr"/>
+          <a:lstStyle/>
+          <a:p>
+            <a:pPr algn="ctr"/>
+            <a:endParaRPr lang="zh-CN" altLang="en-US"/>
+          </a:p>
+        </p:txBody>
+      </p:sp>
+      <p:sp>
+        <p:nvSpPr>
+          <p:cNvPr id="71" name="TextBox 70"/>
+          <p:cNvSpPr txBox="1"/>
+          <p:nvPr/>
+        </p:nvSpPr>
+        <p:spPr>
+          <a:xfrm>
+            <a:off x="14329519" y="5736308"/>
+            <a:ext cx="5072098" cy="400110"/>
+          </a:xfrm>
+          <a:prstGeom prst="rect">
+            <a:avLst/>
+          </a:prstGeom>
+          <a:noFill/>
+        </p:spPr>
+        <p:txBody>
+          <a:bodyPr wrap="square" rtlCol="0">
+            <a:spAutoFit/>
+          </a:bodyPr>
+          <a:lstStyle/>
+          <a:p>
+            <a:r>
+              <a:rPr lang="en-US" altLang="zh-CN" sz="2000" dirty="0">
+                <a:solidFill>
+                  <a:srgbClr val="FF0000"/>
+                </a:solidFill>
+              </a:rPr>
+              <a:t>Choose course, year, semester, assignment</a:t>
+            </a:r>
+            <a:endParaRPr lang="zh-CN" altLang="en-US" sz="2000" dirty="0">
+              <a:solidFill>
+                <a:srgbClr val="FF0000"/>
+              </a:solidFill>
+            </a:endParaRPr>
+          </a:p>
+        </p:txBody>
+      </p:sp>
+      <p:sp>
+        <p:nvSpPr>
+          <p:cNvPr id="75" name="矩形标注 74"/>
+          <p:cNvSpPr/>
+          <p:nvPr/>
+        </p:nvSpPr>
+        <p:spPr>
+          <a:xfrm rot="16200000" flipV="1">
+            <a:off x="28438524" y="5886385"/>
+            <a:ext cx="1143008" cy="928694"/>
+          </a:xfrm>
+          <a:prstGeom prst="wedgeRectCallout">
+            <a:avLst/>
+          </a:prstGeom>
+          <a:noFill/>
+        </p:spPr>
+        <p:style>
+          <a:lnRef idx="2">
+            <a:schemeClr val="accent1">
+              <a:shade val="50000"/>
+            </a:schemeClr>
+          </a:lnRef>
+          <a:fillRef idx="1">
+            <a:schemeClr val="accent1"/>
+          </a:fillRef>
+          <a:effectRef idx="0">
+            <a:schemeClr val="accent1"/>
+          </a:effectRef>
+          <a:fontRef idx="minor">
+            <a:schemeClr val="lt1"/>
+          </a:fontRef>
+        </p:style>
+        <p:txBody>
+          <a:bodyPr rtlCol="0" anchor="ctr"/>
+          <a:lstStyle/>
+          <a:p>
+            <a:pPr algn="ctr"/>
+            <a:endParaRPr lang="zh-CN" altLang="en-US"/>
+          </a:p>
+        </p:txBody>
+      </p:sp>
+      <p:sp>
+        <p:nvSpPr>
+          <p:cNvPr id="76" name="TextBox 75"/>
+          <p:cNvSpPr txBox="1"/>
+          <p:nvPr/>
+        </p:nvSpPr>
+        <p:spPr>
+          <a:xfrm rot="10800000" flipV="1">
+            <a:off x="28474243" y="5850666"/>
+            <a:ext cx="1214446" cy="954107"/>
+          </a:xfrm>
+          <a:prstGeom prst="rect">
+            <a:avLst/>
+          </a:prstGeom>
+          <a:noFill/>
+        </p:spPr>
+        <p:txBody>
+          <a:bodyPr wrap="square" rtlCol="0">
+            <a:spAutoFit/>
+          </a:bodyPr>
+          <a:lstStyle/>
+          <a:p>
+            <a:r>
+              <a:rPr lang="en-US" altLang="zh-CN" sz="1400" dirty="0">
+                <a:solidFill>
+                  <a:srgbClr val="FF0000"/>
+                </a:solidFill>
+              </a:rPr>
+              <a:t>Alphabetical, descending, ascending order</a:t>
+            </a:r>
+            <a:endParaRPr lang="zh-CN" altLang="en-US" sz="1400" dirty="0">
+              <a:solidFill>
+                <a:srgbClr val="FF0000"/>
+              </a:solidFill>
+            </a:endParaRPr>
+          </a:p>
+        </p:txBody>
+      </p:sp>
+      <p:sp>
+        <p:nvSpPr>
+          <p:cNvPr id="77" name="矩形标注 76"/>
+          <p:cNvSpPr/>
+          <p:nvPr/>
+        </p:nvSpPr>
+        <p:spPr>
+          <a:xfrm rot="16200000" flipV="1">
+            <a:off x="28617119" y="7850930"/>
+            <a:ext cx="500066" cy="1500198"/>
+          </a:xfrm>
+          <a:prstGeom prst="wedgeRectCallout">
+            <a:avLst/>
+          </a:prstGeom>
+          <a:noFill/>
+        </p:spPr>
+        <p:style>
+          <a:lnRef idx="2">
+            <a:schemeClr val="accent1">
+              <a:shade val="50000"/>
+            </a:schemeClr>
+          </a:lnRef>
+          <a:fillRef idx="1">
+            <a:schemeClr val="accent1"/>
+          </a:fillRef>
+          <a:effectRef idx="0">
+            <a:schemeClr val="accent1"/>
+          </a:effectRef>
+          <a:fontRef idx="minor">
+            <a:schemeClr val="lt1"/>
+          </a:fontRef>
+        </p:style>
+        <p:txBody>
+          <a:bodyPr rtlCol="0" anchor="ctr"/>
+          <a:lstStyle/>
+          <a:p>
+            <a:pPr algn="ctr"/>
+            <a:endParaRPr lang="zh-CN" altLang="en-US"/>
+          </a:p>
+        </p:txBody>
+      </p:sp>
+      <p:sp>
+        <p:nvSpPr>
+          <p:cNvPr id="78" name="TextBox 77"/>
+          <p:cNvSpPr txBox="1"/>
+          <p:nvPr/>
+        </p:nvSpPr>
+        <p:spPr>
+          <a:xfrm rot="10800000" flipV="1">
+            <a:off x="28117053" y="8279558"/>
+            <a:ext cx="1500198" cy="646331"/>
+          </a:xfrm>
+          <a:prstGeom prst="rect">
+            <a:avLst/>
+          </a:prstGeom>
+          <a:noFill/>
+        </p:spPr>
+        <p:txBody>
+          <a:bodyPr wrap="square" rtlCol="0">
+            <a:spAutoFit/>
+          </a:bodyPr>
+          <a:lstStyle/>
+          <a:p>
+            <a:r>
+              <a:rPr lang="en-US" altLang="zh-CN" sz="1800" dirty="0">
+                <a:solidFill>
+                  <a:srgbClr val="FF0000"/>
+                </a:solidFill>
+              </a:rPr>
+              <a:t>Filter data by threshold</a:t>
+            </a:r>
+            <a:endParaRPr lang="zh-CN" altLang="en-US" sz="1800" dirty="0">
+              <a:solidFill>
+                <a:srgbClr val="FF0000"/>
+              </a:solidFill>
+            </a:endParaRPr>
+          </a:p>
+        </p:txBody>
+      </p:sp>
+      <p:sp>
+        <p:nvSpPr>
+          <p:cNvPr id="79" name="矩形标注 78"/>
+          <p:cNvSpPr/>
+          <p:nvPr/>
+        </p:nvSpPr>
+        <p:spPr>
+          <a:xfrm rot="16200000" flipV="1">
+            <a:off x="28259929" y="8422434"/>
+            <a:ext cx="642942" cy="1643074"/>
+          </a:xfrm>
+          <a:prstGeom prst="wedgeRectCallout">
+            <a:avLst/>
+          </a:prstGeom>
+          <a:noFill/>
+        </p:spPr>
+        <p:style>
+          <a:lnRef idx="2">
+            <a:schemeClr val="accent1">
+              <a:shade val="50000"/>
+            </a:schemeClr>
+          </a:lnRef>
+          <a:fillRef idx="1">
+            <a:schemeClr val="accent1"/>
+          </a:fillRef>
+          <a:effectRef idx="0">
+            <a:schemeClr val="accent1"/>
+          </a:effectRef>
+          <a:fontRef idx="minor">
+            <a:schemeClr val="lt1"/>
+          </a:fontRef>
+        </p:style>
+        <p:txBody>
+          <a:bodyPr rtlCol="0" anchor="ctr"/>
+          <a:lstStyle/>
+          <a:p>
+            <a:pPr algn="ctr"/>
+            <a:endParaRPr lang="zh-CN" altLang="en-US"/>
+          </a:p>
+        </p:txBody>
+      </p:sp>
+      <p:sp>
+        <p:nvSpPr>
+          <p:cNvPr id="80" name="TextBox 79"/>
+          <p:cNvSpPr txBox="1"/>
+          <p:nvPr/>
+        </p:nvSpPr>
+        <p:spPr>
+          <a:xfrm rot="10800000" flipV="1">
+            <a:off x="27759863" y="8879579"/>
+            <a:ext cx="1714512" cy="707886"/>
+          </a:xfrm>
+          <a:prstGeom prst="rect">
+            <a:avLst/>
+          </a:prstGeom>
+          <a:noFill/>
+        </p:spPr>
+        <p:txBody>
+          <a:bodyPr wrap="square" rtlCol="0">
+            <a:spAutoFit/>
+          </a:bodyPr>
+          <a:lstStyle/>
+          <a:p>
+            <a:r>
+              <a:rPr lang="en-US" altLang="zh-CN" sz="2000" dirty="0">
+                <a:solidFill>
+                  <a:srgbClr val="FF0000"/>
+                </a:solidFill>
+              </a:rPr>
+              <a:t>Export data in CSV format</a:t>
+            </a:r>
+            <a:endParaRPr lang="zh-CN" altLang="en-US" sz="2000" dirty="0">
+              <a:solidFill>
+                <a:srgbClr val="FF0000"/>
+              </a:solidFill>
+            </a:endParaRPr>
+          </a:p>
+        </p:txBody>
+      </p:sp>
+      <p:cxnSp>
+        <p:nvCxnSpPr>
+          <p:cNvPr id="82" name="直接箭头连接符 81"/>
+          <p:cNvCxnSpPr/>
+          <p:nvPr/>
+        </p:nvCxnSpPr>
+        <p:spPr>
+          <a:xfrm rot="10800000" flipV="1">
+            <a:off x="18901551" y="8350996"/>
+            <a:ext cx="4786346" cy="571504"/>
+          </a:xfrm>
+          <a:prstGeom prst="straightConnector1">
+            <a:avLst/>
+          </a:prstGeom>
+          <a:ln>
+            <a:tailEnd type="arrow"/>
+          </a:ln>
+        </p:spPr>
+        <p:style>
+          <a:lnRef idx="1">
+            <a:schemeClr val="accent1"/>
+          </a:lnRef>
+          <a:fillRef idx="0">
+            <a:schemeClr val="accent1"/>
+          </a:fillRef>
+          <a:effectRef idx="0">
+            <a:schemeClr val="accent1"/>
+          </a:effectRef>
+          <a:fontRef idx="minor">
+            <a:schemeClr val="tx1"/>
+          </a:fontRef>
+        </p:style>
+      </p:cxnSp>
+      <p:sp>
+        <p:nvSpPr>
+          <p:cNvPr id="88" name="矩形标注 87"/>
+          <p:cNvSpPr/>
+          <p:nvPr/>
+        </p:nvSpPr>
+        <p:spPr>
+          <a:xfrm>
+            <a:off x="18972989" y="7636616"/>
+            <a:ext cx="2214578" cy="1000132"/>
+          </a:xfrm>
+          <a:prstGeom prst="wedgeRectCallout">
+            <a:avLst/>
+          </a:prstGeom>
+          <a:noFill/>
+        </p:spPr>
+        <p:style>
+          <a:lnRef idx="2">
+            <a:schemeClr val="accent1">
+              <a:shade val="50000"/>
+            </a:schemeClr>
+          </a:lnRef>
+          <a:fillRef idx="1">
+            <a:schemeClr val="accent1"/>
+          </a:fillRef>
+          <a:effectRef idx="0">
+            <a:schemeClr val="accent1"/>
+          </a:effectRef>
+          <a:fontRef idx="minor">
+            <a:schemeClr val="lt1"/>
+          </a:fontRef>
+        </p:style>
+        <p:txBody>
+          <a:bodyPr rtlCol="0" anchor="ctr"/>
+          <a:lstStyle/>
+          <a:p>
+            <a:pPr algn="ctr"/>
+            <a:endParaRPr lang="zh-CN" altLang="en-US"/>
+          </a:p>
+        </p:txBody>
+      </p:sp>
+      <p:sp>
+        <p:nvSpPr>
+          <p:cNvPr id="89" name="TextBox 88"/>
+          <p:cNvSpPr txBox="1"/>
+          <p:nvPr/>
+        </p:nvSpPr>
+        <p:spPr>
+          <a:xfrm>
+            <a:off x="18972989" y="7565178"/>
+            <a:ext cx="2214578" cy="1015663"/>
+          </a:xfrm>
+          <a:prstGeom prst="rect">
+            <a:avLst/>
+          </a:prstGeom>
+          <a:noFill/>
+        </p:spPr>
+        <p:txBody>
+          <a:bodyPr wrap="square" rtlCol="0">
+            <a:spAutoFit/>
+          </a:bodyPr>
+          <a:lstStyle/>
+          <a:p>
+            <a:r>
+              <a:rPr lang="en-US" altLang="zh-CN" sz="2000" dirty="0">
+                <a:solidFill>
+                  <a:srgbClr val="FF0000"/>
+                </a:solidFill>
+              </a:rPr>
+              <a:t>Clicking the bar will give details of activities</a:t>
+            </a:r>
+            <a:endParaRPr lang="zh-CN" altLang="en-US" sz="2000" dirty="0">
+              <a:solidFill>
+                <a:srgbClr val="FF0000"/>
+              </a:solidFill>
+            </a:endParaRPr>
+          </a:p>
+        </p:txBody>
+      </p:sp>
       <p:pic>
         <p:nvPicPr>
-          <p:cNvPr id="1028" name="Picture 4"/>
+          <p:cNvPr id="14" name="Picture 5"/>
           <p:cNvPicPr>
             <a:picLocks noChangeAspect="1" noChangeArrowheads="1"/>
           </p:cNvPicPr>
@@ -6050,8 +5945,8 @@
         </p:blipFill>
         <p:spPr bwMode="auto">
           <a:xfrm>
-            <a:off x="17401353" y="6729560"/>
-            <a:ext cx="1500198" cy="2663618"/>
+            <a:off x="11829189" y="11137078"/>
+            <a:ext cx="5857915" cy="3571900"/>
           </a:xfrm>
           <a:prstGeom prst="rect">
             <a:avLst/>
@@ -6068,13 +5963,13 @@
       </p:pic>
       <p:sp>
         <p:nvSpPr>
-          <p:cNvPr id="65" name="TextBox 64"/>
+          <p:cNvPr id="91" name="TextBox 90"/>
           <p:cNvSpPr txBox="1"/>
           <p:nvPr/>
         </p:nvSpPr>
         <p:spPr>
           <a:xfrm>
-            <a:off x="21259005" y="5350600"/>
+            <a:off x="18187171" y="9494004"/>
             <a:ext cx="7286676" cy="707886"/>
           </a:xfrm>
           <a:prstGeom prst="rect">
@@ -6090,522 +5985,15 @@
           <a:p>
             <a:r>
               <a:rPr lang="en-US" altLang="zh-CN" sz="4000" dirty="0"/>
-              <a:t>Activities of individual student</a:t>
+              <a:t>Activities of the class</a:t>
             </a:r>
             <a:endParaRPr lang="zh-CN" altLang="en-US" sz="4000" dirty="0"/>
-          </a:p>
-        </p:txBody>
-      </p:sp>
-      <p:sp>
-        <p:nvSpPr>
-          <p:cNvPr id="68" name="矩形标注 67"/>
-          <p:cNvSpPr/>
-          <p:nvPr/>
-        </p:nvSpPr>
-        <p:spPr>
-          <a:xfrm rot="10800000">
-            <a:off x="13400825" y="8993938"/>
-            <a:ext cx="2428892" cy="357190"/>
-          </a:xfrm>
-          <a:prstGeom prst="wedgeRectCallout">
-            <a:avLst/>
-          </a:prstGeom>
-          <a:noFill/>
-        </p:spPr>
-        <p:style>
-          <a:lnRef idx="2">
-            <a:schemeClr val="accent1">
-              <a:shade val="50000"/>
-            </a:schemeClr>
-          </a:lnRef>
-          <a:fillRef idx="1">
-            <a:schemeClr val="accent1"/>
-          </a:fillRef>
-          <a:effectRef idx="0">
-            <a:schemeClr val="accent1"/>
-          </a:effectRef>
-          <a:fontRef idx="minor">
-            <a:schemeClr val="lt1"/>
-          </a:fontRef>
-        </p:style>
-        <p:txBody>
-          <a:bodyPr rtlCol="0" anchor="ctr"/>
-          <a:lstStyle/>
-          <a:p>
-            <a:pPr algn="ctr"/>
-            <a:endParaRPr lang="zh-CN" altLang="en-US"/>
-          </a:p>
-        </p:txBody>
-      </p:sp>
-      <p:sp>
-        <p:nvSpPr>
-          <p:cNvPr id="69" name="TextBox 68"/>
-          <p:cNvSpPr txBox="1"/>
-          <p:nvPr/>
-        </p:nvSpPr>
-        <p:spPr>
-          <a:xfrm>
-            <a:off x="13686577" y="8951018"/>
-            <a:ext cx="2071702" cy="400110"/>
-          </a:xfrm>
-          <a:prstGeom prst="rect">
-            <a:avLst/>
-          </a:prstGeom>
-          <a:noFill/>
-        </p:spPr>
-        <p:txBody>
-          <a:bodyPr wrap="square" rtlCol="0">
-            <a:spAutoFit/>
-          </a:bodyPr>
-          <a:lstStyle/>
-          <a:p>
-            <a:r>
-              <a:rPr lang="en-US" altLang="zh-CN" sz="2000" dirty="0">
-                <a:solidFill>
-                  <a:srgbClr val="FF0000"/>
-                </a:solidFill>
-              </a:rPr>
-              <a:t>Automatically  set</a:t>
-            </a:r>
-            <a:endParaRPr lang="zh-CN" altLang="en-US" sz="2000" dirty="0">
-              <a:solidFill>
-                <a:srgbClr val="FF0000"/>
-              </a:solidFill>
-            </a:endParaRPr>
-          </a:p>
-        </p:txBody>
-      </p:sp>
-      <p:sp>
-        <p:nvSpPr>
-          <p:cNvPr id="70" name="矩形标注 69"/>
-          <p:cNvSpPr/>
-          <p:nvPr/>
-        </p:nvSpPr>
-        <p:spPr>
-          <a:xfrm>
-            <a:off x="14186643" y="5723116"/>
-            <a:ext cx="5286412" cy="484740"/>
-          </a:xfrm>
-          <a:prstGeom prst="wedgeRectCallout">
-            <a:avLst/>
-          </a:prstGeom>
-          <a:noFill/>
-        </p:spPr>
-        <p:style>
-          <a:lnRef idx="2">
-            <a:schemeClr val="accent1">
-              <a:shade val="50000"/>
-            </a:schemeClr>
-          </a:lnRef>
-          <a:fillRef idx="1">
-            <a:schemeClr val="accent1"/>
-          </a:fillRef>
-          <a:effectRef idx="0">
-            <a:schemeClr val="accent1"/>
-          </a:effectRef>
-          <a:fontRef idx="minor">
-            <a:schemeClr val="lt1"/>
-          </a:fontRef>
-        </p:style>
-        <p:txBody>
-          <a:bodyPr rtlCol="0" anchor="ctr"/>
-          <a:lstStyle/>
-          <a:p>
-            <a:pPr algn="ctr"/>
-            <a:endParaRPr lang="zh-CN" altLang="en-US"/>
-          </a:p>
-        </p:txBody>
-      </p:sp>
-      <p:sp>
-        <p:nvSpPr>
-          <p:cNvPr id="71" name="TextBox 70"/>
-          <p:cNvSpPr txBox="1"/>
-          <p:nvPr/>
-        </p:nvSpPr>
-        <p:spPr>
-          <a:xfrm>
-            <a:off x="14329519" y="5736308"/>
-            <a:ext cx="5072098" cy="400110"/>
-          </a:xfrm>
-          <a:prstGeom prst="rect">
-            <a:avLst/>
-          </a:prstGeom>
-          <a:noFill/>
-        </p:spPr>
-        <p:txBody>
-          <a:bodyPr wrap="square" rtlCol="0">
-            <a:spAutoFit/>
-          </a:bodyPr>
-          <a:lstStyle/>
-          <a:p>
-            <a:r>
-              <a:rPr lang="en-US" altLang="zh-CN" sz="2000" dirty="0">
-                <a:solidFill>
-                  <a:srgbClr val="FF0000"/>
-                </a:solidFill>
-              </a:rPr>
-              <a:t>Choose course, year, semester, assignment</a:t>
-            </a:r>
-            <a:endParaRPr lang="zh-CN" altLang="en-US" sz="2000" dirty="0">
-              <a:solidFill>
-                <a:srgbClr val="FF0000"/>
-              </a:solidFill>
-            </a:endParaRPr>
-          </a:p>
-        </p:txBody>
-      </p:sp>
-      <p:sp>
-        <p:nvSpPr>
-          <p:cNvPr id="75" name="矩形标注 74"/>
-          <p:cNvSpPr/>
-          <p:nvPr/>
-        </p:nvSpPr>
-        <p:spPr>
-          <a:xfrm rot="16200000" flipV="1">
-            <a:off x="28438524" y="5886385"/>
-            <a:ext cx="1143008" cy="928694"/>
-          </a:xfrm>
-          <a:prstGeom prst="wedgeRectCallout">
-            <a:avLst/>
-          </a:prstGeom>
-          <a:noFill/>
-        </p:spPr>
-        <p:style>
-          <a:lnRef idx="2">
-            <a:schemeClr val="accent1">
-              <a:shade val="50000"/>
-            </a:schemeClr>
-          </a:lnRef>
-          <a:fillRef idx="1">
-            <a:schemeClr val="accent1"/>
-          </a:fillRef>
-          <a:effectRef idx="0">
-            <a:schemeClr val="accent1"/>
-          </a:effectRef>
-          <a:fontRef idx="minor">
-            <a:schemeClr val="lt1"/>
-          </a:fontRef>
-        </p:style>
-        <p:txBody>
-          <a:bodyPr rtlCol="0" anchor="ctr"/>
-          <a:lstStyle/>
-          <a:p>
-            <a:pPr algn="ctr"/>
-            <a:endParaRPr lang="zh-CN" altLang="en-US"/>
-          </a:p>
-        </p:txBody>
-      </p:sp>
-      <p:sp>
-        <p:nvSpPr>
-          <p:cNvPr id="76" name="TextBox 75"/>
-          <p:cNvSpPr txBox="1"/>
-          <p:nvPr/>
-        </p:nvSpPr>
-        <p:spPr>
-          <a:xfrm rot="10800000" flipV="1">
-            <a:off x="28474243" y="5850666"/>
-            <a:ext cx="1214446" cy="954107"/>
-          </a:xfrm>
-          <a:prstGeom prst="rect">
-            <a:avLst/>
-          </a:prstGeom>
-          <a:noFill/>
-        </p:spPr>
-        <p:txBody>
-          <a:bodyPr wrap="square" rtlCol="0">
-            <a:spAutoFit/>
-          </a:bodyPr>
-          <a:lstStyle/>
-          <a:p>
-            <a:r>
-              <a:rPr lang="en-US" altLang="zh-CN" sz="1400" dirty="0">
-                <a:solidFill>
-                  <a:srgbClr val="FF0000"/>
-                </a:solidFill>
-              </a:rPr>
-              <a:t>Alphabetical, descending, ascending order</a:t>
-            </a:r>
-            <a:endParaRPr lang="zh-CN" altLang="en-US" sz="1400" dirty="0">
-              <a:solidFill>
-                <a:srgbClr val="FF0000"/>
-              </a:solidFill>
-            </a:endParaRPr>
-          </a:p>
-        </p:txBody>
-      </p:sp>
-      <p:sp>
-        <p:nvSpPr>
-          <p:cNvPr id="77" name="矩形标注 76"/>
-          <p:cNvSpPr/>
-          <p:nvPr/>
-        </p:nvSpPr>
-        <p:spPr>
-          <a:xfrm rot="16200000" flipV="1">
-            <a:off x="28617119" y="7850930"/>
-            <a:ext cx="500066" cy="1500198"/>
-          </a:xfrm>
-          <a:prstGeom prst="wedgeRectCallout">
-            <a:avLst/>
-          </a:prstGeom>
-          <a:noFill/>
-        </p:spPr>
-        <p:style>
-          <a:lnRef idx="2">
-            <a:schemeClr val="accent1">
-              <a:shade val="50000"/>
-            </a:schemeClr>
-          </a:lnRef>
-          <a:fillRef idx="1">
-            <a:schemeClr val="accent1"/>
-          </a:fillRef>
-          <a:effectRef idx="0">
-            <a:schemeClr val="accent1"/>
-          </a:effectRef>
-          <a:fontRef idx="minor">
-            <a:schemeClr val="lt1"/>
-          </a:fontRef>
-        </p:style>
-        <p:txBody>
-          <a:bodyPr rtlCol="0" anchor="ctr"/>
-          <a:lstStyle/>
-          <a:p>
-            <a:pPr algn="ctr"/>
-            <a:endParaRPr lang="zh-CN" altLang="en-US"/>
-          </a:p>
-        </p:txBody>
-      </p:sp>
-      <p:sp>
-        <p:nvSpPr>
-          <p:cNvPr id="78" name="TextBox 77"/>
-          <p:cNvSpPr txBox="1"/>
-          <p:nvPr/>
-        </p:nvSpPr>
-        <p:spPr>
-          <a:xfrm rot="10800000" flipV="1">
-            <a:off x="28117053" y="8279558"/>
-            <a:ext cx="1500198" cy="646331"/>
-          </a:xfrm>
-          <a:prstGeom prst="rect">
-            <a:avLst/>
-          </a:prstGeom>
-          <a:noFill/>
-        </p:spPr>
-        <p:txBody>
-          <a:bodyPr wrap="square" rtlCol="0">
-            <a:spAutoFit/>
-          </a:bodyPr>
-          <a:lstStyle/>
-          <a:p>
-            <a:r>
-              <a:rPr lang="en-US" altLang="zh-CN" sz="1800" dirty="0">
-                <a:solidFill>
-                  <a:srgbClr val="FF0000"/>
-                </a:solidFill>
-              </a:rPr>
-              <a:t>Filter data by threshold</a:t>
-            </a:r>
-            <a:endParaRPr lang="zh-CN" altLang="en-US" sz="1800" dirty="0">
-              <a:solidFill>
-                <a:srgbClr val="FF0000"/>
-              </a:solidFill>
-            </a:endParaRPr>
-          </a:p>
-        </p:txBody>
-      </p:sp>
-      <p:sp>
-        <p:nvSpPr>
-          <p:cNvPr id="79" name="矩形标注 78"/>
-          <p:cNvSpPr/>
-          <p:nvPr/>
-        </p:nvSpPr>
-        <p:spPr>
-          <a:xfrm rot="16200000" flipV="1">
-            <a:off x="28259929" y="8422434"/>
-            <a:ext cx="642942" cy="1643074"/>
-          </a:xfrm>
-          <a:prstGeom prst="wedgeRectCallout">
-            <a:avLst/>
-          </a:prstGeom>
-          <a:noFill/>
-        </p:spPr>
-        <p:style>
-          <a:lnRef idx="2">
-            <a:schemeClr val="accent1">
-              <a:shade val="50000"/>
-            </a:schemeClr>
-          </a:lnRef>
-          <a:fillRef idx="1">
-            <a:schemeClr val="accent1"/>
-          </a:fillRef>
-          <a:effectRef idx="0">
-            <a:schemeClr val="accent1"/>
-          </a:effectRef>
-          <a:fontRef idx="minor">
-            <a:schemeClr val="lt1"/>
-          </a:fontRef>
-        </p:style>
-        <p:txBody>
-          <a:bodyPr rtlCol="0" anchor="ctr"/>
-          <a:lstStyle/>
-          <a:p>
-            <a:pPr algn="ctr"/>
-            <a:endParaRPr lang="zh-CN" altLang="en-US"/>
-          </a:p>
-        </p:txBody>
-      </p:sp>
-      <p:sp>
-        <p:nvSpPr>
-          <p:cNvPr id="80" name="TextBox 79"/>
-          <p:cNvSpPr txBox="1"/>
-          <p:nvPr/>
-        </p:nvSpPr>
-        <p:spPr>
-          <a:xfrm rot="10800000" flipV="1">
-            <a:off x="27759863" y="8879579"/>
-            <a:ext cx="1714512" cy="707886"/>
-          </a:xfrm>
-          <a:prstGeom prst="rect">
-            <a:avLst/>
-          </a:prstGeom>
-          <a:noFill/>
-        </p:spPr>
-        <p:txBody>
-          <a:bodyPr wrap="square" rtlCol="0">
-            <a:spAutoFit/>
-          </a:bodyPr>
-          <a:lstStyle/>
-          <a:p>
-            <a:r>
-              <a:rPr lang="en-US" altLang="zh-CN" sz="2000" dirty="0">
-                <a:solidFill>
-                  <a:srgbClr val="FF0000"/>
-                </a:solidFill>
-              </a:rPr>
-              <a:t>Export data in CSV format</a:t>
-            </a:r>
-            <a:endParaRPr lang="zh-CN" altLang="en-US" sz="2000" dirty="0">
-              <a:solidFill>
-                <a:srgbClr val="FF0000"/>
-              </a:solidFill>
-            </a:endParaRPr>
-          </a:p>
-        </p:txBody>
-      </p:sp>
-      <p:cxnSp>
-        <p:nvCxnSpPr>
-          <p:cNvPr id="82" name="直接箭头连接符 81"/>
-          <p:cNvCxnSpPr/>
-          <p:nvPr/>
-        </p:nvCxnSpPr>
-        <p:spPr>
-          <a:xfrm rot="10800000" flipV="1">
-            <a:off x="18901551" y="8350996"/>
-            <a:ext cx="4786346" cy="571504"/>
-          </a:xfrm>
-          <a:prstGeom prst="straightConnector1">
-            <a:avLst/>
-          </a:prstGeom>
-          <a:ln>
-            <a:tailEnd type="arrow"/>
-          </a:ln>
-        </p:spPr>
-        <p:style>
-          <a:lnRef idx="1">
-            <a:schemeClr val="accent1"/>
-          </a:lnRef>
-          <a:fillRef idx="0">
-            <a:schemeClr val="accent1"/>
-          </a:fillRef>
-          <a:effectRef idx="0">
-            <a:schemeClr val="accent1"/>
-          </a:effectRef>
-          <a:fontRef idx="minor">
-            <a:schemeClr val="tx1"/>
-          </a:fontRef>
-        </p:style>
-      </p:cxnSp>
-      <p:sp>
-        <p:nvSpPr>
-          <p:cNvPr id="88" name="矩形标注 87"/>
-          <p:cNvSpPr/>
-          <p:nvPr/>
-        </p:nvSpPr>
-        <p:spPr>
-          <a:xfrm>
-            <a:off x="18972989" y="7636616"/>
-            <a:ext cx="2214578" cy="1000132"/>
-          </a:xfrm>
-          <a:prstGeom prst="wedgeRectCallout">
-            <a:avLst/>
-          </a:prstGeom>
-          <a:noFill/>
-        </p:spPr>
-        <p:style>
-          <a:lnRef idx="2">
-            <a:schemeClr val="accent1">
-              <a:shade val="50000"/>
-            </a:schemeClr>
-          </a:lnRef>
-          <a:fillRef idx="1">
-            <a:schemeClr val="accent1"/>
-          </a:fillRef>
-          <a:effectRef idx="0">
-            <a:schemeClr val="accent1"/>
-          </a:effectRef>
-          <a:fontRef idx="minor">
-            <a:schemeClr val="lt1"/>
-          </a:fontRef>
-        </p:style>
-        <p:txBody>
-          <a:bodyPr rtlCol="0" anchor="ctr"/>
-          <a:lstStyle/>
-          <a:p>
-            <a:pPr algn="ctr"/>
-            <a:endParaRPr lang="zh-CN" altLang="en-US"/>
-          </a:p>
-        </p:txBody>
-      </p:sp>
-      <p:sp>
-        <p:nvSpPr>
-          <p:cNvPr id="89" name="TextBox 88"/>
-          <p:cNvSpPr txBox="1"/>
-          <p:nvPr/>
-        </p:nvSpPr>
-        <p:spPr>
-          <a:xfrm>
-            <a:off x="18972989" y="7565178"/>
-            <a:ext cx="2214578" cy="1015663"/>
-          </a:xfrm>
-          <a:prstGeom prst="rect">
-            <a:avLst/>
-          </a:prstGeom>
-          <a:noFill/>
-        </p:spPr>
-        <p:txBody>
-          <a:bodyPr wrap="square" rtlCol="0">
-            <a:spAutoFit/>
-          </a:bodyPr>
-          <a:lstStyle/>
-          <a:p>
-            <a:r>
-              <a:rPr lang="en-US" altLang="zh-CN" sz="2000" dirty="0">
-                <a:solidFill>
-                  <a:srgbClr val="FF0000"/>
-                </a:solidFill>
-              </a:rPr>
-              <a:t>Clicking the bar will give details of activities</a:t>
-            </a:r>
-            <a:endParaRPr lang="zh-CN" altLang="en-US" sz="2000" dirty="0">
-              <a:solidFill>
-                <a:srgbClr val="FF0000"/>
-              </a:solidFill>
-            </a:endParaRPr>
           </a:p>
         </p:txBody>
       </p:sp>
       <p:pic>
         <p:nvPicPr>
-          <p:cNvPr id="14" name="Picture 5"/>
+          <p:cNvPr id="15" name="Picture 6"/>
           <p:cNvPicPr>
             <a:picLocks noChangeAspect="1" noChangeArrowheads="1"/>
           </p:cNvPicPr>
@@ -6620,8 +6008,8 @@
         </p:blipFill>
         <p:spPr bwMode="auto">
           <a:xfrm>
-            <a:off x="11829189" y="11137078"/>
-            <a:ext cx="5857915" cy="3571900"/>
+            <a:off x="17829981" y="11137078"/>
+            <a:ext cx="5357850" cy="3786214"/>
           </a:xfrm>
           <a:prstGeom prst="rect">
             <a:avLst/>
@@ -6636,69 +6024,6 @@
           <a:effectLst/>
         </p:spPr>
       </p:pic>
-      <p:sp>
-        <p:nvSpPr>
-          <p:cNvPr id="91" name="TextBox 90"/>
-          <p:cNvSpPr txBox="1"/>
-          <p:nvPr/>
-        </p:nvSpPr>
-        <p:spPr>
-          <a:xfrm>
-            <a:off x="18187171" y="9494004"/>
-            <a:ext cx="7286676" cy="707886"/>
-          </a:xfrm>
-          <a:prstGeom prst="rect">
-            <a:avLst/>
-          </a:prstGeom>
-          <a:noFill/>
-        </p:spPr>
-        <p:txBody>
-          <a:bodyPr wrap="square" rtlCol="0">
-            <a:spAutoFit/>
-          </a:bodyPr>
-          <a:lstStyle/>
-          <a:p>
-            <a:r>
-              <a:rPr lang="en-US" altLang="zh-CN" sz="4000" dirty="0"/>
-              <a:t>Activities of the class</a:t>
-            </a:r>
-            <a:endParaRPr lang="zh-CN" altLang="en-US" sz="4000" dirty="0"/>
-          </a:p>
-        </p:txBody>
-      </p:sp>
-      <p:pic>
-        <p:nvPicPr>
-          <p:cNvPr id="15" name="Picture 6"/>
-          <p:cNvPicPr>
-            <a:picLocks noChangeAspect="1" noChangeArrowheads="1"/>
-          </p:cNvPicPr>
-          <p:nvPr/>
-        </p:nvPicPr>
-        <p:blipFill>
-          <a:blip r:embed="rId10"/>
-          <a:srcRect/>
-          <a:stretch>
-            <a:fillRect/>
-          </a:stretch>
-        </p:blipFill>
-        <p:spPr bwMode="auto">
-          <a:xfrm>
-            <a:off x="17829981" y="11137078"/>
-            <a:ext cx="5357850" cy="3786214"/>
-          </a:xfrm>
-          <a:prstGeom prst="rect">
-            <a:avLst/>
-          </a:prstGeom>
-          <a:noFill/>
-          <a:ln w="9525">
-            <a:noFill/>
-            <a:miter lim="800000"/>
-            <a:headEnd/>
-            <a:tailEnd/>
-          </a:ln>
-          <a:effectLst/>
-        </p:spPr>
-      </p:pic>
       <p:pic>
         <p:nvPicPr>
           <p:cNvPr id="1031" name="Picture 7"/>
@@ -6708,7 +6033,7 @@
           <p:nvPr/>
         </p:nvPicPr>
         <p:blipFill>
-          <a:blip r:embed="rId11"/>
+          <a:blip r:embed="rId10"/>
           <a:srcRect/>
           <a:stretch>
             <a:fillRect/>
@@ -7218,7 +6543,7 @@
           <p:nvPr/>
         </p:nvPicPr>
         <p:blipFill>
-          <a:blip r:embed="rId12"/>
+          <a:blip r:embed="rId11"/>
           <a:srcRect/>
           <a:stretch>
             <a:fillRect/>
@@ -7275,6 +6600,39 @@
       <p:pic>
         <p:nvPicPr>
           <p:cNvPr id="16" name="Picture 9"/>
+          <p:cNvPicPr>
+            <a:picLocks noChangeAspect="1" noChangeArrowheads="1"/>
+          </p:cNvPicPr>
+          <p:nvPr/>
+        </p:nvPicPr>
+        <p:blipFill>
+          <a:blip r:embed="rId12"/>
+          <a:srcRect/>
+          <a:stretch>
+            <a:fillRect/>
+          </a:stretch>
+        </p:blipFill>
+        <p:spPr bwMode="auto">
+          <a:xfrm>
+            <a:off x="17829981" y="15994862"/>
+            <a:ext cx="5500726" cy="3071834"/>
+          </a:xfrm>
+          <a:prstGeom prst="rect">
+            <a:avLst/>
+          </a:prstGeom>
+          <a:noFill/>
+          <a:ln w="9525">
+            <a:noFill/>
+            <a:miter lim="800000"/>
+            <a:headEnd/>
+            <a:tailEnd/>
+          </a:ln>
+          <a:effectLst/>
+        </p:spPr>
+      </p:pic>
+      <p:pic>
+        <p:nvPicPr>
+          <p:cNvPr id="17" name="Picture 10"/>
           <p:cNvPicPr>
             <a:picLocks noChangeAspect="1" noChangeArrowheads="1"/>
           </p:cNvPicPr>
@@ -7289,8 +6647,8 @@
         </p:blipFill>
         <p:spPr bwMode="auto">
           <a:xfrm>
-            <a:off x="17829981" y="15994862"/>
-            <a:ext cx="5500726" cy="3071834"/>
+            <a:off x="23973649" y="15994862"/>
+            <a:ext cx="5500726" cy="3143272"/>
           </a:xfrm>
           <a:prstGeom prst="rect">
             <a:avLst/>
@@ -7305,9 +6663,253 @@
           <a:effectLst/>
         </p:spPr>
       </p:pic>
+      <p:cxnSp>
+        <p:nvCxnSpPr>
+          <p:cNvPr id="114" name="直接连接符 113"/>
+          <p:cNvCxnSpPr/>
+          <p:nvPr/>
+        </p:nvCxnSpPr>
+        <p:spPr>
+          <a:xfrm rot="10800000" flipV="1">
+            <a:off x="13686577" y="15209044"/>
+            <a:ext cx="6715172" cy="285752"/>
+          </a:xfrm>
+          <a:prstGeom prst="line">
+            <a:avLst/>
+          </a:prstGeom>
+          <a:ln>
+            <a:solidFill>
+              <a:schemeClr val="tx1"/>
+            </a:solidFill>
+          </a:ln>
+        </p:spPr>
+        <p:style>
+          <a:lnRef idx="1">
+            <a:schemeClr val="accent1"/>
+          </a:lnRef>
+          <a:fillRef idx="0">
+            <a:schemeClr val="accent1"/>
+          </a:fillRef>
+          <a:effectRef idx="0">
+            <a:schemeClr val="accent1"/>
+          </a:effectRef>
+          <a:fontRef idx="minor">
+            <a:schemeClr val="tx1"/>
+          </a:fontRef>
+        </p:style>
+      </p:cxnSp>
+      <p:cxnSp>
+        <p:nvCxnSpPr>
+          <p:cNvPr id="115" name="直接连接符 114"/>
+          <p:cNvCxnSpPr/>
+          <p:nvPr/>
+        </p:nvCxnSpPr>
+        <p:spPr>
+          <a:xfrm rot="5400000">
+            <a:off x="20187435" y="15423358"/>
+            <a:ext cx="428628" cy="1588"/>
+          </a:xfrm>
+          <a:prstGeom prst="line">
+            <a:avLst/>
+          </a:prstGeom>
+          <a:ln>
+            <a:solidFill>
+              <a:schemeClr val="tx1"/>
+            </a:solidFill>
+          </a:ln>
+        </p:spPr>
+        <p:style>
+          <a:lnRef idx="1">
+            <a:schemeClr val="accent1"/>
+          </a:lnRef>
+          <a:fillRef idx="0">
+            <a:schemeClr val="accent1"/>
+          </a:fillRef>
+          <a:effectRef idx="0">
+            <a:schemeClr val="accent1"/>
+          </a:effectRef>
+          <a:fontRef idx="minor">
+            <a:schemeClr val="tx1"/>
+          </a:fontRef>
+        </p:style>
+      </p:cxnSp>
+      <p:cxnSp>
+        <p:nvCxnSpPr>
+          <p:cNvPr id="116" name="直接连接符 115"/>
+          <p:cNvCxnSpPr/>
+          <p:nvPr/>
+        </p:nvCxnSpPr>
+        <p:spPr>
+          <a:xfrm>
+            <a:off x="20401749" y="15209044"/>
+            <a:ext cx="5929354" cy="285752"/>
+          </a:xfrm>
+          <a:prstGeom prst="line">
+            <a:avLst/>
+          </a:prstGeom>
+          <a:ln>
+            <a:solidFill>
+              <a:schemeClr val="tx1"/>
+            </a:solidFill>
+          </a:ln>
+        </p:spPr>
+        <p:style>
+          <a:lnRef idx="1">
+            <a:schemeClr val="accent1"/>
+          </a:lnRef>
+          <a:fillRef idx="0">
+            <a:schemeClr val="accent1"/>
+          </a:fillRef>
+          <a:effectRef idx="0">
+            <a:schemeClr val="accent1"/>
+          </a:effectRef>
+          <a:fontRef idx="minor">
+            <a:schemeClr val="tx1"/>
+          </a:fontRef>
+        </p:style>
+      </p:cxnSp>
+      <p:sp>
+        <p:nvSpPr>
+          <p:cNvPr id="119" name="TextBox 118"/>
+          <p:cNvSpPr txBox="1"/>
+          <p:nvPr/>
+        </p:nvSpPr>
+        <p:spPr>
+          <a:xfrm>
+            <a:off x="25259533" y="15494796"/>
+            <a:ext cx="2786082" cy="523220"/>
+          </a:xfrm>
+          <a:prstGeom prst="rect">
+            <a:avLst/>
+          </a:prstGeom>
+          <a:noFill/>
+        </p:spPr>
+        <p:txBody>
+          <a:bodyPr wrap="square" rtlCol="0">
+            <a:spAutoFit/>
+          </a:bodyPr>
+          <a:lstStyle/>
+          <a:p>
+            <a:r>
+              <a:rPr lang="en-US" altLang="zh-CN" sz="2800" dirty="0"/>
+              <a:t>Individual student</a:t>
+            </a:r>
+            <a:endParaRPr lang="zh-CN" altLang="en-US" sz="2800" dirty="0"/>
+          </a:p>
+        </p:txBody>
+      </p:sp>
+      <p:sp>
+        <p:nvSpPr>
+          <p:cNvPr id="121" name="TextBox 120"/>
+          <p:cNvSpPr txBox="1"/>
+          <p:nvPr/>
+        </p:nvSpPr>
+        <p:spPr>
+          <a:xfrm>
+            <a:off x="12829321" y="15471642"/>
+            <a:ext cx="2786082" cy="523220"/>
+          </a:xfrm>
+          <a:prstGeom prst="rect">
+            <a:avLst/>
+          </a:prstGeom>
+          <a:noFill/>
+        </p:spPr>
+        <p:txBody>
+          <a:bodyPr wrap="square" rtlCol="0">
+            <a:spAutoFit/>
+          </a:bodyPr>
+          <a:lstStyle/>
+          <a:p>
+            <a:r>
+              <a:rPr lang="en-US" altLang="zh-CN" sz="2800" dirty="0"/>
+              <a:t>The class</a:t>
+            </a:r>
+            <a:endParaRPr lang="zh-CN" altLang="en-US" sz="2800" dirty="0"/>
+          </a:p>
+        </p:txBody>
+      </p:sp>
+      <p:sp>
+        <p:nvSpPr>
+          <p:cNvPr id="124" name="矩形标注 123"/>
+          <p:cNvSpPr/>
+          <p:nvPr/>
+        </p:nvSpPr>
+        <p:spPr>
+          <a:xfrm rot="10800000" flipV="1">
+            <a:off x="14543833" y="15637672"/>
+            <a:ext cx="2714644" cy="571504"/>
+          </a:xfrm>
+          <a:prstGeom prst="wedgeRectCallout">
+            <a:avLst/>
+          </a:prstGeom>
+          <a:noFill/>
+        </p:spPr>
+        <p:style>
+          <a:lnRef idx="2">
+            <a:schemeClr val="accent1">
+              <a:shade val="50000"/>
+            </a:schemeClr>
+          </a:lnRef>
+          <a:fillRef idx="1">
+            <a:schemeClr val="accent1"/>
+          </a:fillRef>
+          <a:effectRef idx="0">
+            <a:schemeClr val="accent1"/>
+          </a:effectRef>
+          <a:fontRef idx="minor">
+            <a:schemeClr val="lt1"/>
+          </a:fontRef>
+        </p:style>
+        <p:txBody>
+          <a:bodyPr rtlCol="0" anchor="ctr"/>
+          <a:lstStyle/>
+          <a:p>
+            <a:pPr algn="ctr"/>
+            <a:endParaRPr lang="zh-CN" altLang="en-US"/>
+          </a:p>
+        </p:txBody>
+      </p:sp>
+      <p:sp>
+        <p:nvSpPr>
+          <p:cNvPr id="125" name="TextBox 124"/>
+          <p:cNvSpPr txBox="1"/>
+          <p:nvPr/>
+        </p:nvSpPr>
+        <p:spPr>
+          <a:xfrm rot="10800000" flipV="1">
+            <a:off x="14543833" y="15566234"/>
+            <a:ext cx="2786082" cy="707886"/>
+          </a:xfrm>
+          <a:prstGeom prst="rect">
+            <a:avLst/>
+          </a:prstGeom>
+          <a:noFill/>
+        </p:spPr>
+        <p:txBody>
+          <a:bodyPr wrap="square" rtlCol="0">
+            <a:spAutoFit/>
+          </a:bodyPr>
+          <a:lstStyle/>
+          <a:p>
+            <a:r>
+              <a:rPr lang="en-US" altLang="zh-CN" sz="2000" dirty="0">
+                <a:solidFill>
+                  <a:srgbClr val="FF0000"/>
+                </a:solidFill>
+              </a:rPr>
+              <a:t>Annotate assignment  start, due day</a:t>
+            </a:r>
+            <a:endParaRPr lang="zh-CN" altLang="en-US" sz="2000" dirty="0">
+              <a:solidFill>
+                <a:srgbClr val="FF0000"/>
+              </a:solidFill>
+            </a:endParaRPr>
+          </a:p>
+        </p:txBody>
+      </p:sp>
       <p:pic>
         <p:nvPicPr>
-          <p:cNvPr id="17" name="Picture 10"/>
+          <p:cNvPr id="1035" name="Picture 11"/>
           <p:cNvPicPr>
             <a:picLocks noChangeAspect="1" noChangeArrowheads="1"/>
           </p:cNvPicPr>
@@ -7322,8 +6924,8 @@
         </p:blipFill>
         <p:spPr bwMode="auto">
           <a:xfrm>
-            <a:off x="23973649" y="15994862"/>
-            <a:ext cx="5500726" cy="3143272"/>
+            <a:off x="12186380" y="19423886"/>
+            <a:ext cx="7643865" cy="4214842"/>
           </a:xfrm>
           <a:prstGeom prst="rect">
             <a:avLst/>
@@ -7338,253 +6940,9 @@
           <a:effectLst/>
         </p:spPr>
       </p:pic>
-      <p:cxnSp>
-        <p:nvCxnSpPr>
-          <p:cNvPr id="114" name="直接连接符 113"/>
-          <p:cNvCxnSpPr/>
-          <p:nvPr/>
-        </p:nvCxnSpPr>
-        <p:spPr>
-          <a:xfrm rot="10800000" flipV="1">
-            <a:off x="13686577" y="15209044"/>
-            <a:ext cx="6715172" cy="285752"/>
-          </a:xfrm>
-          <a:prstGeom prst="line">
-            <a:avLst/>
-          </a:prstGeom>
-          <a:ln>
-            <a:solidFill>
-              <a:schemeClr val="tx1"/>
-            </a:solidFill>
-          </a:ln>
-        </p:spPr>
-        <p:style>
-          <a:lnRef idx="1">
-            <a:schemeClr val="accent1"/>
-          </a:lnRef>
-          <a:fillRef idx="0">
-            <a:schemeClr val="accent1"/>
-          </a:fillRef>
-          <a:effectRef idx="0">
-            <a:schemeClr val="accent1"/>
-          </a:effectRef>
-          <a:fontRef idx="minor">
-            <a:schemeClr val="tx1"/>
-          </a:fontRef>
-        </p:style>
-      </p:cxnSp>
-      <p:cxnSp>
-        <p:nvCxnSpPr>
-          <p:cNvPr id="115" name="直接连接符 114"/>
-          <p:cNvCxnSpPr/>
-          <p:nvPr/>
-        </p:nvCxnSpPr>
-        <p:spPr>
-          <a:xfrm rot="5400000">
-            <a:off x="20187435" y="15423358"/>
-            <a:ext cx="428628" cy="1588"/>
-          </a:xfrm>
-          <a:prstGeom prst="line">
-            <a:avLst/>
-          </a:prstGeom>
-          <a:ln>
-            <a:solidFill>
-              <a:schemeClr val="tx1"/>
-            </a:solidFill>
-          </a:ln>
-        </p:spPr>
-        <p:style>
-          <a:lnRef idx="1">
-            <a:schemeClr val="accent1"/>
-          </a:lnRef>
-          <a:fillRef idx="0">
-            <a:schemeClr val="accent1"/>
-          </a:fillRef>
-          <a:effectRef idx="0">
-            <a:schemeClr val="accent1"/>
-          </a:effectRef>
-          <a:fontRef idx="minor">
-            <a:schemeClr val="tx1"/>
-          </a:fontRef>
-        </p:style>
-      </p:cxnSp>
-      <p:cxnSp>
-        <p:nvCxnSpPr>
-          <p:cNvPr id="116" name="直接连接符 115"/>
-          <p:cNvCxnSpPr/>
-          <p:nvPr/>
-        </p:nvCxnSpPr>
-        <p:spPr>
-          <a:xfrm>
-            <a:off x="20401749" y="15209044"/>
-            <a:ext cx="5929354" cy="285752"/>
-          </a:xfrm>
-          <a:prstGeom prst="line">
-            <a:avLst/>
-          </a:prstGeom>
-          <a:ln>
-            <a:solidFill>
-              <a:schemeClr val="tx1"/>
-            </a:solidFill>
-          </a:ln>
-        </p:spPr>
-        <p:style>
-          <a:lnRef idx="1">
-            <a:schemeClr val="accent1"/>
-          </a:lnRef>
-          <a:fillRef idx="0">
-            <a:schemeClr val="accent1"/>
-          </a:fillRef>
-          <a:effectRef idx="0">
-            <a:schemeClr val="accent1"/>
-          </a:effectRef>
-          <a:fontRef idx="minor">
-            <a:schemeClr val="tx1"/>
-          </a:fontRef>
-        </p:style>
-      </p:cxnSp>
-      <p:sp>
-        <p:nvSpPr>
-          <p:cNvPr id="119" name="TextBox 118"/>
-          <p:cNvSpPr txBox="1"/>
-          <p:nvPr/>
-        </p:nvSpPr>
-        <p:spPr>
-          <a:xfrm>
-            <a:off x="25259533" y="15494796"/>
-            <a:ext cx="2786082" cy="523220"/>
-          </a:xfrm>
-          <a:prstGeom prst="rect">
-            <a:avLst/>
-          </a:prstGeom>
-          <a:noFill/>
-        </p:spPr>
-        <p:txBody>
-          <a:bodyPr wrap="square" rtlCol="0">
-            <a:spAutoFit/>
-          </a:bodyPr>
-          <a:lstStyle/>
-          <a:p>
-            <a:r>
-              <a:rPr lang="en-US" altLang="zh-CN" sz="2800" dirty="0"/>
-              <a:t>Individual student</a:t>
-            </a:r>
-            <a:endParaRPr lang="zh-CN" altLang="en-US" sz="2800" dirty="0"/>
-          </a:p>
-        </p:txBody>
-      </p:sp>
-      <p:sp>
-        <p:nvSpPr>
-          <p:cNvPr id="121" name="TextBox 120"/>
-          <p:cNvSpPr txBox="1"/>
-          <p:nvPr/>
-        </p:nvSpPr>
-        <p:spPr>
-          <a:xfrm>
-            <a:off x="12829321" y="15471642"/>
-            <a:ext cx="2786082" cy="523220"/>
-          </a:xfrm>
-          <a:prstGeom prst="rect">
-            <a:avLst/>
-          </a:prstGeom>
-          <a:noFill/>
-        </p:spPr>
-        <p:txBody>
-          <a:bodyPr wrap="square" rtlCol="0">
-            <a:spAutoFit/>
-          </a:bodyPr>
-          <a:lstStyle/>
-          <a:p>
-            <a:r>
-              <a:rPr lang="en-US" altLang="zh-CN" sz="2800" dirty="0"/>
-              <a:t>The class</a:t>
-            </a:r>
-            <a:endParaRPr lang="zh-CN" altLang="en-US" sz="2800" dirty="0"/>
-          </a:p>
-        </p:txBody>
-      </p:sp>
-      <p:sp>
-        <p:nvSpPr>
-          <p:cNvPr id="124" name="矩形标注 123"/>
-          <p:cNvSpPr/>
-          <p:nvPr/>
-        </p:nvSpPr>
-        <p:spPr>
-          <a:xfrm rot="10800000" flipV="1">
-            <a:off x="14543833" y="15637672"/>
-            <a:ext cx="2714644" cy="571504"/>
-          </a:xfrm>
-          <a:prstGeom prst="wedgeRectCallout">
-            <a:avLst/>
-          </a:prstGeom>
-          <a:noFill/>
-        </p:spPr>
-        <p:style>
-          <a:lnRef idx="2">
-            <a:schemeClr val="accent1">
-              <a:shade val="50000"/>
-            </a:schemeClr>
-          </a:lnRef>
-          <a:fillRef idx="1">
-            <a:schemeClr val="accent1"/>
-          </a:fillRef>
-          <a:effectRef idx="0">
-            <a:schemeClr val="accent1"/>
-          </a:effectRef>
-          <a:fontRef idx="minor">
-            <a:schemeClr val="lt1"/>
-          </a:fontRef>
-        </p:style>
-        <p:txBody>
-          <a:bodyPr rtlCol="0" anchor="ctr"/>
-          <a:lstStyle/>
-          <a:p>
-            <a:pPr algn="ctr"/>
-            <a:endParaRPr lang="zh-CN" altLang="en-US"/>
-          </a:p>
-        </p:txBody>
-      </p:sp>
-      <p:sp>
-        <p:nvSpPr>
-          <p:cNvPr id="125" name="TextBox 124"/>
-          <p:cNvSpPr txBox="1"/>
-          <p:nvPr/>
-        </p:nvSpPr>
-        <p:spPr>
-          <a:xfrm rot="10800000" flipV="1">
-            <a:off x="14543833" y="15566234"/>
-            <a:ext cx="2786082" cy="707886"/>
-          </a:xfrm>
-          <a:prstGeom prst="rect">
-            <a:avLst/>
-          </a:prstGeom>
-          <a:noFill/>
-        </p:spPr>
-        <p:txBody>
-          <a:bodyPr wrap="square" rtlCol="0">
-            <a:spAutoFit/>
-          </a:bodyPr>
-          <a:lstStyle/>
-          <a:p>
-            <a:r>
-              <a:rPr lang="en-US" altLang="zh-CN" sz="2000" dirty="0">
-                <a:solidFill>
-                  <a:srgbClr val="FF0000"/>
-                </a:solidFill>
-              </a:rPr>
-              <a:t>Annotate assignment  start, due day</a:t>
-            </a:r>
-            <a:endParaRPr lang="zh-CN" altLang="en-US" sz="2000" dirty="0">
-              <a:solidFill>
-                <a:srgbClr val="FF0000"/>
-              </a:solidFill>
-            </a:endParaRPr>
-          </a:p>
-        </p:txBody>
-      </p:sp>
       <p:pic>
         <p:nvPicPr>
-          <p:cNvPr id="1035" name="Picture 11"/>
+          <p:cNvPr id="1036" name="Picture 12"/>
           <p:cNvPicPr>
             <a:picLocks noChangeAspect="1" noChangeArrowheads="1"/>
           </p:cNvPicPr>
@@ -7599,8 +6957,8 @@
         </p:blipFill>
         <p:spPr bwMode="auto">
           <a:xfrm>
-            <a:off x="12186380" y="19423886"/>
-            <a:ext cx="7643865" cy="4214842"/>
+            <a:off x="20901815" y="19638200"/>
+            <a:ext cx="7786742" cy="4000528"/>
           </a:xfrm>
           <a:prstGeom prst="rect">
             <a:avLst/>
@@ -7615,39 +6973,6 @@
           <a:effectLst/>
         </p:spPr>
       </p:pic>
-      <p:pic>
-        <p:nvPicPr>
-          <p:cNvPr id="1036" name="Picture 12"/>
-          <p:cNvPicPr>
-            <a:picLocks noChangeAspect="1" noChangeArrowheads="1"/>
-          </p:cNvPicPr>
-          <p:nvPr/>
-        </p:nvPicPr>
-        <p:blipFill>
-          <a:blip r:embed="rId16"/>
-          <a:srcRect/>
-          <a:stretch>
-            <a:fillRect/>
-          </a:stretch>
-        </p:blipFill>
-        <p:spPr bwMode="auto">
-          <a:xfrm>
-            <a:off x="20901815" y="19638200"/>
-            <a:ext cx="7786742" cy="4000528"/>
-          </a:xfrm>
-          <a:prstGeom prst="rect">
-            <a:avLst/>
-          </a:prstGeom>
-          <a:noFill/>
-          <a:ln w="9525">
-            <a:noFill/>
-            <a:miter lim="800000"/>
-            <a:headEnd/>
-            <a:tailEnd/>
-          </a:ln>
-          <a:effectLst/>
-        </p:spPr>
-      </p:pic>
       <p:sp>
         <p:nvSpPr>
           <p:cNvPr id="126" name="TextBox 125"/>
@@ -7912,731 +7237,6 @@
                 <a:srgbClr val="FF0000"/>
               </a:solidFill>
             </a:endParaRPr>
-          </a:p>
-        </p:txBody>
-      </p:sp>
-      <p:pic>
-        <p:nvPicPr>
-          <p:cNvPr id="24" name="Picture 23">
-            <a:extLst>
-              <a:ext uri="{FF2B5EF4-FFF2-40B4-BE49-F238E27FC236}">
-                <a16:creationId xmlns:a16="http://schemas.microsoft.com/office/drawing/2014/main" id="{7652DBB3-3478-4531-B2AA-87A9856F09F6}"/>
-              </a:ext>
-            </a:extLst>
-          </p:cNvPr>
-          <p:cNvPicPr>
-            <a:picLocks noChangeAspect="1"/>
-          </p:cNvPicPr>
-          <p:nvPr/>
-        </p:nvPicPr>
-        <p:blipFill>
-          <a:blip r:embed="rId17"/>
-          <a:stretch>
-            <a:fillRect/>
-          </a:stretch>
-        </p:blipFill>
-        <p:spPr>
-          <a:xfrm>
-            <a:off x="12126044" y="24846536"/>
-            <a:ext cx="8382000" cy="3990975"/>
-          </a:xfrm>
-          <a:prstGeom prst="rect">
-            <a:avLst/>
-          </a:prstGeom>
-        </p:spPr>
-      </p:pic>
-      <p:sp>
-        <p:nvSpPr>
-          <p:cNvPr id="26" name="Right Brace 25">
-            <a:extLst>
-              <a:ext uri="{FF2B5EF4-FFF2-40B4-BE49-F238E27FC236}">
-                <a16:creationId xmlns:a16="http://schemas.microsoft.com/office/drawing/2014/main" id="{B3566A16-03D5-43B6-9D15-AC4865EAC5F0}"/>
-              </a:ext>
-            </a:extLst>
-          </p:cNvPr>
-          <p:cNvSpPr/>
-          <p:nvPr/>
-        </p:nvSpPr>
-        <p:spPr>
-          <a:xfrm>
-            <a:off x="18258609" y="24846535"/>
-            <a:ext cx="224771" cy="2721281"/>
-          </a:xfrm>
-          <a:prstGeom prst="rightBrace">
-            <a:avLst/>
-          </a:prstGeom>
-        </p:spPr>
-        <p:style>
-          <a:lnRef idx="1">
-            <a:schemeClr val="accent1"/>
-          </a:lnRef>
-          <a:fillRef idx="0">
-            <a:schemeClr val="accent1"/>
-          </a:fillRef>
-          <a:effectRef idx="0">
-            <a:schemeClr val="accent1"/>
-          </a:effectRef>
-          <a:fontRef idx="minor">
-            <a:schemeClr val="tx1"/>
-          </a:fontRef>
-        </p:style>
-        <p:txBody>
-          <a:bodyPr rtlCol="0" anchor="ctr"/>
-          <a:lstStyle/>
-          <a:p>
-            <a:pPr algn="ctr"/>
-            <a:endParaRPr lang="en-US"/>
-          </a:p>
-        </p:txBody>
-      </p:sp>
-      <p:sp>
-        <p:nvSpPr>
-          <p:cNvPr id="34" name="TextBox 33">
-            <a:extLst>
-              <a:ext uri="{FF2B5EF4-FFF2-40B4-BE49-F238E27FC236}">
-                <a16:creationId xmlns:a16="http://schemas.microsoft.com/office/drawing/2014/main" id="{8DF45A53-E2CE-4CA9-9E7D-FEC87BCB5FDF}"/>
-              </a:ext>
-            </a:extLst>
-          </p:cNvPr>
-          <p:cNvSpPr txBox="1"/>
-          <p:nvPr/>
-        </p:nvSpPr>
-        <p:spPr>
-          <a:xfrm>
-            <a:off x="19469343" y="25970744"/>
-            <a:ext cx="2515257" cy="400110"/>
-          </a:xfrm>
-          <a:prstGeom prst="rect">
-            <a:avLst/>
-          </a:prstGeom>
-          <a:solidFill>
-            <a:schemeClr val="bg1"/>
-          </a:solidFill>
-          <a:ln>
-            <a:solidFill>
-              <a:schemeClr val="tx2">
-                <a:lumMod val="60000"/>
-                <a:lumOff val="40000"/>
-              </a:schemeClr>
-            </a:solidFill>
-          </a:ln>
-        </p:spPr>
-        <p:txBody>
-          <a:bodyPr wrap="square" rtlCol="0">
-            <a:spAutoFit/>
-          </a:bodyPr>
-          <a:lstStyle/>
-          <a:p>
-            <a:r>
-              <a:rPr lang="en-US" sz="2000" dirty="0">
-                <a:solidFill>
-                  <a:srgbClr val="FF0000"/>
-                </a:solidFill>
-              </a:rPr>
-              <a:t>Searching criteria</a:t>
-            </a:r>
-          </a:p>
-        </p:txBody>
-      </p:sp>
-      <p:cxnSp>
-        <p:nvCxnSpPr>
-          <p:cNvPr id="38" name="Straight Arrow Connector 37">
-            <a:extLst>
-              <a:ext uri="{FF2B5EF4-FFF2-40B4-BE49-F238E27FC236}">
-                <a16:creationId xmlns:a16="http://schemas.microsoft.com/office/drawing/2014/main" id="{D3CE8F3B-A137-4068-AC10-8C998882734E}"/>
-              </a:ext>
-            </a:extLst>
-          </p:cNvPr>
-          <p:cNvCxnSpPr>
-            <a:cxnSpLocks/>
-          </p:cNvCxnSpPr>
-          <p:nvPr/>
-        </p:nvCxnSpPr>
-        <p:spPr>
-          <a:xfrm>
-            <a:off x="18483461" y="26197335"/>
-            <a:ext cx="985882" cy="0"/>
-          </a:xfrm>
-          <a:prstGeom prst="straightConnector1">
-            <a:avLst/>
-          </a:prstGeom>
-          <a:ln>
-            <a:tailEnd type="triangle"/>
-          </a:ln>
-        </p:spPr>
-        <p:style>
-          <a:lnRef idx="1">
-            <a:schemeClr val="accent1"/>
-          </a:lnRef>
-          <a:fillRef idx="0">
-            <a:schemeClr val="accent1"/>
-          </a:fillRef>
-          <a:effectRef idx="0">
-            <a:schemeClr val="accent1"/>
-          </a:effectRef>
-          <a:fontRef idx="minor">
-            <a:schemeClr val="tx1"/>
-          </a:fontRef>
-        </p:style>
-      </p:cxnSp>
-      <p:sp>
-        <p:nvSpPr>
-          <p:cNvPr id="113" name="TextBox 112">
-            <a:extLst>
-              <a:ext uri="{FF2B5EF4-FFF2-40B4-BE49-F238E27FC236}">
-                <a16:creationId xmlns:a16="http://schemas.microsoft.com/office/drawing/2014/main" id="{A89AB2A4-C6C1-42D2-B264-74C2EE0F5E58}"/>
-              </a:ext>
-            </a:extLst>
-          </p:cNvPr>
-          <p:cNvSpPr txBox="1"/>
-          <p:nvPr/>
-        </p:nvSpPr>
-        <p:spPr>
-          <a:xfrm>
-            <a:off x="23786422" y="25290734"/>
-            <a:ext cx="3304091" cy="400110"/>
-          </a:xfrm>
-          <a:prstGeom prst="rect">
-            <a:avLst/>
-          </a:prstGeom>
-          <a:solidFill>
-            <a:schemeClr val="bg1"/>
-          </a:solidFill>
-          <a:ln>
-            <a:solidFill>
-              <a:schemeClr val="tx2">
-                <a:lumMod val="60000"/>
-                <a:lumOff val="40000"/>
-              </a:schemeClr>
-            </a:solidFill>
-          </a:ln>
-        </p:spPr>
-        <p:txBody>
-          <a:bodyPr wrap="square" rtlCol="0">
-            <a:spAutoFit/>
-          </a:bodyPr>
-          <a:lstStyle/>
-          <a:p>
-            <a:r>
-              <a:rPr lang="en-US" sz="2000" dirty="0">
-                <a:solidFill>
-                  <a:srgbClr val="FF0000"/>
-                </a:solidFill>
-              </a:rPr>
-              <a:t>Copy result data to clipboard</a:t>
-            </a:r>
-          </a:p>
-        </p:txBody>
-      </p:sp>
-      <p:sp>
-        <p:nvSpPr>
-          <p:cNvPr id="118" name="TextBox 117">
-            <a:extLst>
-              <a:ext uri="{FF2B5EF4-FFF2-40B4-BE49-F238E27FC236}">
-                <a16:creationId xmlns:a16="http://schemas.microsoft.com/office/drawing/2014/main" id="{8A231199-9499-4C1C-9E08-C8682ACD8D3F}"/>
-              </a:ext>
-            </a:extLst>
-          </p:cNvPr>
-          <p:cNvSpPr txBox="1"/>
-          <p:nvPr/>
-        </p:nvSpPr>
-        <p:spPr>
-          <a:xfrm>
-            <a:off x="23804278" y="25788871"/>
-            <a:ext cx="3286235" cy="406030"/>
-          </a:xfrm>
-          <a:prstGeom prst="rect">
-            <a:avLst/>
-          </a:prstGeom>
-          <a:solidFill>
-            <a:schemeClr val="bg1"/>
-          </a:solidFill>
-          <a:ln>
-            <a:solidFill>
-              <a:schemeClr val="tx2">
-                <a:lumMod val="60000"/>
-                <a:lumOff val="40000"/>
-              </a:schemeClr>
-            </a:solidFill>
-          </a:ln>
-        </p:spPr>
-        <p:txBody>
-          <a:bodyPr wrap="square" rtlCol="0">
-            <a:spAutoFit/>
-          </a:bodyPr>
-          <a:lstStyle/>
-          <a:p>
-            <a:r>
-              <a:rPr lang="en-US" sz="2000" dirty="0">
-                <a:solidFill>
-                  <a:srgbClr val="FF0000"/>
-                </a:solidFill>
-              </a:rPr>
-              <a:t>Export result data to CSV</a:t>
-            </a:r>
-          </a:p>
-        </p:txBody>
-      </p:sp>
-      <p:sp>
-        <p:nvSpPr>
-          <p:cNvPr id="122" name="TextBox 121">
-            <a:extLst>
-              <a:ext uri="{FF2B5EF4-FFF2-40B4-BE49-F238E27FC236}">
-                <a16:creationId xmlns:a16="http://schemas.microsoft.com/office/drawing/2014/main" id="{F4C68349-A3D6-4BA0-B375-38C93B770723}"/>
-              </a:ext>
-            </a:extLst>
-          </p:cNvPr>
-          <p:cNvSpPr txBox="1"/>
-          <p:nvPr/>
-        </p:nvSpPr>
-        <p:spPr>
-          <a:xfrm>
-            <a:off x="23804278" y="26298847"/>
-            <a:ext cx="3286235" cy="400110"/>
-          </a:xfrm>
-          <a:prstGeom prst="rect">
-            <a:avLst/>
-          </a:prstGeom>
-          <a:solidFill>
-            <a:schemeClr val="bg1"/>
-          </a:solidFill>
-          <a:ln>
-            <a:solidFill>
-              <a:schemeClr val="tx2">
-                <a:lumMod val="60000"/>
-                <a:lumOff val="40000"/>
-              </a:schemeClr>
-            </a:solidFill>
-          </a:ln>
-        </p:spPr>
-        <p:txBody>
-          <a:bodyPr wrap="square" rtlCol="0">
-            <a:spAutoFit/>
-          </a:bodyPr>
-          <a:lstStyle/>
-          <a:p>
-            <a:r>
-              <a:rPr lang="en-US" sz="2000" dirty="0">
-                <a:solidFill>
-                  <a:srgbClr val="FF0000"/>
-                </a:solidFill>
-              </a:rPr>
-              <a:t>Export result data to Excel</a:t>
-            </a:r>
-          </a:p>
-        </p:txBody>
-      </p:sp>
-      <p:sp>
-        <p:nvSpPr>
-          <p:cNvPr id="132" name="TextBox 131">
-            <a:extLst>
-              <a:ext uri="{FF2B5EF4-FFF2-40B4-BE49-F238E27FC236}">
-                <a16:creationId xmlns:a16="http://schemas.microsoft.com/office/drawing/2014/main" id="{D6D0CFF8-4487-410C-817E-D998B55F3810}"/>
-              </a:ext>
-            </a:extLst>
-          </p:cNvPr>
-          <p:cNvSpPr txBox="1"/>
-          <p:nvPr/>
-        </p:nvSpPr>
-        <p:spPr>
-          <a:xfrm>
-            <a:off x="23778145" y="26834841"/>
-            <a:ext cx="3312368" cy="400110"/>
-          </a:xfrm>
-          <a:prstGeom prst="rect">
-            <a:avLst/>
-          </a:prstGeom>
-          <a:solidFill>
-            <a:schemeClr val="bg1"/>
-          </a:solidFill>
-          <a:ln>
-            <a:solidFill>
-              <a:schemeClr val="tx2">
-                <a:lumMod val="60000"/>
-                <a:lumOff val="40000"/>
-              </a:schemeClr>
-            </a:solidFill>
-          </a:ln>
-        </p:spPr>
-        <p:txBody>
-          <a:bodyPr wrap="square" rtlCol="0">
-            <a:spAutoFit/>
-          </a:bodyPr>
-          <a:lstStyle/>
-          <a:p>
-            <a:r>
-              <a:rPr lang="en-US" sz="2000" dirty="0">
-                <a:solidFill>
-                  <a:srgbClr val="FF0000"/>
-                </a:solidFill>
-              </a:rPr>
-              <a:t>Export result data to PDF</a:t>
-            </a:r>
-          </a:p>
-        </p:txBody>
-      </p:sp>
-      <p:sp>
-        <p:nvSpPr>
-          <p:cNvPr id="139" name="TextBox 138">
-            <a:extLst>
-              <a:ext uri="{FF2B5EF4-FFF2-40B4-BE49-F238E27FC236}">
-                <a16:creationId xmlns:a16="http://schemas.microsoft.com/office/drawing/2014/main" id="{E7D1816C-F8ED-4577-9FE3-3240A137C233}"/>
-              </a:ext>
-            </a:extLst>
-          </p:cNvPr>
-          <p:cNvSpPr txBox="1"/>
-          <p:nvPr/>
-        </p:nvSpPr>
-        <p:spPr>
-          <a:xfrm>
-            <a:off x="23789243" y="27366470"/>
-            <a:ext cx="3301270" cy="400110"/>
-          </a:xfrm>
-          <a:prstGeom prst="rect">
-            <a:avLst/>
-          </a:prstGeom>
-          <a:solidFill>
-            <a:schemeClr val="bg1"/>
-          </a:solidFill>
-          <a:ln>
-            <a:solidFill>
-              <a:schemeClr val="tx2">
-                <a:lumMod val="60000"/>
-                <a:lumOff val="40000"/>
-              </a:schemeClr>
-            </a:solidFill>
-          </a:ln>
-        </p:spPr>
-        <p:txBody>
-          <a:bodyPr wrap="square" rtlCol="0">
-            <a:spAutoFit/>
-          </a:bodyPr>
-          <a:lstStyle/>
-          <a:p>
-            <a:r>
-              <a:rPr lang="en-US" sz="2000" dirty="0">
-                <a:solidFill>
-                  <a:srgbClr val="FF0000"/>
-                </a:solidFill>
-              </a:rPr>
-              <a:t>Print result data</a:t>
-            </a:r>
-          </a:p>
-        </p:txBody>
-      </p:sp>
-      <p:cxnSp>
-        <p:nvCxnSpPr>
-          <p:cNvPr id="145" name="Straight Arrow Connector 144">
-            <a:extLst>
-              <a:ext uri="{FF2B5EF4-FFF2-40B4-BE49-F238E27FC236}">
-                <a16:creationId xmlns:a16="http://schemas.microsoft.com/office/drawing/2014/main" id="{CE48567A-65AF-41D2-BCB2-36734D581962}"/>
-              </a:ext>
-            </a:extLst>
-          </p:cNvPr>
-          <p:cNvCxnSpPr>
-            <a:cxnSpLocks/>
-          </p:cNvCxnSpPr>
-          <p:nvPr/>
-        </p:nvCxnSpPr>
-        <p:spPr>
-          <a:xfrm>
-            <a:off x="20484827" y="28041896"/>
-            <a:ext cx="971296" cy="0"/>
-          </a:xfrm>
-          <a:prstGeom prst="straightConnector1">
-            <a:avLst/>
-          </a:prstGeom>
-          <a:ln>
-            <a:tailEnd type="triangle"/>
-          </a:ln>
-        </p:spPr>
-        <p:style>
-          <a:lnRef idx="1">
-            <a:schemeClr val="accent1"/>
-          </a:lnRef>
-          <a:fillRef idx="0">
-            <a:schemeClr val="accent1"/>
-          </a:fillRef>
-          <a:effectRef idx="0">
-            <a:schemeClr val="accent1"/>
-          </a:effectRef>
-          <a:fontRef idx="minor">
-            <a:schemeClr val="tx1"/>
-          </a:fontRef>
-        </p:style>
-      </p:cxnSp>
-      <p:sp>
-        <p:nvSpPr>
-          <p:cNvPr id="146" name="TextBox 145">
-            <a:extLst>
-              <a:ext uri="{FF2B5EF4-FFF2-40B4-BE49-F238E27FC236}">
-                <a16:creationId xmlns:a16="http://schemas.microsoft.com/office/drawing/2014/main" id="{74191CD7-3551-488F-95DC-F62B4825FD7C}"/>
-              </a:ext>
-            </a:extLst>
-          </p:cNvPr>
-          <p:cNvSpPr txBox="1"/>
-          <p:nvPr/>
-        </p:nvSpPr>
-        <p:spPr>
-          <a:xfrm>
-            <a:off x="21454839" y="27883022"/>
-            <a:ext cx="1531218" cy="400110"/>
-          </a:xfrm>
-          <a:prstGeom prst="rect">
-            <a:avLst/>
-          </a:prstGeom>
-          <a:solidFill>
-            <a:schemeClr val="bg1"/>
-          </a:solidFill>
-          <a:ln>
-            <a:solidFill>
-              <a:schemeClr val="tx2">
-                <a:lumMod val="60000"/>
-                <a:lumOff val="40000"/>
-              </a:schemeClr>
-            </a:solidFill>
-          </a:ln>
-        </p:spPr>
-        <p:txBody>
-          <a:bodyPr wrap="square" rtlCol="0">
-            <a:spAutoFit/>
-          </a:bodyPr>
-          <a:lstStyle/>
-          <a:p>
-            <a:r>
-              <a:rPr lang="en-US" sz="2000" dirty="0">
-                <a:solidFill>
-                  <a:srgbClr val="FF0000"/>
-                </a:solidFill>
-              </a:rPr>
-              <a:t>Search data</a:t>
-            </a:r>
-          </a:p>
-        </p:txBody>
-      </p:sp>
-      <p:sp>
-        <p:nvSpPr>
-          <p:cNvPr id="149" name="Right Brace 148">
-            <a:extLst>
-              <a:ext uri="{FF2B5EF4-FFF2-40B4-BE49-F238E27FC236}">
-                <a16:creationId xmlns:a16="http://schemas.microsoft.com/office/drawing/2014/main" id="{6C0FE88A-6777-44D6-8907-A57ABBD95A91}"/>
-              </a:ext>
-            </a:extLst>
-          </p:cNvPr>
-          <p:cNvSpPr/>
-          <p:nvPr/>
-        </p:nvSpPr>
-        <p:spPr>
-          <a:xfrm rot="16200000" flipV="1">
-            <a:off x="13626892" y="26724462"/>
-            <a:ext cx="273539" cy="2149496"/>
-          </a:xfrm>
-          <a:prstGeom prst="rightBrace">
-            <a:avLst>
-              <a:gd name="adj1" fmla="val 8333"/>
-              <a:gd name="adj2" fmla="val 49644"/>
-            </a:avLst>
-          </a:prstGeom>
-        </p:spPr>
-        <p:style>
-          <a:lnRef idx="1">
-            <a:schemeClr val="accent1"/>
-          </a:lnRef>
-          <a:fillRef idx="0">
-            <a:schemeClr val="accent1"/>
-          </a:fillRef>
-          <a:effectRef idx="0">
-            <a:schemeClr val="accent1"/>
-          </a:effectRef>
-          <a:fontRef idx="minor">
-            <a:schemeClr val="tx1"/>
-          </a:fontRef>
-        </p:style>
-        <p:txBody>
-          <a:bodyPr rtlCol="0" anchor="ctr"/>
-          <a:lstStyle/>
-          <a:p>
-            <a:pPr algn="ctr"/>
-            <a:endParaRPr lang="en-US"/>
-          </a:p>
-        </p:txBody>
-      </p:sp>
-      <p:sp>
-        <p:nvSpPr>
-          <p:cNvPr id="155" name="Right Brace 154">
-            <a:extLst>
-              <a:ext uri="{FF2B5EF4-FFF2-40B4-BE49-F238E27FC236}">
-                <a16:creationId xmlns:a16="http://schemas.microsoft.com/office/drawing/2014/main" id="{1B994C7E-583F-4116-880B-21F048CBF254}"/>
-              </a:ext>
-            </a:extLst>
-          </p:cNvPr>
-          <p:cNvSpPr/>
-          <p:nvPr/>
-        </p:nvSpPr>
-        <p:spPr>
-          <a:xfrm rot="10800000">
-            <a:off x="23346098" y="25275876"/>
-            <a:ext cx="285752" cy="2460422"/>
-          </a:xfrm>
-          <a:prstGeom prst="rightBrace">
-            <a:avLst/>
-          </a:prstGeom>
-        </p:spPr>
-        <p:style>
-          <a:lnRef idx="1">
-            <a:schemeClr val="accent1"/>
-          </a:lnRef>
-          <a:fillRef idx="0">
-            <a:schemeClr val="accent1"/>
-          </a:fillRef>
-          <a:effectRef idx="0">
-            <a:schemeClr val="accent1"/>
-          </a:effectRef>
-          <a:fontRef idx="minor">
-            <a:schemeClr val="tx1"/>
-          </a:fontRef>
-        </p:style>
-        <p:txBody>
-          <a:bodyPr rtlCol="0" anchor="ctr"/>
-          <a:lstStyle/>
-          <a:p>
-            <a:pPr algn="ctr"/>
-            <a:endParaRPr lang="en-US"/>
-          </a:p>
-        </p:txBody>
-      </p:sp>
-      <p:cxnSp>
-        <p:nvCxnSpPr>
-          <p:cNvPr id="1040" name="Connector: Elbow 1039">
-            <a:extLst>
-              <a:ext uri="{FF2B5EF4-FFF2-40B4-BE49-F238E27FC236}">
-                <a16:creationId xmlns:a16="http://schemas.microsoft.com/office/drawing/2014/main" id="{3B24D2C9-EF21-4E5C-A658-C1E941CA1571}"/>
-              </a:ext>
-            </a:extLst>
-          </p:cNvPr>
-          <p:cNvCxnSpPr>
-            <a:cxnSpLocks/>
-            <a:stCxn id="149" idx="1"/>
-          </p:cNvCxnSpPr>
-          <p:nvPr/>
-        </p:nvCxnSpPr>
-        <p:spPr>
-          <a:xfrm rot="5400000" flipH="1" flipV="1">
-            <a:off x="18013788" y="22368313"/>
-            <a:ext cx="1051654" cy="9536602"/>
-          </a:xfrm>
-          <a:prstGeom prst="bentConnector4">
-            <a:avLst>
-              <a:gd name="adj1" fmla="val -1812"/>
-              <a:gd name="adj2" fmla="val 50677"/>
-            </a:avLst>
-          </a:prstGeom>
-          <a:ln>
-            <a:tailEnd type="triangle"/>
-          </a:ln>
-        </p:spPr>
-        <p:style>
-          <a:lnRef idx="1">
-            <a:schemeClr val="accent1"/>
-          </a:lnRef>
-          <a:fillRef idx="0">
-            <a:schemeClr val="accent1"/>
-          </a:fillRef>
-          <a:effectRef idx="0">
-            <a:schemeClr val="accent1"/>
-          </a:effectRef>
-          <a:fontRef idx="minor">
-            <a:schemeClr val="tx1"/>
-          </a:fontRef>
-        </p:style>
-      </p:cxnSp>
-      <p:cxnSp>
-        <p:nvCxnSpPr>
-          <p:cNvPr id="178" name="Straight Arrow Connector 177">
-            <a:extLst>
-              <a:ext uri="{FF2B5EF4-FFF2-40B4-BE49-F238E27FC236}">
-                <a16:creationId xmlns:a16="http://schemas.microsoft.com/office/drawing/2014/main" id="{B32DEC14-D36E-4018-915F-8470B2073B09}"/>
-              </a:ext>
-            </a:extLst>
-          </p:cNvPr>
-          <p:cNvCxnSpPr>
-            <a:cxnSpLocks/>
-          </p:cNvCxnSpPr>
-          <p:nvPr/>
-        </p:nvCxnSpPr>
-        <p:spPr>
-          <a:xfrm>
-            <a:off x="20465777" y="28617960"/>
-            <a:ext cx="971296" cy="0"/>
-          </a:xfrm>
-          <a:prstGeom prst="straightConnector1">
-            <a:avLst/>
-          </a:prstGeom>
-          <a:ln>
-            <a:tailEnd type="triangle"/>
-          </a:ln>
-        </p:spPr>
-        <p:style>
-          <a:lnRef idx="1">
-            <a:schemeClr val="accent1"/>
-          </a:lnRef>
-          <a:fillRef idx="0">
-            <a:schemeClr val="accent1"/>
-          </a:fillRef>
-          <a:effectRef idx="0">
-            <a:schemeClr val="accent1"/>
-          </a:effectRef>
-          <a:fontRef idx="minor">
-            <a:schemeClr val="tx1"/>
-          </a:fontRef>
-        </p:style>
-      </p:cxnSp>
-      <p:sp>
-        <p:nvSpPr>
-          <p:cNvPr id="179" name="TextBox 178">
-            <a:extLst>
-              <a:ext uri="{FF2B5EF4-FFF2-40B4-BE49-F238E27FC236}">
-                <a16:creationId xmlns:a16="http://schemas.microsoft.com/office/drawing/2014/main" id="{02BF7658-EE90-4D66-968C-BBA1A71950EF}"/>
-              </a:ext>
-            </a:extLst>
-          </p:cNvPr>
-          <p:cNvSpPr txBox="1"/>
-          <p:nvPr/>
-        </p:nvSpPr>
-        <p:spPr>
-          <a:xfrm>
-            <a:off x="21435789" y="28459086"/>
-            <a:ext cx="1531218" cy="400110"/>
-          </a:xfrm>
-          <a:prstGeom prst="rect">
-            <a:avLst/>
-          </a:prstGeom>
-          <a:solidFill>
-            <a:schemeClr val="bg1"/>
-          </a:solidFill>
-          <a:ln>
-            <a:solidFill>
-              <a:schemeClr val="tx2">
-                <a:lumMod val="60000"/>
-                <a:lumOff val="40000"/>
-              </a:schemeClr>
-            </a:solidFill>
-          </a:ln>
-        </p:spPr>
-        <p:txBody>
-          <a:bodyPr wrap="square" rtlCol="0">
-            <a:spAutoFit/>
-          </a:bodyPr>
-          <a:lstStyle/>
-          <a:p>
-            <a:r>
-              <a:rPr lang="en-US" sz="2000" dirty="0">
-                <a:solidFill>
-                  <a:srgbClr val="FF0000"/>
-                </a:solidFill>
-              </a:rPr>
-              <a:t>Result data</a:t>
-            </a:r>
           </a:p>
         </p:txBody>
       </p:sp>
@@ -8654,7 +7254,7 @@
         </p:nvSpPr>
         <p:spPr>
           <a:xfrm>
-            <a:off x="30026444" y="16055384"/>
+            <a:off x="30026444" y="13831904"/>
             <a:ext cx="12506104" cy="4693271"/>
           </a:xfrm>
           <a:custGeom>
@@ -9054,7 +7654,7 @@
         </p:nvSpPr>
         <p:spPr>
           <a:xfrm>
-            <a:off x="32354204" y="15562215"/>
+            <a:off x="32354204" y="13338735"/>
             <a:ext cx="7527807" cy="1015551"/>
           </a:xfrm>
           <a:prstGeom prst="roundRect">
@@ -9108,8 +7708,8 @@
         </p:nvSpPr>
         <p:spPr>
           <a:xfrm>
-            <a:off x="32137703" y="15488878"/>
-            <a:ext cx="7936789" cy="1015663"/>
+            <a:off x="32137703" y="13265398"/>
+            <a:ext cx="7471605" cy="1015663"/>
           </a:xfrm>
           <a:prstGeom prst="rect">
             <a:avLst/>
@@ -9159,7 +7759,7 @@
         </p:nvSpPr>
         <p:spPr>
           <a:xfrm>
-            <a:off x="31152155" y="17059170"/>
+            <a:off x="31152155" y="14835690"/>
             <a:ext cx="9966614" cy="3046988"/>
           </a:xfrm>
           <a:prstGeom prst="rect">
@@ -9236,7 +7836,7 @@
           <p:nvPr/>
         </p:nvPicPr>
         <p:blipFill>
-          <a:blip r:embed="rId18"/>
+          <a:blip r:embed="rId16"/>
           <a:stretch>
             <a:fillRect/>
           </a:stretch>
@@ -9251,6 +7851,933 @@
           </a:prstGeom>
         </p:spPr>
       </p:pic>
+      <p:sp>
+        <p:nvSpPr>
+          <p:cNvPr id="197" name="Rounded Rectangle 58">
+            <a:extLst>
+              <a:ext uri="{FF2B5EF4-FFF2-40B4-BE49-F238E27FC236}">
+                <a16:creationId xmlns:a16="http://schemas.microsoft.com/office/drawing/2014/main" id="{3422F8A2-D13C-46AA-9E89-0541C36D0177}"/>
+              </a:ext>
+            </a:extLst>
+          </p:cNvPr>
+          <p:cNvSpPr/>
+          <p:nvPr/>
+        </p:nvSpPr>
+        <p:spPr>
+          <a:xfrm>
+            <a:off x="32353521" y="4142200"/>
+            <a:ext cx="7527807" cy="1015551"/>
+          </a:xfrm>
+          <a:prstGeom prst="roundRect">
+            <a:avLst/>
+          </a:prstGeom>
+          <a:solidFill>
+            <a:srgbClr val="FF5A9C"/>
+          </a:solidFill>
+          <a:ln>
+            <a:solidFill>
+              <a:srgbClr val="FF5A9C"/>
+            </a:solidFill>
+          </a:ln>
+        </p:spPr>
+        <p:style>
+          <a:lnRef idx="2">
+            <a:schemeClr val="accent1">
+              <a:shade val="50000"/>
+            </a:schemeClr>
+          </a:lnRef>
+          <a:fillRef idx="1">
+            <a:schemeClr val="accent1"/>
+          </a:fillRef>
+          <a:effectRef idx="0">
+            <a:schemeClr val="accent1"/>
+          </a:effectRef>
+          <a:fontRef idx="minor">
+            <a:schemeClr val="lt1"/>
+          </a:fontRef>
+        </p:style>
+        <p:txBody>
+          <a:bodyPr rtlCol="0" anchor="ctr"/>
+          <a:lstStyle/>
+          <a:p>
+            <a:pPr algn="ctr"/>
+            <a:endParaRPr lang="en-US"/>
+          </a:p>
+        </p:txBody>
+      </p:sp>
+      <p:sp>
+        <p:nvSpPr>
+          <p:cNvPr id="198" name="TextBox 197">
+            <a:extLst>
+              <a:ext uri="{FF2B5EF4-FFF2-40B4-BE49-F238E27FC236}">
+                <a16:creationId xmlns:a16="http://schemas.microsoft.com/office/drawing/2014/main" id="{E02AE829-D70C-472F-AFBC-0E9D16292207}"/>
+              </a:ext>
+            </a:extLst>
+          </p:cNvPr>
+          <p:cNvSpPr txBox="1"/>
+          <p:nvPr/>
+        </p:nvSpPr>
+        <p:spPr>
+          <a:xfrm>
+            <a:off x="32792561" y="4120382"/>
+            <a:ext cx="6816747" cy="1015663"/>
+          </a:xfrm>
+          <a:prstGeom prst="rect">
+            <a:avLst/>
+          </a:prstGeom>
+          <a:noFill/>
+        </p:spPr>
+        <p:txBody>
+          <a:bodyPr wrap="square" rtlCol="0">
+            <a:spAutoFit/>
+          </a:bodyPr>
+          <a:lstStyle/>
+          <a:p>
+            <a:r>
+              <a:rPr lang="en-US" altLang="zh-CN" sz="6000" dirty="0">
+                <a:solidFill>
+                  <a:schemeClr val="bg1"/>
+                </a:solidFill>
+                <a:latin typeface="Arial" charset="0"/>
+                <a:ea typeface="Arial" charset="0"/>
+                <a:cs typeface="Arial" charset="0"/>
+              </a:rPr>
+              <a:t>D</a:t>
+            </a:r>
+            <a:r>
+              <a:rPr lang="en-US" sz="6000" dirty="0">
+                <a:solidFill>
+                  <a:schemeClr val="bg1"/>
+                </a:solidFill>
+                <a:latin typeface="Arial" charset="0"/>
+                <a:ea typeface="Arial" charset="0"/>
+                <a:cs typeface="Arial" charset="0"/>
+              </a:rPr>
+              <a:t>ata query module</a:t>
+            </a:r>
+          </a:p>
+        </p:txBody>
+      </p:sp>
+      <p:pic>
+        <p:nvPicPr>
+          <p:cNvPr id="199" name="Picture 198">
+            <a:extLst>
+              <a:ext uri="{FF2B5EF4-FFF2-40B4-BE49-F238E27FC236}">
+                <a16:creationId xmlns:a16="http://schemas.microsoft.com/office/drawing/2014/main" id="{FAA4BAD6-BD1D-4627-BF30-41CDD6750D88}"/>
+              </a:ext>
+            </a:extLst>
+          </p:cNvPr>
+          <p:cNvPicPr>
+            <a:picLocks noChangeAspect="1"/>
+          </p:cNvPicPr>
+          <p:nvPr/>
+        </p:nvPicPr>
+        <p:blipFill>
+          <a:blip r:embed="rId17"/>
+          <a:stretch>
+            <a:fillRect/>
+          </a:stretch>
+        </p:blipFill>
+        <p:spPr>
+          <a:xfrm>
+            <a:off x="30269764" y="5569690"/>
+            <a:ext cx="7827820" cy="6018195"/>
+          </a:xfrm>
+          <a:prstGeom prst="rect">
+            <a:avLst/>
+          </a:prstGeom>
+        </p:spPr>
+      </p:pic>
+      <p:sp>
+        <p:nvSpPr>
+          <p:cNvPr id="201" name="TextBox 200">
+            <a:extLst>
+              <a:ext uri="{FF2B5EF4-FFF2-40B4-BE49-F238E27FC236}">
+                <a16:creationId xmlns:a16="http://schemas.microsoft.com/office/drawing/2014/main" id="{E87F6C0F-7F72-4F94-89C9-CFB317A6D2E5}"/>
+              </a:ext>
+            </a:extLst>
+          </p:cNvPr>
+          <p:cNvSpPr txBox="1"/>
+          <p:nvPr/>
+        </p:nvSpPr>
+        <p:spPr>
+          <a:xfrm>
+            <a:off x="37968744" y="7411636"/>
+            <a:ext cx="2515257" cy="400110"/>
+          </a:xfrm>
+          <a:prstGeom prst="rect">
+            <a:avLst/>
+          </a:prstGeom>
+          <a:solidFill>
+            <a:schemeClr val="bg1"/>
+          </a:solidFill>
+          <a:ln>
+            <a:solidFill>
+              <a:schemeClr val="tx2">
+                <a:lumMod val="60000"/>
+                <a:lumOff val="40000"/>
+              </a:schemeClr>
+            </a:solidFill>
+          </a:ln>
+        </p:spPr>
+        <p:txBody>
+          <a:bodyPr wrap="square" rtlCol="0">
+            <a:spAutoFit/>
+          </a:bodyPr>
+          <a:lstStyle/>
+          <a:p>
+            <a:r>
+              <a:rPr lang="en-US" sz="2000" dirty="0">
+                <a:solidFill>
+                  <a:srgbClr val="FF0000"/>
+                </a:solidFill>
+              </a:rPr>
+              <a:t>Searching criteria</a:t>
+            </a:r>
+          </a:p>
+        </p:txBody>
+      </p:sp>
+      <p:cxnSp>
+        <p:nvCxnSpPr>
+          <p:cNvPr id="202" name="Straight Arrow Connector 201">
+            <a:extLst>
+              <a:ext uri="{FF2B5EF4-FFF2-40B4-BE49-F238E27FC236}">
+                <a16:creationId xmlns:a16="http://schemas.microsoft.com/office/drawing/2014/main" id="{B344B93E-D350-4C33-BC58-33563C7EC1E1}"/>
+              </a:ext>
+            </a:extLst>
+          </p:cNvPr>
+          <p:cNvCxnSpPr>
+            <a:cxnSpLocks/>
+          </p:cNvCxnSpPr>
+          <p:nvPr/>
+        </p:nvCxnSpPr>
+        <p:spPr>
+          <a:xfrm>
+            <a:off x="36481069" y="7626205"/>
+            <a:ext cx="1487675" cy="0"/>
+          </a:xfrm>
+          <a:prstGeom prst="straightConnector1">
+            <a:avLst/>
+          </a:prstGeom>
+          <a:ln>
+            <a:tailEnd type="triangle"/>
+          </a:ln>
+        </p:spPr>
+        <p:style>
+          <a:lnRef idx="1">
+            <a:schemeClr val="accent1"/>
+          </a:lnRef>
+          <a:fillRef idx="0">
+            <a:schemeClr val="accent1"/>
+          </a:fillRef>
+          <a:effectRef idx="0">
+            <a:schemeClr val="accent1"/>
+          </a:effectRef>
+          <a:fontRef idx="minor">
+            <a:schemeClr val="tx1"/>
+          </a:fontRef>
+        </p:style>
+      </p:cxnSp>
+      <p:sp>
+        <p:nvSpPr>
+          <p:cNvPr id="203" name="TextBox 202">
+            <a:extLst>
+              <a:ext uri="{FF2B5EF4-FFF2-40B4-BE49-F238E27FC236}">
+                <a16:creationId xmlns:a16="http://schemas.microsoft.com/office/drawing/2014/main" id="{DA9609B9-6A83-4FA2-B9BD-E5F98B1906F8}"/>
+              </a:ext>
+            </a:extLst>
+          </p:cNvPr>
+          <p:cNvSpPr txBox="1"/>
+          <p:nvPr/>
+        </p:nvSpPr>
+        <p:spPr>
+          <a:xfrm>
+            <a:off x="38807628" y="8023673"/>
+            <a:ext cx="3304091" cy="400110"/>
+          </a:xfrm>
+          <a:prstGeom prst="rect">
+            <a:avLst/>
+          </a:prstGeom>
+          <a:solidFill>
+            <a:schemeClr val="bg1"/>
+          </a:solidFill>
+          <a:ln>
+            <a:solidFill>
+              <a:schemeClr val="tx2">
+                <a:lumMod val="60000"/>
+                <a:lumOff val="40000"/>
+              </a:schemeClr>
+            </a:solidFill>
+          </a:ln>
+        </p:spPr>
+        <p:txBody>
+          <a:bodyPr wrap="square" rtlCol="0">
+            <a:spAutoFit/>
+          </a:bodyPr>
+          <a:lstStyle/>
+          <a:p>
+            <a:r>
+              <a:rPr lang="en-US" sz="2000" dirty="0">
+                <a:solidFill>
+                  <a:srgbClr val="FF0000"/>
+                </a:solidFill>
+              </a:rPr>
+              <a:t>Copy result data to clipboard</a:t>
+            </a:r>
+          </a:p>
+        </p:txBody>
+      </p:sp>
+      <p:sp>
+        <p:nvSpPr>
+          <p:cNvPr id="204" name="TextBox 203">
+            <a:extLst>
+              <a:ext uri="{FF2B5EF4-FFF2-40B4-BE49-F238E27FC236}">
+                <a16:creationId xmlns:a16="http://schemas.microsoft.com/office/drawing/2014/main" id="{995AA3DF-9003-4E04-BBA9-3560845F72F7}"/>
+              </a:ext>
+            </a:extLst>
+          </p:cNvPr>
+          <p:cNvSpPr txBox="1"/>
+          <p:nvPr/>
+        </p:nvSpPr>
+        <p:spPr>
+          <a:xfrm>
+            <a:off x="38825484" y="8521810"/>
+            <a:ext cx="3286235" cy="406030"/>
+          </a:xfrm>
+          <a:prstGeom prst="rect">
+            <a:avLst/>
+          </a:prstGeom>
+          <a:solidFill>
+            <a:schemeClr val="bg1"/>
+          </a:solidFill>
+          <a:ln>
+            <a:solidFill>
+              <a:schemeClr val="tx2">
+                <a:lumMod val="60000"/>
+                <a:lumOff val="40000"/>
+              </a:schemeClr>
+            </a:solidFill>
+          </a:ln>
+        </p:spPr>
+        <p:txBody>
+          <a:bodyPr wrap="square" rtlCol="0">
+            <a:spAutoFit/>
+          </a:bodyPr>
+          <a:lstStyle/>
+          <a:p>
+            <a:r>
+              <a:rPr lang="en-US" sz="2000" dirty="0">
+                <a:solidFill>
+                  <a:srgbClr val="FF0000"/>
+                </a:solidFill>
+              </a:rPr>
+              <a:t>Export result data to CSV</a:t>
+            </a:r>
+          </a:p>
+        </p:txBody>
+      </p:sp>
+      <p:sp>
+        <p:nvSpPr>
+          <p:cNvPr id="205" name="TextBox 204">
+            <a:extLst>
+              <a:ext uri="{FF2B5EF4-FFF2-40B4-BE49-F238E27FC236}">
+                <a16:creationId xmlns:a16="http://schemas.microsoft.com/office/drawing/2014/main" id="{17562840-F675-4869-A9B7-E1F2A91CBC63}"/>
+              </a:ext>
+            </a:extLst>
+          </p:cNvPr>
+          <p:cNvSpPr txBox="1"/>
+          <p:nvPr/>
+        </p:nvSpPr>
+        <p:spPr>
+          <a:xfrm>
+            <a:off x="38825484" y="9031786"/>
+            <a:ext cx="3286235" cy="400110"/>
+          </a:xfrm>
+          <a:prstGeom prst="rect">
+            <a:avLst/>
+          </a:prstGeom>
+          <a:solidFill>
+            <a:schemeClr val="bg1"/>
+          </a:solidFill>
+          <a:ln>
+            <a:solidFill>
+              <a:schemeClr val="tx2">
+                <a:lumMod val="60000"/>
+                <a:lumOff val="40000"/>
+              </a:schemeClr>
+            </a:solidFill>
+          </a:ln>
+        </p:spPr>
+        <p:txBody>
+          <a:bodyPr wrap="square" rtlCol="0">
+            <a:spAutoFit/>
+          </a:bodyPr>
+          <a:lstStyle/>
+          <a:p>
+            <a:r>
+              <a:rPr lang="en-US" sz="2000" dirty="0">
+                <a:solidFill>
+                  <a:srgbClr val="FF0000"/>
+                </a:solidFill>
+              </a:rPr>
+              <a:t>Export result data to Excel</a:t>
+            </a:r>
+          </a:p>
+        </p:txBody>
+      </p:sp>
+      <p:sp>
+        <p:nvSpPr>
+          <p:cNvPr id="206" name="TextBox 205">
+            <a:extLst>
+              <a:ext uri="{FF2B5EF4-FFF2-40B4-BE49-F238E27FC236}">
+                <a16:creationId xmlns:a16="http://schemas.microsoft.com/office/drawing/2014/main" id="{883B6665-0C86-4836-9462-5D5A840D7FD3}"/>
+              </a:ext>
+            </a:extLst>
+          </p:cNvPr>
+          <p:cNvSpPr txBox="1"/>
+          <p:nvPr/>
+        </p:nvSpPr>
+        <p:spPr>
+          <a:xfrm>
+            <a:off x="38799351" y="9567780"/>
+            <a:ext cx="3312368" cy="400110"/>
+          </a:xfrm>
+          <a:prstGeom prst="rect">
+            <a:avLst/>
+          </a:prstGeom>
+          <a:solidFill>
+            <a:schemeClr val="bg1"/>
+          </a:solidFill>
+          <a:ln>
+            <a:solidFill>
+              <a:schemeClr val="tx2">
+                <a:lumMod val="60000"/>
+                <a:lumOff val="40000"/>
+              </a:schemeClr>
+            </a:solidFill>
+          </a:ln>
+        </p:spPr>
+        <p:txBody>
+          <a:bodyPr wrap="square" rtlCol="0">
+            <a:spAutoFit/>
+          </a:bodyPr>
+          <a:lstStyle/>
+          <a:p>
+            <a:r>
+              <a:rPr lang="en-US" sz="2000" dirty="0">
+                <a:solidFill>
+                  <a:srgbClr val="FF0000"/>
+                </a:solidFill>
+              </a:rPr>
+              <a:t>Export result data to PDF</a:t>
+            </a:r>
+          </a:p>
+        </p:txBody>
+      </p:sp>
+      <p:sp>
+        <p:nvSpPr>
+          <p:cNvPr id="207" name="TextBox 206">
+            <a:extLst>
+              <a:ext uri="{FF2B5EF4-FFF2-40B4-BE49-F238E27FC236}">
+                <a16:creationId xmlns:a16="http://schemas.microsoft.com/office/drawing/2014/main" id="{7E890F9F-7FE6-4BF1-B58C-D3BB5B9DD6F8}"/>
+              </a:ext>
+            </a:extLst>
+          </p:cNvPr>
+          <p:cNvSpPr txBox="1"/>
+          <p:nvPr/>
+        </p:nvSpPr>
+        <p:spPr>
+          <a:xfrm>
+            <a:off x="38810449" y="10099409"/>
+            <a:ext cx="3301270" cy="400110"/>
+          </a:xfrm>
+          <a:prstGeom prst="rect">
+            <a:avLst/>
+          </a:prstGeom>
+          <a:solidFill>
+            <a:schemeClr val="bg1"/>
+          </a:solidFill>
+          <a:ln>
+            <a:solidFill>
+              <a:schemeClr val="tx2">
+                <a:lumMod val="60000"/>
+                <a:lumOff val="40000"/>
+              </a:schemeClr>
+            </a:solidFill>
+          </a:ln>
+        </p:spPr>
+        <p:txBody>
+          <a:bodyPr wrap="square" rtlCol="0">
+            <a:spAutoFit/>
+          </a:bodyPr>
+          <a:lstStyle/>
+          <a:p>
+            <a:r>
+              <a:rPr lang="en-US" sz="2000" dirty="0">
+                <a:solidFill>
+                  <a:srgbClr val="FF0000"/>
+                </a:solidFill>
+              </a:rPr>
+              <a:t>Print result data</a:t>
+            </a:r>
+          </a:p>
+        </p:txBody>
+      </p:sp>
+      <p:cxnSp>
+        <p:nvCxnSpPr>
+          <p:cNvPr id="208" name="Straight Arrow Connector 207">
+            <a:extLst>
+              <a:ext uri="{FF2B5EF4-FFF2-40B4-BE49-F238E27FC236}">
+                <a16:creationId xmlns:a16="http://schemas.microsoft.com/office/drawing/2014/main" id="{8DF3D484-A5A1-4131-8038-E4B12F7DF5E9}"/>
+              </a:ext>
+            </a:extLst>
+          </p:cNvPr>
+          <p:cNvCxnSpPr>
+            <a:cxnSpLocks/>
+          </p:cNvCxnSpPr>
+          <p:nvPr/>
+        </p:nvCxnSpPr>
+        <p:spPr>
+          <a:xfrm>
+            <a:off x="37968744" y="10556104"/>
+            <a:ext cx="2087206" cy="916919"/>
+          </a:xfrm>
+          <a:prstGeom prst="straightConnector1">
+            <a:avLst/>
+          </a:prstGeom>
+          <a:ln>
+            <a:tailEnd type="triangle"/>
+          </a:ln>
+        </p:spPr>
+        <p:style>
+          <a:lnRef idx="1">
+            <a:schemeClr val="accent1"/>
+          </a:lnRef>
+          <a:fillRef idx="0">
+            <a:schemeClr val="accent1"/>
+          </a:fillRef>
+          <a:effectRef idx="0">
+            <a:schemeClr val="accent1"/>
+          </a:effectRef>
+          <a:fontRef idx="minor">
+            <a:schemeClr val="tx1"/>
+          </a:fontRef>
+        </p:style>
+      </p:cxnSp>
+      <p:sp>
+        <p:nvSpPr>
+          <p:cNvPr id="209" name="TextBox 208">
+            <a:extLst>
+              <a:ext uri="{FF2B5EF4-FFF2-40B4-BE49-F238E27FC236}">
+                <a16:creationId xmlns:a16="http://schemas.microsoft.com/office/drawing/2014/main" id="{EB93FA7E-02A3-4F9C-A719-3C260151D8E4}"/>
+              </a:ext>
+            </a:extLst>
+          </p:cNvPr>
+          <p:cNvSpPr txBox="1"/>
+          <p:nvPr/>
+        </p:nvSpPr>
+        <p:spPr>
+          <a:xfrm>
+            <a:off x="40051953" y="11281112"/>
+            <a:ext cx="1531218" cy="400110"/>
+          </a:xfrm>
+          <a:prstGeom prst="rect">
+            <a:avLst/>
+          </a:prstGeom>
+          <a:solidFill>
+            <a:schemeClr val="bg1"/>
+          </a:solidFill>
+          <a:ln>
+            <a:solidFill>
+              <a:schemeClr val="tx2">
+                <a:lumMod val="60000"/>
+                <a:lumOff val="40000"/>
+              </a:schemeClr>
+            </a:solidFill>
+          </a:ln>
+        </p:spPr>
+        <p:txBody>
+          <a:bodyPr wrap="square" rtlCol="0">
+            <a:spAutoFit/>
+          </a:bodyPr>
+          <a:lstStyle/>
+          <a:p>
+            <a:r>
+              <a:rPr lang="en-US" sz="2000" dirty="0">
+                <a:solidFill>
+                  <a:srgbClr val="FF0000"/>
+                </a:solidFill>
+              </a:rPr>
+              <a:t>Search data</a:t>
+            </a:r>
+          </a:p>
+        </p:txBody>
+      </p:sp>
+      <p:sp>
+        <p:nvSpPr>
+          <p:cNvPr id="210" name="Right Brace 209">
+            <a:extLst>
+              <a:ext uri="{FF2B5EF4-FFF2-40B4-BE49-F238E27FC236}">
+                <a16:creationId xmlns:a16="http://schemas.microsoft.com/office/drawing/2014/main" id="{EE4689BD-4A7B-4846-9DF6-669FE95F38D2}"/>
+              </a:ext>
+            </a:extLst>
+          </p:cNvPr>
+          <p:cNvSpPr/>
+          <p:nvPr/>
+        </p:nvSpPr>
+        <p:spPr>
+          <a:xfrm flipV="1">
+            <a:off x="36307537" y="5488534"/>
+            <a:ext cx="154636" cy="4216200"/>
+          </a:xfrm>
+          <a:prstGeom prst="rightBrace">
+            <a:avLst>
+              <a:gd name="adj1" fmla="val 8333"/>
+              <a:gd name="adj2" fmla="val 49644"/>
+            </a:avLst>
+          </a:prstGeom>
+        </p:spPr>
+        <p:style>
+          <a:lnRef idx="1">
+            <a:schemeClr val="accent1"/>
+          </a:lnRef>
+          <a:fillRef idx="0">
+            <a:schemeClr val="accent1"/>
+          </a:fillRef>
+          <a:effectRef idx="0">
+            <a:schemeClr val="accent1"/>
+          </a:effectRef>
+          <a:fontRef idx="minor">
+            <a:schemeClr val="tx1"/>
+          </a:fontRef>
+        </p:style>
+        <p:txBody>
+          <a:bodyPr rtlCol="0" anchor="ctr"/>
+          <a:lstStyle/>
+          <a:p>
+            <a:pPr algn="ctr"/>
+            <a:endParaRPr lang="en-US"/>
+          </a:p>
+        </p:txBody>
+      </p:sp>
+      <p:sp>
+        <p:nvSpPr>
+          <p:cNvPr id="211" name="Right Brace 210">
+            <a:extLst>
+              <a:ext uri="{FF2B5EF4-FFF2-40B4-BE49-F238E27FC236}">
+                <a16:creationId xmlns:a16="http://schemas.microsoft.com/office/drawing/2014/main" id="{A241B7E6-F374-456F-A0B9-1685EA48931D}"/>
+              </a:ext>
+            </a:extLst>
+          </p:cNvPr>
+          <p:cNvSpPr/>
+          <p:nvPr/>
+        </p:nvSpPr>
+        <p:spPr>
+          <a:xfrm rot="10800000">
+            <a:off x="38467777" y="8008815"/>
+            <a:ext cx="285752" cy="2460422"/>
+          </a:xfrm>
+          <a:prstGeom prst="rightBrace">
+            <a:avLst/>
+          </a:prstGeom>
+        </p:spPr>
+        <p:style>
+          <a:lnRef idx="1">
+            <a:schemeClr val="accent1"/>
+          </a:lnRef>
+          <a:fillRef idx="0">
+            <a:schemeClr val="accent1"/>
+          </a:fillRef>
+          <a:effectRef idx="0">
+            <a:schemeClr val="accent1"/>
+          </a:effectRef>
+          <a:fontRef idx="minor">
+            <a:schemeClr val="tx1"/>
+          </a:fontRef>
+        </p:style>
+        <p:txBody>
+          <a:bodyPr rtlCol="0" anchor="ctr"/>
+          <a:lstStyle/>
+          <a:p>
+            <a:pPr algn="ctr"/>
+            <a:endParaRPr lang="en-US"/>
+          </a:p>
+        </p:txBody>
+      </p:sp>
+      <p:cxnSp>
+        <p:nvCxnSpPr>
+          <p:cNvPr id="213" name="Straight Arrow Connector 212">
+            <a:extLst>
+              <a:ext uri="{FF2B5EF4-FFF2-40B4-BE49-F238E27FC236}">
+                <a16:creationId xmlns:a16="http://schemas.microsoft.com/office/drawing/2014/main" id="{6FB1E967-501B-45E6-9AB8-5B94CABD26E1}"/>
+              </a:ext>
+            </a:extLst>
+          </p:cNvPr>
+          <p:cNvCxnSpPr>
+            <a:cxnSpLocks/>
+          </p:cNvCxnSpPr>
+          <p:nvPr/>
+        </p:nvCxnSpPr>
+        <p:spPr>
+          <a:xfrm>
+            <a:off x="38061556" y="11306406"/>
+            <a:ext cx="1990397" cy="856220"/>
+          </a:xfrm>
+          <a:prstGeom prst="straightConnector1">
+            <a:avLst/>
+          </a:prstGeom>
+          <a:ln>
+            <a:tailEnd type="triangle"/>
+          </a:ln>
+        </p:spPr>
+        <p:style>
+          <a:lnRef idx="1">
+            <a:schemeClr val="accent1"/>
+          </a:lnRef>
+          <a:fillRef idx="0">
+            <a:schemeClr val="accent1"/>
+          </a:fillRef>
+          <a:effectRef idx="0">
+            <a:schemeClr val="accent1"/>
+          </a:effectRef>
+          <a:fontRef idx="minor">
+            <a:schemeClr val="tx1"/>
+          </a:fontRef>
+        </p:style>
+      </p:cxnSp>
+      <p:sp>
+        <p:nvSpPr>
+          <p:cNvPr id="214" name="TextBox 213">
+            <a:extLst>
+              <a:ext uri="{FF2B5EF4-FFF2-40B4-BE49-F238E27FC236}">
+                <a16:creationId xmlns:a16="http://schemas.microsoft.com/office/drawing/2014/main" id="{35A90C18-06CA-435C-8FAC-83B9EC7396F7}"/>
+              </a:ext>
+            </a:extLst>
+          </p:cNvPr>
+          <p:cNvSpPr txBox="1"/>
+          <p:nvPr/>
+        </p:nvSpPr>
+        <p:spPr>
+          <a:xfrm>
+            <a:off x="40048534" y="11943587"/>
+            <a:ext cx="1531218" cy="400110"/>
+          </a:xfrm>
+          <a:prstGeom prst="rect">
+            <a:avLst/>
+          </a:prstGeom>
+          <a:solidFill>
+            <a:schemeClr val="bg1"/>
+          </a:solidFill>
+          <a:ln>
+            <a:solidFill>
+              <a:schemeClr val="tx2">
+                <a:lumMod val="60000"/>
+                <a:lumOff val="40000"/>
+              </a:schemeClr>
+            </a:solidFill>
+          </a:ln>
+        </p:spPr>
+        <p:txBody>
+          <a:bodyPr wrap="square" rtlCol="0">
+            <a:spAutoFit/>
+          </a:bodyPr>
+          <a:lstStyle/>
+          <a:p>
+            <a:r>
+              <a:rPr lang="en-US" sz="2000" dirty="0">
+                <a:solidFill>
+                  <a:srgbClr val="FF0000"/>
+                </a:solidFill>
+              </a:rPr>
+              <a:t>Result data</a:t>
+            </a:r>
+          </a:p>
+        </p:txBody>
+      </p:sp>
+      <p:cxnSp>
+        <p:nvCxnSpPr>
+          <p:cNvPr id="86" name="Straight Arrow Connector 85">
+            <a:extLst>
+              <a:ext uri="{FF2B5EF4-FFF2-40B4-BE49-F238E27FC236}">
+                <a16:creationId xmlns:a16="http://schemas.microsoft.com/office/drawing/2014/main" id="{4BBB2482-91CA-4B70-8796-F80C517369E4}"/>
+              </a:ext>
+            </a:extLst>
+          </p:cNvPr>
+          <p:cNvCxnSpPr>
+            <a:cxnSpLocks/>
+          </p:cNvCxnSpPr>
+          <p:nvPr/>
+        </p:nvCxnSpPr>
+        <p:spPr>
+          <a:xfrm flipV="1">
+            <a:off x="38456699" y="9231842"/>
+            <a:ext cx="0" cy="645360"/>
+          </a:xfrm>
+          <a:prstGeom prst="straightConnector1">
+            <a:avLst/>
+          </a:prstGeom>
+          <a:ln>
+            <a:tailEnd type="triangle"/>
+          </a:ln>
+        </p:spPr>
+        <p:style>
+          <a:lnRef idx="1">
+            <a:schemeClr val="accent1"/>
+          </a:lnRef>
+          <a:fillRef idx="0">
+            <a:schemeClr val="accent1"/>
+          </a:fillRef>
+          <a:effectRef idx="0">
+            <a:schemeClr val="accent1"/>
+          </a:effectRef>
+          <a:fontRef idx="minor">
+            <a:schemeClr val="tx1"/>
+          </a:fontRef>
+        </p:style>
+      </p:cxnSp>
+      <p:sp>
+        <p:nvSpPr>
+          <p:cNvPr id="231" name="Right Brace 230">
+            <a:extLst>
+              <a:ext uri="{FF2B5EF4-FFF2-40B4-BE49-F238E27FC236}">
+                <a16:creationId xmlns:a16="http://schemas.microsoft.com/office/drawing/2014/main" id="{799F21F1-D92E-4AEC-8907-6E35D2527FE8}"/>
+              </a:ext>
+            </a:extLst>
+          </p:cNvPr>
+          <p:cNvSpPr/>
+          <p:nvPr/>
+        </p:nvSpPr>
+        <p:spPr>
+          <a:xfrm rot="16200000">
+            <a:off x="31514199" y="8789868"/>
+            <a:ext cx="285752" cy="2460422"/>
+          </a:xfrm>
+          <a:prstGeom prst="rightBrace">
+            <a:avLst/>
+          </a:prstGeom>
+        </p:spPr>
+        <p:style>
+          <a:lnRef idx="1">
+            <a:schemeClr val="accent1"/>
+          </a:lnRef>
+          <a:fillRef idx="0">
+            <a:schemeClr val="accent1"/>
+          </a:fillRef>
+          <a:effectRef idx="0">
+            <a:schemeClr val="accent1"/>
+          </a:effectRef>
+          <a:fontRef idx="minor">
+            <a:schemeClr val="tx1"/>
+          </a:fontRef>
+        </p:style>
+        <p:txBody>
+          <a:bodyPr rtlCol="0" anchor="ctr"/>
+          <a:lstStyle/>
+          <a:p>
+            <a:pPr algn="ctr"/>
+            <a:endParaRPr lang="en-US"/>
+          </a:p>
+        </p:txBody>
+      </p:sp>
+      <p:cxnSp>
+        <p:nvCxnSpPr>
+          <p:cNvPr id="1049" name="Straight Connector 1048">
+            <a:extLst>
+              <a:ext uri="{FF2B5EF4-FFF2-40B4-BE49-F238E27FC236}">
+                <a16:creationId xmlns:a16="http://schemas.microsoft.com/office/drawing/2014/main" id="{F4E27ED7-01DD-4046-B9B5-EB7C07B1C936}"/>
+              </a:ext>
+            </a:extLst>
+          </p:cNvPr>
+          <p:cNvCxnSpPr>
+            <a:stCxn id="231" idx="1"/>
+          </p:cNvCxnSpPr>
+          <p:nvPr/>
+        </p:nvCxnSpPr>
+        <p:spPr>
+          <a:xfrm flipV="1">
+            <a:off x="31657075" y="9877202"/>
+            <a:ext cx="6799624" cy="1"/>
+          </a:xfrm>
+          <a:prstGeom prst="line">
+            <a:avLst/>
+          </a:prstGeom>
+        </p:spPr>
+        <p:style>
+          <a:lnRef idx="1">
+            <a:schemeClr val="accent1"/>
+          </a:lnRef>
+          <a:fillRef idx="0">
+            <a:schemeClr val="accent1"/>
+          </a:fillRef>
+          <a:effectRef idx="0">
+            <a:schemeClr val="accent1"/>
+          </a:effectRef>
+          <a:fontRef idx="minor">
+            <a:schemeClr val="tx1"/>
+          </a:fontRef>
+        </p:style>
+      </p:cxnSp>
+      <p:sp>
+        <p:nvSpPr>
+          <p:cNvPr id="1051" name="Rectangle 1050">
+            <a:extLst>
+              <a:ext uri="{FF2B5EF4-FFF2-40B4-BE49-F238E27FC236}">
+                <a16:creationId xmlns:a16="http://schemas.microsoft.com/office/drawing/2014/main" id="{CE74AD9A-2470-414E-883D-CF8F76FD80A5}"/>
+              </a:ext>
+            </a:extLst>
+          </p:cNvPr>
+          <p:cNvSpPr/>
+          <p:nvPr/>
+        </p:nvSpPr>
+        <p:spPr>
+          <a:xfrm>
+            <a:off x="7889511" y="26338947"/>
+            <a:ext cx="2351130" cy="391947"/>
+          </a:xfrm>
+          <a:prstGeom prst="rect">
+            <a:avLst/>
+          </a:prstGeom>
+          <a:solidFill>
+            <a:schemeClr val="bg1"/>
+          </a:solidFill>
+          <a:ln>
+            <a:noFill/>
+          </a:ln>
+        </p:spPr>
+        <p:style>
+          <a:lnRef idx="2">
+            <a:schemeClr val="accent1">
+              <a:shade val="50000"/>
+            </a:schemeClr>
+          </a:lnRef>
+          <a:fillRef idx="1">
+            <a:schemeClr val="accent1"/>
+          </a:fillRef>
+          <a:effectRef idx="0">
+            <a:schemeClr val="accent1"/>
+          </a:effectRef>
+          <a:fontRef idx="minor">
+            <a:schemeClr val="lt1"/>
+          </a:fontRef>
+        </p:style>
+        <p:txBody>
+          <a:bodyPr rtlCol="0" anchor="ctr"/>
+          <a:lstStyle/>
+          <a:p>
+            <a:pPr algn="ctr"/>
+            <a:r>
+              <a:rPr lang="en-US" sz="1300" dirty="0">
+                <a:solidFill>
+                  <a:schemeClr val="tx1"/>
+                </a:solidFill>
+                <a:latin typeface="Times New Roman" panose="02020603050405020304" pitchFamily="18" charset="0"/>
+                <a:cs typeface="Times New Roman" panose="02020603050405020304" pitchFamily="18" charset="0"/>
+              </a:rPr>
+              <a:t>(Restful API, Slim Framework)</a:t>
+            </a:r>
+          </a:p>
+        </p:txBody>
+      </p:sp>
     </p:spTree>
     <p:extLst>
       <p:ext uri="{BB962C8B-B14F-4D97-AF65-F5344CB8AC3E}">

</xml_diff>